<commit_message>
Bugfixes, extensions and layouting after Monday morning session
</commit_message>
<xml_diff>
--- a/2017/recap_and_warmup_slides.pptx
+++ b/2017/recap_and_warmup_slides.pptx
@@ -5,10 +5,10 @@
     <p:sldMasterId id="2147483650" r:id="rId1"/>
   </p:sldMasterIdLst>
   <p:notesMasterIdLst>
-    <p:notesMasterId r:id="rId12"/>
+    <p:notesMasterId r:id="rId13"/>
   </p:notesMasterIdLst>
   <p:handoutMasterIdLst>
-    <p:handoutMasterId r:id="rId13"/>
+    <p:handoutMasterId r:id="rId14"/>
   </p:handoutMasterIdLst>
   <p:sldIdLst>
     <p:sldId id="454" r:id="rId2"/>
@@ -18,9 +18,10 @@
     <p:sldId id="465" r:id="rId6"/>
     <p:sldId id="474" r:id="rId7"/>
     <p:sldId id="479" r:id="rId8"/>
-    <p:sldId id="480" r:id="rId9"/>
-    <p:sldId id="481" r:id="rId10"/>
-    <p:sldId id="471" r:id="rId11"/>
+    <p:sldId id="483" r:id="rId9"/>
+    <p:sldId id="480" r:id="rId10"/>
+    <p:sldId id="481" r:id="rId11"/>
+    <p:sldId id="471" r:id="rId12"/>
   </p:sldIdLst>
   <p:sldSz cx="9144000" cy="6858000" type="screen4x3"/>
   <p:notesSz cx="7099300" cy="10234613"/>
@@ -201,6 +202,7 @@
             <p14:sldId id="465"/>
             <p14:sldId id="474"/>
             <p14:sldId id="479"/>
+            <p14:sldId id="483"/>
             <p14:sldId id="480"/>
             <p14:sldId id="481"/>
             <p14:sldId id="471"/>
@@ -1933,7 +1935,46 @@
               <a:buNone/>
             </a:pPr>
             <a:r>
-              <a:rPr lang="de-DE" altLang="de-DE" i="0" dirty="0" err="1" smtClean="0">
+              <a:rPr lang="de-DE" altLang="de-DE" i="0" smtClean="0">
+                <a:latin typeface="Times New Roman" pitchFamily="16" charset="0"/>
+              </a:rPr>
+              <a:t>*iP; ist eine</a:t>
+            </a:r>
+            <a:r>
+              <a:rPr lang="de-DE" altLang="de-DE" i="0" baseline="0" smtClean="0">
+                <a:latin typeface="Times New Roman" pitchFamily="16" charset="0"/>
+              </a:rPr>
+              <a:t> Referenz auf die Speicherzelle von i.</a:t>
+            </a:r>
+          </a:p>
+          <a:p>
+            <a:pPr marL="0" indent="0">
+              <a:buFontTx/>
+              <a:buNone/>
+            </a:pPr>
+            <a:r>
+              <a:rPr lang="de-DE" altLang="de-DE" i="0" baseline="0" smtClean="0">
+                <a:latin typeface="Times New Roman" pitchFamily="16" charset="0"/>
+              </a:rPr>
+              <a:t>Ansonsten wäre folgende Zuweisung nicht möglich: "int &amp;iR = *iP"</a:t>
+            </a:r>
+          </a:p>
+          <a:p>
+            <a:pPr marL="0" indent="0">
+              <a:buFontTx/>
+              <a:buNone/>
+            </a:pPr>
+            <a:endParaRPr lang="de-DE" altLang="de-DE" i="0" smtClean="0">
+              <a:latin typeface="Times New Roman" pitchFamily="16" charset="0"/>
+            </a:endParaRPr>
+          </a:p>
+          <a:p>
+            <a:pPr marL="0" indent="0">
+              <a:buFontTx/>
+              <a:buNone/>
+            </a:pPr>
+            <a:r>
+              <a:rPr lang="de-DE" altLang="de-DE" i="0" smtClean="0">
                 <a:latin typeface="Times New Roman" pitchFamily="16" charset="0"/>
               </a:rPr>
               <a:t>Asterisk</a:t>
@@ -1954,31 +1995,49 @@
               <a:rPr lang="de-DE" altLang="de-DE" i="0" dirty="0" smtClean="0">
                 <a:latin typeface="Times New Roman" pitchFamily="16" charset="0"/>
               </a:rPr>
-              <a:t> bei Pointern, (ii) Als </a:t>
-            </a:r>
-            <a:r>
-              <a:rPr lang="de-DE" altLang="de-DE" i="0" dirty="0" err="1" smtClean="0">
+              <a:t> bei Pointern, (ii) </a:t>
+            </a:r>
+            <a:r>
+              <a:rPr lang="de-DE" altLang="de-DE" i="0" smtClean="0">
+                <a:latin typeface="Times New Roman" pitchFamily="16" charset="0"/>
+              </a:rPr>
+              <a:t>Als </a:t>
+            </a:r>
+            <a:r>
+              <a:rPr lang="de-DE" altLang="de-DE" i="0" smtClean="0">
                 <a:latin typeface="Times New Roman" pitchFamily="16" charset="0"/>
               </a:rPr>
               <a:t>Dereferenzierungs</a:t>
             </a:r>
             <a:r>
-              <a:rPr lang="de-DE" altLang="de-DE" b="1" i="0" dirty="0" err="1" smtClean="0">
+              <a:rPr lang="de-DE" altLang="de-DE" b="1" i="0" smtClean="0">
                 <a:latin typeface="Times New Roman" pitchFamily="16" charset="0"/>
               </a:rPr>
               <a:t>operator</a:t>
             </a:r>
-            <a:endParaRPr lang="de-DE" altLang="de-DE" b="1" i="0" dirty="0" smtClean="0">
-              <a:latin typeface="Times New Roman" pitchFamily="16" charset="0"/>
-            </a:endParaRPr>
+            <a:r>
+              <a:rPr lang="de-DE" altLang="de-DE" b="0" i="0" smtClean="0">
+                <a:latin typeface="Times New Roman" pitchFamily="16" charset="0"/>
+              </a:rPr>
+              <a:t>, (iii) Multiplikation</a:t>
+            </a:r>
           </a:p>
           <a:p>
             <a:pPr marL="0" indent="0">
               <a:buFontTx/>
               <a:buNone/>
             </a:pPr>
-            <a:r>
-              <a:rPr lang="de-DE" altLang="de-DE" i="0" dirty="0" err="1" smtClean="0">
+            <a:endParaRPr lang="de-DE" altLang="de-DE" b="1" i="0" dirty="0" smtClean="0">
+              <a:latin typeface="Times New Roman" pitchFamily="16" charset="0"/>
+            </a:endParaRPr>
+          </a:p>
+          <a:p>
+            <a:pPr marL="0" indent="0">
+              <a:buFontTx/>
+              <a:buNone/>
+            </a:pPr>
+            <a:r>
+              <a:rPr lang="de-DE" altLang="de-DE" i="0" smtClean="0">
                 <a:latin typeface="Times New Roman" pitchFamily="16" charset="0"/>
               </a:rPr>
               <a:t>Ampersand</a:t>
@@ -2005,13 +2064,31 @@
               <a:rPr lang="de-DE" altLang="de-DE" i="0" baseline="0" dirty="0" smtClean="0">
                 <a:latin typeface="Times New Roman" pitchFamily="16" charset="0"/>
               </a:rPr>
-              <a:t> Referenzen, (ii) Als Adress</a:t>
-            </a:r>
-            <a:r>
-              <a:rPr lang="de-DE" altLang="de-DE" b="1" i="0" baseline="0" dirty="0" smtClean="0">
+              <a:t> Referenzen, (ii) </a:t>
+            </a:r>
+            <a:r>
+              <a:rPr lang="de-DE" altLang="de-DE" i="0" baseline="0" smtClean="0">
+                <a:latin typeface="Times New Roman" pitchFamily="16" charset="0"/>
+              </a:rPr>
+              <a:t>Als </a:t>
+            </a:r>
+            <a:r>
+              <a:rPr lang="de-DE" altLang="de-DE" i="0" baseline="0" smtClean="0">
+                <a:latin typeface="Times New Roman" pitchFamily="16" charset="0"/>
+              </a:rPr>
+              <a:t>Adress</a:t>
+            </a:r>
+            <a:r>
+              <a:rPr lang="de-DE" altLang="de-DE" b="1" i="0" baseline="0" smtClean="0">
                 <a:latin typeface="Times New Roman" pitchFamily="16" charset="0"/>
               </a:rPr>
               <a:t>operator</a:t>
+            </a:r>
+            <a:r>
+              <a:rPr lang="de-DE" altLang="de-DE" b="0" i="0" baseline="0" smtClean="0">
+                <a:latin typeface="Times New Roman" pitchFamily="16" charset="0"/>
+              </a:rPr>
+              <a:t>, (iii) Bitweises Oder</a:t>
             </a:r>
             <a:endParaRPr lang="de-DE" altLang="de-DE" b="1" i="0" dirty="0" smtClean="0">
               <a:latin typeface="Times New Roman" pitchFamily="16" charset="0"/>
@@ -3712,7 +3789,7 @@
                 <a:latin typeface="Stafford" pitchFamily="2" charset="0"/>
               </a:rPr>
               <a:pPr eaLnBrk="1" hangingPunct="1"/>
-              <a:t>8</a:t>
+              <a:t>9</a:t>
             </a:fld>
             <a:endParaRPr lang="en-US" altLang="de-DE" smtClean="0">
               <a:solidFill>
@@ -8174,7 +8251,7 @@
           <a:graphicData uri="http://schemas.openxmlformats.org/presentationml/2006/ole">
             <mc:AlternateContent xmlns:mc="http://schemas.openxmlformats.org/markup-compatibility/2006">
               <mc:Choice xmlns:v="urn:schemas-microsoft-com:vml" Requires="v">
-                <p:oleObj spid="_x0000_s1968" r:id="rId16" imgW="1038370" imgH="980952" progId="">
+                <p:oleObj spid="_x0000_s1978" r:id="rId16" imgW="1038370" imgH="980952" progId="">
                   <p:embed/>
                 </p:oleObj>
               </mc:Choice>
@@ -8612,7 +8689,7 @@
                 </a:lnSpc>
                 <a:defRPr/>
               </a:pPr>
-              <a:t>01.09.2017</a:t>
+              <a:t>04.09.2017</a:t>
             </a:fld>
             <a:r>
               <a:rPr lang="en-GB" altLang="de-DE" sz="1000" smtClean="0">
@@ -9172,6 +9249,194 @@
           <a:bodyPr/>
           <a:lstStyle/>
           <a:p>
+            <a:pPr>
+              <a:tabLst>
+                <a:tab pos="2155825" algn="l"/>
+              </a:tabLst>
+            </a:pPr>
+            <a:r>
+              <a:rPr lang="de-DE" altLang="de-DE"/>
+              <a:t>Tag 6: </a:t>
+            </a:r>
+            <a:r>
+              <a:rPr lang="en-US"/>
+              <a:t>Hinweise zur Klausur</a:t>
+            </a:r>
+          </a:p>
+        </p:txBody>
+      </p:sp>
+      <p:sp>
+        <p:nvSpPr>
+          <p:cNvPr id="3" name="Inhaltsplatzhalter 2"/>
+          <p:cNvSpPr>
+            <a:spLocks noGrp="1"/>
+          </p:cNvSpPr>
+          <p:nvPr>
+            <p:ph idx="1"/>
+          </p:nvPr>
+        </p:nvSpPr>
+        <p:spPr/>
+        <p:txBody>
+          <a:bodyPr/>
+          <a:lstStyle/>
+          <a:p>
+            <a:pPr>
+              <a:tabLst>
+                <a:tab pos="2155825" algn="l"/>
+              </a:tabLst>
+            </a:pPr>
+            <a:r>
+              <a:rPr lang="en-US" b="1"/>
+              <a:t>Hinweise zur Klausur</a:t>
+            </a:r>
+          </a:p>
+          <a:p>
+            <a:pPr lvl="1">
+              <a:tabLst>
+                <a:tab pos="2155825" algn="l"/>
+              </a:tabLst>
+            </a:pPr>
+            <a:r>
+              <a:rPr lang="en-US"/>
+              <a:t>Wir gehen davon aus, dass </a:t>
+            </a:r>
+            <a:r>
+              <a:rPr lang="en-US" b="1"/>
+              <a:t>alle nicht-optionalen Übungen </a:t>
+            </a:r>
+            <a:r>
+              <a:rPr lang="en-US"/>
+              <a:t>der </a:t>
+            </a:r>
+            <a:r>
+              <a:rPr lang="en-US" b="1"/>
+              <a:t>Tage 1-4 </a:t>
+            </a:r>
+            <a:r>
+              <a:rPr lang="en-US"/>
+              <a:t>bearbeitet wurden </a:t>
+            </a:r>
+            <a:r>
+              <a:rPr lang="en-US" b="1"/>
+              <a:t>und</a:t>
+            </a:r>
+            <a:r>
+              <a:rPr lang="en-US"/>
+              <a:t> alle Folien soweit verstanden wurden.</a:t>
+            </a:r>
+          </a:p>
+          <a:p>
+            <a:pPr lvl="1">
+              <a:tabLst>
+                <a:tab pos="2155825" algn="l"/>
+              </a:tabLst>
+            </a:pPr>
+            <a:r>
+              <a:rPr lang="en-US"/>
+              <a:t>Es wird ein </a:t>
+            </a:r>
+            <a:r>
+              <a:rPr lang="en-US" b="1"/>
+              <a:t>Codehandout</a:t>
+            </a:r>
+            <a:r>
+              <a:rPr lang="en-US"/>
+              <a:t> geben, in dem für bestimmte Funktionen/Datentypen/Methoden eine Beschreibung vorliegt.</a:t>
+            </a:r>
+          </a:p>
+          <a:p>
+            <a:pPr lvl="2">
+              <a:tabLst>
+                <a:tab pos="2155825" algn="l"/>
+              </a:tabLst>
+            </a:pPr>
+            <a:r>
+              <a:rPr lang="en-US"/>
+              <a:t>NICHT zu erwarten ist bspw. </a:t>
+            </a:r>
+            <a:r>
+              <a:rPr lang="en-US">
+                <a:latin typeface="Consolas" panose="020B0609020204030204" pitchFamily="49" charset="0"/>
+                <a:cs typeface="Consolas" panose="020B0609020204030204" pitchFamily="49" charset="0"/>
+              </a:rPr>
+              <a:t>std::vector&lt;T&gt;::push_back</a:t>
+            </a:r>
+          </a:p>
+          <a:p>
+            <a:pPr lvl="2">
+              <a:tabLst>
+                <a:tab pos="2155825" algn="l"/>
+              </a:tabLst>
+            </a:pPr>
+            <a:r>
+              <a:rPr lang="en-US"/>
+              <a:t>Zu erwarten ist bspw. </a:t>
+            </a:r>
+            <a:r>
+              <a:rPr lang="en-US">
+                <a:latin typeface="Consolas" panose="020B0609020204030204" pitchFamily="49" charset="0"/>
+                <a:cs typeface="Consolas" panose="020B0609020204030204" pitchFamily="49" charset="0"/>
+              </a:rPr>
+              <a:t>std::string::find</a:t>
+            </a:r>
+          </a:p>
+          <a:p>
+            <a:endParaRPr lang="en-US"/>
+          </a:p>
+        </p:txBody>
+      </p:sp>
+    </p:spTree>
+    <p:extLst>
+      <p:ext uri="{BB962C8B-B14F-4D97-AF65-F5344CB8AC3E}">
+        <p14:creationId xmlns:p14="http://schemas.microsoft.com/office/powerpoint/2010/main" val="3875772686"/>
+      </p:ext>
+    </p:extLst>
+  </p:cSld>
+  <p:clrMapOvr>
+    <a:masterClrMapping/>
+  </p:clrMapOvr>
+  <p:timing>
+    <p:tnLst>
+      <p:par>
+        <p:cTn id="1" dur="indefinite" restart="never" nodeType="tmRoot"/>
+      </p:par>
+    </p:tnLst>
+  </p:timing>
+</p:sld>
+</file>
+
+<file path=ppt/slides/slide11.xml><?xml version="1.0" encoding="utf-8"?>
+<p:sld xmlns:a="http://schemas.openxmlformats.org/drawingml/2006/main" xmlns:r="http://schemas.openxmlformats.org/officeDocument/2006/relationships" xmlns:p="http://schemas.openxmlformats.org/presentationml/2006/main">
+  <p:cSld>
+    <p:spTree>
+      <p:nvGrpSpPr>
+        <p:cNvPr id="1" name=""/>
+        <p:cNvGrpSpPr/>
+        <p:nvPr/>
+      </p:nvGrpSpPr>
+      <p:grpSpPr>
+        <a:xfrm>
+          <a:off x="0" y="0"/>
+          <a:ext cx="0" cy="0"/>
+          <a:chOff x="0" y="0"/>
+          <a:chExt cx="0" cy="0"/>
+        </a:xfrm>
+      </p:grpSpPr>
+      <p:sp>
+        <p:nvSpPr>
+          <p:cNvPr id="2" name="Titel 1"/>
+          <p:cNvSpPr>
+            <a:spLocks noGrp="1"/>
+          </p:cNvSpPr>
+          <p:nvPr>
+            <p:ph type="title"/>
+          </p:nvPr>
+        </p:nvSpPr>
+        <p:spPr/>
+        <p:txBody>
+          <a:bodyPr/>
+          <a:lstStyle/>
+          <a:p>
             <a:r>
               <a:rPr lang="en-US" smtClean="0"/>
               <a:t>Block 2</a:t>
@@ -9538,15 +9803,7 @@
           <a:p>
             <a:r>
               <a:rPr lang="en-US" smtClean="0"/>
-              <a:t>Tag </a:t>
-            </a:r>
-            <a:r>
-              <a:rPr lang="en-US" smtClean="0"/>
-              <a:t>2-Nachmittag</a:t>
-            </a:r>
-            <a:r>
-              <a:rPr lang="en-US" smtClean="0"/>
-              <a:t>: Anmerkungen</a:t>
+              <a:t>Tag 2-Nachmittag: Anmerkungen</a:t>
             </a:r>
             <a:endParaRPr lang="en-US" dirty="0"/>
           </a:p>
@@ -9571,8 +9828,49 @@
           <a:p>
             <a:r>
               <a:rPr lang="en-US" b="1" smtClean="0"/>
+              <a:t>Orga</a:t>
+            </a:r>
+          </a:p>
+          <a:p>
+            <a:pPr marL="342900" indent="-342900">
+              <a:buFontTx/>
+              <a:buChar char="-"/>
+            </a:pPr>
+            <a:r>
+              <a:rPr lang="en-US" smtClean="0"/>
+              <a:t>Nächster Praktikumstag: </a:t>
+            </a:r>
+            <a:r>
+              <a:rPr lang="en-US" b="1" smtClean="0"/>
+              <a:t>Montag </a:t>
+            </a:r>
+            <a:r>
+              <a:rPr lang="en-US" b="1" smtClean="0">
+                <a:sym typeface="Wingdings" panose="05000000000000000000" pitchFamily="2" charset="2"/>
+              </a:rPr>
+              <a:t></a:t>
+            </a:r>
+            <a:endParaRPr lang="en-US" b="1" smtClean="0"/>
+          </a:p>
+          <a:p>
+            <a:endParaRPr lang="en-US" b="1"/>
+          </a:p>
+          <a:p>
+            <a:r>
+              <a:rPr lang="en-US" b="1" smtClean="0"/>
               <a:t>Änderungen</a:t>
             </a:r>
+          </a:p>
+          <a:p>
+            <a:pPr marL="342900" indent="-342900">
+              <a:buFontTx/>
+              <a:buChar char="-"/>
+            </a:pPr>
+            <a:r>
+              <a:rPr lang="en-US" b="1" smtClean="0"/>
+              <a:t>Bugfix für operator=</a:t>
+            </a:r>
+            <a:endParaRPr lang="en-US" smtClean="0"/>
           </a:p>
           <a:p>
             <a:pPr marL="692150" lvl="1" indent="-342900">
@@ -9580,23 +9878,12 @@
               <a:buChar char="-"/>
             </a:pPr>
             <a:r>
-              <a:rPr lang="en-US" b="1" smtClean="0"/>
-              <a:t>Bugfix für operator=</a:t>
-            </a:r>
-            <a:endParaRPr lang="en-US" smtClean="0"/>
-          </a:p>
-          <a:p>
-            <a:pPr marL="881063" lvl="2" indent="-342900">
-              <a:buFontTx/>
-              <a:buChar char="-"/>
-            </a:pPr>
-            <a:r>
               <a:rPr lang="en-US" smtClean="0"/>
               <a:t>Man benötigt einen Rückgabewert, sodass eine Verkettung möglich wird.</a:t>
             </a:r>
           </a:p>
           <a:p>
-            <a:pPr marL="881063" lvl="2" indent="-342900">
+            <a:pPr marL="692150" lvl="1" indent="-342900">
               <a:buFontTx/>
               <a:buChar char="-"/>
             </a:pPr>
@@ -9612,7 +9899,7 @@
                 <a:latin typeface="Consolas" panose="020B0609020204030204" pitchFamily="49" charset="0"/>
                 <a:cs typeface="Consolas" panose="020B0609020204030204" pitchFamily="49" charset="0"/>
               </a:rPr>
-              <a:t>C &amp;operator(const C &amp;other) { </a:t>
+              <a:t>C &amp;operator=(const C &amp;other) { </a:t>
             </a:r>
             <a:br>
               <a:rPr lang="en-US" smtClean="0">
@@ -9655,7 +9942,7 @@
             </a:r>
           </a:p>
           <a:p>
-            <a:pPr marL="881063" lvl="2" indent="-342900">
+            <a:pPr marL="692150" lvl="1" indent="-342900">
               <a:buFontTx/>
               <a:buChar char="-"/>
             </a:pPr>
@@ -9675,7 +9962,7 @@
             </a:r>
           </a:p>
           <a:p>
-            <a:pPr marL="692150" lvl="1" indent="-342900">
+            <a:pPr marL="342900" indent="-342900">
               <a:buFontTx/>
               <a:buChar char="-"/>
             </a:pPr>
@@ -9714,7 +10001,314 @@
   <p:timing>
     <p:tnLst>
       <p:par>
-        <p:cTn id="1" dur="indefinite" restart="never" nodeType="tmRoot"/>
+        <p:cTn id="1" dur="indefinite" restart="never" nodeType="tmRoot">
+          <p:childTnLst>
+            <p:seq concurrent="1" nextAc="seek">
+              <p:cTn id="2" dur="indefinite" nodeType="mainSeq">
+                <p:childTnLst>
+                  <p:par>
+                    <p:cTn id="3" fill="hold">
+                      <p:stCondLst>
+                        <p:cond delay="indefinite"/>
+                      </p:stCondLst>
+                      <p:childTnLst>
+                        <p:par>
+                          <p:cTn id="4" fill="hold">
+                            <p:stCondLst>
+                              <p:cond delay="0"/>
+                            </p:stCondLst>
+                            <p:childTnLst>
+                              <p:par>
+                                <p:cTn id="5" presetID="1" presetClass="entr" presetSubtype="0" fill="hold" nodeType="clickEffect">
+                                  <p:stCondLst>
+                                    <p:cond delay="0"/>
+                                  </p:stCondLst>
+                                  <p:childTnLst>
+                                    <p:set>
+                                      <p:cBhvr>
+                                        <p:cTn id="6" dur="1" fill="hold">
+                                          <p:stCondLst>
+                                            <p:cond delay="0"/>
+                                          </p:stCondLst>
+                                        </p:cTn>
+                                        <p:tgtEl>
+                                          <p:spTgt spid="8">
+                                            <p:txEl>
+                                              <p:pRg st="0" end="0"/>
+                                            </p:txEl>
+                                          </p:spTgt>
+                                        </p:tgtEl>
+                                        <p:attrNameLst>
+                                          <p:attrName>style.visibility</p:attrName>
+                                        </p:attrNameLst>
+                                      </p:cBhvr>
+                                      <p:to>
+                                        <p:strVal val="visible"/>
+                                      </p:to>
+                                    </p:set>
+                                  </p:childTnLst>
+                                </p:cTn>
+                              </p:par>
+                              <p:par>
+                                <p:cTn id="7" presetID="1" presetClass="entr" presetSubtype="0" fill="hold" nodeType="withEffect">
+                                  <p:stCondLst>
+                                    <p:cond delay="0"/>
+                                  </p:stCondLst>
+                                  <p:childTnLst>
+                                    <p:set>
+                                      <p:cBhvr>
+                                        <p:cTn id="8" dur="1" fill="hold">
+                                          <p:stCondLst>
+                                            <p:cond delay="0"/>
+                                          </p:stCondLst>
+                                        </p:cTn>
+                                        <p:tgtEl>
+                                          <p:spTgt spid="8">
+                                            <p:txEl>
+                                              <p:pRg st="1" end="1"/>
+                                            </p:txEl>
+                                          </p:spTgt>
+                                        </p:tgtEl>
+                                        <p:attrNameLst>
+                                          <p:attrName>style.visibility</p:attrName>
+                                        </p:attrNameLst>
+                                      </p:cBhvr>
+                                      <p:to>
+                                        <p:strVal val="visible"/>
+                                      </p:to>
+                                    </p:set>
+                                  </p:childTnLst>
+                                </p:cTn>
+                              </p:par>
+                            </p:childTnLst>
+                          </p:cTn>
+                        </p:par>
+                      </p:childTnLst>
+                    </p:cTn>
+                  </p:par>
+                  <p:par>
+                    <p:cTn id="9" fill="hold">
+                      <p:stCondLst>
+                        <p:cond delay="indefinite"/>
+                      </p:stCondLst>
+                      <p:childTnLst>
+                        <p:par>
+                          <p:cTn id="10" fill="hold">
+                            <p:stCondLst>
+                              <p:cond delay="0"/>
+                            </p:stCondLst>
+                            <p:childTnLst>
+                              <p:par>
+                                <p:cTn id="11" presetID="1" presetClass="entr" presetSubtype="0" fill="hold" nodeType="clickEffect">
+                                  <p:stCondLst>
+                                    <p:cond delay="0"/>
+                                  </p:stCondLst>
+                                  <p:childTnLst>
+                                    <p:set>
+                                      <p:cBhvr>
+                                        <p:cTn id="12" dur="1" fill="hold">
+                                          <p:stCondLst>
+                                            <p:cond delay="0"/>
+                                          </p:stCondLst>
+                                        </p:cTn>
+                                        <p:tgtEl>
+                                          <p:spTgt spid="8">
+                                            <p:txEl>
+                                              <p:pRg st="3" end="3"/>
+                                            </p:txEl>
+                                          </p:spTgt>
+                                        </p:tgtEl>
+                                        <p:attrNameLst>
+                                          <p:attrName>style.visibility</p:attrName>
+                                        </p:attrNameLst>
+                                      </p:cBhvr>
+                                      <p:to>
+                                        <p:strVal val="visible"/>
+                                      </p:to>
+                                    </p:set>
+                                  </p:childTnLst>
+                                </p:cTn>
+                              </p:par>
+                              <p:par>
+                                <p:cTn id="13" presetID="1" presetClass="entr" presetSubtype="0" fill="hold" nodeType="withEffect">
+                                  <p:stCondLst>
+                                    <p:cond delay="0"/>
+                                  </p:stCondLst>
+                                  <p:childTnLst>
+                                    <p:set>
+                                      <p:cBhvr>
+                                        <p:cTn id="14" dur="1" fill="hold">
+                                          <p:stCondLst>
+                                            <p:cond delay="0"/>
+                                          </p:stCondLst>
+                                        </p:cTn>
+                                        <p:tgtEl>
+                                          <p:spTgt spid="8">
+                                            <p:txEl>
+                                              <p:pRg st="4" end="4"/>
+                                            </p:txEl>
+                                          </p:spTgt>
+                                        </p:tgtEl>
+                                        <p:attrNameLst>
+                                          <p:attrName>style.visibility</p:attrName>
+                                        </p:attrNameLst>
+                                      </p:cBhvr>
+                                      <p:to>
+                                        <p:strVal val="visible"/>
+                                      </p:to>
+                                    </p:set>
+                                  </p:childTnLst>
+                                </p:cTn>
+                              </p:par>
+                              <p:par>
+                                <p:cTn id="15" presetID="1" presetClass="entr" presetSubtype="0" fill="hold" nodeType="withEffect">
+                                  <p:stCondLst>
+                                    <p:cond delay="0"/>
+                                  </p:stCondLst>
+                                  <p:childTnLst>
+                                    <p:set>
+                                      <p:cBhvr>
+                                        <p:cTn id="16" dur="1" fill="hold">
+                                          <p:stCondLst>
+                                            <p:cond delay="0"/>
+                                          </p:stCondLst>
+                                        </p:cTn>
+                                        <p:tgtEl>
+                                          <p:spTgt spid="8">
+                                            <p:txEl>
+                                              <p:pRg st="5" end="5"/>
+                                            </p:txEl>
+                                          </p:spTgt>
+                                        </p:tgtEl>
+                                        <p:attrNameLst>
+                                          <p:attrName>style.visibility</p:attrName>
+                                        </p:attrNameLst>
+                                      </p:cBhvr>
+                                      <p:to>
+                                        <p:strVal val="visible"/>
+                                      </p:to>
+                                    </p:set>
+                                  </p:childTnLst>
+                                </p:cTn>
+                              </p:par>
+                              <p:par>
+                                <p:cTn id="17" presetID="1" presetClass="entr" presetSubtype="0" fill="hold" nodeType="withEffect">
+                                  <p:stCondLst>
+                                    <p:cond delay="0"/>
+                                  </p:stCondLst>
+                                  <p:childTnLst>
+                                    <p:set>
+                                      <p:cBhvr>
+                                        <p:cTn id="18" dur="1" fill="hold">
+                                          <p:stCondLst>
+                                            <p:cond delay="0"/>
+                                          </p:stCondLst>
+                                        </p:cTn>
+                                        <p:tgtEl>
+                                          <p:spTgt spid="8">
+                                            <p:txEl>
+                                              <p:pRg st="6" end="6"/>
+                                            </p:txEl>
+                                          </p:spTgt>
+                                        </p:tgtEl>
+                                        <p:attrNameLst>
+                                          <p:attrName>style.visibility</p:attrName>
+                                        </p:attrNameLst>
+                                      </p:cBhvr>
+                                      <p:to>
+                                        <p:strVal val="visible"/>
+                                      </p:to>
+                                    </p:set>
+                                  </p:childTnLst>
+                                </p:cTn>
+                              </p:par>
+                              <p:par>
+                                <p:cTn id="19" presetID="1" presetClass="entr" presetSubtype="0" fill="hold" nodeType="withEffect">
+                                  <p:stCondLst>
+                                    <p:cond delay="0"/>
+                                  </p:stCondLst>
+                                  <p:childTnLst>
+                                    <p:set>
+                                      <p:cBhvr>
+                                        <p:cTn id="20" dur="1" fill="hold">
+                                          <p:stCondLst>
+                                            <p:cond delay="0"/>
+                                          </p:stCondLst>
+                                        </p:cTn>
+                                        <p:tgtEl>
+                                          <p:spTgt spid="8">
+                                            <p:txEl>
+                                              <p:pRg st="7" end="7"/>
+                                            </p:txEl>
+                                          </p:spTgt>
+                                        </p:tgtEl>
+                                        <p:attrNameLst>
+                                          <p:attrName>style.visibility</p:attrName>
+                                        </p:attrNameLst>
+                                      </p:cBhvr>
+                                      <p:to>
+                                        <p:strVal val="visible"/>
+                                      </p:to>
+                                    </p:set>
+                                  </p:childTnLst>
+                                </p:cTn>
+                              </p:par>
+                              <p:par>
+                                <p:cTn id="21" presetID="1" presetClass="entr" presetSubtype="0" fill="hold" nodeType="withEffect">
+                                  <p:stCondLst>
+                                    <p:cond delay="0"/>
+                                  </p:stCondLst>
+                                  <p:childTnLst>
+                                    <p:set>
+                                      <p:cBhvr>
+                                        <p:cTn id="22" dur="1" fill="hold">
+                                          <p:stCondLst>
+                                            <p:cond delay="0"/>
+                                          </p:stCondLst>
+                                        </p:cTn>
+                                        <p:tgtEl>
+                                          <p:spTgt spid="8">
+                                            <p:txEl>
+                                              <p:pRg st="8" end="8"/>
+                                            </p:txEl>
+                                          </p:spTgt>
+                                        </p:tgtEl>
+                                        <p:attrNameLst>
+                                          <p:attrName>style.visibility</p:attrName>
+                                        </p:attrNameLst>
+                                      </p:cBhvr>
+                                      <p:to>
+                                        <p:strVal val="visible"/>
+                                      </p:to>
+                                    </p:set>
+                                  </p:childTnLst>
+                                </p:cTn>
+                              </p:par>
+                            </p:childTnLst>
+                          </p:cTn>
+                        </p:par>
+                      </p:childTnLst>
+                    </p:cTn>
+                  </p:par>
+                </p:childTnLst>
+              </p:cTn>
+              <p:prevCondLst>
+                <p:cond evt="onPrev" delay="0">
+                  <p:tgtEl>
+                    <p:sldTgt/>
+                  </p:tgtEl>
+                </p:cond>
+              </p:prevCondLst>
+              <p:nextCondLst>
+                <p:cond evt="onNext" delay="0">
+                  <p:tgtEl>
+                    <p:sldTgt/>
+                  </p:tgtEl>
+                </p:cond>
+              </p:nextCondLst>
+            </p:seq>
+          </p:childTnLst>
+        </p:cTn>
       </p:par>
     </p:tnLst>
   </p:timing>
@@ -9754,31 +10348,21 @@
           <a:lstStyle/>
           <a:p>
             <a:r>
-              <a:rPr lang="de-DE" altLang="de-DE"/>
-              <a:t>Tag 3:</a:t>
-            </a:r>
-            <a:r>
-              <a:rPr lang="de-DE" altLang="de-DE" smtClean="0">
-                <a:latin typeface="Consolas" panose="020B0609020204030204" pitchFamily="49" charset="0"/>
-                <a:cs typeface="Consolas" panose="020B0609020204030204" pitchFamily="49" charset="0"/>
-              </a:rPr>
-              <a:t> *</a:t>
-            </a:r>
-            <a:r>
-              <a:rPr lang="de-DE" altLang="de-DE" smtClean="0"/>
-              <a:t> </a:t>
-            </a:r>
-            <a:r>
-              <a:rPr lang="de-DE" altLang="de-DE" dirty="0" smtClean="0"/>
-              <a:t>und </a:t>
-            </a:r>
-            <a:r>
-              <a:rPr lang="de-DE" altLang="de-DE" dirty="0" smtClean="0">
-                <a:latin typeface="Consolas" panose="020B0609020204030204" pitchFamily="49" charset="0"/>
-                <a:cs typeface="Consolas" panose="020B0609020204030204" pitchFamily="49" charset="0"/>
-              </a:rPr>
-              <a:t>&amp;</a:t>
-            </a:r>
+              <a:rPr lang="en-US"/>
+              <a:t>Tag 3: Rückschau und Warm </a:t>
+            </a:r>
+            <a:r>
+              <a:rPr lang="en-US"/>
+              <a:t>Up </a:t>
+            </a:r>
+            <a:r>
+              <a:rPr lang="en-US" smtClean="0"/>
+              <a:t>(I)</a:t>
+            </a:r>
+            <a:endParaRPr lang="de-DE" altLang="de-DE" dirty="0" smtClean="0">
+              <a:latin typeface="Consolas" panose="020B0609020204030204" pitchFamily="49" charset="0"/>
+              <a:cs typeface="Consolas" panose="020B0609020204030204" pitchFamily="49" charset="0"/>
+            </a:endParaRPr>
           </a:p>
         </p:txBody>
       </p:sp>
@@ -9849,8 +10433,47 @@
                 <a:latin typeface="Consolas" panose="020B0609020204030204" pitchFamily="49" charset="0"/>
                 <a:cs typeface="Consolas" panose="020B0609020204030204" pitchFamily="49" charset="0"/>
               </a:rPr>
-              <a:t>*iP; // &lt;- Type?</a:t>
-            </a:r>
+              <a:t>*iP; // &lt;- Type</a:t>
+            </a:r>
+            <a:r>
+              <a:rPr lang="de-DE" altLang="de-DE" smtClean="0">
+                <a:latin typeface="Consolas" panose="020B0609020204030204" pitchFamily="49" charset="0"/>
+                <a:cs typeface="Consolas" panose="020B0609020204030204" pitchFamily="49" charset="0"/>
+              </a:rPr>
+              <a:t>?</a:t>
+            </a:r>
+          </a:p>
+          <a:p>
+            <a:pPr eaLnBrk="1" hangingPunct="1">
+              <a:spcBef>
+                <a:spcPct val="0"/>
+              </a:spcBef>
+            </a:pPr>
+            <a:r>
+              <a:rPr lang="de-DE" altLang="de-DE" smtClean="0">
+                <a:latin typeface="Consolas" panose="020B0609020204030204" pitchFamily="49" charset="0"/>
+                <a:cs typeface="Consolas" panose="020B0609020204030204" pitchFamily="49" charset="0"/>
+              </a:rPr>
+              <a:t>int &amp;iR = *iP;</a:t>
+            </a:r>
+          </a:p>
+          <a:p>
+            <a:pPr eaLnBrk="1" hangingPunct="1">
+              <a:spcBef>
+                <a:spcPct val="0"/>
+              </a:spcBef>
+            </a:pPr>
+            <a:r>
+              <a:rPr lang="de-DE" altLang="de-DE" smtClean="0">
+                <a:latin typeface="Consolas" panose="020B0609020204030204" pitchFamily="49" charset="0"/>
+                <a:cs typeface="Consolas" panose="020B0609020204030204" pitchFamily="49" charset="0"/>
+              </a:rPr>
+              <a:t>int i = *iP;</a:t>
+            </a:r>
+            <a:endParaRPr lang="de-DE" altLang="de-DE" smtClean="0">
+              <a:latin typeface="Consolas" panose="020B0609020204030204" pitchFamily="49" charset="0"/>
+              <a:cs typeface="Consolas" panose="020B0609020204030204" pitchFamily="49" charset="0"/>
+            </a:endParaRPr>
           </a:p>
           <a:p>
             <a:pPr eaLnBrk="1" hangingPunct="1">
@@ -9970,9 +10593,324 @@
   <p:timing>
     <p:tnLst>
       <p:par>
-        <p:cTn id="1" dur="indefinite" restart="never" nodeType="tmRoot"/>
+        <p:cTn id="1" dur="indefinite" restart="never" nodeType="tmRoot">
+          <p:childTnLst>
+            <p:seq concurrent="1" nextAc="seek">
+              <p:cTn id="2" dur="indefinite" nodeType="mainSeq">
+                <p:childTnLst>
+                  <p:par>
+                    <p:cTn id="3" fill="hold">
+                      <p:stCondLst>
+                        <p:cond delay="indefinite"/>
+                      </p:stCondLst>
+                      <p:childTnLst>
+                        <p:par>
+                          <p:cTn id="4" fill="hold">
+                            <p:stCondLst>
+                              <p:cond delay="0"/>
+                            </p:stCondLst>
+                            <p:childTnLst>
+                              <p:par>
+                                <p:cTn id="5" presetID="1" presetClass="entr" presetSubtype="0" fill="hold" grpId="0" nodeType="clickEffect">
+                                  <p:stCondLst>
+                                    <p:cond delay="0"/>
+                                  </p:stCondLst>
+                                  <p:childTnLst>
+                                    <p:set>
+                                      <p:cBhvr>
+                                        <p:cTn id="6" dur="1" fill="hold">
+                                          <p:stCondLst>
+                                            <p:cond delay="0"/>
+                                          </p:stCondLst>
+                                        </p:cTn>
+                                        <p:tgtEl>
+                                          <p:spTgt spid="2">
+                                            <p:txEl>
+                                              <p:pRg st="0" end="0"/>
+                                            </p:txEl>
+                                          </p:spTgt>
+                                        </p:tgtEl>
+                                        <p:attrNameLst>
+                                          <p:attrName>style.visibility</p:attrName>
+                                        </p:attrNameLst>
+                                      </p:cBhvr>
+                                      <p:to>
+                                        <p:strVal val="visible"/>
+                                      </p:to>
+                                    </p:set>
+                                  </p:childTnLst>
+                                </p:cTn>
+                              </p:par>
+                              <p:par>
+                                <p:cTn id="7" presetID="1" presetClass="entr" presetSubtype="0" fill="hold" grpId="0" nodeType="withEffect">
+                                  <p:stCondLst>
+                                    <p:cond delay="0"/>
+                                  </p:stCondLst>
+                                  <p:childTnLst>
+                                    <p:set>
+                                      <p:cBhvr>
+                                        <p:cTn id="8" dur="1" fill="hold">
+                                          <p:stCondLst>
+                                            <p:cond delay="0"/>
+                                          </p:stCondLst>
+                                        </p:cTn>
+                                        <p:tgtEl>
+                                          <p:spTgt spid="2">
+                                            <p:txEl>
+                                              <p:pRg st="1" end="1"/>
+                                            </p:txEl>
+                                          </p:spTgt>
+                                        </p:tgtEl>
+                                        <p:attrNameLst>
+                                          <p:attrName>style.visibility</p:attrName>
+                                        </p:attrNameLst>
+                                      </p:cBhvr>
+                                      <p:to>
+                                        <p:strVal val="visible"/>
+                                      </p:to>
+                                    </p:set>
+                                  </p:childTnLst>
+                                </p:cTn>
+                              </p:par>
+                              <p:par>
+                                <p:cTn id="9" presetID="1" presetClass="entr" presetSubtype="0" fill="hold" grpId="0" nodeType="withEffect">
+                                  <p:stCondLst>
+                                    <p:cond delay="0"/>
+                                  </p:stCondLst>
+                                  <p:childTnLst>
+                                    <p:set>
+                                      <p:cBhvr>
+                                        <p:cTn id="10" dur="1" fill="hold">
+                                          <p:stCondLst>
+                                            <p:cond delay="0"/>
+                                          </p:stCondLst>
+                                        </p:cTn>
+                                        <p:tgtEl>
+                                          <p:spTgt spid="2">
+                                            <p:txEl>
+                                              <p:pRg st="2" end="2"/>
+                                            </p:txEl>
+                                          </p:spTgt>
+                                        </p:tgtEl>
+                                        <p:attrNameLst>
+                                          <p:attrName>style.visibility</p:attrName>
+                                        </p:attrNameLst>
+                                      </p:cBhvr>
+                                      <p:to>
+                                        <p:strVal val="visible"/>
+                                      </p:to>
+                                    </p:set>
+                                  </p:childTnLst>
+                                </p:cTn>
+                              </p:par>
+                            </p:childTnLst>
+                          </p:cTn>
+                        </p:par>
+                      </p:childTnLst>
+                    </p:cTn>
+                  </p:par>
+                  <p:par>
+                    <p:cTn id="11" fill="hold">
+                      <p:stCondLst>
+                        <p:cond delay="indefinite"/>
+                      </p:stCondLst>
+                      <p:childTnLst>
+                        <p:par>
+                          <p:cTn id="12" fill="hold">
+                            <p:stCondLst>
+                              <p:cond delay="0"/>
+                            </p:stCondLst>
+                            <p:childTnLst>
+                              <p:par>
+                                <p:cTn id="13" presetID="1" presetClass="entr" presetSubtype="0" fill="hold" grpId="0" nodeType="clickEffect">
+                                  <p:stCondLst>
+                                    <p:cond delay="0"/>
+                                  </p:stCondLst>
+                                  <p:childTnLst>
+                                    <p:set>
+                                      <p:cBhvr>
+                                        <p:cTn id="14" dur="1" fill="hold">
+                                          <p:stCondLst>
+                                            <p:cond delay="0"/>
+                                          </p:stCondLst>
+                                        </p:cTn>
+                                        <p:tgtEl>
+                                          <p:spTgt spid="2">
+                                            <p:txEl>
+                                              <p:pRg st="3" end="3"/>
+                                            </p:txEl>
+                                          </p:spTgt>
+                                        </p:tgtEl>
+                                        <p:attrNameLst>
+                                          <p:attrName>style.visibility</p:attrName>
+                                        </p:attrNameLst>
+                                      </p:cBhvr>
+                                      <p:to>
+                                        <p:strVal val="visible"/>
+                                      </p:to>
+                                    </p:set>
+                                  </p:childTnLst>
+                                </p:cTn>
+                              </p:par>
+                              <p:par>
+                                <p:cTn id="15" presetID="1" presetClass="entr" presetSubtype="0" fill="hold" grpId="0" nodeType="withEffect">
+                                  <p:stCondLst>
+                                    <p:cond delay="0"/>
+                                  </p:stCondLst>
+                                  <p:childTnLst>
+                                    <p:set>
+                                      <p:cBhvr>
+                                        <p:cTn id="16" dur="1" fill="hold">
+                                          <p:stCondLst>
+                                            <p:cond delay="0"/>
+                                          </p:stCondLst>
+                                        </p:cTn>
+                                        <p:tgtEl>
+                                          <p:spTgt spid="2">
+                                            <p:txEl>
+                                              <p:pRg st="4" end="4"/>
+                                            </p:txEl>
+                                          </p:spTgt>
+                                        </p:tgtEl>
+                                        <p:attrNameLst>
+                                          <p:attrName>style.visibility</p:attrName>
+                                        </p:attrNameLst>
+                                      </p:cBhvr>
+                                      <p:to>
+                                        <p:strVal val="visible"/>
+                                      </p:to>
+                                    </p:set>
+                                  </p:childTnLst>
+                                </p:cTn>
+                              </p:par>
+                            </p:childTnLst>
+                          </p:cTn>
+                        </p:par>
+                      </p:childTnLst>
+                    </p:cTn>
+                  </p:par>
+                  <p:par>
+                    <p:cTn id="17" fill="hold">
+                      <p:stCondLst>
+                        <p:cond delay="indefinite"/>
+                      </p:stCondLst>
+                      <p:childTnLst>
+                        <p:par>
+                          <p:cTn id="18" fill="hold">
+                            <p:stCondLst>
+                              <p:cond delay="0"/>
+                            </p:stCondLst>
+                            <p:childTnLst>
+                              <p:par>
+                                <p:cTn id="19" presetID="1" presetClass="entr" presetSubtype="0" fill="hold" grpId="0" nodeType="clickEffect">
+                                  <p:stCondLst>
+                                    <p:cond delay="0"/>
+                                  </p:stCondLst>
+                                  <p:childTnLst>
+                                    <p:set>
+                                      <p:cBhvr>
+                                        <p:cTn id="20" dur="1" fill="hold">
+                                          <p:stCondLst>
+                                            <p:cond delay="0"/>
+                                          </p:stCondLst>
+                                        </p:cTn>
+                                        <p:tgtEl>
+                                          <p:spTgt spid="2">
+                                            <p:txEl>
+                                              <p:pRg st="6" end="6"/>
+                                            </p:txEl>
+                                          </p:spTgt>
+                                        </p:tgtEl>
+                                        <p:attrNameLst>
+                                          <p:attrName>style.visibility</p:attrName>
+                                        </p:attrNameLst>
+                                      </p:cBhvr>
+                                      <p:to>
+                                        <p:strVal val="visible"/>
+                                      </p:to>
+                                    </p:set>
+                                  </p:childTnLst>
+                                </p:cTn>
+                              </p:par>
+                            </p:childTnLst>
+                          </p:cTn>
+                        </p:par>
+                      </p:childTnLst>
+                    </p:cTn>
+                  </p:par>
+                  <p:par>
+                    <p:cTn id="21" fill="hold">
+                      <p:stCondLst>
+                        <p:cond delay="indefinite"/>
+                      </p:stCondLst>
+                      <p:childTnLst>
+                        <p:par>
+                          <p:cTn id="22" fill="hold">
+                            <p:stCondLst>
+                              <p:cond delay="0"/>
+                            </p:stCondLst>
+                            <p:childTnLst>
+                              <p:par>
+                                <p:cTn id="23" presetID="1" presetClass="entr" presetSubtype="0" fill="hold" grpId="0" nodeType="clickEffect">
+                                  <p:stCondLst>
+                                    <p:cond delay="0"/>
+                                  </p:stCondLst>
+                                  <p:childTnLst>
+                                    <p:set>
+                                      <p:cBhvr>
+                                        <p:cTn id="24" dur="1" fill="hold">
+                                          <p:stCondLst>
+                                            <p:cond delay="0"/>
+                                          </p:stCondLst>
+                                        </p:cTn>
+                                        <p:tgtEl>
+                                          <p:spTgt spid="2">
+                                            <p:txEl>
+                                              <p:pRg st="9" end="9"/>
+                                            </p:txEl>
+                                          </p:spTgt>
+                                        </p:tgtEl>
+                                        <p:attrNameLst>
+                                          <p:attrName>style.visibility</p:attrName>
+                                        </p:attrNameLst>
+                                      </p:cBhvr>
+                                      <p:to>
+                                        <p:strVal val="visible"/>
+                                      </p:to>
+                                    </p:set>
+                                  </p:childTnLst>
+                                </p:cTn>
+                              </p:par>
+                            </p:childTnLst>
+                          </p:cTn>
+                        </p:par>
+                      </p:childTnLst>
+                    </p:cTn>
+                  </p:par>
+                </p:childTnLst>
+              </p:cTn>
+              <p:prevCondLst>
+                <p:cond evt="onPrev" delay="0">
+                  <p:tgtEl>
+                    <p:sldTgt/>
+                  </p:tgtEl>
+                </p:cond>
+              </p:prevCondLst>
+              <p:nextCondLst>
+                <p:cond evt="onNext" delay="0">
+                  <p:tgtEl>
+                    <p:sldTgt/>
+                  </p:tgtEl>
+                </p:cond>
+              </p:nextCondLst>
+            </p:seq>
+          </p:childTnLst>
+        </p:cTn>
       </p:par>
     </p:tnLst>
+    <p:bldLst>
+      <p:bldP spid="2" grpId="0" uiExpand="1" build="p"/>
+    </p:bldLst>
   </p:timing>
 </p:sld>
 </file>
@@ -10031,7 +10969,7 @@
             </a:r>
             <a:r>
               <a:rPr lang="en-US" smtClean="0"/>
-              <a:t>Up </a:t>
+              <a:t>Up  (II) </a:t>
             </a:r>
             <a:endParaRPr lang="en-US" dirty="0"/>
           </a:p>
@@ -10121,82 +11059,11 @@
             <a:endParaRPr lang="en-US" b="1" smtClean="0"/>
           </a:p>
           <a:p>
-            <a:endParaRPr lang="en-US" b="1"/>
-          </a:p>
-          <a:p>
             <a:pPr eaLnBrk="1" hangingPunct="1">
               <a:spcBef>
                 <a:spcPct val="0"/>
               </a:spcBef>
             </a:pPr>
-            <a:r>
-              <a:rPr lang="de-DE" altLang="de-DE" b="1" smtClean="0"/>
-              <a:t>* und &amp;</a:t>
-            </a:r>
-          </a:p>
-          <a:p>
-            <a:pPr lvl="1" eaLnBrk="1" hangingPunct="1">
-              <a:spcBef>
-                <a:spcPct val="0"/>
-              </a:spcBef>
-            </a:pPr>
-            <a:r>
-              <a:rPr lang="de-DE" altLang="de-DE" smtClean="0"/>
-              <a:t>Welche </a:t>
-            </a:r>
-            <a:r>
-              <a:rPr lang="de-DE" altLang="de-DE" b="1"/>
-              <a:t>Bedeutung</a:t>
-            </a:r>
-            <a:r>
-              <a:rPr lang="de-DE" altLang="de-DE"/>
-              <a:t> kann der Asterisk (</a:t>
-            </a:r>
-            <a:r>
-              <a:rPr lang="de-DE" altLang="de-DE">
-                <a:latin typeface="Courier New" panose="02070309020205020404" pitchFamily="49" charset="0"/>
-                <a:cs typeface="Courier New" panose="02070309020205020404" pitchFamily="49" charset="0"/>
-              </a:rPr>
-              <a:t>*</a:t>
-            </a:r>
-            <a:r>
-              <a:rPr lang="de-DE" altLang="de-DE"/>
-              <a:t>) im Code annehmen?</a:t>
-            </a:r>
-          </a:p>
-          <a:p>
-            <a:pPr lvl="1" eaLnBrk="1" hangingPunct="1">
-              <a:spcBef>
-                <a:spcPct val="0"/>
-              </a:spcBef>
-            </a:pPr>
-            <a:r>
-              <a:rPr lang="de-DE" altLang="de-DE" smtClean="0"/>
-              <a:t>Welche </a:t>
-            </a:r>
-            <a:r>
-              <a:rPr lang="de-DE" altLang="de-DE" b="1"/>
-              <a:t>Bedeutung</a:t>
-            </a:r>
-            <a:r>
-              <a:rPr lang="de-DE" altLang="de-DE"/>
-              <a:t> kann das Ampersand (</a:t>
-            </a:r>
-            <a:r>
-              <a:rPr lang="de-DE" altLang="de-DE">
-                <a:latin typeface="Courier New" panose="02070309020205020404" pitchFamily="49" charset="0"/>
-                <a:cs typeface="Courier New" panose="02070309020205020404" pitchFamily="49" charset="0"/>
-              </a:rPr>
-              <a:t>&amp;</a:t>
-            </a:r>
-            <a:r>
-              <a:rPr lang="de-DE" altLang="de-DE"/>
-              <a:t>) im Code annehmen</a:t>
-            </a:r>
-            <a:r>
-              <a:rPr lang="de-DE" altLang="de-DE" smtClean="0"/>
-              <a:t>?</a:t>
-            </a:r>
             <a:endParaRPr lang="en-US" b="1" dirty="0"/>
           </a:p>
           <a:p>
@@ -10849,8 +11716,18 @@
             </a:pPr>
             <a:r>
               <a:rPr lang="en-US" smtClean="0"/>
-              <a:t>Selbsteinschätzung deiner C++-Kenntnisse (1=Keine Vorkenntnisse, 3=Eigene kleinere Projekte, 5=Sehr erfahrener C++-Programmierer)</a:t>
-            </a:r>
+              <a:t>Selbsteinschätzung deiner C++-Kenntnisse (1=Keine Vorkenntnisse, 3=Eigene kleinere Projekte, 5=Sehr erfahrener C++-Programmierer</a:t>
+            </a:r>
+            <a:r>
+              <a:rPr lang="en-US" smtClean="0"/>
+              <a:t>)</a:t>
+            </a:r>
+          </a:p>
+          <a:p>
+            <a:pPr marL="692150" lvl="1" indent="-342900">
+              <a:buFont typeface="+mj-lt"/>
+              <a:buAutoNum type="arabicPeriod"/>
+            </a:pPr>
             <a:endParaRPr lang="en-US" dirty="0"/>
           </a:p>
           <a:p>
@@ -10876,11 +11753,15 @@
             </a:r>
             <a:r>
               <a:rPr lang="en-US" dirty="0" smtClean="0"/>
-              <a:t>: Holger Wech von Cypress/</a:t>
-            </a:r>
-            <a:r>
-              <a:rPr lang="en-US" dirty="0" err="1" smtClean="0"/>
-              <a:t>Spansion</a:t>
+              <a:t>: Holger Wech </a:t>
+            </a:r>
+            <a:r>
+              <a:rPr lang="en-US" smtClean="0"/>
+              <a:t>von </a:t>
+            </a:r>
+            <a:r>
+              <a:rPr lang="en-US" smtClean="0"/>
+              <a:t>Cypress / Spansion</a:t>
             </a:r>
             <a:r>
               <a:rPr lang="en-US" dirty="0" smtClean="0"/>
@@ -10901,7 +11782,7 @@
         </p:nvGrpSpPr>
         <p:grpSpPr>
           <a:xfrm>
-            <a:off x="1475656" y="3645024"/>
+            <a:off x="1475656" y="3968750"/>
             <a:ext cx="4992961" cy="1865682"/>
             <a:chOff x="1475656" y="4521395"/>
             <a:chExt cx="4992961" cy="1865682"/>
@@ -11019,7 +11900,7 @@
       </p:grpSpPr>
       <p:sp>
         <p:nvSpPr>
-          <p:cNvPr id="15362" name="Titel 1"/>
+          <p:cNvPr id="2" name="Titel 1"/>
           <p:cNvSpPr>
             <a:spLocks noGrp="1"/>
           </p:cNvSpPr>
@@ -11033,16 +11914,20 @@
           <a:lstStyle/>
           <a:p>
             <a:r>
-              <a:rPr lang="de-DE" altLang="de-DE" smtClean="0"/>
-              <a:t>Tag 6: Evaluationsfragen</a:t>
-            </a:r>
-            <a:endParaRPr lang="de-DE" altLang="de-DE" dirty="0" smtClean="0"/>
+              <a:rPr lang="en-US" smtClean="0"/>
+              <a:t>Tag </a:t>
+            </a:r>
+            <a:r>
+              <a:rPr lang="en-US" smtClean="0"/>
+              <a:t>3 – Nachmittag</a:t>
+            </a:r>
+            <a:endParaRPr lang="en-US" dirty="0"/>
           </a:p>
         </p:txBody>
       </p:sp>
       <p:sp>
         <p:nvSpPr>
-          <p:cNvPr id="2" name="Inhaltsplatzhalter 1"/>
+          <p:cNvPr id="3" name="Inhaltsplatzhalter 2"/>
           <p:cNvSpPr>
             <a:spLocks noGrp="1"/>
           </p:cNvSpPr>
@@ -11055,112 +11940,257 @@
           <a:bodyPr/>
           <a:lstStyle/>
           <a:p>
-            <a:r>
-              <a:rPr lang="en-US" b="1" smtClean="0"/>
-              <a:t>Fragen für die Evaluation</a:t>
-            </a:r>
-          </a:p>
-          <a:p>
-            <a:pPr lvl="1"/>
+            <a:pPr marL="342900" indent="-342900">
+              <a:buFontTx/>
+              <a:buChar char="-"/>
+            </a:pPr>
+            <a:endParaRPr lang="en-US" dirty="0" smtClean="0"/>
+          </a:p>
+          <a:p>
+            <a:pPr marL="342900" indent="-342900">
+              <a:buFontTx/>
+              <a:buChar char="-"/>
+            </a:pPr>
             <a:r>
               <a:rPr lang="en-US" smtClean="0"/>
-              <a:t>Stärkerer Fokus auf C++(11) legen (= weniger Fokus auf C)?</a:t>
-            </a:r>
-          </a:p>
-          <a:p>
-            <a:pPr lvl="2"/>
-            <a:r>
+              <a:t>Welchem Raw Pointer entspricht der folgenden Ausdruck?</a:t>
+            </a:r>
+            <a:br>
               <a:rPr lang="en-US" smtClean="0"/>
-              <a:t>"trifft zu" = mehr C++</a:t>
-            </a:r>
-          </a:p>
-          <a:p>
-            <a:pPr lvl="2"/>
+            </a:br>
             <a:r>
               <a:rPr lang="en-US" smtClean="0"/>
-              <a:t>"Mitte" = gleich lassen</a:t>
-            </a:r>
-          </a:p>
-          <a:p>
-            <a:pPr lvl="2"/>
-            <a:r>
+              <a:t/>
+            </a:r>
+            <a:br>
               <a:rPr lang="en-US" smtClean="0"/>
-              <a:t>"trifft nicht zu" = mehr C</a:t>
-            </a:r>
-          </a:p>
-          <a:p>
-            <a:pPr lvl="1"/>
+            </a:br>
+            <a:r>
+              <a:rPr lang="en-US" b="1" smtClean="0">
+                <a:solidFill>
+                  <a:srgbClr val="000000"/>
+                </a:solidFill>
+                <a:latin typeface="Courier New" panose="02070309020205020404" pitchFamily="49" charset="0"/>
+              </a:rPr>
+              <a:t>std</a:t>
+            </a:r>
+            <a:r>
+              <a:rPr lang="en-US" b="1">
+                <a:solidFill>
+                  <a:srgbClr val="000000"/>
+                </a:solidFill>
+                <a:latin typeface="Courier New" panose="02070309020205020404" pitchFamily="49" charset="0"/>
+              </a:rPr>
+              <a:t>::shared_ptr&lt;</a:t>
+            </a:r>
+            <a:r>
+              <a:rPr lang="en-US" b="1">
+                <a:solidFill>
+                  <a:srgbClr val="005032"/>
+                </a:solidFill>
+                <a:latin typeface="Courier New" panose="02070309020205020404" pitchFamily="49" charset="0"/>
+              </a:rPr>
+              <a:t>Person</a:t>
+            </a:r>
+            <a:r>
+              <a:rPr lang="en-US" b="1">
+                <a:solidFill>
+                  <a:srgbClr val="000000"/>
+                </a:solidFill>
+                <a:latin typeface="Courier New" panose="02070309020205020404" pitchFamily="49" charset="0"/>
+              </a:rPr>
+              <a:t>&gt; </a:t>
+            </a:r>
+            <a:r>
+              <a:rPr lang="en-US" b="1">
+                <a:solidFill>
+                  <a:srgbClr val="000000"/>
+                </a:solidFill>
+                <a:latin typeface="Courier New" panose="02070309020205020404" pitchFamily="49" charset="0"/>
+              </a:rPr>
+              <a:t>nobody</a:t>
+            </a:r>
+            <a:r>
+              <a:rPr lang="en-US" b="1" smtClean="0">
+                <a:solidFill>
+                  <a:srgbClr val="000000"/>
+                </a:solidFill>
+                <a:latin typeface="Courier New" panose="02070309020205020404" pitchFamily="49" charset="0"/>
+              </a:rPr>
+              <a:t>;</a:t>
+            </a:r>
+          </a:p>
+          <a:p>
+            <a:pPr lvl="1" indent="0">
+              <a:buNone/>
+            </a:pPr>
+            <a:r>
+              <a:rPr lang="en-US" b="1" smtClean="0">
+                <a:solidFill>
+                  <a:srgbClr val="000000"/>
+                </a:solidFill>
+                <a:latin typeface="Courier New" panose="02070309020205020404" pitchFamily="49" charset="0"/>
+              </a:rPr>
+              <a:t/>
+            </a:r>
+            <a:br>
+              <a:rPr lang="en-US" b="1" smtClean="0">
+                <a:solidFill>
+                  <a:srgbClr val="000000"/>
+                </a:solidFill>
+                <a:latin typeface="Courier New" panose="02070309020205020404" pitchFamily="49" charset="0"/>
+              </a:rPr>
+            </a:br>
+            <a:r>
+              <a:rPr lang="en-US" smtClean="0">
+                <a:solidFill>
+                  <a:srgbClr val="000000"/>
+                </a:solidFill>
+                <a:latin typeface="Courier New" panose="02070309020205020404" pitchFamily="49" charset="0"/>
+                <a:sym typeface="Wingdings" panose="05000000000000000000" pitchFamily="2" charset="2"/>
+              </a:rPr>
+              <a:t> </a:t>
+            </a:r>
+            <a:r>
+              <a:rPr lang="en-US"/>
+              <a:t>In etwa "</a:t>
+            </a:r>
+            <a:r>
+              <a:rPr lang="en-US" b="1"/>
+              <a:t>nullptr</a:t>
+            </a:r>
+            <a:r>
+              <a:rPr lang="en-US"/>
+              <a:t>" (s</a:t>
+            </a:r>
+            <a:r>
+              <a:rPr lang="en-US"/>
+              <a:t>. </a:t>
+            </a:r>
             <a:r>
               <a:rPr lang="en-US" smtClean="0"/>
-              <a:t>Ich hatte vorher keine C++-Kenntnisse</a:t>
-            </a:r>
-          </a:p>
-          <a:p>
-            <a:pPr lvl="2">
-              <a:tabLst>
-                <a:tab pos="2155825" algn="l"/>
-              </a:tabLst>
-            </a:pPr>
+              <a:t>1&amp;2 </a:t>
+            </a:r>
+            <a:r>
+              <a:rPr lang="en-US"/>
+              <a:t>hier: </a:t>
+            </a:r>
+            <a:r>
+              <a:rPr lang="en-US" sz="1200">
+                <a:hlinkClick r:id="rId2"/>
+              </a:rPr>
+              <a:t>http</a:t>
+            </a:r>
+            <a:r>
+              <a:rPr lang="en-US" sz="1200">
+                <a:hlinkClick r:id="rId2"/>
+              </a:rPr>
+              <a:t>://</a:t>
+            </a:r>
+            <a:r>
+              <a:rPr lang="en-US" sz="1200" smtClean="0">
+                <a:hlinkClick r:id="rId2"/>
+              </a:rPr>
+              <a:t>en.cppreference.com/w/cpp/memory/shared_ptr/shared_ptr</a:t>
+            </a:r>
+            <a:r>
+              <a:rPr lang="en-US" sz="1200" smtClean="0"/>
+              <a:t> </a:t>
+            </a:r>
             <a:r>
               <a:rPr lang="en-US" smtClean="0"/>
-              <a:t>"trifft zu" 	= Keine Vorkenntnisse</a:t>
-            </a:r>
-          </a:p>
-          <a:p>
-            <a:pPr lvl="2">
-              <a:tabLst>
-                <a:tab pos="2155825" algn="l"/>
-              </a:tabLst>
-            </a:pPr>
-            <a:r>
-              <a:rPr lang="en-US" smtClean="0"/>
-              <a:t>"Mitte"	= Eigene kleinere Projekte</a:t>
-            </a:r>
-          </a:p>
-          <a:p>
-            <a:pPr lvl="2">
-              <a:tabLst>
-                <a:tab pos="2155825" algn="l"/>
-              </a:tabLst>
-            </a:pPr>
-            <a:r>
-              <a:rPr lang="en-US" smtClean="0"/>
-              <a:t>"trifft nicht zu" 	= Sehr erfahrener C++-Programmierer</a:t>
-            </a:r>
-          </a:p>
-          <a:p>
-            <a:pPr marL="350838" lvl="2" indent="0">
-              <a:buNone/>
-              <a:tabLst>
-                <a:tab pos="2155825" algn="l"/>
-              </a:tabLst>
-            </a:pPr>
-            <a:endParaRPr lang="en-US"/>
+              <a:t>)</a:t>
+            </a:r>
+            <a:endParaRPr lang="en-US" dirty="0"/>
           </a:p>
         </p:txBody>
       </p:sp>
     </p:spTree>
     <p:extLst>
       <p:ext uri="{BB962C8B-B14F-4D97-AF65-F5344CB8AC3E}">
-        <p14:creationId xmlns:p14="http://schemas.microsoft.com/office/powerpoint/2010/main" val="2676316158"/>
+        <p14:creationId xmlns:p14="http://schemas.microsoft.com/office/powerpoint/2010/main" val="598179509"/>
       </p:ext>
     </p:extLst>
   </p:cSld>
   <p:clrMapOvr>
     <a:masterClrMapping/>
   </p:clrMapOvr>
-  <mc:AlternateContent xmlns:mc="http://schemas.openxmlformats.org/markup-compatibility/2006" xmlns:p14="http://schemas.microsoft.com/office/powerpoint/2010/main">
-    <mc:Choice Requires="p14">
-      <p:transition spd="slow" p14:dur="2000"/>
-    </mc:Choice>
-    <mc:Fallback xmlns="">
-      <p:transition spd="slow"/>
-    </mc:Fallback>
-  </mc:AlternateContent>
   <p:timing>
     <p:tnLst>
       <p:par>
-        <p:cTn id="1" dur="indefinite" restart="never" nodeType="tmRoot"/>
+        <p:cTn id="1" dur="indefinite" restart="never" nodeType="tmRoot">
+          <p:childTnLst>
+            <p:seq concurrent="1" nextAc="seek">
+              <p:cTn id="2" dur="indefinite" nodeType="mainSeq">
+                <p:childTnLst>
+                  <p:par>
+                    <p:cTn id="3" fill="hold">
+                      <p:stCondLst>
+                        <p:cond delay="indefinite"/>
+                      </p:stCondLst>
+                      <p:childTnLst>
+                        <p:par>
+                          <p:cTn id="4" fill="hold">
+                            <p:stCondLst>
+                              <p:cond delay="0"/>
+                            </p:stCondLst>
+                            <p:childTnLst>
+                              <p:par>
+                                <p:cTn id="5" presetID="1" presetClass="entr" presetSubtype="0" fill="hold" nodeType="clickEffect">
+                                  <p:stCondLst>
+                                    <p:cond delay="0"/>
+                                  </p:stCondLst>
+                                  <p:childTnLst>
+                                    <p:set>
+                                      <p:cBhvr>
+                                        <p:cTn id="6" dur="1" fill="hold">
+                                          <p:stCondLst>
+                                            <p:cond delay="0"/>
+                                          </p:stCondLst>
+                                        </p:cTn>
+                                        <p:tgtEl>
+                                          <p:spTgt spid="3">
+                                            <p:txEl>
+                                              <p:pRg st="2" end="2"/>
+                                            </p:txEl>
+                                          </p:spTgt>
+                                        </p:tgtEl>
+                                        <p:attrNameLst>
+                                          <p:attrName>style.visibility</p:attrName>
+                                        </p:attrNameLst>
+                                      </p:cBhvr>
+                                      <p:to>
+                                        <p:strVal val="visible"/>
+                                      </p:to>
+                                    </p:set>
+                                  </p:childTnLst>
+                                </p:cTn>
+                              </p:par>
+                            </p:childTnLst>
+                          </p:cTn>
+                        </p:par>
+                      </p:childTnLst>
+                    </p:cTn>
+                  </p:par>
+                </p:childTnLst>
+              </p:cTn>
+              <p:prevCondLst>
+                <p:cond evt="onPrev" delay="0">
+                  <p:tgtEl>
+                    <p:sldTgt/>
+                  </p:tgtEl>
+                </p:cond>
+              </p:prevCondLst>
+              <p:nextCondLst>
+                <p:cond evt="onNext" delay="0">
+                  <p:tgtEl>
+                    <p:sldTgt/>
+                  </p:tgtEl>
+                </p:cond>
+              </p:nextCondLst>
+            </p:seq>
+          </p:childTnLst>
+        </p:cTn>
       </p:par>
     </p:tnLst>
   </p:timing>
@@ -11186,7 +12216,7 @@
       </p:grpSpPr>
       <p:sp>
         <p:nvSpPr>
-          <p:cNvPr id="2" name="Titel 1"/>
+          <p:cNvPr id="15362" name="Titel 1"/>
           <p:cNvSpPr>
             <a:spLocks noGrp="1"/>
           </p:cNvSpPr>
@@ -11199,25 +12229,17 @@
           <a:bodyPr/>
           <a:lstStyle/>
           <a:p>
-            <a:pPr>
-              <a:tabLst>
-                <a:tab pos="2155825" algn="l"/>
-              </a:tabLst>
-            </a:pPr>
-            <a:r>
-              <a:rPr lang="de-DE" altLang="de-DE"/>
-              <a:t>Tag 6: </a:t>
-            </a:r>
-            <a:r>
-              <a:rPr lang="en-US"/>
-              <a:t>Hinweise zur Klausur</a:t>
-            </a:r>
+            <a:r>
+              <a:rPr lang="de-DE" altLang="de-DE" smtClean="0"/>
+              <a:t>Tag 6: Evaluationsfragen</a:t>
+            </a:r>
+            <a:endParaRPr lang="de-DE" altLang="de-DE" dirty="0" smtClean="0"/>
           </a:p>
         </p:txBody>
       </p:sp>
       <p:sp>
         <p:nvSpPr>
-          <p:cNvPr id="3" name="Inhaltsplatzhalter 2"/>
+          <p:cNvPr id="2" name="Inhaltsplatzhalter 1"/>
           <p:cNvSpPr>
             <a:spLocks noGrp="1"/>
           </p:cNvSpPr>
@@ -11230,68 +12252,44 @@
           <a:bodyPr/>
           <a:lstStyle/>
           <a:p>
-            <a:pPr>
-              <a:tabLst>
-                <a:tab pos="2155825" algn="l"/>
-              </a:tabLst>
-            </a:pPr>
-            <a:r>
-              <a:rPr lang="en-US" b="1"/>
-              <a:t>Hinweise zur Klausur</a:t>
-            </a:r>
-          </a:p>
-          <a:p>
-            <a:pPr lvl="1">
-              <a:tabLst>
-                <a:tab pos="2155825" algn="l"/>
-              </a:tabLst>
-            </a:pPr>
-            <a:r>
-              <a:rPr lang="en-US"/>
-              <a:t>Wir gehen davon aus, dass </a:t>
-            </a:r>
-            <a:r>
-              <a:rPr lang="en-US" b="1"/>
-              <a:t>alle nicht-optionalen Übungen </a:t>
-            </a:r>
-            <a:r>
-              <a:rPr lang="en-US"/>
-              <a:t>der </a:t>
-            </a:r>
-            <a:r>
-              <a:rPr lang="en-US" b="1"/>
-              <a:t>Tage 1-4 </a:t>
-            </a:r>
-            <a:r>
-              <a:rPr lang="en-US"/>
-              <a:t>bearbeitet wurden </a:t>
-            </a:r>
-            <a:r>
-              <a:rPr lang="en-US" b="1"/>
-              <a:t>und</a:t>
-            </a:r>
-            <a:r>
-              <a:rPr lang="en-US"/>
-              <a:t> alle Folien soweit verstanden wurden.</a:t>
-            </a:r>
-          </a:p>
-          <a:p>
-            <a:pPr lvl="1">
-              <a:tabLst>
-                <a:tab pos="2155825" algn="l"/>
-              </a:tabLst>
-            </a:pPr>
-            <a:r>
-              <a:rPr lang="en-US"/>
-              <a:t>Es wird ein </a:t>
-            </a:r>
-            <a:r>
-              <a:rPr lang="en-US" b="1"/>
-              <a:t>Codehandout</a:t>
-            </a:r>
-            <a:r>
-              <a:rPr lang="en-US"/>
-              <a:t> geben, in dem für bestimmte Funktionen/Datentypen/Methoden eine Beschreibung vorliegt.</a:t>
+            <a:r>
+              <a:rPr lang="en-US" b="1" smtClean="0"/>
+              <a:t>Fragen für die Evaluation</a:t>
+            </a:r>
+          </a:p>
+          <a:p>
+            <a:pPr lvl="1"/>
+            <a:r>
+              <a:rPr lang="en-US" smtClean="0"/>
+              <a:t>Stärkerer Fokus auf C++(11) legen (= weniger Fokus auf C)?</a:t>
+            </a:r>
+          </a:p>
+          <a:p>
+            <a:pPr lvl="2"/>
+            <a:r>
+              <a:rPr lang="en-US" smtClean="0"/>
+              <a:t>"trifft zu" = mehr C++</a:t>
+            </a:r>
+          </a:p>
+          <a:p>
+            <a:pPr lvl="2"/>
+            <a:r>
+              <a:rPr lang="en-US" smtClean="0"/>
+              <a:t>"Mitte" = gleich lassen</a:t>
+            </a:r>
+          </a:p>
+          <a:p>
+            <a:pPr lvl="2"/>
+            <a:r>
+              <a:rPr lang="en-US" smtClean="0"/>
+              <a:t>"trifft nicht zu" = mehr C</a:t>
+            </a:r>
+          </a:p>
+          <a:p>
+            <a:pPr lvl="1"/>
+            <a:r>
+              <a:rPr lang="en-US" smtClean="0"/>
+              <a:t>Ich hatte vorher keine C++-Kenntnisse</a:t>
             </a:r>
           </a:p>
           <a:p>
@@ -11301,15 +12299,8 @@
               </a:tabLst>
             </a:pPr>
             <a:r>
-              <a:rPr lang="en-US"/>
-              <a:t>NICHT zu erwarten ist bspw. </a:t>
-            </a:r>
-            <a:r>
-              <a:rPr lang="en-US">
-                <a:latin typeface="Consolas" panose="020B0609020204030204" pitchFamily="49" charset="0"/>
-                <a:cs typeface="Consolas" panose="020B0609020204030204" pitchFamily="49" charset="0"/>
-              </a:rPr>
-              <a:t>std::vector&lt;T&gt;::push_back</a:t>
+              <a:rPr lang="en-US" smtClean="0"/>
+              <a:t>"trifft zu" 	= Keine Vorkenntnisse</a:t>
             </a:r>
           </a:p>
           <a:p>
@@ -11319,18 +12310,28 @@
               </a:tabLst>
             </a:pPr>
             <a:r>
-              <a:rPr lang="en-US"/>
-              <a:t>Zu erwarten ist bspw. </a:t>
-            </a:r>
-            <a:r>
-              <a:rPr lang="en-US">
-                <a:latin typeface="Consolas" panose="020B0609020204030204" pitchFamily="49" charset="0"/>
-                <a:cs typeface="Consolas" panose="020B0609020204030204" pitchFamily="49" charset="0"/>
-              </a:rPr>
-              <a:t>std::string::find</a:t>
-            </a:r>
-          </a:p>
-          <a:p>
+              <a:rPr lang="en-US" smtClean="0"/>
+              <a:t>"Mitte"	= Eigene kleinere Projekte</a:t>
+            </a:r>
+          </a:p>
+          <a:p>
+            <a:pPr lvl="2">
+              <a:tabLst>
+                <a:tab pos="2155825" algn="l"/>
+              </a:tabLst>
+            </a:pPr>
+            <a:r>
+              <a:rPr lang="en-US" smtClean="0"/>
+              <a:t>"trifft nicht zu" 	= Sehr erfahrener C++-Programmierer</a:t>
+            </a:r>
+          </a:p>
+          <a:p>
+            <a:pPr marL="350838" lvl="2" indent="0">
+              <a:buNone/>
+              <a:tabLst>
+                <a:tab pos="2155825" algn="l"/>
+              </a:tabLst>
+            </a:pPr>
             <a:endParaRPr lang="en-US"/>
           </a:p>
         </p:txBody>
@@ -11338,13 +12339,21 @@
     </p:spTree>
     <p:extLst>
       <p:ext uri="{BB962C8B-B14F-4D97-AF65-F5344CB8AC3E}">
-        <p14:creationId xmlns:p14="http://schemas.microsoft.com/office/powerpoint/2010/main" val="3875772686"/>
+        <p14:creationId xmlns:p14="http://schemas.microsoft.com/office/powerpoint/2010/main" val="2676316158"/>
       </p:ext>
     </p:extLst>
   </p:cSld>
   <p:clrMapOvr>
     <a:masterClrMapping/>
   </p:clrMapOvr>
+  <mc:AlternateContent xmlns:mc="http://schemas.openxmlformats.org/markup-compatibility/2006" xmlns:p14="http://schemas.microsoft.com/office/powerpoint/2010/main">
+    <mc:Choice Requires="p14">
+      <p:transition spd="slow" p14:dur="2000"/>
+    </mc:Choice>
+    <mc:Fallback xmlns="">
+      <p:transition spd="slow"/>
+    </mc:Fallback>
+  </mc:AlternateContent>
   <p:timing>
     <p:tnLst>
       <p:par>

</xml_diff>

<commit_message>
Minor improvements + bugfix in explanation of List::end()
</commit_message>
<xml_diff>
--- a/2017/recap_and_warmup_slides.pptx
+++ b/2017/recap_and_warmup_slides.pptx
@@ -2001,13 +2001,7 @@
               <a:rPr lang="de-DE" altLang="de-DE" i="0" smtClean="0">
                 <a:latin typeface="Times New Roman" pitchFamily="16" charset="0"/>
               </a:rPr>
-              <a:t>Als </a:t>
-            </a:r>
-            <a:r>
-              <a:rPr lang="de-DE" altLang="de-DE" i="0" smtClean="0">
-                <a:latin typeface="Times New Roman" pitchFamily="16" charset="0"/>
-              </a:rPr>
-              <a:t>Dereferenzierungs</a:t>
+              <a:t>Als Dereferenzierungs</a:t>
             </a:r>
             <a:r>
               <a:rPr lang="de-DE" altLang="de-DE" b="1" i="0" smtClean="0">
@@ -2070,13 +2064,7 @@
               <a:rPr lang="de-DE" altLang="de-DE" i="0" baseline="0" smtClean="0">
                 <a:latin typeface="Times New Roman" pitchFamily="16" charset="0"/>
               </a:rPr>
-              <a:t>Als </a:t>
-            </a:r>
-            <a:r>
-              <a:rPr lang="de-DE" altLang="de-DE" i="0" baseline="0" smtClean="0">
-                <a:latin typeface="Times New Roman" pitchFamily="16" charset="0"/>
-              </a:rPr>
-              <a:t>Adress</a:t>
+              <a:t>Als Adress</a:t>
             </a:r>
             <a:r>
               <a:rPr lang="de-DE" altLang="de-DE" b="1" i="0" baseline="0" smtClean="0">
@@ -8251,7 +8239,7 @@
           <a:graphicData uri="http://schemas.openxmlformats.org/presentationml/2006/ole">
             <mc:AlternateContent xmlns:mc="http://schemas.openxmlformats.org/markup-compatibility/2006">
               <mc:Choice xmlns:v="urn:schemas-microsoft-com:vml" Requires="v">
-                <p:oleObj spid="_x0000_s1978" r:id="rId16" imgW="1038370" imgH="980952" progId="">
+                <p:oleObj spid="_x0000_s1985" r:id="rId16" imgW="1038370" imgH="980952" progId="">
                   <p:embed/>
                 </p:oleObj>
               </mc:Choice>
@@ -10349,11 +10337,7 @@
           <a:p>
             <a:r>
               <a:rPr lang="en-US"/>
-              <a:t>Tag 3: Rückschau und Warm </a:t>
-            </a:r>
-            <a:r>
-              <a:rPr lang="en-US"/>
-              <a:t>Up </a:t>
+              <a:t>Tag 3: Rückschau und Warm Up </a:t>
             </a:r>
             <a:r>
               <a:rPr lang="en-US" smtClean="0"/>
@@ -10433,14 +10417,7 @@
                 <a:latin typeface="Consolas" panose="020B0609020204030204" pitchFamily="49" charset="0"/>
                 <a:cs typeface="Consolas" panose="020B0609020204030204" pitchFamily="49" charset="0"/>
               </a:rPr>
-              <a:t>*iP; // &lt;- Type</a:t>
-            </a:r>
-            <a:r>
-              <a:rPr lang="de-DE" altLang="de-DE" smtClean="0">
-                <a:latin typeface="Consolas" panose="020B0609020204030204" pitchFamily="49" charset="0"/>
-                <a:cs typeface="Consolas" panose="020B0609020204030204" pitchFamily="49" charset="0"/>
-              </a:rPr>
-              <a:t>?</a:t>
+              <a:t>*iP; // &lt;- Type?</a:t>
             </a:r>
           </a:p>
           <a:p>
@@ -10470,10 +10447,6 @@
               </a:rPr>
               <a:t>int i = *iP;</a:t>
             </a:r>
-            <a:endParaRPr lang="de-DE" altLang="de-DE" smtClean="0">
-              <a:latin typeface="Consolas" panose="020B0609020204030204" pitchFamily="49" charset="0"/>
-              <a:cs typeface="Consolas" panose="020B0609020204030204" pitchFamily="49" charset="0"/>
-            </a:endParaRPr>
           </a:p>
           <a:p>
             <a:pPr eaLnBrk="1" hangingPunct="1">
@@ -11716,11 +11689,7 @@
             </a:pPr>
             <a:r>
               <a:rPr lang="en-US" smtClean="0"/>
-              <a:t>Selbsteinschätzung deiner C++-Kenntnisse (1=Keine Vorkenntnisse, 3=Eigene kleinere Projekte, 5=Sehr erfahrener C++-Programmierer</a:t>
-            </a:r>
-            <a:r>
-              <a:rPr lang="en-US" smtClean="0"/>
-              <a:t>)</a:t>
+              <a:t>Selbsteinschätzung deiner C++-Kenntnisse (1=Keine Vorkenntnisse, 3=Eigene kleinere Projekte, 5=Sehr erfahrener C++-Programmierer)</a:t>
             </a:r>
           </a:p>
           <a:p>
@@ -11757,11 +11726,7 @@
             </a:r>
             <a:r>
               <a:rPr lang="en-US" smtClean="0"/>
-              <a:t>von </a:t>
-            </a:r>
-            <a:r>
-              <a:rPr lang="en-US" smtClean="0"/>
-              <a:t>Cypress / Spansion</a:t>
+              <a:t>von Cypress / Spansion</a:t>
             </a:r>
             <a:r>
               <a:rPr lang="en-US" dirty="0" smtClean="0"/>
@@ -11915,11 +11880,7 @@
           <a:p>
             <a:r>
               <a:rPr lang="en-US" smtClean="0"/>
-              <a:t>Tag </a:t>
-            </a:r>
-            <a:r>
-              <a:rPr lang="en-US" smtClean="0"/>
-              <a:t>3 – Nachmittag</a:t>
+              <a:t>Tag 3 – Nachmittag</a:t>
             </a:r>
             <a:endParaRPr lang="en-US" dirty="0"/>
           </a:p>
@@ -11999,16 +11960,7 @@
                 </a:solidFill>
                 <a:latin typeface="Courier New" panose="02070309020205020404" pitchFamily="49" charset="0"/>
               </a:rPr>
-              <a:t>&gt; </a:t>
-            </a:r>
-            <a:r>
-              <a:rPr lang="en-US" b="1">
-                <a:solidFill>
-                  <a:srgbClr val="000000"/>
-                </a:solidFill>
-                <a:latin typeface="Courier New" panose="02070309020205020404" pitchFamily="49" charset="0"/>
-              </a:rPr>
-              <a:t>nobody</a:t>
+              <a:t>&gt; nobody</a:t>
             </a:r>
             <a:r>
               <a:rPr lang="en-US" b="1" smtClean="0">
@@ -12061,11 +12013,7 @@
             </a:r>
             <a:r>
               <a:rPr lang="en-US"/>
-              <a:t>" (s</a:t>
-            </a:r>
-            <a:r>
-              <a:rPr lang="en-US"/>
-              <a:t>. </a:t>
+              <a:t>" (s. </a:t>
             </a:r>
             <a:r>
               <a:rPr lang="en-US" smtClean="0"/>
@@ -12079,13 +12027,7 @@
               <a:rPr lang="en-US" sz="1200">
                 <a:hlinkClick r:id="rId2"/>
               </a:rPr>
-              <a:t>http</a:t>
-            </a:r>
-            <a:r>
-              <a:rPr lang="en-US" sz="1200">
-                <a:hlinkClick r:id="rId2"/>
-              </a:rPr>
-              <a:t>://</a:t>
+              <a:t>http://</a:t>
             </a:r>
             <a:r>
               <a:rPr lang="en-US" sz="1200" smtClean="0">
@@ -12101,7 +12043,181 @@
               <a:rPr lang="en-US" smtClean="0"/>
               <a:t>)</a:t>
             </a:r>
+          </a:p>
+          <a:p>
+            <a:pPr lvl="1" indent="0">
+              <a:buNone/>
+            </a:pPr>
             <a:endParaRPr lang="en-US" dirty="0"/>
+          </a:p>
+          <a:p>
+            <a:pPr marL="342900" indent="-342900">
+              <a:buFontTx/>
+              <a:buChar char="-"/>
+            </a:pPr>
+            <a:r>
+              <a:rPr lang="en-US" smtClean="0"/>
+              <a:t>Bugfix in </a:t>
+            </a:r>
+            <a:r>
+              <a:rPr lang="en-US" b="1" smtClean="0"/>
+              <a:t>Aufgabe 7.5</a:t>
+            </a:r>
+            <a:r>
+              <a:rPr lang="en-US" smtClean="0"/>
+              <a:t>: </a:t>
+            </a:r>
+          </a:p>
+          <a:p>
+            <a:pPr marL="692150" lvl="1" indent="-342900">
+              <a:buFontTx/>
+              <a:buChar char="-"/>
+            </a:pPr>
+            <a:r>
+              <a:rPr lang="en-US" smtClean="0"/>
+              <a:t>"</a:t>
+            </a:r>
+            <a:r>
+              <a:rPr lang="en-US" b="1" smtClean="0"/>
+              <a:t>List::end()</a:t>
+            </a:r>
+            <a:r>
+              <a:rPr lang="en-US" smtClean="0"/>
+              <a:t>" liefert einen ListIterator, der "</a:t>
+            </a:r>
+            <a:r>
+              <a:rPr lang="en-US" b="1" smtClean="0"/>
+              <a:t>hinter das Ende zeigt</a:t>
+            </a:r>
+            <a:r>
+              <a:rPr lang="en-US" smtClean="0"/>
+              <a:t>" </a:t>
+            </a:r>
+            <a:br>
+              <a:rPr lang="en-US" smtClean="0"/>
+            </a:br>
+            <a:r>
+              <a:rPr lang="en-US" smtClean="0"/>
+              <a:t>(</a:t>
+            </a:r>
+            <a:r>
+              <a:rPr lang="en-US" i="1" smtClean="0"/>
+              <a:t>past-the end element</a:t>
+            </a:r>
+            <a:r>
+              <a:rPr lang="en-US" smtClean="0"/>
+              <a:t>)</a:t>
+            </a:r>
+          </a:p>
+          <a:p>
+            <a:pPr marL="692150" lvl="1" indent="-342900">
+              <a:buFontTx/>
+              <a:buChar char="-"/>
+            </a:pPr>
+            <a:r>
+              <a:rPr lang="en-US" smtClean="0"/>
+              <a:t>Genauer: </a:t>
+            </a:r>
+            <a:r>
+              <a:rPr lang="en-US" b="1" smtClean="0">
+                <a:latin typeface="Consolas" panose="020B0609020204030204" pitchFamily="49" charset="0"/>
+                <a:cs typeface="Consolas" panose="020B0609020204030204" pitchFamily="49" charset="0"/>
+              </a:rPr>
+              <a:t>List::end()</a:t>
+            </a:r>
+            <a:r>
+              <a:rPr lang="en-US" smtClean="0"/>
+              <a:t> liefert denjenigen Iterator, den man nach </a:t>
+            </a:r>
+            <a:r>
+              <a:rPr lang="en-US" b="1">
+                <a:latin typeface="Consolas" panose="020B0609020204030204" pitchFamily="49" charset="0"/>
+                <a:cs typeface="Consolas" panose="020B0609020204030204" pitchFamily="49" charset="0"/>
+              </a:rPr>
+              <a:t>getSize()</a:t>
+            </a:r>
+            <a:r>
+              <a:rPr lang="en-US" smtClean="0"/>
+              <a:t> Aufrufen von </a:t>
+            </a:r>
+            <a:r>
+              <a:rPr lang="en-US" b="1">
+                <a:latin typeface="Consolas" panose="020B0609020204030204" pitchFamily="49" charset="0"/>
+                <a:cs typeface="Consolas" panose="020B0609020204030204" pitchFamily="49" charset="0"/>
+              </a:rPr>
+              <a:t>operator++</a:t>
+            </a:r>
+            <a:r>
+              <a:rPr lang="en-US" smtClean="0"/>
+              <a:t> auf </a:t>
+            </a:r>
+            <a:r>
+              <a:rPr lang="en-US" b="1">
+                <a:latin typeface="Consolas" panose="020B0609020204030204" pitchFamily="49" charset="0"/>
+                <a:cs typeface="Consolas" panose="020B0609020204030204" pitchFamily="49" charset="0"/>
+              </a:rPr>
+              <a:t>iter = </a:t>
+            </a:r>
+            <a:r>
+              <a:rPr lang="en-US" b="1" smtClean="0">
+                <a:latin typeface="Consolas" panose="020B0609020204030204" pitchFamily="49" charset="0"/>
+                <a:cs typeface="Consolas" panose="020B0609020204030204" pitchFamily="49" charset="0"/>
+              </a:rPr>
+              <a:t>List</a:t>
+            </a:r>
+            <a:r>
+              <a:rPr lang="en-US" b="1">
+                <a:latin typeface="Consolas" panose="020B0609020204030204" pitchFamily="49" charset="0"/>
+                <a:cs typeface="Consolas" panose="020B0609020204030204" pitchFamily="49" charset="0"/>
+              </a:rPr>
+              <a:t>::begin</a:t>
+            </a:r>
+            <a:r>
+              <a:rPr lang="en-US" b="1">
+                <a:latin typeface="Consolas" panose="020B0609020204030204" pitchFamily="49" charset="0"/>
+                <a:cs typeface="Consolas" panose="020B0609020204030204" pitchFamily="49" charset="0"/>
+              </a:rPr>
+              <a:t>()</a:t>
+            </a:r>
+            <a:r>
+              <a:rPr lang="en-US" smtClean="0"/>
+              <a:t> erhält</a:t>
+            </a:r>
+            <a:br>
+              <a:rPr lang="en-US" smtClean="0"/>
+            </a:br>
+            <a:r>
+              <a:rPr lang="en-US" smtClean="0"/>
+              <a:t/>
+            </a:r>
+            <a:br>
+              <a:rPr lang="en-US" smtClean="0"/>
+            </a:br>
+            <a:r>
+              <a:rPr lang="en-US" smtClean="0">
+                <a:sym typeface="Wingdings" panose="05000000000000000000" pitchFamily="2" charset="2"/>
+              </a:rPr>
+              <a:t> </a:t>
+            </a:r>
+            <a:r>
+              <a:rPr lang="en-US" b="1" smtClean="0"/>
+              <a:t>Schleifenabbruchbedingung</a:t>
+            </a:r>
+            <a:r>
+              <a:rPr lang="en-US"/>
+              <a:t> </a:t>
+            </a:r>
+            <a:r>
+              <a:rPr lang="en-US">
+                <a:latin typeface="Consolas" panose="020B0609020204030204" pitchFamily="49" charset="0"/>
+                <a:cs typeface="Consolas" panose="020B0609020204030204" pitchFamily="49" charset="0"/>
+              </a:rPr>
+              <a:t>"iter != list.end()"</a:t>
+            </a:r>
+            <a:endParaRPr lang="en-US">
+              <a:latin typeface="Consolas" panose="020B0609020204030204" pitchFamily="49" charset="0"/>
+              <a:cs typeface="Consolas" panose="020B0609020204030204" pitchFamily="49" charset="0"/>
+            </a:endParaRPr>
           </a:p>
         </p:txBody>
       </p:sp>
@@ -12152,6 +12268,153 @@
                                           <p:spTgt spid="3">
                                             <p:txEl>
                                               <p:pRg st="2" end="2"/>
+                                            </p:txEl>
+                                          </p:spTgt>
+                                        </p:tgtEl>
+                                        <p:attrNameLst>
+                                          <p:attrName>style.visibility</p:attrName>
+                                        </p:attrNameLst>
+                                      </p:cBhvr>
+                                      <p:to>
+                                        <p:strVal val="visible"/>
+                                      </p:to>
+                                    </p:set>
+                                  </p:childTnLst>
+                                </p:cTn>
+                              </p:par>
+                            </p:childTnLst>
+                          </p:cTn>
+                        </p:par>
+                      </p:childTnLst>
+                    </p:cTn>
+                  </p:par>
+                  <p:par>
+                    <p:cTn id="7" fill="hold">
+                      <p:stCondLst>
+                        <p:cond delay="indefinite"/>
+                      </p:stCondLst>
+                      <p:childTnLst>
+                        <p:par>
+                          <p:cTn id="8" fill="hold">
+                            <p:stCondLst>
+                              <p:cond delay="0"/>
+                            </p:stCondLst>
+                            <p:childTnLst>
+                              <p:par>
+                                <p:cTn id="9" presetID="1" presetClass="entr" presetSubtype="0" fill="hold" nodeType="clickEffect">
+                                  <p:stCondLst>
+                                    <p:cond delay="0"/>
+                                  </p:stCondLst>
+                                  <p:childTnLst>
+                                    <p:set>
+                                      <p:cBhvr>
+                                        <p:cTn id="10" dur="1" fill="hold">
+                                          <p:stCondLst>
+                                            <p:cond delay="0"/>
+                                          </p:stCondLst>
+                                        </p:cTn>
+                                        <p:tgtEl>
+                                          <p:spTgt spid="3">
+                                            <p:txEl>
+                                              <p:pRg st="4" end="4"/>
+                                            </p:txEl>
+                                          </p:spTgt>
+                                        </p:tgtEl>
+                                        <p:attrNameLst>
+                                          <p:attrName>style.visibility</p:attrName>
+                                        </p:attrNameLst>
+                                      </p:cBhvr>
+                                      <p:to>
+                                        <p:strVal val="visible"/>
+                                      </p:to>
+                                    </p:set>
+                                  </p:childTnLst>
+                                </p:cTn>
+                              </p:par>
+                            </p:childTnLst>
+                          </p:cTn>
+                        </p:par>
+                      </p:childTnLst>
+                    </p:cTn>
+                  </p:par>
+                  <p:par>
+                    <p:cTn id="11" fill="hold">
+                      <p:stCondLst>
+                        <p:cond delay="indefinite"/>
+                      </p:stCondLst>
+                      <p:childTnLst>
+                        <p:par>
+                          <p:cTn id="12" fill="hold">
+                            <p:stCondLst>
+                              <p:cond delay="0"/>
+                            </p:stCondLst>
+                            <p:childTnLst>
+                              <p:par>
+                                <p:cTn id="13" presetID="1" presetClass="entr" presetSubtype="0" fill="hold" nodeType="clickEffect">
+                                  <p:stCondLst>
+                                    <p:cond delay="0"/>
+                                  </p:stCondLst>
+                                  <p:childTnLst>
+                                    <p:set>
+                                      <p:cBhvr>
+                                        <p:cTn id="14" dur="1" fill="hold">
+                                          <p:stCondLst>
+                                            <p:cond delay="0"/>
+                                          </p:stCondLst>
+                                        </p:cTn>
+                                        <p:tgtEl>
+                                          <p:spTgt spid="3">
+                                            <p:txEl>
+                                              <p:pRg st="5" end="5"/>
+                                            </p:txEl>
+                                          </p:spTgt>
+                                        </p:tgtEl>
+                                        <p:attrNameLst>
+                                          <p:attrName>style.visibility</p:attrName>
+                                        </p:attrNameLst>
+                                      </p:cBhvr>
+                                      <p:to>
+                                        <p:strVal val="visible"/>
+                                      </p:to>
+                                    </p:set>
+                                  </p:childTnLst>
+                                </p:cTn>
+                              </p:par>
+                            </p:childTnLst>
+                          </p:cTn>
+                        </p:par>
+                      </p:childTnLst>
+                    </p:cTn>
+                  </p:par>
+                  <p:par>
+                    <p:cTn id="15" fill="hold">
+                      <p:stCondLst>
+                        <p:cond delay="indefinite"/>
+                      </p:stCondLst>
+                      <p:childTnLst>
+                        <p:par>
+                          <p:cTn id="16" fill="hold">
+                            <p:stCondLst>
+                              <p:cond delay="0"/>
+                            </p:stCondLst>
+                            <p:childTnLst>
+                              <p:par>
+                                <p:cTn id="17" presetID="1" presetClass="entr" presetSubtype="0" fill="hold" nodeType="clickEffect">
+                                  <p:stCondLst>
+                                    <p:cond delay="0"/>
+                                  </p:stCondLst>
+                                  <p:childTnLst>
+                                    <p:set>
+                                      <p:cBhvr>
+                                        <p:cTn id="18" dur="1" fill="hold">
+                                          <p:stCondLst>
+                                            <p:cond delay="0"/>
+                                          </p:stCondLst>
+                                        </p:cTn>
+                                        <p:tgtEl>
+                                          <p:spTgt spid="3">
+                                            <p:txEl>
+                                              <p:pRg st="6" end="6"/>
                                             </p:txEl>
                                           </p:spTgt>
                                         </p:tgtEl>

</xml_diff>

<commit_message>
Improve slides on bit operations
</commit_message>
<xml_diff>
--- a/2017/recap_and_warmup_slides.pptx
+++ b/2017/recap_and_warmup_slides.pptx
@@ -5,10 +5,10 @@
     <p:sldMasterId id="2147483650" r:id="rId1"/>
   </p:sldMasterIdLst>
   <p:notesMasterIdLst>
-    <p:notesMasterId r:id="rId13"/>
+    <p:notesMasterId r:id="rId15"/>
   </p:notesMasterIdLst>
   <p:handoutMasterIdLst>
-    <p:handoutMasterId r:id="rId14"/>
+    <p:handoutMasterId r:id="rId16"/>
   </p:handoutMasterIdLst>
   <p:sldIdLst>
     <p:sldId id="454" r:id="rId2"/>
@@ -19,9 +19,11 @@
     <p:sldId id="474" r:id="rId7"/>
     <p:sldId id="479" r:id="rId8"/>
     <p:sldId id="483" r:id="rId9"/>
-    <p:sldId id="480" r:id="rId10"/>
-    <p:sldId id="481" r:id="rId11"/>
-    <p:sldId id="471" r:id="rId12"/>
+    <p:sldId id="485" r:id="rId10"/>
+    <p:sldId id="484" r:id="rId11"/>
+    <p:sldId id="481" r:id="rId12"/>
+    <p:sldId id="480" r:id="rId13"/>
+    <p:sldId id="471" r:id="rId14"/>
   </p:sldIdLst>
   <p:sldSz cx="9144000" cy="6858000" type="screen4x3"/>
   <p:notesSz cx="7099300" cy="10234613"/>
@@ -203,8 +205,10 @@
             <p14:sldId id="474"/>
             <p14:sldId id="479"/>
             <p14:sldId id="483"/>
+            <p14:sldId id="485"/>
+            <p14:sldId id="484"/>
+            <p14:sldId id="481"/>
             <p14:sldId id="480"/>
-            <p14:sldId id="481"/>
             <p14:sldId id="471"/>
           </p14:sldIdLst>
         </p14:section>
@@ -3000,6 +3004,152 @@
       </p:grpSpPr>
       <p:sp>
         <p:nvSpPr>
+          <p:cNvPr id="2" name="Folienbildplatzhalter 1"/>
+          <p:cNvSpPr>
+            <a:spLocks noGrp="1" noRot="1" noChangeAspect="1"/>
+          </p:cNvSpPr>
+          <p:nvPr>
+            <p:ph type="sldImg"/>
+          </p:nvPr>
+        </p:nvSpPr>
+        <p:spPr/>
+      </p:sp>
+      <p:sp>
+        <p:nvSpPr>
+          <p:cNvPr id="3" name="Notizenplatzhalter 2"/>
+          <p:cNvSpPr>
+            <a:spLocks noGrp="1"/>
+          </p:cNvSpPr>
+          <p:nvPr>
+            <p:ph type="body" idx="1"/>
+          </p:nvPr>
+        </p:nvSpPr>
+        <p:spPr/>
+        <p:txBody>
+          <a:bodyPr/>
+          <a:lstStyle/>
+          <a:p>
+            <a:endParaRPr lang="en-US"/>
+          </a:p>
+        </p:txBody>
+      </p:sp>
+      <p:sp>
+        <p:nvSpPr>
+          <p:cNvPr id="4" name="Datumsplatzhalter 3"/>
+          <p:cNvSpPr>
+            <a:spLocks noGrp="1"/>
+          </p:cNvSpPr>
+          <p:nvPr>
+            <p:ph type="dt" idx="10"/>
+          </p:nvPr>
+        </p:nvSpPr>
+        <p:spPr/>
+        <p:txBody>
+          <a:bodyPr/>
+          <a:lstStyle/>
+          <a:p>
+            <a:pPr>
+              <a:defRPr/>
+            </a:pPr>
+            <a:r>
+              <a:rPr lang="en-US" smtClean="0"/>
+              <a:t>November 19, 2007</a:t>
+            </a:r>
+            <a:endParaRPr lang="en-US"/>
+          </a:p>
+        </p:txBody>
+      </p:sp>
+      <p:sp>
+        <p:nvSpPr>
+          <p:cNvPr id="5" name="Fußzeilenplatzhalter 4"/>
+          <p:cNvSpPr>
+            <a:spLocks noGrp="1"/>
+          </p:cNvSpPr>
+          <p:nvPr>
+            <p:ph type="ftr" idx="11"/>
+          </p:nvPr>
+        </p:nvSpPr>
+        <p:spPr/>
+        <p:txBody>
+          <a:bodyPr/>
+          <a:lstStyle/>
+          <a:p>
+            <a:pPr>
+              <a:defRPr/>
+            </a:pPr>
+            <a:r>
+              <a:rPr lang="en-US" smtClean="0"/>
+              <a:t>|  </a:t>
+            </a:r>
+            <a:endParaRPr lang="en-US"/>
+          </a:p>
+        </p:txBody>
+      </p:sp>
+      <p:sp>
+        <p:nvSpPr>
+          <p:cNvPr id="6" name="Foliennummernplatzhalter 5"/>
+          <p:cNvSpPr>
+            <a:spLocks noGrp="1"/>
+          </p:cNvSpPr>
+          <p:nvPr>
+            <p:ph type="sldNum" idx="12"/>
+          </p:nvPr>
+        </p:nvSpPr>
+        <p:spPr/>
+        <p:txBody>
+          <a:bodyPr/>
+          <a:lstStyle/>
+          <a:p>
+            <a:pPr>
+              <a:defRPr/>
+            </a:pPr>
+            <a:r>
+              <a:rPr lang="en-US" smtClean="0"/>
+              <a:t>|  </a:t>
+            </a:r>
+            <a:fld id="{1AC4CB2F-BC5A-454C-A55C-75DB3FC15FD2}" type="slidenum">
+              <a:rPr lang="en-US" smtClean="0"/>
+              <a:pPr>
+                <a:defRPr/>
+              </a:pPr>
+              <a:t>9</a:t>
+            </a:fld>
+            <a:endParaRPr lang="en-US"/>
+          </a:p>
+        </p:txBody>
+      </p:sp>
+    </p:spTree>
+    <p:extLst>
+      <p:ext uri="{BB962C8B-B14F-4D97-AF65-F5344CB8AC3E}">
+        <p14:creationId xmlns:p14="http://schemas.microsoft.com/office/powerpoint/2010/main" val="422263401"/>
+      </p:ext>
+    </p:extLst>
+  </p:cSld>
+  <p:clrMapOvr>
+    <a:masterClrMapping/>
+  </p:clrMapOvr>
+</p:notes>
+</file>
+
+<file path=ppt/notesSlides/notesSlide4.xml><?xml version="1.0" encoding="utf-8"?>
+<p:notes xmlns:a="http://schemas.openxmlformats.org/drawingml/2006/main" xmlns:r="http://schemas.openxmlformats.org/officeDocument/2006/relationships" xmlns:p="http://schemas.openxmlformats.org/presentationml/2006/main">
+  <p:cSld>
+    <p:spTree>
+      <p:nvGrpSpPr>
+        <p:cNvPr id="1" name=""/>
+        <p:cNvGrpSpPr/>
+        <p:nvPr/>
+      </p:nvGrpSpPr>
+      <p:grpSpPr>
+        <a:xfrm>
+          <a:off x="0" y="0"/>
+          <a:ext cx="0" cy="0"/>
+          <a:chOff x="0" y="0"/>
+          <a:chExt cx="0" cy="0"/>
+        </a:xfrm>
+      </p:grpSpPr>
+      <p:sp>
+        <p:nvSpPr>
           <p:cNvPr id="53250" name="Folienbildplatzhalter 1"/>
           <p:cNvSpPr>
             <a:spLocks noGrp="1" noRot="1" noChangeAspect="1" noTextEdit="1"/>
@@ -3777,7 +3927,7 @@
                 <a:latin typeface="Stafford" pitchFamily="2" charset="0"/>
               </a:rPr>
               <a:pPr eaLnBrk="1" hangingPunct="1"/>
-              <a:t>9</a:t>
+              <a:t>12</a:t>
             </a:fld>
             <a:endParaRPr lang="en-US" altLang="de-DE" smtClean="0">
               <a:solidFill>
@@ -8239,7 +8389,7 @@
           <a:graphicData uri="http://schemas.openxmlformats.org/presentationml/2006/ole">
             <mc:AlternateContent xmlns:mc="http://schemas.openxmlformats.org/markup-compatibility/2006">
               <mc:Choice xmlns:v="urn:schemas-microsoft-com:vml" Requires="v">
-                <p:oleObj spid="_x0000_s1985" r:id="rId16" imgW="1038370" imgH="980952" progId="">
+                <p:oleObj spid="_x0000_s1994" r:id="rId16" imgW="1038370" imgH="980952" progId="">
                   <p:embed/>
                 </p:oleObj>
               </mc:Choice>
@@ -8677,7 +8827,7 @@
                 </a:lnSpc>
                 <a:defRPr/>
               </a:pPr>
-              <a:t>04.09.2017</a:t>
+              <a:t>06.09.2017</a:t>
             </a:fld>
             <a:r>
               <a:rPr lang="en-GB" altLang="de-DE" sz="1000" smtClean="0">
@@ -9237,19 +9387,15 @@
           <a:bodyPr/>
           <a:lstStyle/>
           <a:p>
-            <a:pPr>
-              <a:tabLst>
-                <a:tab pos="2155825" algn="l"/>
-              </a:tabLst>
-            </a:pPr>
-            <a:r>
-              <a:rPr lang="de-DE" altLang="de-DE"/>
-              <a:t>Tag 6: </a:t>
-            </a:r>
-            <a:r>
-              <a:rPr lang="en-US"/>
-              <a:t>Hinweise zur Klausur</a:t>
-            </a:r>
+            <a:r>
+              <a:rPr lang="en-US" smtClean="0"/>
+              <a:t>Tag </a:t>
+            </a:r>
+            <a:r>
+              <a:rPr lang="en-US" smtClean="0"/>
+              <a:t>5: Evaluation und Gastvortrag</a:t>
+            </a:r>
+            <a:endParaRPr lang="en-US" dirty="0"/>
           </a:p>
         </p:txBody>
       </p:sp>
@@ -9268,12 +9414,400 @@
           <a:bodyPr/>
           <a:lstStyle/>
           <a:p>
+            <a:pPr marL="342900" indent="-342900">
+              <a:buFontTx/>
+              <a:buChar char="-"/>
+            </a:pPr>
+            <a:endParaRPr lang="en-US" dirty="0" smtClean="0"/>
+          </a:p>
+          <a:p>
+            <a:pPr marL="342900" indent="-342900">
+              <a:buFontTx/>
+              <a:buChar char="-"/>
+            </a:pPr>
+            <a:r>
+              <a:rPr lang="en-US" smtClean="0"/>
+              <a:t>Fragen </a:t>
+            </a:r>
+            <a:r>
+              <a:rPr lang="en-US" dirty="0" err="1" smtClean="0"/>
+              <a:t>für</a:t>
+            </a:r>
+            <a:r>
+              <a:rPr lang="en-US" dirty="0" smtClean="0"/>
+              <a:t> die </a:t>
+            </a:r>
+            <a:r>
+              <a:rPr lang="en-US" b="1" dirty="0" smtClean="0"/>
+              <a:t>Evaluation</a:t>
+            </a:r>
+            <a:r>
+              <a:rPr lang="en-US" dirty="0" smtClean="0"/>
+              <a:t> am </a:t>
+            </a:r>
+            <a:r>
+              <a:rPr lang="en-US" dirty="0" err="1" smtClean="0"/>
+              <a:t>letzten</a:t>
+            </a:r>
+            <a:r>
+              <a:rPr lang="en-US" dirty="0" smtClean="0"/>
+              <a:t> Tag</a:t>
+            </a:r>
+          </a:p>
+          <a:p>
+            <a:pPr marL="692150" lvl="1" indent="-342900">
+              <a:buFont typeface="+mj-lt"/>
+              <a:buAutoNum type="arabicPeriod"/>
+            </a:pPr>
+            <a:r>
+              <a:rPr lang="en-US" dirty="0" err="1" smtClean="0"/>
+              <a:t>Stärkerer</a:t>
+            </a:r>
+            <a:r>
+              <a:rPr lang="en-US" dirty="0" smtClean="0"/>
+              <a:t> </a:t>
+            </a:r>
+            <a:r>
+              <a:rPr lang="en-US" dirty="0" err="1" smtClean="0"/>
+              <a:t>Fokus</a:t>
+            </a:r>
+            <a:r>
+              <a:rPr lang="en-US" dirty="0" smtClean="0"/>
+              <a:t> auf </a:t>
+            </a:r>
+            <a:r>
+              <a:rPr lang="en-US" smtClean="0"/>
+              <a:t>C++(11) legen (= weniger Fokus auf C)?</a:t>
+            </a:r>
+            <a:endParaRPr lang="en-US" dirty="0" smtClean="0"/>
+          </a:p>
+          <a:p>
+            <a:pPr marL="692150" lvl="1" indent="-342900">
+              <a:buFont typeface="+mj-lt"/>
+              <a:buAutoNum type="arabicPeriod"/>
+            </a:pPr>
+            <a:r>
+              <a:rPr lang="en-US" smtClean="0"/>
+              <a:t>Selbsteinschätzung deiner C++-Kenntnisse (1=Keine Vorkenntnisse, 3=Eigene kleinere Projekte, 5=Sehr erfahrener C++-Programmierer)</a:t>
+            </a:r>
+          </a:p>
+          <a:p>
+            <a:pPr marL="692150" lvl="1" indent="-342900">
+              <a:buFont typeface="+mj-lt"/>
+              <a:buAutoNum type="arabicPeriod"/>
+            </a:pPr>
+            <a:endParaRPr lang="en-US" dirty="0"/>
+          </a:p>
+          <a:p>
+            <a:pPr marL="342900" indent="-342900">
+              <a:buFontTx/>
+              <a:buChar char="-"/>
+            </a:pPr>
+            <a:r>
+              <a:rPr lang="en-US" b="1" dirty="0" err="1" smtClean="0"/>
+              <a:t>Gastvortrag</a:t>
+            </a:r>
+            <a:r>
+              <a:rPr lang="en-US" b="1" dirty="0" smtClean="0"/>
+              <a:t> am </a:t>
+            </a:r>
+            <a:r>
+              <a:rPr lang="en-US" b="1" dirty="0" err="1" smtClean="0"/>
+              <a:t>letzten</a:t>
+            </a:r>
+            <a:r>
+              <a:rPr lang="en-US" b="1" dirty="0" smtClean="0"/>
+              <a:t> Tag</a:t>
+            </a:r>
+            <a:r>
+              <a:rPr lang="en-US" dirty="0" smtClean="0"/>
+              <a:t>: Holger Wech </a:t>
+            </a:r>
+            <a:r>
+              <a:rPr lang="en-US" smtClean="0"/>
+              <a:t>von Cypress / Spansion</a:t>
+            </a:r>
+            <a:r>
+              <a:rPr lang="en-US" dirty="0" smtClean="0"/>
+              <a:t/>
+            </a:r>
+            <a:br>
+              <a:rPr lang="en-US" dirty="0" smtClean="0"/>
+            </a:br>
+            <a:endParaRPr lang="en-US" dirty="0"/>
+          </a:p>
+        </p:txBody>
+      </p:sp>
+      <p:grpSp>
+        <p:nvGrpSpPr>
+          <p:cNvPr id="8" name="Gruppieren 7"/>
+          <p:cNvGrpSpPr/>
+          <p:nvPr/>
+        </p:nvGrpSpPr>
+        <p:grpSpPr>
+          <a:xfrm>
+            <a:off x="1475656" y="3968750"/>
+            <a:ext cx="4992961" cy="1865682"/>
+            <a:chOff x="1475656" y="4521395"/>
+            <a:chExt cx="4992961" cy="1865682"/>
+          </a:xfrm>
+        </p:grpSpPr>
+        <p:pic>
+          <p:nvPicPr>
+            <p:cNvPr id="4" name="Grafik 3"/>
+            <p:cNvPicPr>
+              <a:picLocks noChangeAspect="1"/>
+            </p:cNvPicPr>
+            <p:nvPr/>
+          </p:nvPicPr>
+          <p:blipFill>
+            <a:blip r:embed="rId2"/>
+            <a:stretch>
+              <a:fillRect/>
+            </a:stretch>
+          </p:blipFill>
+          <p:spPr>
+            <a:xfrm>
+              <a:off x="1475656" y="4521395"/>
+              <a:ext cx="4824536" cy="1865682"/>
+            </a:xfrm>
+            <a:prstGeom prst="rect">
+              <a:avLst/>
+            </a:prstGeom>
+          </p:spPr>
+        </p:pic>
+        <p:sp>
+          <p:nvSpPr>
+            <p:cNvPr id="5" name="Rechteck 4"/>
+            <p:cNvSpPr/>
+            <p:nvPr/>
+          </p:nvSpPr>
+          <p:spPr bwMode="auto">
+            <a:xfrm>
+              <a:off x="4139952" y="5805264"/>
+              <a:ext cx="2328665" cy="170166"/>
+            </a:xfrm>
+            <a:prstGeom prst="rect">
+              <a:avLst/>
+            </a:prstGeom>
+            <a:solidFill>
+              <a:schemeClr val="bg1"/>
+            </a:solidFill>
+            <a:ln w="9525">
+              <a:noFill/>
+              <a:miter lim="800000"/>
+              <a:headEnd/>
+              <a:tailEnd/>
+            </a:ln>
+            <a:extLst/>
+          </p:spPr>
+          <p:txBody>
+            <a:bodyPr wrap="square" rtlCol="0" anchor="ctr">
+              <a:spAutoFit/>
+            </a:bodyPr>
+            <a:lstStyle/>
+            <a:p>
+              <a:pPr algn="ctr" eaLnBrk="1" hangingPunct="1">
+                <a:spcBef>
+                  <a:spcPct val="0"/>
+                </a:spcBef>
+                <a:buSzTx/>
+                <a:buFont typeface="Arial" charset="0"/>
+                <a:buNone/>
+              </a:pPr>
+              <a:endParaRPr lang="en-US" sz="1400" dirty="0" err="1">
+                <a:solidFill>
+                  <a:srgbClr val="7F0055"/>
+                </a:solidFill>
+                <a:latin typeface="Consolas" pitchFamily="49" charset="0"/>
+              </a:endParaRPr>
+            </a:p>
+          </p:txBody>
+        </p:sp>
+      </p:grpSp>
+      <p:sp>
+        <p:nvSpPr>
+          <p:cNvPr id="6" name="Abgerundete rechteckige Legende 5"/>
+          <p:cNvSpPr/>
+          <p:nvPr/>
+        </p:nvSpPr>
+        <p:spPr bwMode="auto">
+          <a:xfrm>
+            <a:off x="6300887" y="3995018"/>
+            <a:ext cx="2448272" cy="672241"/>
+          </a:xfrm>
+          <a:prstGeom prst="wedgeRoundRectCallout">
+            <a:avLst>
+              <a:gd name="adj1" fmla="val -64124"/>
+              <a:gd name="adj2" fmla="val 39314"/>
+              <a:gd name="adj3" fmla="val 16667"/>
+            </a:avLst>
+          </a:prstGeom>
+          <a:ln>
+            <a:headEnd/>
+            <a:tailEnd/>
+          </a:ln>
+          <a:extLst/>
+        </p:spPr>
+        <p:style>
+          <a:lnRef idx="2">
+            <a:schemeClr val="dk1">
+              <a:shade val="50000"/>
+            </a:schemeClr>
+          </a:lnRef>
+          <a:fillRef idx="1">
+            <a:schemeClr val="dk1"/>
+          </a:fillRef>
+          <a:effectRef idx="0">
+            <a:schemeClr val="dk1"/>
+          </a:effectRef>
+          <a:fontRef idx="minor">
+            <a:schemeClr val="lt1"/>
+          </a:fontRef>
+        </p:style>
+        <p:txBody>
+          <a:bodyPr rtlCol="0" anchor="ctr">
+            <a:spAutoFit/>
+          </a:bodyPr>
+          <a:lstStyle/>
+          <a:p>
+            <a:pPr algn="ctr" eaLnBrk="1" hangingPunct="1">
+              <a:spcBef>
+                <a:spcPct val="0"/>
+              </a:spcBef>
+              <a:buSzTx/>
+              <a:buFont typeface="Arial" charset="0"/>
+              <a:buNone/>
+            </a:pPr>
+            <a:r>
+              <a:rPr lang="en-US" smtClean="0">
+                <a:solidFill>
+                  <a:schemeClr val="bg1"/>
+                </a:solidFill>
+                <a:latin typeface="+mj-lt"/>
+              </a:rPr>
+              <a:t>Wir starten </a:t>
+            </a:r>
+            <a:r>
+              <a:rPr lang="en-US" b="1" smtClean="0">
+                <a:solidFill>
+                  <a:schemeClr val="bg1"/>
+                </a:solidFill>
+                <a:latin typeface="+mj-lt"/>
+              </a:rPr>
+              <a:t>pünktlich</a:t>
+            </a:r>
+            <a:r>
+              <a:rPr lang="en-US" smtClean="0">
+                <a:solidFill>
+                  <a:schemeClr val="bg1"/>
+                </a:solidFill>
+                <a:latin typeface="+mj-lt"/>
+              </a:rPr>
+              <a:t> um 9 Uhr</a:t>
+            </a:r>
+            <a:endParaRPr lang="en-US" dirty="0" err="1">
+              <a:solidFill>
+                <a:schemeClr val="bg1"/>
+              </a:solidFill>
+              <a:latin typeface="+mj-lt"/>
+            </a:endParaRPr>
+          </a:p>
+        </p:txBody>
+      </p:sp>
+    </p:spTree>
+    <p:extLst>
+      <p:ext uri="{BB962C8B-B14F-4D97-AF65-F5344CB8AC3E}">
+        <p14:creationId xmlns:p14="http://schemas.microsoft.com/office/powerpoint/2010/main" val="870028258"/>
+      </p:ext>
+    </p:extLst>
+  </p:cSld>
+  <p:clrMapOvr>
+    <a:masterClrMapping/>
+  </p:clrMapOvr>
+  <p:timing>
+    <p:tnLst>
+      <p:par>
+        <p:cTn id="1" dur="indefinite" restart="never" nodeType="tmRoot"/>
+      </p:par>
+    </p:tnLst>
+  </p:timing>
+</p:sld>
+</file>
+
+<file path=ppt/slides/slide11.xml><?xml version="1.0" encoding="utf-8"?>
+<p:sld xmlns:a="http://schemas.openxmlformats.org/drawingml/2006/main" xmlns:r="http://schemas.openxmlformats.org/officeDocument/2006/relationships" xmlns:p="http://schemas.openxmlformats.org/presentationml/2006/main">
+  <p:cSld>
+    <p:spTree>
+      <p:nvGrpSpPr>
+        <p:cNvPr id="1" name=""/>
+        <p:cNvGrpSpPr/>
+        <p:nvPr/>
+      </p:nvGrpSpPr>
+      <p:grpSpPr>
+        <a:xfrm>
+          <a:off x="0" y="0"/>
+          <a:ext cx="0" cy="0"/>
+          <a:chOff x="0" y="0"/>
+          <a:chExt cx="0" cy="0"/>
+        </a:xfrm>
+      </p:grpSpPr>
+      <p:sp>
+        <p:nvSpPr>
+          <p:cNvPr id="2" name="Titel 1"/>
+          <p:cNvSpPr>
+            <a:spLocks noGrp="1"/>
+          </p:cNvSpPr>
+          <p:nvPr>
+            <p:ph type="title"/>
+          </p:nvPr>
+        </p:nvSpPr>
+        <p:spPr/>
+        <p:txBody>
+          <a:bodyPr/>
+          <a:lstStyle/>
+          <a:p>
             <a:pPr>
               <a:tabLst>
                 <a:tab pos="2155825" algn="l"/>
               </a:tabLst>
             </a:pPr>
             <a:r>
+              <a:rPr lang="de-DE" altLang="de-DE"/>
+              <a:t>Tag </a:t>
+            </a:r>
+            <a:r>
+              <a:rPr lang="de-DE" altLang="de-DE" smtClean="0"/>
+              <a:t>5: </a:t>
+            </a:r>
+            <a:r>
+              <a:rPr lang="en-US"/>
+              <a:t>Hinweise zur Klausur</a:t>
+            </a:r>
+          </a:p>
+        </p:txBody>
+      </p:sp>
+      <p:sp>
+        <p:nvSpPr>
+          <p:cNvPr id="3" name="Inhaltsplatzhalter 2"/>
+          <p:cNvSpPr>
+            <a:spLocks noGrp="1"/>
+          </p:cNvSpPr>
+          <p:nvPr>
+            <p:ph idx="1"/>
+          </p:nvPr>
+        </p:nvSpPr>
+        <p:spPr/>
+        <p:txBody>
+          <a:bodyPr/>
+          <a:lstStyle/>
+          <a:p>
+            <a:pPr>
+              <a:tabLst>
+                <a:tab pos="2155825" algn="l"/>
+              </a:tabLst>
+            </a:pPr>
+            <a:r>
               <a:rPr lang="en-US" b="1"/>
               <a:t>Hinweise zur Klausur</a:t>
             </a:r>
@@ -9293,16 +9827,12 @@
               <a:t>alle nicht-optionalen Übungen </a:t>
             </a:r>
             <a:r>
+              <a:rPr lang="en-US" smtClean="0"/>
+              <a:t>bearbeitet </a:t>
+            </a:r>
+            <a:r>
               <a:rPr lang="en-US"/>
-              <a:t>der </a:t>
-            </a:r>
-            <a:r>
-              <a:rPr lang="en-US" b="1"/>
-              <a:t>Tage 1-4 </a:t>
-            </a:r>
-            <a:r>
-              <a:rPr lang="en-US"/>
-              <a:t>bearbeitet wurden </a:t>
+              <a:t>wurden </a:t>
             </a:r>
             <a:r>
               <a:rPr lang="en-US" b="1"/>
@@ -9339,8 +9869,12 @@
               </a:tabLst>
             </a:pPr>
             <a:r>
+              <a:rPr lang="en-US" b="1"/>
+              <a:t>NICHT </a:t>
+            </a:r>
+            <a:r>
               <a:rPr lang="en-US"/>
-              <a:t>NICHT zu erwarten ist bspw. </a:t>
+              <a:t>zu erwarten ist bspw. </a:t>
             </a:r>
             <a:r>
               <a:rPr lang="en-US">
@@ -9393,7 +9927,174 @@
 </p:sld>
 </file>
 
-<file path=ppt/slides/slide11.xml><?xml version="1.0" encoding="utf-8"?>
+<file path=ppt/slides/slide12.xml><?xml version="1.0" encoding="utf-8"?>
+<p:sld xmlns:a="http://schemas.openxmlformats.org/drawingml/2006/main" xmlns:r="http://schemas.openxmlformats.org/officeDocument/2006/relationships" xmlns:p="http://schemas.openxmlformats.org/presentationml/2006/main">
+  <p:cSld>
+    <p:spTree>
+      <p:nvGrpSpPr>
+        <p:cNvPr id="1" name=""/>
+        <p:cNvGrpSpPr/>
+        <p:nvPr/>
+      </p:nvGrpSpPr>
+      <p:grpSpPr>
+        <a:xfrm>
+          <a:off x="0" y="0"/>
+          <a:ext cx="0" cy="0"/>
+          <a:chOff x="0" y="0"/>
+          <a:chExt cx="0" cy="0"/>
+        </a:xfrm>
+      </p:grpSpPr>
+      <p:sp>
+        <p:nvSpPr>
+          <p:cNvPr id="15362" name="Titel 1"/>
+          <p:cNvSpPr>
+            <a:spLocks noGrp="1"/>
+          </p:cNvSpPr>
+          <p:nvPr>
+            <p:ph type="title"/>
+          </p:nvPr>
+        </p:nvSpPr>
+        <p:spPr/>
+        <p:txBody>
+          <a:bodyPr/>
+          <a:lstStyle/>
+          <a:p>
+            <a:r>
+              <a:rPr lang="de-DE" altLang="de-DE" smtClean="0"/>
+              <a:t>Tag 6: Evaluationsfragen</a:t>
+            </a:r>
+            <a:endParaRPr lang="de-DE" altLang="de-DE" dirty="0" smtClean="0"/>
+          </a:p>
+        </p:txBody>
+      </p:sp>
+      <p:sp>
+        <p:nvSpPr>
+          <p:cNvPr id="2" name="Inhaltsplatzhalter 1"/>
+          <p:cNvSpPr>
+            <a:spLocks noGrp="1"/>
+          </p:cNvSpPr>
+          <p:nvPr>
+            <p:ph idx="1"/>
+          </p:nvPr>
+        </p:nvSpPr>
+        <p:spPr/>
+        <p:txBody>
+          <a:bodyPr/>
+          <a:lstStyle/>
+          <a:p>
+            <a:r>
+              <a:rPr lang="en-US" b="1" smtClean="0"/>
+              <a:t>Fragen für die Evaluation</a:t>
+            </a:r>
+          </a:p>
+          <a:p>
+            <a:pPr lvl="1"/>
+            <a:r>
+              <a:rPr lang="en-US" smtClean="0"/>
+              <a:t>Stärkerer Fokus auf C++(11) legen (= weniger Fokus auf C)?</a:t>
+            </a:r>
+          </a:p>
+          <a:p>
+            <a:pPr lvl="2"/>
+            <a:r>
+              <a:rPr lang="en-US" smtClean="0"/>
+              <a:t>"trifft zu" = mehr C++</a:t>
+            </a:r>
+          </a:p>
+          <a:p>
+            <a:pPr lvl="2"/>
+            <a:r>
+              <a:rPr lang="en-US" smtClean="0"/>
+              <a:t>"Mitte" = gleich lassen</a:t>
+            </a:r>
+          </a:p>
+          <a:p>
+            <a:pPr lvl="2"/>
+            <a:r>
+              <a:rPr lang="en-US" smtClean="0"/>
+              <a:t>"trifft nicht zu" = mehr C</a:t>
+            </a:r>
+          </a:p>
+          <a:p>
+            <a:pPr lvl="1"/>
+            <a:r>
+              <a:rPr lang="en-US" smtClean="0"/>
+              <a:t>Ich hatte vorher keine C++-Kenntnisse</a:t>
+            </a:r>
+          </a:p>
+          <a:p>
+            <a:pPr lvl="2">
+              <a:tabLst>
+                <a:tab pos="2155825" algn="l"/>
+              </a:tabLst>
+            </a:pPr>
+            <a:r>
+              <a:rPr lang="en-US" smtClean="0"/>
+              <a:t>"trifft zu" 	= Keine Vorkenntnisse</a:t>
+            </a:r>
+          </a:p>
+          <a:p>
+            <a:pPr lvl="2">
+              <a:tabLst>
+                <a:tab pos="2155825" algn="l"/>
+              </a:tabLst>
+            </a:pPr>
+            <a:r>
+              <a:rPr lang="en-US" smtClean="0"/>
+              <a:t>"Mitte"	= Eigene kleinere Projekte</a:t>
+            </a:r>
+          </a:p>
+          <a:p>
+            <a:pPr lvl="2">
+              <a:tabLst>
+                <a:tab pos="2155825" algn="l"/>
+              </a:tabLst>
+            </a:pPr>
+            <a:r>
+              <a:rPr lang="en-US" smtClean="0"/>
+              <a:t>"trifft nicht zu" 	= Sehr erfahrener C++-Programmierer</a:t>
+            </a:r>
+          </a:p>
+          <a:p>
+            <a:pPr marL="350838" lvl="2" indent="0">
+              <a:buNone/>
+              <a:tabLst>
+                <a:tab pos="2155825" algn="l"/>
+              </a:tabLst>
+            </a:pPr>
+            <a:endParaRPr lang="en-US"/>
+          </a:p>
+        </p:txBody>
+      </p:sp>
+    </p:spTree>
+    <p:extLst>
+      <p:ext uri="{BB962C8B-B14F-4D97-AF65-F5344CB8AC3E}">
+        <p14:creationId xmlns:p14="http://schemas.microsoft.com/office/powerpoint/2010/main" val="2676316158"/>
+      </p:ext>
+    </p:extLst>
+  </p:cSld>
+  <p:clrMapOvr>
+    <a:masterClrMapping/>
+  </p:clrMapOvr>
+  <mc:AlternateContent xmlns:mc="http://schemas.openxmlformats.org/markup-compatibility/2006" xmlns:p14="http://schemas.microsoft.com/office/powerpoint/2010/main">
+    <mc:Choice Requires="p14">
+      <p:transition spd="slow" p14:dur="2000"/>
+    </mc:Choice>
+    <mc:Fallback xmlns="">
+      <p:transition spd="slow"/>
+    </mc:Fallback>
+  </mc:AlternateContent>
+  <p:timing>
+    <p:tnLst>
+      <p:par>
+        <p:cTn id="1" dur="indefinite" restart="never" nodeType="tmRoot"/>
+      </p:par>
+    </p:tnLst>
+  </p:timing>
+</p:sld>
+</file>
+
+<file path=ppt/slides/slide13.xml><?xml version="1.0" encoding="utf-8"?>
 <p:sld xmlns:a="http://schemas.openxmlformats.org/drawingml/2006/main" xmlns:r="http://schemas.openxmlformats.org/officeDocument/2006/relationships" xmlns:p="http://schemas.openxmlformats.org/presentationml/2006/main">
   <p:cSld>
     <p:spTree>
@@ -12170,14 +12871,7 @@
                 <a:latin typeface="Consolas" panose="020B0609020204030204" pitchFamily="49" charset="0"/>
                 <a:cs typeface="Consolas" panose="020B0609020204030204" pitchFamily="49" charset="0"/>
               </a:rPr>
-              <a:t>::begin</a:t>
-            </a:r>
-            <a:r>
-              <a:rPr lang="en-US" b="1">
-                <a:latin typeface="Consolas" panose="020B0609020204030204" pitchFamily="49" charset="0"/>
-                <a:cs typeface="Consolas" panose="020B0609020204030204" pitchFamily="49" charset="0"/>
-              </a:rPr>
-              <a:t>()</a:t>
+              <a:t>::begin()</a:t>
             </a:r>
             <a:r>
               <a:rPr lang="en-US" smtClean="0"/>
@@ -12214,10 +12908,6 @@
               </a:rPr>
               <a:t>"iter != list.end()"</a:t>
             </a:r>
-            <a:endParaRPr lang="en-US">
-              <a:latin typeface="Consolas" panose="020B0609020204030204" pitchFamily="49" charset="0"/>
-              <a:cs typeface="Consolas" panose="020B0609020204030204" pitchFamily="49" charset="0"/>
-            </a:endParaRPr>
           </a:p>
         </p:txBody>
       </p:sp>
@@ -12479,7 +13169,7 @@
       </p:grpSpPr>
       <p:sp>
         <p:nvSpPr>
-          <p:cNvPr id="15362" name="Titel 1"/>
+          <p:cNvPr id="2" name="Titel 1"/>
           <p:cNvSpPr>
             <a:spLocks noGrp="1"/>
           </p:cNvSpPr>
@@ -12493,16 +13183,16 @@
           <a:lstStyle/>
           <a:p>
             <a:r>
-              <a:rPr lang="de-DE" altLang="de-DE" smtClean="0"/>
-              <a:t>Tag 6: Evaluationsfragen</a:t>
-            </a:r>
-            <a:endParaRPr lang="de-DE" altLang="de-DE" dirty="0" smtClean="0"/>
+              <a:rPr lang="en-US" smtClean="0"/>
+              <a:t>Tag 5: Anmerkungen</a:t>
+            </a:r>
+            <a:endParaRPr lang="en-US"/>
           </a:p>
         </p:txBody>
       </p:sp>
       <p:sp>
         <p:nvSpPr>
-          <p:cNvPr id="2" name="Inhaltsplatzhalter 1"/>
+          <p:cNvPr id="3" name="Inhaltsplatzhalter 2"/>
           <p:cNvSpPr>
             <a:spLocks noGrp="1"/>
           </p:cNvSpPr>
@@ -12515,115 +13205,186 @@
           <a:bodyPr/>
           <a:lstStyle/>
           <a:p>
+            <a:pPr marL="342900" indent="-342900">
+              <a:buFontTx/>
+              <a:buChar char="-"/>
+            </a:pPr>
             <a:r>
               <a:rPr lang="en-US" b="1" smtClean="0"/>
-              <a:t>Fragen für die Evaluation</a:t>
-            </a:r>
-          </a:p>
-          <a:p>
-            <a:pPr lvl="1"/>
+              <a:t>Bugfixes</a:t>
+            </a:r>
             <a:r>
               <a:rPr lang="en-US" smtClean="0"/>
-              <a:t>Stärkerer Fokus auf C++(11) legen (= weniger Fokus auf C)?</a:t>
-            </a:r>
-          </a:p>
-          <a:p>
-            <a:pPr lvl="2"/>
+              <a:t> in den Folien</a:t>
+            </a:r>
+          </a:p>
+          <a:p>
+            <a:pPr marL="692150" lvl="1" indent="-342900">
+              <a:buFontTx/>
+              <a:buChar char="-"/>
+            </a:pPr>
+            <a:r>
+              <a:rPr lang="en-US" b="1" smtClean="0"/>
+              <a:t>Right-Shift-Operator </a:t>
+            </a:r>
             <a:r>
               <a:rPr lang="en-US" smtClean="0"/>
-              <a:t>"trifft zu" = mehr C++</a:t>
-            </a:r>
-          </a:p>
-          <a:p>
-            <a:pPr lvl="2"/>
+              <a:t>"respektiert" </a:t>
+            </a:r>
+            <a:r>
+              <a:rPr lang="en-US" b="1" smtClean="0"/>
+              <a:t>Vorzeichen</a:t>
+            </a:r>
+          </a:p>
+          <a:p>
+            <a:pPr marL="881063" lvl="2" indent="-342900">
+              <a:buFontTx/>
+              <a:buChar char="-"/>
+            </a:pPr>
+            <a:r>
+              <a:rPr lang="en-US" smtClean="0">
+                <a:latin typeface="Consolas" panose="020B0609020204030204" pitchFamily="49" charset="0"/>
+                <a:cs typeface="Consolas" panose="020B0609020204030204" pitchFamily="49" charset="0"/>
+              </a:rPr>
+              <a:t> 5 &gt;&gt; 2 </a:t>
+            </a:r>
             <a:r>
               <a:rPr lang="en-US" smtClean="0"/>
-              <a:t>"Mitte" = gleich lassen</a:t>
-            </a:r>
-          </a:p>
-          <a:p>
-            <a:pPr lvl="2"/>
+              <a:t>	</a:t>
+            </a:r>
+            <a:r>
+              <a:rPr lang="en-US" smtClean="0">
+                <a:sym typeface="Wingdings" panose="05000000000000000000" pitchFamily="2" charset="2"/>
+              </a:rPr>
+              <a:t> auffüllen mit '0'</a:t>
+            </a:r>
+          </a:p>
+          <a:p>
+            <a:pPr marL="881063" lvl="2" indent="-342900">
+              <a:buFontTx/>
+              <a:buChar char="-"/>
+            </a:pPr>
+            <a:r>
+              <a:rPr lang="en-US" smtClean="0">
+                <a:latin typeface="Consolas" panose="020B0609020204030204" pitchFamily="49" charset="0"/>
+                <a:cs typeface="Consolas" panose="020B0609020204030204" pitchFamily="49" charset="0"/>
+                <a:sym typeface="Wingdings" panose="05000000000000000000" pitchFamily="2" charset="2"/>
+              </a:rPr>
+              <a:t>-5 &gt;&gt; 2 </a:t>
+            </a:r>
+            <a:r>
+              <a:rPr lang="en-US" smtClean="0">
+                <a:sym typeface="Wingdings" panose="05000000000000000000" pitchFamily="2" charset="2"/>
+              </a:rPr>
+              <a:t>	 auffüllen mit '1' (bei Zweierkomplementdarstellung)</a:t>
+            </a:r>
+          </a:p>
+          <a:p>
+            <a:pPr marL="342900" indent="-342900">
+              <a:buFontTx/>
+              <a:buChar char="-"/>
+            </a:pPr>
+            <a:endParaRPr lang="en-US" smtClean="0"/>
+          </a:p>
+          <a:p>
+            <a:pPr marL="342900" indent="-342900">
+              <a:buFontTx/>
+              <a:buChar char="-"/>
+            </a:pPr>
+            <a:r>
+              <a:rPr lang="en-US" b="1" smtClean="0"/>
+              <a:t>A 21.4: "Nullbyte am Ende überschreiben"</a:t>
+            </a:r>
             <a:r>
               <a:rPr lang="en-US" smtClean="0"/>
-              <a:t>"trifft nicht zu" = mehr C</a:t>
-            </a:r>
-          </a:p>
-          <a:p>
-            <a:pPr lvl="1"/>
+              <a:t> </a:t>
+            </a:r>
+          </a:p>
+          <a:p>
+            <a:pPr marL="692150" lvl="1" indent="-342900">
+              <a:buFontTx/>
+              <a:buChar char="-"/>
+            </a:pPr>
             <a:r>
               <a:rPr lang="en-US" smtClean="0"/>
-              <a:t>Ich hatte vorher keine C++-Kenntnisse</a:t>
-            </a:r>
-          </a:p>
-          <a:p>
-            <a:pPr lvl="2">
-              <a:tabLst>
-                <a:tab pos="2155825" algn="l"/>
-              </a:tabLst>
+              <a:t>… klappt leider nicht </a:t>
+            </a:r>
+            <a:r>
+              <a:rPr lang="en-US" smtClean="0">
+                <a:sym typeface="Wingdings" panose="05000000000000000000" pitchFamily="2" charset="2"/>
+              </a:rPr>
+              <a:t></a:t>
+            </a:r>
+            <a:endParaRPr lang="en-US" smtClean="0"/>
+          </a:p>
+          <a:p>
+            <a:pPr marL="692150" lvl="1" indent="-342900">
+              <a:buFontTx/>
+              <a:buChar char="-"/>
             </a:pPr>
             <a:r>
               <a:rPr lang="en-US" smtClean="0"/>
-              <a:t>"trifft zu" 	= Keine Vorkenntnisse</a:t>
-            </a:r>
-          </a:p>
-          <a:p>
-            <a:pPr lvl="2">
-              <a:tabLst>
-                <a:tab pos="2155825" algn="l"/>
-              </a:tabLst>
-            </a:pPr>
+              <a:t>Denn: </a:t>
+            </a:r>
+            <a:r>
+              <a:rPr lang="en-US" smtClean="0">
+                <a:latin typeface="Consolas" panose="020B0609020204030204" pitchFamily="49" charset="0"/>
+                <a:cs typeface="Consolas" panose="020B0609020204030204" pitchFamily="49" charset="0"/>
+              </a:rPr>
+              <a:t>malloc()</a:t>
+            </a:r>
             <a:r>
               <a:rPr lang="en-US" smtClean="0"/>
-              <a:t>"Mitte"	= Eigene kleinere Projekte</a:t>
-            </a:r>
-          </a:p>
-          <a:p>
-            <a:pPr lvl="2">
-              <a:tabLst>
-                <a:tab pos="2155825" algn="l"/>
-              </a:tabLst>
-            </a:pPr>
+              <a:t> liefert bei uns immer mit '</a:t>
+            </a:r>
+            <a:r>
+              <a:rPr lang="en-US" smtClean="0">
+                <a:latin typeface="Consolas" panose="020B0609020204030204" pitchFamily="49" charset="0"/>
+                <a:cs typeface="Consolas" panose="020B0609020204030204" pitchFamily="49" charset="0"/>
+              </a:rPr>
+              <a:t>\0</a:t>
+            </a:r>
             <a:r>
               <a:rPr lang="en-US" smtClean="0"/>
-              <a:t>"trifft nicht zu" 	= Sehr erfahrener C++-Programmierer</a:t>
-            </a:r>
-          </a:p>
-          <a:p>
-            <a:pPr marL="350838" lvl="2" indent="0">
-              <a:buNone/>
-              <a:tabLst>
-                <a:tab pos="2155825" algn="l"/>
-              </a:tabLst>
-            </a:pPr>
-            <a:endParaRPr lang="en-US"/>
+              <a:t>' initialisierte Blöcke</a:t>
+            </a:r>
+            <a:br>
+              <a:rPr lang="en-US" smtClean="0"/>
+            </a:br>
+            <a:r>
+              <a:rPr lang="en-US" smtClean="0">
+                <a:sym typeface="Wingdings" panose="05000000000000000000" pitchFamily="2" charset="2"/>
+              </a:rPr>
+              <a:t> Nach dem künstlich eingefügten Zeichen ist wieder ein </a:t>
+            </a:r>
+            <a:r>
+              <a:rPr lang="en-US"/>
+              <a:t>'</a:t>
+            </a:r>
+            <a:r>
+              <a:rPr lang="en-US">
+                <a:latin typeface="Consolas" panose="020B0609020204030204" pitchFamily="49" charset="0"/>
+                <a:cs typeface="Consolas" panose="020B0609020204030204" pitchFamily="49" charset="0"/>
+              </a:rPr>
+              <a:t>\0</a:t>
+            </a:r>
+            <a:r>
+              <a:rPr lang="en-US"/>
+              <a:t>'</a:t>
+            </a:r>
           </a:p>
         </p:txBody>
       </p:sp>
     </p:spTree>
     <p:extLst>
       <p:ext uri="{BB962C8B-B14F-4D97-AF65-F5344CB8AC3E}">
-        <p14:creationId xmlns:p14="http://schemas.microsoft.com/office/powerpoint/2010/main" val="2676316158"/>
+        <p14:creationId xmlns:p14="http://schemas.microsoft.com/office/powerpoint/2010/main" val="1502797075"/>
       </p:ext>
     </p:extLst>
   </p:cSld>
   <p:clrMapOvr>
     <a:masterClrMapping/>
   </p:clrMapOvr>
-  <mc:AlternateContent xmlns:mc="http://schemas.openxmlformats.org/markup-compatibility/2006" xmlns:p14="http://schemas.microsoft.com/office/powerpoint/2010/main">
-    <mc:Choice Requires="p14">
-      <p:transition spd="slow" p14:dur="2000"/>
-    </mc:Choice>
-    <mc:Fallback xmlns="">
-      <p:transition spd="slow"/>
-    </mc:Fallback>
-  </mc:AlternateContent>
-  <p:timing>
-    <p:tnLst>
-      <p:par>
-        <p:cTn id="1" dur="indefinite" restart="never" nodeType="tmRoot"/>
-      </p:par>
-    </p:tnLst>
-  </p:timing>
 </p:sld>
 </file>
 

</xml_diff>

<commit_message>
Various improvements and minor bugfixes of 2017-09-07
</commit_message>
<xml_diff>
--- a/2017/recap_and_warmup_slides.pptx
+++ b/2017/recap_and_warmup_slides.pptx
@@ -4932,7 +4932,19 @@
             </a:pPr>
             <a:r>
               <a:rPr lang="en-US" sz="800" dirty="0" smtClean="0"/>
-              <a:t>© author(s) of these slides 2014-2015 including research results of the research network ES  and TU Darmstadt otherwise as specified at the respective slide</a:t>
+              <a:t>© author(s) of these </a:t>
+            </a:r>
+            <a:r>
+              <a:rPr lang="en-US" sz="800" smtClean="0"/>
+              <a:t>slides </a:t>
+            </a:r>
+            <a:r>
+              <a:rPr lang="en-US" sz="800" smtClean="0"/>
+              <a:t>2014-2017 </a:t>
+            </a:r>
+            <a:r>
+              <a:rPr lang="en-US" sz="800" dirty="0" smtClean="0"/>
+              <a:t>including research results of the research network ES  and TU Darmstadt otherwise as specified at the respective slide</a:t>
             </a:r>
             <a:endParaRPr lang="en-US" sz="1200" dirty="0" smtClean="0"/>
           </a:p>
@@ -8389,7 +8401,7 @@
           <a:graphicData uri="http://schemas.openxmlformats.org/presentationml/2006/ole">
             <mc:AlternateContent xmlns:mc="http://schemas.openxmlformats.org/markup-compatibility/2006">
               <mc:Choice xmlns:v="urn:schemas-microsoft-com:vml" Requires="v">
-                <p:oleObj spid="_x0000_s1997" r:id="rId16" imgW="1038370" imgH="980952" progId="">
+                <p:oleObj spid="_x0000_s2001" r:id="rId16" imgW="1038370" imgH="980952" progId="">
                   <p:embed/>
                 </p:oleObj>
               </mc:Choice>
@@ -8827,7 +8839,7 @@
                 </a:lnSpc>
                 <a:defRPr/>
               </a:pPr>
-              <a:t>06.09.2017</a:t>
+              <a:t>07.09.2017</a:t>
             </a:fld>
             <a:r>
               <a:rPr lang="en-GB" altLang="de-DE" sz="1000" smtClean="0">
@@ -9980,14 +9992,39 @@
           <a:p>
             <a:r>
               <a:rPr lang="en-US" b="1" smtClean="0"/>
+              <a:t>Versuchsgerät = Entwicklungsumgebung + Microcontrollerboards</a:t>
+            </a:r>
+          </a:p>
+          <a:p>
+            <a:endParaRPr lang="en-US" b="1"/>
+          </a:p>
+          <a:p>
+            <a:r>
+              <a:rPr lang="en-US" b="1" smtClean="0"/>
+              <a:t>Praktikumsgruppe = 1 für Block 1; 2 für Block 2</a:t>
+            </a:r>
+          </a:p>
+          <a:p>
+            <a:endParaRPr lang="en-US" b="1"/>
+          </a:p>
+          <a:p>
+            <a:r>
+              <a:rPr lang="en-US" b="1" smtClean="0"/>
               <a:t>Fragen für die Evaluation</a:t>
             </a:r>
           </a:p>
           <a:p>
-            <a:pPr lvl="1"/>
+            <a:pPr marL="523875" lvl="1" indent="-342900">
+              <a:buFont typeface="+mj-lt"/>
+              <a:buAutoNum type="arabicPeriod"/>
+            </a:pPr>
             <a:r>
               <a:rPr lang="en-US" smtClean="0"/>
-              <a:t>Stärkerer Fokus auf C++(11) legen (= weniger Fokus auf C)?</a:t>
+              <a:t>Stärkeren Fokus </a:t>
+            </a:r>
+            <a:r>
+              <a:rPr lang="en-US" smtClean="0"/>
+              <a:t>auf C++(11) legen (= weniger Fokus auf C)?</a:t>
             </a:r>
           </a:p>
           <a:p>
@@ -10012,7 +10049,10 @@
             </a:r>
           </a:p>
           <a:p>
-            <a:pPr lvl="1"/>
+            <a:pPr marL="523875" lvl="1" indent="-342900">
+              <a:buFont typeface="+mj-lt"/>
+              <a:buAutoNum type="arabicPeriod"/>
+            </a:pPr>
             <a:r>
               <a:rPr lang="en-US" smtClean="0"/>
               <a:t>Ich hatte vorher keine C++-Kenntnisse</a:t>
@@ -13289,13 +13329,7 @@
               <a:rPr lang="en-US" b="1" smtClean="0">
                 <a:sym typeface="Wingdings" panose="05000000000000000000" pitchFamily="2" charset="2"/>
               </a:rPr>
-              <a:t>Bugfixes in den </a:t>
-            </a:r>
-            <a:r>
-              <a:rPr lang="en-US" b="1" smtClean="0">
-                <a:sym typeface="Wingdings" panose="05000000000000000000" pitchFamily="2" charset="2"/>
-              </a:rPr>
-              <a:t>Übungen</a:t>
+              <a:t>Bugfixes in den Übungen</a:t>
             </a:r>
             <a:r>
               <a:rPr lang="en-US" smtClean="0">
@@ -13309,9 +13343,6 @@
               </a:rPr>
               <a:t>button.c</a:t>
             </a:r>
-            <a:endParaRPr lang="en-US" i="1" smtClean="0">
-              <a:sym typeface="Wingdings" panose="05000000000000000000" pitchFamily="2" charset="2"/>
-            </a:endParaRPr>
           </a:p>
           <a:p>
             <a:pPr marL="881063" lvl="2" indent="-342900">

</xml_diff>

<commit_message>
Add exam slide for group 2
</commit_message>
<xml_diff>
--- a/2017/recap_and_warmup_slides.pptx
+++ b/2017/recap_and_warmup_slides.pptx
@@ -5,10 +5,10 @@
     <p:sldMasterId id="2147483650" r:id="rId1"/>
   </p:sldMasterIdLst>
   <p:notesMasterIdLst>
-    <p:notesMasterId r:id="rId15"/>
+    <p:notesMasterId r:id="rId16"/>
   </p:notesMasterIdLst>
   <p:handoutMasterIdLst>
-    <p:handoutMasterId r:id="rId16"/>
+    <p:handoutMasterId r:id="rId17"/>
   </p:handoutMasterIdLst>
   <p:sldIdLst>
     <p:sldId id="454" r:id="rId2"/>
@@ -24,6 +24,7 @@
     <p:sldId id="481" r:id="rId12"/>
     <p:sldId id="480" r:id="rId13"/>
     <p:sldId id="471" r:id="rId14"/>
+    <p:sldId id="486" r:id="rId15"/>
   </p:sldIdLst>
   <p:sldSz cx="9144000" cy="6858000" type="screen4x3"/>
   <p:notesSz cx="7099300" cy="10234613"/>
@@ -210,6 +211,7 @@
             <p14:sldId id="481"/>
             <p14:sldId id="480"/>
             <p14:sldId id="471"/>
+            <p14:sldId id="486"/>
           </p14:sldIdLst>
         </p14:section>
       </p14:sectionLst>
@@ -4936,11 +4938,7 @@
             </a:r>
             <a:r>
               <a:rPr lang="en-US" sz="800" smtClean="0"/>
-              <a:t>slides </a:t>
-            </a:r>
-            <a:r>
-              <a:rPr lang="en-US" sz="800" smtClean="0"/>
-              <a:t>2014-2017 </a:t>
+              <a:t>slides 2014-2017 </a:t>
             </a:r>
             <a:r>
               <a:rPr lang="en-US" sz="800" dirty="0" smtClean="0"/>
@@ -8401,7 +8399,7 @@
           <a:graphicData uri="http://schemas.openxmlformats.org/presentationml/2006/ole">
             <mc:AlternateContent xmlns:mc="http://schemas.openxmlformats.org/markup-compatibility/2006">
               <mc:Choice xmlns:v="urn:schemas-microsoft-com:vml" Requires="v">
-                <p:oleObj spid="_x0000_s2001" r:id="rId16" imgW="1038370" imgH="980952" progId="">
+                <p:oleObj spid="_x0000_s2002" r:id="rId16" imgW="1038370" imgH="980952" progId="">
                   <p:embed/>
                 </p:oleObj>
               </mc:Choice>
@@ -8839,7 +8837,7 @@
                 </a:lnSpc>
                 <a:defRPr/>
               </a:pPr>
-              <a:t>07.09.2017</a:t>
+              <a:t>13.09.2017</a:t>
             </a:fld>
             <a:r>
               <a:rPr lang="en-GB" altLang="de-DE" sz="1000" smtClean="0">
@@ -10020,11 +10018,7 @@
             </a:pPr>
             <a:r>
               <a:rPr lang="en-US" smtClean="0"/>
-              <a:t>Stärkeren Fokus </a:t>
-            </a:r>
-            <a:r>
-              <a:rPr lang="en-US" smtClean="0"/>
-              <a:t>auf C++(11) legen (= weniger Fokus auf C)?</a:t>
+              <a:t>Stärkeren Fokus auf C++(11) legen (= weniger Fokus auf C)?</a:t>
             </a:r>
           </a:p>
           <a:p>
@@ -10193,6 +10187,233 @@
     <p:extLst>
       <p:ext uri="{BB962C8B-B14F-4D97-AF65-F5344CB8AC3E}">
         <p14:creationId xmlns:p14="http://schemas.microsoft.com/office/powerpoint/2010/main" val="3650036911"/>
+      </p:ext>
+    </p:extLst>
+  </p:cSld>
+  <p:clrMapOvr>
+    <a:masterClrMapping/>
+  </p:clrMapOvr>
+  <p:timing>
+    <p:tnLst>
+      <p:par>
+        <p:cTn id="1" dur="indefinite" restart="never" nodeType="tmRoot"/>
+      </p:par>
+    </p:tnLst>
+  </p:timing>
+</p:sld>
+</file>
+
+<file path=ppt/slides/slide14.xml><?xml version="1.0" encoding="utf-8"?>
+<p:sld xmlns:a="http://schemas.openxmlformats.org/drawingml/2006/main" xmlns:r="http://schemas.openxmlformats.org/officeDocument/2006/relationships" xmlns:p="http://schemas.openxmlformats.org/presentationml/2006/main">
+  <p:cSld>
+    <p:spTree>
+      <p:nvGrpSpPr>
+        <p:cNvPr id="1" name=""/>
+        <p:cNvGrpSpPr/>
+        <p:nvPr/>
+      </p:nvGrpSpPr>
+      <p:grpSpPr>
+        <a:xfrm>
+          <a:off x="0" y="0"/>
+          <a:ext cx="0" cy="0"/>
+          <a:chOff x="0" y="0"/>
+          <a:chExt cx="0" cy="0"/>
+        </a:xfrm>
+      </p:grpSpPr>
+      <p:sp>
+        <p:nvSpPr>
+          <p:cNvPr id="2" name="Titel 1"/>
+          <p:cNvSpPr>
+            <a:spLocks noGrp="1"/>
+          </p:cNvSpPr>
+          <p:nvPr>
+            <p:ph type="title"/>
+          </p:nvPr>
+        </p:nvSpPr>
+        <p:spPr/>
+        <p:txBody>
+          <a:bodyPr/>
+          <a:lstStyle/>
+          <a:p>
+            <a:pPr>
+              <a:tabLst>
+                <a:tab pos="2155825" algn="l"/>
+              </a:tabLst>
+            </a:pPr>
+            <a:r>
+              <a:rPr lang="de-DE" altLang="de-DE"/>
+              <a:t>Tag </a:t>
+            </a:r>
+            <a:r>
+              <a:rPr lang="de-DE" altLang="de-DE" smtClean="0"/>
+              <a:t>5: </a:t>
+            </a:r>
+            <a:r>
+              <a:rPr lang="en-US"/>
+              <a:t>Hinweise zur Klausur</a:t>
+            </a:r>
+          </a:p>
+        </p:txBody>
+      </p:sp>
+      <p:sp>
+        <p:nvSpPr>
+          <p:cNvPr id="3" name="Inhaltsplatzhalter 2"/>
+          <p:cNvSpPr>
+            <a:spLocks noGrp="1"/>
+          </p:cNvSpPr>
+          <p:nvPr>
+            <p:ph idx="1"/>
+          </p:nvPr>
+        </p:nvSpPr>
+        <p:spPr/>
+        <p:txBody>
+          <a:bodyPr/>
+          <a:lstStyle/>
+          <a:p>
+            <a:pPr>
+              <a:tabLst>
+                <a:tab pos="2155825" algn="l"/>
+              </a:tabLst>
+            </a:pPr>
+            <a:r>
+              <a:rPr lang="en-US" b="1"/>
+              <a:t>Hinweise zur Klausur</a:t>
+            </a:r>
+          </a:p>
+          <a:p>
+            <a:pPr lvl="1">
+              <a:tabLst>
+                <a:tab pos="2155825" algn="l"/>
+              </a:tabLst>
+            </a:pPr>
+            <a:r>
+              <a:rPr lang="en-US"/>
+              <a:t>Wir gehen davon aus, dass </a:t>
+            </a:r>
+            <a:r>
+              <a:rPr lang="en-US" b="1"/>
+              <a:t>alle nicht-optionalen Übungen </a:t>
+            </a:r>
+            <a:r>
+              <a:rPr lang="en-US" smtClean="0"/>
+              <a:t>bearbeitet </a:t>
+            </a:r>
+            <a:r>
+              <a:rPr lang="en-US"/>
+              <a:t>wurden </a:t>
+            </a:r>
+            <a:r>
+              <a:rPr lang="en-US" b="1"/>
+              <a:t>und</a:t>
+            </a:r>
+            <a:r>
+              <a:rPr lang="en-US"/>
+              <a:t> alle Folien soweit verstanden wurden.</a:t>
+            </a:r>
+          </a:p>
+          <a:p>
+            <a:pPr lvl="1">
+              <a:tabLst>
+                <a:tab pos="2155825" algn="l"/>
+              </a:tabLst>
+            </a:pPr>
+            <a:r>
+              <a:rPr lang="en-US"/>
+              <a:t>Es wird ein </a:t>
+            </a:r>
+            <a:r>
+              <a:rPr lang="en-US" b="1"/>
+              <a:t>Codehandout</a:t>
+            </a:r>
+            <a:r>
+              <a:rPr lang="en-US"/>
+              <a:t> geben, in dem für bestimmte Funktionen/Datentypen/Methoden eine Beschreibung vorliegt.</a:t>
+            </a:r>
+          </a:p>
+          <a:p>
+            <a:pPr lvl="2">
+              <a:tabLst>
+                <a:tab pos="2155825" algn="l"/>
+              </a:tabLst>
+            </a:pPr>
+            <a:r>
+              <a:rPr lang="en-US" b="1"/>
+              <a:t>NICHT </a:t>
+            </a:r>
+            <a:r>
+              <a:rPr lang="en-US"/>
+              <a:t>zu erwarten ist bspw. </a:t>
+            </a:r>
+            <a:r>
+              <a:rPr lang="en-US">
+                <a:latin typeface="Consolas" panose="020B0609020204030204" pitchFamily="49" charset="0"/>
+                <a:cs typeface="Consolas" panose="020B0609020204030204" pitchFamily="49" charset="0"/>
+              </a:rPr>
+              <a:t>std::vector&lt;T&gt;::push_back</a:t>
+            </a:r>
+          </a:p>
+          <a:p>
+            <a:pPr lvl="2">
+              <a:tabLst>
+                <a:tab pos="2155825" algn="l"/>
+              </a:tabLst>
+            </a:pPr>
+            <a:r>
+              <a:rPr lang="en-US"/>
+              <a:t>Zu erwarten ist bspw. </a:t>
+            </a:r>
+            <a:r>
+              <a:rPr lang="en-US">
+                <a:latin typeface="Consolas" panose="020B0609020204030204" pitchFamily="49" charset="0"/>
+                <a:cs typeface="Consolas" panose="020B0609020204030204" pitchFamily="49" charset="0"/>
+              </a:rPr>
+              <a:t>std::string::</a:t>
+            </a:r>
+            <a:r>
+              <a:rPr lang="en-US" smtClean="0">
+                <a:latin typeface="Consolas" panose="020B0609020204030204" pitchFamily="49" charset="0"/>
+                <a:cs typeface="Consolas" panose="020B0609020204030204" pitchFamily="49" charset="0"/>
+              </a:rPr>
+              <a:t>find</a:t>
+            </a:r>
+          </a:p>
+          <a:p>
+            <a:pPr lvl="2">
+              <a:tabLst>
+                <a:tab pos="2155825" algn="l"/>
+              </a:tabLst>
+            </a:pPr>
+            <a:r>
+              <a:rPr lang="en-US"/>
+              <a:t>Das </a:t>
+            </a:r>
+            <a:r>
+              <a:rPr lang="en-US" b="1" smtClean="0"/>
+              <a:t>Codehandout </a:t>
+            </a:r>
+            <a:r>
+              <a:rPr lang="en-US" smtClean="0"/>
+              <a:t>ist auf </a:t>
+            </a:r>
+            <a:r>
+              <a:rPr lang="en-US" b="1" smtClean="0"/>
+              <a:t>Englisch</a:t>
+            </a:r>
+            <a:r>
+              <a:rPr lang="en-US" smtClean="0"/>
+              <a:t>! (Ist das für jemanden problematisch?)</a:t>
+            </a:r>
+            <a:endParaRPr lang="en-US"/>
+          </a:p>
+          <a:p>
+            <a:endParaRPr lang="en-US"/>
+          </a:p>
+        </p:txBody>
+      </p:sp>
+    </p:spTree>
+    <p:extLst>
+      <p:ext uri="{BB962C8B-B14F-4D97-AF65-F5344CB8AC3E}">
+        <p14:creationId xmlns:p14="http://schemas.microsoft.com/office/powerpoint/2010/main" val="746502156"/>
       </p:ext>
     </p:extLst>
   </p:cSld>

</xml_diff>

<commit_message>
Bugfixes in memory management part (Floor constructor)
</commit_message>
<xml_diff>
--- a/2017/recap_and_warmup_slides.pptx
+++ b/2017/recap_and_warmup_slides.pptx
@@ -5,10 +5,10 @@
     <p:sldMasterId id="2147483650" r:id="rId1"/>
   </p:sldMasterIdLst>
   <p:notesMasterIdLst>
-    <p:notesMasterId r:id="rId16"/>
+    <p:notesMasterId r:id="rId20"/>
   </p:notesMasterIdLst>
   <p:handoutMasterIdLst>
-    <p:handoutMasterId r:id="rId17"/>
+    <p:handoutMasterId r:id="rId21"/>
   </p:handoutMasterIdLst>
   <p:sldIdLst>
     <p:sldId id="454" r:id="rId2"/>
@@ -24,7 +24,11 @@
     <p:sldId id="481" r:id="rId12"/>
     <p:sldId id="480" r:id="rId13"/>
     <p:sldId id="471" r:id="rId14"/>
-    <p:sldId id="486" r:id="rId15"/>
+    <p:sldId id="487" r:id="rId15"/>
+    <p:sldId id="488" r:id="rId16"/>
+    <p:sldId id="489" r:id="rId17"/>
+    <p:sldId id="490" r:id="rId18"/>
+    <p:sldId id="486" r:id="rId19"/>
   </p:sldIdLst>
   <p:sldSz cx="9144000" cy="6858000" type="screen4x3"/>
   <p:notesSz cx="7099300" cy="10234613"/>
@@ -211,6 +215,10 @@
             <p14:sldId id="481"/>
             <p14:sldId id="480"/>
             <p14:sldId id="471"/>
+            <p14:sldId id="487"/>
+            <p14:sldId id="488"/>
+            <p14:sldId id="489"/>
+            <p14:sldId id="490"/>
             <p14:sldId id="486"/>
           </p14:sldIdLst>
         </p14:section>
@@ -8399,7 +8407,7 @@
           <a:graphicData uri="http://schemas.openxmlformats.org/presentationml/2006/ole">
             <mc:AlternateContent xmlns:mc="http://schemas.openxmlformats.org/markup-compatibility/2006">
               <mc:Choice xmlns:v="urn:schemas-microsoft-com:vml" Requires="v">
-                <p:oleObj spid="_x0000_s2002" r:id="rId16" imgW="1038370" imgH="980952" progId="">
+                <p:oleObj spid="_x0000_s2009" r:id="rId16" imgW="1038370" imgH="980952" progId="">
                   <p:embed/>
                 </p:oleObj>
               </mc:Choice>
@@ -8837,7 +8845,7 @@
                 </a:lnSpc>
                 <a:defRPr/>
               </a:pPr>
-              <a:t>13.09.2017</a:t>
+              <a:t>15.09.2017</a:t>
             </a:fld>
             <a:r>
               <a:rPr lang="en-GB" altLang="de-DE" sz="1000" smtClean="0">
@@ -10204,6 +10212,2015 @@
 </file>
 
 <file path=ppt/slides/slide14.xml><?xml version="1.0" encoding="utf-8"?>
+<p:sld xmlns:a="http://schemas.openxmlformats.org/drawingml/2006/main" xmlns:r="http://schemas.openxmlformats.org/officeDocument/2006/relationships" xmlns:p="http://schemas.openxmlformats.org/presentationml/2006/main">
+  <p:cSld>
+    <p:spTree>
+      <p:nvGrpSpPr>
+        <p:cNvPr id="1" name=""/>
+        <p:cNvGrpSpPr/>
+        <p:nvPr/>
+      </p:nvGrpSpPr>
+      <p:grpSpPr>
+        <a:xfrm>
+          <a:off x="0" y="0"/>
+          <a:ext cx="0" cy="0"/>
+          <a:chOff x="0" y="0"/>
+          <a:chExt cx="0" cy="0"/>
+        </a:xfrm>
+      </p:grpSpPr>
+      <p:sp>
+        <p:nvSpPr>
+          <p:cNvPr id="7" name="Titel 6"/>
+          <p:cNvSpPr>
+            <a:spLocks noGrp="1"/>
+          </p:cNvSpPr>
+          <p:nvPr>
+            <p:ph type="title"/>
+          </p:nvPr>
+        </p:nvSpPr>
+        <p:spPr/>
+        <p:txBody>
+          <a:bodyPr/>
+          <a:lstStyle/>
+          <a:p>
+            <a:r>
+              <a:rPr lang="en-US" smtClean="0"/>
+              <a:t>Tag 2: Anmerkungen</a:t>
+            </a:r>
+            <a:endParaRPr lang="en-US" dirty="0"/>
+          </a:p>
+        </p:txBody>
+      </p:sp>
+      <p:sp>
+        <p:nvSpPr>
+          <p:cNvPr id="8" name="Inhaltsplatzhalter 7"/>
+          <p:cNvSpPr>
+            <a:spLocks noGrp="1"/>
+          </p:cNvSpPr>
+          <p:nvPr>
+            <p:ph idx="1"/>
+          </p:nvPr>
+        </p:nvSpPr>
+        <p:spPr/>
+        <p:txBody>
+          <a:bodyPr>
+            <a:normAutofit/>
+          </a:bodyPr>
+          <a:lstStyle/>
+          <a:p>
+            <a:pPr marL="342900" indent="-342900">
+              <a:buFontTx/>
+              <a:buChar char="-"/>
+            </a:pPr>
+            <a:r>
+              <a:rPr lang="en-US" b="1" smtClean="0"/>
+              <a:t>PCs können nicht heruntergefahren werden.</a:t>
+            </a:r>
+          </a:p>
+          <a:p>
+            <a:pPr marL="692150" lvl="1" indent="-342900">
+              <a:buFontTx/>
+              <a:buChar char="-"/>
+            </a:pPr>
+            <a:r>
+              <a:rPr lang="en-US" smtClean="0"/>
+              <a:t>Einfach nur zuklappen / abmelden.</a:t>
+            </a:r>
+          </a:p>
+          <a:p>
+            <a:pPr marL="342900" indent="-342900">
+              <a:buFontTx/>
+              <a:buChar char="-"/>
+            </a:pPr>
+            <a:r>
+              <a:rPr lang="en-US" b="1" smtClean="0"/>
+              <a:t>Aktualisierung der Unterlagen</a:t>
+            </a:r>
+            <a:endParaRPr lang="en-US" smtClean="0"/>
+          </a:p>
+          <a:p>
+            <a:pPr marL="692150" lvl="1" indent="-342900">
+              <a:buFont typeface="+mj-lt"/>
+              <a:buAutoNum type="arabicPeriod"/>
+            </a:pPr>
+            <a:r>
+              <a:rPr lang="en-US" smtClean="0"/>
+              <a:t>Terminal öffnen</a:t>
+            </a:r>
+          </a:p>
+          <a:p>
+            <a:pPr marL="692150" lvl="1" indent="-342900">
+              <a:buFont typeface="+mj-lt"/>
+              <a:buAutoNum type="arabicPeriod"/>
+            </a:pPr>
+            <a:r>
+              <a:rPr lang="en-US" smtClean="0">
+                <a:latin typeface="Consolas" panose="020B0609020204030204" pitchFamily="49" charset="0"/>
+                <a:cs typeface="Consolas" panose="020B0609020204030204" pitchFamily="49" charset="0"/>
+              </a:rPr>
+              <a:t>cd ~/Repos/tud-cppp</a:t>
+            </a:r>
+          </a:p>
+          <a:p>
+            <a:pPr marL="692150" lvl="1" indent="-342900">
+              <a:buFont typeface="+mj-lt"/>
+              <a:buAutoNum type="arabicPeriod"/>
+            </a:pPr>
+            <a:r>
+              <a:rPr lang="en-US">
+                <a:latin typeface="Consolas" panose="020B0609020204030204" pitchFamily="49" charset="0"/>
+                <a:cs typeface="Consolas" panose="020B0609020204030204" pitchFamily="49" charset="0"/>
+              </a:rPr>
+              <a:t>git pull</a:t>
+            </a:r>
+          </a:p>
+          <a:p>
+            <a:pPr marL="342900" indent="-342900">
+              <a:buFontTx/>
+              <a:buChar char="-"/>
+            </a:pPr>
+            <a:r>
+              <a:rPr lang="en-US" b="1" smtClean="0"/>
+              <a:t>Changelog online</a:t>
+            </a:r>
+            <a:r>
+              <a:rPr lang="en-US" smtClean="0"/>
+              <a:t>: </a:t>
+            </a:r>
+            <a:r>
+              <a:rPr lang="en-US" smtClean="0">
+                <a:hlinkClick r:id="rId2"/>
+              </a:rPr>
+              <a:t>https://github.com/Echtzeitsysteme/tud-cppp/blob/master/changelog.md</a:t>
+            </a:r>
+            <a:r>
+              <a:rPr lang="en-US" smtClean="0"/>
+              <a:t> </a:t>
+            </a:r>
+            <a:endParaRPr lang="en-US"/>
+          </a:p>
+        </p:txBody>
+      </p:sp>
+    </p:spTree>
+    <p:extLst>
+      <p:ext uri="{BB962C8B-B14F-4D97-AF65-F5344CB8AC3E}">
+        <p14:creationId xmlns:p14="http://schemas.microsoft.com/office/powerpoint/2010/main" val="3815613991"/>
+      </p:ext>
+    </p:extLst>
+  </p:cSld>
+  <p:clrMapOvr>
+    <a:masterClrMapping/>
+  </p:clrMapOvr>
+  <p:timing>
+    <p:tnLst>
+      <p:par>
+        <p:cTn id="1" dur="indefinite" restart="never" nodeType="tmRoot">
+          <p:childTnLst>
+            <p:seq concurrent="1" nextAc="seek">
+              <p:cTn id="2" dur="indefinite" nodeType="mainSeq">
+                <p:childTnLst>
+                  <p:par>
+                    <p:cTn id="3" fill="hold">
+                      <p:stCondLst>
+                        <p:cond delay="indefinite"/>
+                        <p:cond evt="onBegin" delay="0">
+                          <p:tn val="2"/>
+                        </p:cond>
+                      </p:stCondLst>
+                      <p:childTnLst>
+                        <p:par>
+                          <p:cTn id="4" fill="hold">
+                            <p:stCondLst>
+                              <p:cond delay="0"/>
+                            </p:stCondLst>
+                            <p:childTnLst>
+                              <p:par>
+                                <p:cTn id="5" presetID="1" presetClass="entr" presetSubtype="0" fill="hold" nodeType="withEffect">
+                                  <p:stCondLst>
+                                    <p:cond delay="0"/>
+                                  </p:stCondLst>
+                                  <p:childTnLst>
+                                    <p:set>
+                                      <p:cBhvr>
+                                        <p:cTn id="6" dur="1" fill="hold">
+                                          <p:stCondLst>
+                                            <p:cond delay="0"/>
+                                          </p:stCondLst>
+                                        </p:cTn>
+                                        <p:tgtEl>
+                                          <p:spTgt spid="8">
+                                            <p:txEl>
+                                              <p:pRg st="6" end="6"/>
+                                            </p:txEl>
+                                          </p:spTgt>
+                                        </p:tgtEl>
+                                        <p:attrNameLst>
+                                          <p:attrName>style.visibility</p:attrName>
+                                        </p:attrNameLst>
+                                      </p:cBhvr>
+                                      <p:to>
+                                        <p:strVal val="visible"/>
+                                      </p:to>
+                                    </p:set>
+                                  </p:childTnLst>
+                                </p:cTn>
+                              </p:par>
+                              <p:par>
+                                <p:cTn id="7" presetID="1" presetClass="entr" presetSubtype="0" fill="hold" nodeType="withEffect">
+                                  <p:stCondLst>
+                                    <p:cond delay="0"/>
+                                  </p:stCondLst>
+                                  <p:childTnLst>
+                                    <p:set>
+                                      <p:cBhvr>
+                                        <p:cTn id="8" dur="1" fill="hold">
+                                          <p:stCondLst>
+                                            <p:cond delay="0"/>
+                                          </p:stCondLst>
+                                        </p:cTn>
+                                        <p:tgtEl>
+                                          <p:spTgt spid="8">
+                                            <p:txEl>
+                                              <p:pRg st="2" end="2"/>
+                                            </p:txEl>
+                                          </p:spTgt>
+                                        </p:tgtEl>
+                                        <p:attrNameLst>
+                                          <p:attrName>style.visibility</p:attrName>
+                                        </p:attrNameLst>
+                                      </p:cBhvr>
+                                      <p:to>
+                                        <p:strVal val="visible"/>
+                                      </p:to>
+                                    </p:set>
+                                  </p:childTnLst>
+                                </p:cTn>
+                              </p:par>
+                              <p:par>
+                                <p:cTn id="9" presetID="1" presetClass="entr" presetSubtype="0" fill="hold" nodeType="withEffect">
+                                  <p:stCondLst>
+                                    <p:cond delay="0"/>
+                                  </p:stCondLst>
+                                  <p:childTnLst>
+                                    <p:set>
+                                      <p:cBhvr>
+                                        <p:cTn id="10" dur="1" fill="hold">
+                                          <p:stCondLst>
+                                            <p:cond delay="0"/>
+                                          </p:stCondLst>
+                                        </p:cTn>
+                                        <p:tgtEl>
+                                          <p:spTgt spid="8">
+                                            <p:txEl>
+                                              <p:pRg st="0" end="0"/>
+                                            </p:txEl>
+                                          </p:spTgt>
+                                        </p:tgtEl>
+                                        <p:attrNameLst>
+                                          <p:attrName>style.visibility</p:attrName>
+                                        </p:attrNameLst>
+                                      </p:cBhvr>
+                                      <p:to>
+                                        <p:strVal val="visible"/>
+                                      </p:to>
+                                    </p:set>
+                                  </p:childTnLst>
+                                </p:cTn>
+                              </p:par>
+                              <p:par>
+                                <p:cTn id="11" presetID="1" presetClass="entr" presetSubtype="0" fill="hold" nodeType="withEffect">
+                                  <p:stCondLst>
+                                    <p:cond delay="0"/>
+                                  </p:stCondLst>
+                                  <p:childTnLst>
+                                    <p:set>
+                                      <p:cBhvr>
+                                        <p:cTn id="12" dur="1" fill="hold">
+                                          <p:stCondLst>
+                                            <p:cond delay="0"/>
+                                          </p:stCondLst>
+                                        </p:cTn>
+                                        <p:tgtEl>
+                                          <p:spTgt spid="8">
+                                            <p:txEl>
+                                              <p:pRg st="1" end="1"/>
+                                            </p:txEl>
+                                          </p:spTgt>
+                                        </p:tgtEl>
+                                        <p:attrNameLst>
+                                          <p:attrName>style.visibility</p:attrName>
+                                        </p:attrNameLst>
+                                      </p:cBhvr>
+                                      <p:to>
+                                        <p:strVal val="visible"/>
+                                      </p:to>
+                                    </p:set>
+                                  </p:childTnLst>
+                                </p:cTn>
+                              </p:par>
+                              <p:par>
+                                <p:cTn id="13" presetID="1" presetClass="entr" presetSubtype="0" fill="hold" nodeType="withEffect">
+                                  <p:stCondLst>
+                                    <p:cond delay="0"/>
+                                  </p:stCondLst>
+                                  <p:childTnLst>
+                                    <p:set>
+                                      <p:cBhvr>
+                                        <p:cTn id="14" dur="1" fill="hold">
+                                          <p:stCondLst>
+                                            <p:cond delay="0"/>
+                                          </p:stCondLst>
+                                        </p:cTn>
+                                        <p:tgtEl>
+                                          <p:spTgt spid="8">
+                                            <p:txEl>
+                                              <p:pRg st="3" end="3"/>
+                                            </p:txEl>
+                                          </p:spTgt>
+                                        </p:tgtEl>
+                                        <p:attrNameLst>
+                                          <p:attrName>style.visibility</p:attrName>
+                                        </p:attrNameLst>
+                                      </p:cBhvr>
+                                      <p:to>
+                                        <p:strVal val="visible"/>
+                                      </p:to>
+                                    </p:set>
+                                  </p:childTnLst>
+                                </p:cTn>
+                              </p:par>
+                              <p:par>
+                                <p:cTn id="15" presetID="1" presetClass="entr" presetSubtype="0" fill="hold" nodeType="withEffect">
+                                  <p:stCondLst>
+                                    <p:cond delay="0"/>
+                                  </p:stCondLst>
+                                  <p:childTnLst>
+                                    <p:set>
+                                      <p:cBhvr>
+                                        <p:cTn id="16" dur="1" fill="hold">
+                                          <p:stCondLst>
+                                            <p:cond delay="0"/>
+                                          </p:stCondLst>
+                                        </p:cTn>
+                                        <p:tgtEl>
+                                          <p:spTgt spid="8">
+                                            <p:txEl>
+                                              <p:pRg st="4" end="4"/>
+                                            </p:txEl>
+                                          </p:spTgt>
+                                        </p:tgtEl>
+                                        <p:attrNameLst>
+                                          <p:attrName>style.visibility</p:attrName>
+                                        </p:attrNameLst>
+                                      </p:cBhvr>
+                                      <p:to>
+                                        <p:strVal val="visible"/>
+                                      </p:to>
+                                    </p:set>
+                                  </p:childTnLst>
+                                </p:cTn>
+                              </p:par>
+                              <p:par>
+                                <p:cTn id="17" presetID="1" presetClass="entr" presetSubtype="0" fill="hold" nodeType="withEffect">
+                                  <p:stCondLst>
+                                    <p:cond delay="0"/>
+                                  </p:stCondLst>
+                                  <p:childTnLst>
+                                    <p:set>
+                                      <p:cBhvr>
+                                        <p:cTn id="18" dur="1" fill="hold">
+                                          <p:stCondLst>
+                                            <p:cond delay="0"/>
+                                          </p:stCondLst>
+                                        </p:cTn>
+                                        <p:tgtEl>
+                                          <p:spTgt spid="8">
+                                            <p:txEl>
+                                              <p:pRg st="5" end="5"/>
+                                            </p:txEl>
+                                          </p:spTgt>
+                                        </p:tgtEl>
+                                        <p:attrNameLst>
+                                          <p:attrName>style.visibility</p:attrName>
+                                        </p:attrNameLst>
+                                      </p:cBhvr>
+                                      <p:to>
+                                        <p:strVal val="visible"/>
+                                      </p:to>
+                                    </p:set>
+                                  </p:childTnLst>
+                                </p:cTn>
+                              </p:par>
+                            </p:childTnLst>
+                          </p:cTn>
+                        </p:par>
+                      </p:childTnLst>
+                    </p:cTn>
+                  </p:par>
+                </p:childTnLst>
+              </p:cTn>
+              <p:prevCondLst>
+                <p:cond evt="onPrev" delay="0">
+                  <p:tgtEl>
+                    <p:sldTgt/>
+                  </p:tgtEl>
+                </p:cond>
+              </p:prevCondLst>
+              <p:nextCondLst>
+                <p:cond evt="onNext" delay="0">
+                  <p:tgtEl>
+                    <p:sldTgt/>
+                  </p:tgtEl>
+                </p:cond>
+              </p:nextCondLst>
+            </p:seq>
+          </p:childTnLst>
+        </p:cTn>
+      </p:par>
+    </p:tnLst>
+  </p:timing>
+</p:sld>
+</file>
+
+<file path=ppt/slides/slide15.xml><?xml version="1.0" encoding="utf-8"?>
+<p:sld xmlns:a="http://schemas.openxmlformats.org/drawingml/2006/main" xmlns:r="http://schemas.openxmlformats.org/officeDocument/2006/relationships" xmlns:p="http://schemas.openxmlformats.org/presentationml/2006/main">
+  <p:cSld>
+    <p:spTree>
+      <p:nvGrpSpPr>
+        <p:cNvPr id="1" name=""/>
+        <p:cNvGrpSpPr/>
+        <p:nvPr/>
+      </p:nvGrpSpPr>
+      <p:grpSpPr>
+        <a:xfrm>
+          <a:off x="0" y="0"/>
+          <a:ext cx="0" cy="0"/>
+          <a:chOff x="0" y="0"/>
+          <a:chExt cx="0" cy="0"/>
+        </a:xfrm>
+      </p:grpSpPr>
+      <p:sp>
+        <p:nvSpPr>
+          <p:cNvPr id="2" name="Titel 1"/>
+          <p:cNvSpPr>
+            <a:spLocks noGrp="1"/>
+          </p:cNvSpPr>
+          <p:nvPr>
+            <p:ph type="title"/>
+          </p:nvPr>
+        </p:nvSpPr>
+        <p:spPr/>
+        <p:txBody>
+          <a:bodyPr/>
+          <a:lstStyle/>
+          <a:p>
+            <a:r>
+              <a:rPr lang="en-US" smtClean="0"/>
+              <a:t>Tag 2: Anmerkungen (II)</a:t>
+            </a:r>
+            <a:endParaRPr lang="en-US"/>
+          </a:p>
+        </p:txBody>
+      </p:sp>
+      <p:sp>
+        <p:nvSpPr>
+          <p:cNvPr id="3" name="Inhaltsplatzhalter 2"/>
+          <p:cNvSpPr>
+            <a:spLocks noGrp="1"/>
+          </p:cNvSpPr>
+          <p:nvPr>
+            <p:ph idx="1"/>
+          </p:nvPr>
+        </p:nvSpPr>
+        <p:spPr/>
+        <p:txBody>
+          <a:bodyPr/>
+          <a:lstStyle/>
+          <a:p>
+            <a:r>
+              <a:rPr lang="en-US" b="1" smtClean="0"/>
+              <a:t>Ist das Folgende eine Deklaration oder Definition (oder Beides)?</a:t>
+            </a:r>
+          </a:p>
+          <a:p>
+            <a:endParaRPr lang="en-US" b="1"/>
+          </a:p>
+          <a:p>
+            <a:pPr marL="342900" indent="-342900">
+              <a:buFont typeface="Wingdings" panose="05000000000000000000" pitchFamily="2" charset="2"/>
+              <a:buChar char="§"/>
+            </a:pPr>
+            <a:r>
+              <a:rPr lang="en-US" smtClean="0">
+                <a:latin typeface="Consolas" panose="020B0609020204030204" pitchFamily="49" charset="0"/>
+                <a:cs typeface="Consolas" panose="020B0609020204030204" pitchFamily="49" charset="0"/>
+              </a:rPr>
+              <a:t>void myFunction() {};</a:t>
+            </a:r>
+            <a:endParaRPr lang="en-US">
+              <a:latin typeface="Consolas" panose="020B0609020204030204" pitchFamily="49" charset="0"/>
+              <a:cs typeface="Consolas" panose="020B0609020204030204" pitchFamily="49" charset="0"/>
+            </a:endParaRPr>
+          </a:p>
+          <a:p>
+            <a:pPr marL="692150" lvl="1" indent="-342900"/>
+            <a:r>
+              <a:rPr lang="en-US" smtClean="0"/>
+              <a:t>Definition (ohne {} </a:t>
+            </a:r>
+            <a:r>
+              <a:rPr lang="en-US" smtClean="0">
+                <a:sym typeface="Wingdings" panose="05000000000000000000" pitchFamily="2" charset="2"/>
+              </a:rPr>
+              <a:t> Deklaration)</a:t>
+            </a:r>
+            <a:endParaRPr lang="en-US"/>
+          </a:p>
+          <a:p>
+            <a:pPr marL="342900" indent="-342900">
+              <a:buFont typeface="Wingdings" panose="05000000000000000000" pitchFamily="2" charset="2"/>
+              <a:buChar char="§"/>
+            </a:pPr>
+            <a:r>
+              <a:rPr lang="en-US" smtClean="0">
+                <a:latin typeface="Consolas" panose="020B0609020204030204" pitchFamily="49" charset="0"/>
+                <a:cs typeface="Consolas" panose="020B0609020204030204" pitchFamily="49" charset="0"/>
+              </a:rPr>
+              <a:t>int x;</a:t>
+            </a:r>
+          </a:p>
+          <a:p>
+            <a:pPr marL="692150" lvl="1" indent="-342900"/>
+            <a:r>
+              <a:rPr lang="en-US"/>
+              <a:t>Deklaration</a:t>
+            </a:r>
+          </a:p>
+          <a:p>
+            <a:pPr marL="342900" indent="-342900">
+              <a:buFont typeface="Wingdings" panose="05000000000000000000" pitchFamily="2" charset="2"/>
+              <a:buChar char="§"/>
+            </a:pPr>
+            <a:r>
+              <a:rPr lang="en-US" smtClean="0">
+                <a:latin typeface="Consolas" panose="020B0609020204030204" pitchFamily="49" charset="0"/>
+                <a:cs typeface="Consolas" panose="020B0609020204030204" pitchFamily="49" charset="0"/>
+              </a:rPr>
+              <a:t>double y = 3.0;</a:t>
+            </a:r>
+          </a:p>
+          <a:p>
+            <a:pPr marL="692150" lvl="1" indent="-342900"/>
+            <a:r>
+              <a:rPr lang="en-US" smtClean="0"/>
+              <a:t>Deklaration + Definition</a:t>
+            </a:r>
+            <a:endParaRPr lang="en-US" smtClean="0">
+              <a:latin typeface="Consolas" panose="020B0609020204030204" pitchFamily="49" charset="0"/>
+              <a:cs typeface="Consolas" panose="020B0609020204030204" pitchFamily="49" charset="0"/>
+            </a:endParaRPr>
+          </a:p>
+          <a:p>
+            <a:pPr marL="342900" indent="-342900">
+              <a:buFont typeface="Wingdings" panose="05000000000000000000" pitchFamily="2" charset="2"/>
+              <a:buChar char="§"/>
+            </a:pPr>
+            <a:r>
+              <a:rPr lang="en-US" smtClean="0">
+                <a:latin typeface="Consolas" panose="020B0609020204030204" pitchFamily="49" charset="0"/>
+                <a:cs typeface="Consolas" panose="020B0609020204030204" pitchFamily="49" charset="0"/>
+              </a:rPr>
+              <a:t>Building building(3);</a:t>
+            </a:r>
+          </a:p>
+          <a:p>
+            <a:pPr marL="692150" lvl="1" indent="-342900"/>
+            <a:r>
+              <a:rPr lang="en-US"/>
+              <a:t>Deklaration + </a:t>
+            </a:r>
+            <a:r>
+              <a:rPr lang="en-US" smtClean="0"/>
+              <a:t>Definition</a:t>
+            </a:r>
+            <a:endParaRPr lang="en-US" smtClean="0">
+              <a:latin typeface="Consolas" panose="020B0609020204030204" pitchFamily="49" charset="0"/>
+              <a:cs typeface="Consolas" panose="020B0609020204030204" pitchFamily="49" charset="0"/>
+            </a:endParaRPr>
+          </a:p>
+          <a:p>
+            <a:pPr marL="342900" indent="-342900">
+              <a:buFont typeface="Wingdings" panose="05000000000000000000" pitchFamily="2" charset="2"/>
+              <a:buChar char="§"/>
+            </a:pPr>
+            <a:r>
+              <a:rPr lang="en-US" smtClean="0">
+                <a:latin typeface="Consolas" panose="020B0609020204030204" pitchFamily="49" charset="0"/>
+                <a:cs typeface="Consolas" panose="020B0609020204030204" pitchFamily="49" charset="0"/>
+              </a:rPr>
+              <a:t>CharGenerator charGen = CharGenerator();</a:t>
+            </a:r>
+          </a:p>
+          <a:p>
+            <a:pPr marL="692150" lvl="1" indent="-342900"/>
+            <a:r>
+              <a:rPr lang="en-US"/>
+              <a:t>Deklaration + </a:t>
+            </a:r>
+            <a:r>
+              <a:rPr lang="en-US" smtClean="0"/>
+              <a:t>Definition</a:t>
+            </a:r>
+            <a:endParaRPr lang="en-US" smtClean="0">
+              <a:latin typeface="Consolas" panose="020B0609020204030204" pitchFamily="49" charset="0"/>
+              <a:cs typeface="Consolas" panose="020B0609020204030204" pitchFamily="49" charset="0"/>
+            </a:endParaRPr>
+          </a:p>
+          <a:p>
+            <a:pPr marL="342900" indent="-342900">
+              <a:buFont typeface="Wingdings" panose="05000000000000000000" pitchFamily="2" charset="2"/>
+              <a:buChar char="§"/>
+            </a:pPr>
+            <a:r>
+              <a:rPr lang="en-US" smtClean="0">
+                <a:latin typeface="Consolas" panose="020B0609020204030204" pitchFamily="49" charset="0"/>
+                <a:cs typeface="Consolas" panose="020B0609020204030204" pitchFamily="49" charset="0"/>
+              </a:rPr>
+              <a:t>CharGenerator charGen;</a:t>
+            </a:r>
+          </a:p>
+          <a:p>
+            <a:pPr marL="692150" lvl="1" indent="-342900"/>
+            <a:r>
+              <a:rPr lang="en-US"/>
+              <a:t>Deklaration + </a:t>
+            </a:r>
+            <a:r>
+              <a:rPr lang="en-US" smtClean="0"/>
+              <a:t>Definition – leider etwas verwirrend.</a:t>
+            </a:r>
+            <a:endParaRPr lang="en-US"/>
+          </a:p>
+          <a:p>
+            <a:pPr marL="692150" lvl="1" indent="-342900"/>
+            <a:endParaRPr lang="en-US" smtClean="0">
+              <a:latin typeface="Consolas" panose="020B0609020204030204" pitchFamily="49" charset="0"/>
+              <a:cs typeface="Consolas" panose="020B0609020204030204" pitchFamily="49" charset="0"/>
+            </a:endParaRPr>
+          </a:p>
+          <a:p>
+            <a:pPr marL="692150" lvl="1" indent="-342900"/>
+            <a:endParaRPr lang="en-US" smtClean="0">
+              <a:latin typeface="Consolas" panose="020B0609020204030204" pitchFamily="49" charset="0"/>
+              <a:cs typeface="Consolas" panose="020B0609020204030204" pitchFamily="49" charset="0"/>
+            </a:endParaRPr>
+          </a:p>
+          <a:p>
+            <a:endParaRPr lang="en-US" b="1"/>
+          </a:p>
+        </p:txBody>
+      </p:sp>
+    </p:spTree>
+    <p:extLst>
+      <p:ext uri="{BB962C8B-B14F-4D97-AF65-F5344CB8AC3E}">
+        <p14:creationId xmlns:p14="http://schemas.microsoft.com/office/powerpoint/2010/main" val="3056485622"/>
+      </p:ext>
+    </p:extLst>
+  </p:cSld>
+  <p:clrMapOvr>
+    <a:masterClrMapping/>
+  </p:clrMapOvr>
+  <p:timing>
+    <p:tnLst>
+      <p:par>
+        <p:cTn id="1" dur="indefinite" restart="never" nodeType="tmRoot">
+          <p:childTnLst>
+            <p:seq concurrent="1" nextAc="seek">
+              <p:cTn id="2" dur="indefinite" nodeType="mainSeq">
+                <p:childTnLst>
+                  <p:par>
+                    <p:cTn id="3" fill="hold">
+                      <p:stCondLst>
+                        <p:cond delay="indefinite"/>
+                      </p:stCondLst>
+                      <p:childTnLst>
+                        <p:par>
+                          <p:cTn id="4" fill="hold">
+                            <p:stCondLst>
+                              <p:cond delay="0"/>
+                            </p:stCondLst>
+                            <p:childTnLst>
+                              <p:par>
+                                <p:cTn id="5" presetID="1" presetClass="entr" presetSubtype="0" fill="hold" nodeType="clickEffect">
+                                  <p:stCondLst>
+                                    <p:cond delay="0"/>
+                                  </p:stCondLst>
+                                  <p:childTnLst>
+                                    <p:set>
+                                      <p:cBhvr>
+                                        <p:cTn id="6" dur="1" fill="hold">
+                                          <p:stCondLst>
+                                            <p:cond delay="0"/>
+                                          </p:stCondLst>
+                                        </p:cTn>
+                                        <p:tgtEl>
+                                          <p:spTgt spid="3">
+                                            <p:txEl>
+                                              <p:pRg st="2" end="2"/>
+                                            </p:txEl>
+                                          </p:spTgt>
+                                        </p:tgtEl>
+                                        <p:attrNameLst>
+                                          <p:attrName>style.visibility</p:attrName>
+                                        </p:attrNameLst>
+                                      </p:cBhvr>
+                                      <p:to>
+                                        <p:strVal val="visible"/>
+                                      </p:to>
+                                    </p:set>
+                                  </p:childTnLst>
+                                </p:cTn>
+                              </p:par>
+                            </p:childTnLst>
+                          </p:cTn>
+                        </p:par>
+                      </p:childTnLst>
+                    </p:cTn>
+                  </p:par>
+                  <p:par>
+                    <p:cTn id="7" fill="hold">
+                      <p:stCondLst>
+                        <p:cond delay="indefinite"/>
+                      </p:stCondLst>
+                      <p:childTnLst>
+                        <p:par>
+                          <p:cTn id="8" fill="hold">
+                            <p:stCondLst>
+                              <p:cond delay="0"/>
+                            </p:stCondLst>
+                            <p:childTnLst>
+                              <p:par>
+                                <p:cTn id="9" presetID="1" presetClass="entr" presetSubtype="0" fill="hold" nodeType="clickEffect">
+                                  <p:stCondLst>
+                                    <p:cond delay="0"/>
+                                  </p:stCondLst>
+                                  <p:childTnLst>
+                                    <p:set>
+                                      <p:cBhvr>
+                                        <p:cTn id="10" dur="1" fill="hold">
+                                          <p:stCondLst>
+                                            <p:cond delay="0"/>
+                                          </p:stCondLst>
+                                        </p:cTn>
+                                        <p:tgtEl>
+                                          <p:spTgt spid="3">
+                                            <p:txEl>
+                                              <p:pRg st="3" end="3"/>
+                                            </p:txEl>
+                                          </p:spTgt>
+                                        </p:tgtEl>
+                                        <p:attrNameLst>
+                                          <p:attrName>style.visibility</p:attrName>
+                                        </p:attrNameLst>
+                                      </p:cBhvr>
+                                      <p:to>
+                                        <p:strVal val="visible"/>
+                                      </p:to>
+                                    </p:set>
+                                  </p:childTnLst>
+                                </p:cTn>
+                              </p:par>
+                            </p:childTnLst>
+                          </p:cTn>
+                        </p:par>
+                      </p:childTnLst>
+                    </p:cTn>
+                  </p:par>
+                  <p:par>
+                    <p:cTn id="11" fill="hold">
+                      <p:stCondLst>
+                        <p:cond delay="indefinite"/>
+                      </p:stCondLst>
+                      <p:childTnLst>
+                        <p:par>
+                          <p:cTn id="12" fill="hold">
+                            <p:stCondLst>
+                              <p:cond delay="0"/>
+                            </p:stCondLst>
+                            <p:childTnLst>
+                              <p:par>
+                                <p:cTn id="13" presetID="1" presetClass="entr" presetSubtype="0" fill="hold" nodeType="clickEffect">
+                                  <p:stCondLst>
+                                    <p:cond delay="0"/>
+                                  </p:stCondLst>
+                                  <p:childTnLst>
+                                    <p:set>
+                                      <p:cBhvr>
+                                        <p:cTn id="14" dur="1" fill="hold">
+                                          <p:stCondLst>
+                                            <p:cond delay="0"/>
+                                          </p:stCondLst>
+                                        </p:cTn>
+                                        <p:tgtEl>
+                                          <p:spTgt spid="3">
+                                            <p:txEl>
+                                              <p:pRg st="4" end="4"/>
+                                            </p:txEl>
+                                          </p:spTgt>
+                                        </p:tgtEl>
+                                        <p:attrNameLst>
+                                          <p:attrName>style.visibility</p:attrName>
+                                        </p:attrNameLst>
+                                      </p:cBhvr>
+                                      <p:to>
+                                        <p:strVal val="visible"/>
+                                      </p:to>
+                                    </p:set>
+                                  </p:childTnLst>
+                                </p:cTn>
+                              </p:par>
+                            </p:childTnLst>
+                          </p:cTn>
+                        </p:par>
+                      </p:childTnLst>
+                    </p:cTn>
+                  </p:par>
+                  <p:par>
+                    <p:cTn id="15" fill="hold">
+                      <p:stCondLst>
+                        <p:cond delay="indefinite"/>
+                      </p:stCondLst>
+                      <p:childTnLst>
+                        <p:par>
+                          <p:cTn id="16" fill="hold">
+                            <p:stCondLst>
+                              <p:cond delay="0"/>
+                            </p:stCondLst>
+                            <p:childTnLst>
+                              <p:par>
+                                <p:cTn id="17" presetID="1" presetClass="entr" presetSubtype="0" fill="hold" nodeType="clickEffect">
+                                  <p:stCondLst>
+                                    <p:cond delay="0"/>
+                                  </p:stCondLst>
+                                  <p:childTnLst>
+                                    <p:set>
+                                      <p:cBhvr>
+                                        <p:cTn id="18" dur="1" fill="hold">
+                                          <p:stCondLst>
+                                            <p:cond delay="0"/>
+                                          </p:stCondLst>
+                                        </p:cTn>
+                                        <p:tgtEl>
+                                          <p:spTgt spid="3">
+                                            <p:txEl>
+                                              <p:pRg st="5" end="5"/>
+                                            </p:txEl>
+                                          </p:spTgt>
+                                        </p:tgtEl>
+                                        <p:attrNameLst>
+                                          <p:attrName>style.visibility</p:attrName>
+                                        </p:attrNameLst>
+                                      </p:cBhvr>
+                                      <p:to>
+                                        <p:strVal val="visible"/>
+                                      </p:to>
+                                    </p:set>
+                                  </p:childTnLst>
+                                </p:cTn>
+                              </p:par>
+                            </p:childTnLst>
+                          </p:cTn>
+                        </p:par>
+                      </p:childTnLst>
+                    </p:cTn>
+                  </p:par>
+                  <p:par>
+                    <p:cTn id="19" fill="hold">
+                      <p:stCondLst>
+                        <p:cond delay="indefinite"/>
+                      </p:stCondLst>
+                      <p:childTnLst>
+                        <p:par>
+                          <p:cTn id="20" fill="hold">
+                            <p:stCondLst>
+                              <p:cond delay="0"/>
+                            </p:stCondLst>
+                            <p:childTnLst>
+                              <p:par>
+                                <p:cTn id="21" presetID="1" presetClass="entr" presetSubtype="0" fill="hold" nodeType="clickEffect">
+                                  <p:stCondLst>
+                                    <p:cond delay="0"/>
+                                  </p:stCondLst>
+                                  <p:childTnLst>
+                                    <p:set>
+                                      <p:cBhvr>
+                                        <p:cTn id="22" dur="1" fill="hold">
+                                          <p:stCondLst>
+                                            <p:cond delay="0"/>
+                                          </p:stCondLst>
+                                        </p:cTn>
+                                        <p:tgtEl>
+                                          <p:spTgt spid="3">
+                                            <p:txEl>
+                                              <p:pRg st="6" end="6"/>
+                                            </p:txEl>
+                                          </p:spTgt>
+                                        </p:tgtEl>
+                                        <p:attrNameLst>
+                                          <p:attrName>style.visibility</p:attrName>
+                                        </p:attrNameLst>
+                                      </p:cBhvr>
+                                      <p:to>
+                                        <p:strVal val="visible"/>
+                                      </p:to>
+                                    </p:set>
+                                  </p:childTnLst>
+                                </p:cTn>
+                              </p:par>
+                            </p:childTnLst>
+                          </p:cTn>
+                        </p:par>
+                      </p:childTnLst>
+                    </p:cTn>
+                  </p:par>
+                  <p:par>
+                    <p:cTn id="23" fill="hold">
+                      <p:stCondLst>
+                        <p:cond delay="indefinite"/>
+                      </p:stCondLst>
+                      <p:childTnLst>
+                        <p:par>
+                          <p:cTn id="24" fill="hold">
+                            <p:stCondLst>
+                              <p:cond delay="0"/>
+                            </p:stCondLst>
+                            <p:childTnLst>
+                              <p:par>
+                                <p:cTn id="25" presetID="1" presetClass="entr" presetSubtype="0" fill="hold" nodeType="clickEffect">
+                                  <p:stCondLst>
+                                    <p:cond delay="0"/>
+                                  </p:stCondLst>
+                                  <p:childTnLst>
+                                    <p:set>
+                                      <p:cBhvr>
+                                        <p:cTn id="26" dur="1" fill="hold">
+                                          <p:stCondLst>
+                                            <p:cond delay="0"/>
+                                          </p:stCondLst>
+                                        </p:cTn>
+                                        <p:tgtEl>
+                                          <p:spTgt spid="3">
+                                            <p:txEl>
+                                              <p:pRg st="7" end="7"/>
+                                            </p:txEl>
+                                          </p:spTgt>
+                                        </p:tgtEl>
+                                        <p:attrNameLst>
+                                          <p:attrName>style.visibility</p:attrName>
+                                        </p:attrNameLst>
+                                      </p:cBhvr>
+                                      <p:to>
+                                        <p:strVal val="visible"/>
+                                      </p:to>
+                                    </p:set>
+                                  </p:childTnLst>
+                                </p:cTn>
+                              </p:par>
+                            </p:childTnLst>
+                          </p:cTn>
+                        </p:par>
+                      </p:childTnLst>
+                    </p:cTn>
+                  </p:par>
+                  <p:par>
+                    <p:cTn id="27" fill="hold">
+                      <p:stCondLst>
+                        <p:cond delay="indefinite"/>
+                      </p:stCondLst>
+                      <p:childTnLst>
+                        <p:par>
+                          <p:cTn id="28" fill="hold">
+                            <p:stCondLst>
+                              <p:cond delay="0"/>
+                            </p:stCondLst>
+                            <p:childTnLst>
+                              <p:par>
+                                <p:cTn id="29" presetID="1" presetClass="entr" presetSubtype="0" fill="hold" nodeType="clickEffect">
+                                  <p:stCondLst>
+                                    <p:cond delay="0"/>
+                                  </p:stCondLst>
+                                  <p:childTnLst>
+                                    <p:set>
+                                      <p:cBhvr>
+                                        <p:cTn id="30" dur="1" fill="hold">
+                                          <p:stCondLst>
+                                            <p:cond delay="0"/>
+                                          </p:stCondLst>
+                                        </p:cTn>
+                                        <p:tgtEl>
+                                          <p:spTgt spid="3">
+                                            <p:txEl>
+                                              <p:pRg st="8" end="8"/>
+                                            </p:txEl>
+                                          </p:spTgt>
+                                        </p:tgtEl>
+                                        <p:attrNameLst>
+                                          <p:attrName>style.visibility</p:attrName>
+                                        </p:attrNameLst>
+                                      </p:cBhvr>
+                                      <p:to>
+                                        <p:strVal val="visible"/>
+                                      </p:to>
+                                    </p:set>
+                                  </p:childTnLst>
+                                </p:cTn>
+                              </p:par>
+                            </p:childTnLst>
+                          </p:cTn>
+                        </p:par>
+                      </p:childTnLst>
+                    </p:cTn>
+                  </p:par>
+                  <p:par>
+                    <p:cTn id="31" fill="hold">
+                      <p:stCondLst>
+                        <p:cond delay="indefinite"/>
+                      </p:stCondLst>
+                      <p:childTnLst>
+                        <p:par>
+                          <p:cTn id="32" fill="hold">
+                            <p:stCondLst>
+                              <p:cond delay="0"/>
+                            </p:stCondLst>
+                            <p:childTnLst>
+                              <p:par>
+                                <p:cTn id="33" presetID="1" presetClass="entr" presetSubtype="0" fill="hold" nodeType="clickEffect">
+                                  <p:stCondLst>
+                                    <p:cond delay="0"/>
+                                  </p:stCondLst>
+                                  <p:childTnLst>
+                                    <p:set>
+                                      <p:cBhvr>
+                                        <p:cTn id="34" dur="1" fill="hold">
+                                          <p:stCondLst>
+                                            <p:cond delay="0"/>
+                                          </p:stCondLst>
+                                        </p:cTn>
+                                        <p:tgtEl>
+                                          <p:spTgt spid="3">
+                                            <p:txEl>
+                                              <p:pRg st="9" end="9"/>
+                                            </p:txEl>
+                                          </p:spTgt>
+                                        </p:tgtEl>
+                                        <p:attrNameLst>
+                                          <p:attrName>style.visibility</p:attrName>
+                                        </p:attrNameLst>
+                                      </p:cBhvr>
+                                      <p:to>
+                                        <p:strVal val="visible"/>
+                                      </p:to>
+                                    </p:set>
+                                  </p:childTnLst>
+                                </p:cTn>
+                              </p:par>
+                            </p:childTnLst>
+                          </p:cTn>
+                        </p:par>
+                      </p:childTnLst>
+                    </p:cTn>
+                  </p:par>
+                  <p:par>
+                    <p:cTn id="35" fill="hold">
+                      <p:stCondLst>
+                        <p:cond delay="indefinite"/>
+                      </p:stCondLst>
+                      <p:childTnLst>
+                        <p:par>
+                          <p:cTn id="36" fill="hold">
+                            <p:stCondLst>
+                              <p:cond delay="0"/>
+                            </p:stCondLst>
+                            <p:childTnLst>
+                              <p:par>
+                                <p:cTn id="37" presetID="1" presetClass="entr" presetSubtype="0" fill="hold" nodeType="clickEffect">
+                                  <p:stCondLst>
+                                    <p:cond delay="0"/>
+                                  </p:stCondLst>
+                                  <p:childTnLst>
+                                    <p:set>
+                                      <p:cBhvr>
+                                        <p:cTn id="38" dur="1" fill="hold">
+                                          <p:stCondLst>
+                                            <p:cond delay="0"/>
+                                          </p:stCondLst>
+                                        </p:cTn>
+                                        <p:tgtEl>
+                                          <p:spTgt spid="3">
+                                            <p:txEl>
+                                              <p:pRg st="10" end="10"/>
+                                            </p:txEl>
+                                          </p:spTgt>
+                                        </p:tgtEl>
+                                        <p:attrNameLst>
+                                          <p:attrName>style.visibility</p:attrName>
+                                        </p:attrNameLst>
+                                      </p:cBhvr>
+                                      <p:to>
+                                        <p:strVal val="visible"/>
+                                      </p:to>
+                                    </p:set>
+                                  </p:childTnLst>
+                                </p:cTn>
+                              </p:par>
+                            </p:childTnLst>
+                          </p:cTn>
+                        </p:par>
+                      </p:childTnLst>
+                    </p:cTn>
+                  </p:par>
+                  <p:par>
+                    <p:cTn id="39" fill="hold">
+                      <p:stCondLst>
+                        <p:cond delay="indefinite"/>
+                      </p:stCondLst>
+                      <p:childTnLst>
+                        <p:par>
+                          <p:cTn id="40" fill="hold">
+                            <p:stCondLst>
+                              <p:cond delay="0"/>
+                            </p:stCondLst>
+                            <p:childTnLst>
+                              <p:par>
+                                <p:cTn id="41" presetID="1" presetClass="entr" presetSubtype="0" fill="hold" nodeType="clickEffect">
+                                  <p:stCondLst>
+                                    <p:cond delay="0"/>
+                                  </p:stCondLst>
+                                  <p:childTnLst>
+                                    <p:set>
+                                      <p:cBhvr>
+                                        <p:cTn id="42" dur="1" fill="hold">
+                                          <p:stCondLst>
+                                            <p:cond delay="0"/>
+                                          </p:stCondLst>
+                                        </p:cTn>
+                                        <p:tgtEl>
+                                          <p:spTgt spid="3">
+                                            <p:txEl>
+                                              <p:pRg st="11" end="11"/>
+                                            </p:txEl>
+                                          </p:spTgt>
+                                        </p:tgtEl>
+                                        <p:attrNameLst>
+                                          <p:attrName>style.visibility</p:attrName>
+                                        </p:attrNameLst>
+                                      </p:cBhvr>
+                                      <p:to>
+                                        <p:strVal val="visible"/>
+                                      </p:to>
+                                    </p:set>
+                                  </p:childTnLst>
+                                </p:cTn>
+                              </p:par>
+                            </p:childTnLst>
+                          </p:cTn>
+                        </p:par>
+                      </p:childTnLst>
+                    </p:cTn>
+                  </p:par>
+                  <p:par>
+                    <p:cTn id="43" fill="hold">
+                      <p:stCondLst>
+                        <p:cond delay="indefinite"/>
+                      </p:stCondLst>
+                      <p:childTnLst>
+                        <p:par>
+                          <p:cTn id="44" fill="hold">
+                            <p:stCondLst>
+                              <p:cond delay="0"/>
+                            </p:stCondLst>
+                            <p:childTnLst>
+                              <p:par>
+                                <p:cTn id="45" presetID="1" presetClass="entr" presetSubtype="0" fill="hold" nodeType="clickEffect">
+                                  <p:stCondLst>
+                                    <p:cond delay="0"/>
+                                  </p:stCondLst>
+                                  <p:childTnLst>
+                                    <p:set>
+                                      <p:cBhvr>
+                                        <p:cTn id="46" dur="1" fill="hold">
+                                          <p:stCondLst>
+                                            <p:cond delay="0"/>
+                                          </p:stCondLst>
+                                        </p:cTn>
+                                        <p:tgtEl>
+                                          <p:spTgt spid="3">
+                                            <p:txEl>
+                                              <p:pRg st="12" end="12"/>
+                                            </p:txEl>
+                                          </p:spTgt>
+                                        </p:tgtEl>
+                                        <p:attrNameLst>
+                                          <p:attrName>style.visibility</p:attrName>
+                                        </p:attrNameLst>
+                                      </p:cBhvr>
+                                      <p:to>
+                                        <p:strVal val="visible"/>
+                                      </p:to>
+                                    </p:set>
+                                  </p:childTnLst>
+                                </p:cTn>
+                              </p:par>
+                            </p:childTnLst>
+                          </p:cTn>
+                        </p:par>
+                      </p:childTnLst>
+                    </p:cTn>
+                  </p:par>
+                  <p:par>
+                    <p:cTn id="47" fill="hold">
+                      <p:stCondLst>
+                        <p:cond delay="indefinite"/>
+                      </p:stCondLst>
+                      <p:childTnLst>
+                        <p:par>
+                          <p:cTn id="48" fill="hold">
+                            <p:stCondLst>
+                              <p:cond delay="0"/>
+                            </p:stCondLst>
+                            <p:childTnLst>
+                              <p:par>
+                                <p:cTn id="49" presetID="1" presetClass="entr" presetSubtype="0" fill="hold" nodeType="clickEffect">
+                                  <p:stCondLst>
+                                    <p:cond delay="0"/>
+                                  </p:stCondLst>
+                                  <p:childTnLst>
+                                    <p:set>
+                                      <p:cBhvr>
+                                        <p:cTn id="50" dur="1" fill="hold">
+                                          <p:stCondLst>
+                                            <p:cond delay="0"/>
+                                          </p:stCondLst>
+                                        </p:cTn>
+                                        <p:tgtEl>
+                                          <p:spTgt spid="3">
+                                            <p:txEl>
+                                              <p:pRg st="13" end="13"/>
+                                            </p:txEl>
+                                          </p:spTgt>
+                                        </p:tgtEl>
+                                        <p:attrNameLst>
+                                          <p:attrName>style.visibility</p:attrName>
+                                        </p:attrNameLst>
+                                      </p:cBhvr>
+                                      <p:to>
+                                        <p:strVal val="visible"/>
+                                      </p:to>
+                                    </p:set>
+                                  </p:childTnLst>
+                                </p:cTn>
+                              </p:par>
+                            </p:childTnLst>
+                          </p:cTn>
+                        </p:par>
+                      </p:childTnLst>
+                    </p:cTn>
+                  </p:par>
+                </p:childTnLst>
+              </p:cTn>
+              <p:prevCondLst>
+                <p:cond evt="onPrev" delay="0">
+                  <p:tgtEl>
+                    <p:sldTgt/>
+                  </p:tgtEl>
+                </p:cond>
+              </p:prevCondLst>
+              <p:nextCondLst>
+                <p:cond evt="onNext" delay="0">
+                  <p:tgtEl>
+                    <p:sldTgt/>
+                  </p:tgtEl>
+                </p:cond>
+              </p:nextCondLst>
+            </p:seq>
+          </p:childTnLst>
+        </p:cTn>
+      </p:par>
+    </p:tnLst>
+  </p:timing>
+</p:sld>
+</file>
+
+<file path=ppt/slides/slide16.xml><?xml version="1.0" encoding="utf-8"?>
+<p:sld xmlns:a="http://schemas.openxmlformats.org/drawingml/2006/main" xmlns:r="http://schemas.openxmlformats.org/officeDocument/2006/relationships" xmlns:p="http://schemas.openxmlformats.org/presentationml/2006/main">
+  <p:cSld>
+    <p:spTree>
+      <p:nvGrpSpPr>
+        <p:cNvPr id="1" name=""/>
+        <p:cNvGrpSpPr/>
+        <p:nvPr/>
+      </p:nvGrpSpPr>
+      <p:grpSpPr>
+        <a:xfrm>
+          <a:off x="0" y="0"/>
+          <a:ext cx="0" cy="0"/>
+          <a:chOff x="0" y="0"/>
+          <a:chExt cx="0" cy="0"/>
+        </a:xfrm>
+      </p:grpSpPr>
+      <p:sp>
+        <p:nvSpPr>
+          <p:cNvPr id="2" name="Titel 1"/>
+          <p:cNvSpPr>
+            <a:spLocks noGrp="1"/>
+          </p:cNvSpPr>
+          <p:nvPr>
+            <p:ph type="title"/>
+          </p:nvPr>
+        </p:nvSpPr>
+        <p:spPr/>
+        <p:txBody>
+          <a:bodyPr/>
+          <a:lstStyle/>
+          <a:p>
+            <a:r>
+              <a:rPr lang="en-US" smtClean="0"/>
+              <a:t>Tag </a:t>
+            </a:r>
+            <a:r>
+              <a:rPr lang="en-US" smtClean="0"/>
+              <a:t>2-Nachmittag</a:t>
+            </a:r>
+            <a:r>
+              <a:rPr lang="en-US" smtClean="0"/>
+              <a:t>: Deklaration bei Klassen</a:t>
+            </a:r>
+            <a:endParaRPr lang="en-US"/>
+          </a:p>
+        </p:txBody>
+      </p:sp>
+      <p:sp>
+        <p:nvSpPr>
+          <p:cNvPr id="7" name="Inhaltsplatzhalter 6"/>
+          <p:cNvSpPr>
+            <a:spLocks noGrp="1"/>
+          </p:cNvSpPr>
+          <p:nvPr>
+            <p:ph idx="1"/>
+          </p:nvPr>
+        </p:nvSpPr>
+        <p:spPr/>
+        <p:txBody>
+          <a:bodyPr/>
+          <a:lstStyle/>
+          <a:p>
+            <a:r>
+              <a:rPr lang="en-US" b="1" smtClean="0"/>
+              <a:t>Fazit:</a:t>
+            </a:r>
+            <a:endParaRPr lang="en-US"/>
+          </a:p>
+          <a:p>
+            <a:pPr marL="342900" indent="-342900">
+              <a:buFont typeface="Wingdings" panose="05000000000000000000" pitchFamily="2" charset="2"/>
+              <a:buChar char="§"/>
+            </a:pPr>
+            <a:r>
+              <a:rPr lang="en-US" smtClean="0"/>
+              <a:t>Auch bei fehlendem Default-Konstruktor wird der Ausdruck </a:t>
+            </a:r>
+            <a:r>
+              <a:rPr lang="en-US" b="1" smtClean="0">
+                <a:latin typeface="Consolas" panose="020B0609020204030204" pitchFamily="49" charset="0"/>
+                <a:cs typeface="Consolas" panose="020B0609020204030204" pitchFamily="49" charset="0"/>
+              </a:rPr>
+              <a:t>CharGenerator charGen;</a:t>
+            </a:r>
+            <a:r>
+              <a:rPr lang="en-US" smtClean="0"/>
+              <a:t> nicht als Deklaration interpretiert.</a:t>
+            </a:r>
+          </a:p>
+          <a:p>
+            <a:pPr marL="342900" indent="-342900">
+              <a:buFont typeface="Wingdings" panose="05000000000000000000" pitchFamily="2" charset="2"/>
+              <a:buChar char="§"/>
+            </a:pPr>
+            <a:r>
+              <a:rPr lang="en-US" smtClean="0"/>
+              <a:t>Eigentlich klar: </a:t>
+            </a:r>
+            <a:r>
+              <a:rPr lang="en-US" b="1" smtClean="0"/>
+              <a:t>Der Parser hat noch keine Ahnung, was es für Konstruktoren gibt!</a:t>
+            </a:r>
+            <a:endParaRPr lang="en-US" b="1"/>
+          </a:p>
+        </p:txBody>
+      </p:sp>
+      <p:sp>
+        <p:nvSpPr>
+          <p:cNvPr id="4" name="Textfeld 3"/>
+          <p:cNvSpPr txBox="1"/>
+          <p:nvPr/>
+        </p:nvSpPr>
+        <p:spPr>
+          <a:xfrm>
+            <a:off x="358775" y="3438128"/>
+            <a:ext cx="3857146" cy="2153410"/>
+          </a:xfrm>
+          <a:prstGeom prst="rect">
+            <a:avLst/>
+          </a:prstGeom>
+          <a:noFill/>
+          <a:ln>
+            <a:solidFill>
+              <a:schemeClr val="tx1"/>
+            </a:solidFill>
+          </a:ln>
+        </p:spPr>
+        <p:txBody>
+          <a:bodyPr wrap="none" rtlCol="0">
+            <a:spAutoFit/>
+          </a:bodyPr>
+          <a:lstStyle/>
+          <a:p>
+            <a:pPr algn="l"/>
+            <a:r>
+              <a:rPr lang="en-US">
+                <a:latin typeface="Consolas" panose="020B0609020204030204" pitchFamily="49" charset="0"/>
+                <a:cs typeface="Consolas" panose="020B0609020204030204" pitchFamily="49" charset="0"/>
+              </a:rPr>
+              <a:t>class CharGenerator {</a:t>
+            </a:r>
+          </a:p>
+          <a:p>
+            <a:pPr algn="l"/>
+            <a:r>
+              <a:rPr lang="en-US">
+                <a:latin typeface="Consolas" panose="020B0609020204030204" pitchFamily="49" charset="0"/>
+                <a:cs typeface="Consolas" panose="020B0609020204030204" pitchFamily="49" charset="0"/>
+              </a:rPr>
+              <a:t>  CharGenerator(char x) {}   </a:t>
+            </a:r>
+          </a:p>
+          <a:p>
+            <a:pPr algn="l"/>
+            <a:r>
+              <a:rPr lang="en-US">
+                <a:latin typeface="Consolas" panose="020B0609020204030204" pitchFamily="49" charset="0"/>
+                <a:cs typeface="Consolas" panose="020B0609020204030204" pitchFamily="49" charset="0"/>
+              </a:rPr>
+              <a:t>};</a:t>
+            </a:r>
+          </a:p>
+          <a:p>
+            <a:pPr algn="l"/>
+            <a:endParaRPr lang="en-US">
+              <a:latin typeface="Consolas" panose="020B0609020204030204" pitchFamily="49" charset="0"/>
+              <a:cs typeface="Consolas" panose="020B0609020204030204" pitchFamily="49" charset="0"/>
+            </a:endParaRPr>
+          </a:p>
+          <a:p>
+            <a:pPr algn="l"/>
+            <a:r>
+              <a:rPr lang="en-US">
+                <a:latin typeface="Consolas" panose="020B0609020204030204" pitchFamily="49" charset="0"/>
+                <a:cs typeface="Consolas" panose="020B0609020204030204" pitchFamily="49" charset="0"/>
+              </a:rPr>
+              <a:t>int </a:t>
+            </a:r>
+            <a:r>
+              <a:rPr lang="en-US">
+                <a:latin typeface="Consolas" panose="020B0609020204030204" pitchFamily="49" charset="0"/>
+                <a:cs typeface="Consolas" panose="020B0609020204030204" pitchFamily="49" charset="0"/>
+              </a:rPr>
+              <a:t>main</a:t>
+            </a:r>
+            <a:r>
+              <a:rPr lang="en-US" smtClean="0">
+                <a:latin typeface="Consolas" panose="020B0609020204030204" pitchFamily="49" charset="0"/>
+                <a:cs typeface="Consolas" panose="020B0609020204030204" pitchFamily="49" charset="0"/>
+              </a:rPr>
+              <a:t>() {</a:t>
+            </a:r>
+            <a:endParaRPr lang="en-US">
+              <a:latin typeface="Consolas" panose="020B0609020204030204" pitchFamily="49" charset="0"/>
+              <a:cs typeface="Consolas" panose="020B0609020204030204" pitchFamily="49" charset="0"/>
+            </a:endParaRPr>
+          </a:p>
+          <a:p>
+            <a:pPr algn="l"/>
+            <a:r>
+              <a:rPr lang="en-US">
+                <a:latin typeface="Consolas" panose="020B0609020204030204" pitchFamily="49" charset="0"/>
+                <a:cs typeface="Consolas" panose="020B0609020204030204" pitchFamily="49" charset="0"/>
+              </a:rPr>
+              <a:t>  CharGenerator charGen;</a:t>
+            </a:r>
+          </a:p>
+          <a:p>
+            <a:pPr algn="l"/>
+            <a:r>
+              <a:rPr lang="en-US">
+                <a:latin typeface="Consolas" panose="020B0609020204030204" pitchFamily="49" charset="0"/>
+                <a:cs typeface="Consolas" panose="020B0609020204030204" pitchFamily="49" charset="0"/>
+              </a:rPr>
+              <a:t>}</a:t>
+            </a:r>
+          </a:p>
+          <a:p>
+            <a:pPr algn="l"/>
+            <a:endParaRPr lang="en-US">
+              <a:latin typeface="Consolas" panose="020B0609020204030204" pitchFamily="49" charset="0"/>
+              <a:cs typeface="Consolas" panose="020B0609020204030204" pitchFamily="49" charset="0"/>
+            </a:endParaRPr>
+          </a:p>
+        </p:txBody>
+      </p:sp>
+      <p:sp>
+        <p:nvSpPr>
+          <p:cNvPr id="5" name="Abgerundete rechteckige Legende 4"/>
+          <p:cNvSpPr/>
+          <p:nvPr/>
+        </p:nvSpPr>
+        <p:spPr bwMode="auto">
+          <a:xfrm>
+            <a:off x="4067944" y="4514833"/>
+            <a:ext cx="4248472" cy="672241"/>
+          </a:xfrm>
+          <a:prstGeom prst="wedgeRoundRectCallout">
+            <a:avLst>
+              <a:gd name="adj1" fmla="val -63918"/>
+              <a:gd name="adj2" fmla="val 8957"/>
+              <a:gd name="adj3" fmla="val 16667"/>
+            </a:avLst>
+          </a:prstGeom>
+          <a:solidFill>
+            <a:srgbClr val="C00000"/>
+          </a:solidFill>
+          <a:ln>
+            <a:noFill/>
+            <a:headEnd/>
+            <a:tailEnd/>
+          </a:ln>
+          <a:extLst/>
+        </p:spPr>
+        <p:style>
+          <a:lnRef idx="2">
+            <a:schemeClr val="dk1">
+              <a:shade val="50000"/>
+            </a:schemeClr>
+          </a:lnRef>
+          <a:fillRef idx="1">
+            <a:schemeClr val="dk1"/>
+          </a:fillRef>
+          <a:effectRef idx="0">
+            <a:schemeClr val="dk1"/>
+          </a:effectRef>
+          <a:fontRef idx="minor">
+            <a:schemeClr val="lt1"/>
+          </a:fontRef>
+        </p:style>
+        <p:txBody>
+          <a:bodyPr rtlCol="0" anchor="ctr">
+            <a:spAutoFit/>
+          </a:bodyPr>
+          <a:lstStyle/>
+          <a:p>
+            <a:pPr algn="l">
+              <a:buSzTx/>
+            </a:pPr>
+            <a:r>
+              <a:rPr lang="en-US"/>
+              <a:t>error: no matching function for call to 'CharGenerator::CharGenerator()'</a:t>
+            </a:r>
+            <a:endParaRPr lang="en-US" dirty="0" err="1">
+              <a:solidFill>
+                <a:srgbClr val="7F0055"/>
+              </a:solidFill>
+              <a:latin typeface="Consolas" pitchFamily="49" charset="0"/>
+            </a:endParaRPr>
+          </a:p>
+        </p:txBody>
+      </p:sp>
+      <p:sp>
+        <p:nvSpPr>
+          <p:cNvPr id="8" name="Rechteck 7"/>
+          <p:cNvSpPr/>
+          <p:nvPr/>
+        </p:nvSpPr>
+        <p:spPr>
+          <a:xfrm>
+            <a:off x="6556164" y="6130468"/>
+            <a:ext cx="2274983" cy="349968"/>
+          </a:xfrm>
+          <a:prstGeom prst="rect">
+            <a:avLst/>
+          </a:prstGeom>
+        </p:spPr>
+        <p:txBody>
+          <a:bodyPr wrap="none">
+            <a:spAutoFit/>
+          </a:bodyPr>
+          <a:lstStyle/>
+          <a:p>
+            <a:r>
+              <a:rPr lang="en-US">
+                <a:hlinkClick r:id="rId2"/>
+              </a:rPr>
+              <a:t>http</a:t>
+            </a:r>
+            <a:r>
+              <a:rPr lang="en-US">
+                <a:hlinkClick r:id="rId2"/>
+              </a:rPr>
+              <a:t>://</a:t>
+            </a:r>
+            <a:r>
+              <a:rPr lang="en-US" smtClean="0">
+                <a:hlinkClick r:id="rId2"/>
+              </a:rPr>
+              <a:t>cpp.sh/2fm63</a:t>
+            </a:r>
+            <a:r>
+              <a:rPr lang="en-US" smtClean="0"/>
+              <a:t>  </a:t>
+            </a:r>
+            <a:endParaRPr lang="en-US"/>
+          </a:p>
+        </p:txBody>
+      </p:sp>
+    </p:spTree>
+    <p:extLst>
+      <p:ext uri="{BB962C8B-B14F-4D97-AF65-F5344CB8AC3E}">
+        <p14:creationId xmlns:p14="http://schemas.microsoft.com/office/powerpoint/2010/main" val="1639546671"/>
+      </p:ext>
+    </p:extLst>
+  </p:cSld>
+  <p:clrMapOvr>
+    <a:masterClrMapping/>
+  </p:clrMapOvr>
+  <p:timing>
+    <p:tnLst>
+      <p:par>
+        <p:cTn id="1" dur="indefinite" restart="never" nodeType="tmRoot"/>
+      </p:par>
+    </p:tnLst>
+  </p:timing>
+</p:sld>
+</file>
+
+<file path=ppt/slides/slide17.xml><?xml version="1.0" encoding="utf-8"?>
+<p:sld xmlns:a="http://schemas.openxmlformats.org/drawingml/2006/main" xmlns:r="http://schemas.openxmlformats.org/officeDocument/2006/relationships" xmlns:p="http://schemas.openxmlformats.org/presentationml/2006/main">
+  <p:cSld>
+    <p:spTree>
+      <p:nvGrpSpPr>
+        <p:cNvPr id="1" name=""/>
+        <p:cNvGrpSpPr/>
+        <p:nvPr/>
+      </p:nvGrpSpPr>
+      <p:grpSpPr>
+        <a:xfrm>
+          <a:off x="0" y="0"/>
+          <a:ext cx="0" cy="0"/>
+          <a:chOff x="0" y="0"/>
+          <a:chExt cx="0" cy="0"/>
+        </a:xfrm>
+      </p:grpSpPr>
+      <p:sp>
+        <p:nvSpPr>
+          <p:cNvPr id="2" name="Titel 1"/>
+          <p:cNvSpPr>
+            <a:spLocks noGrp="1"/>
+          </p:cNvSpPr>
+          <p:nvPr>
+            <p:ph type="title"/>
+          </p:nvPr>
+        </p:nvSpPr>
+        <p:spPr/>
+        <p:txBody>
+          <a:bodyPr/>
+          <a:lstStyle/>
+          <a:p>
+            <a:r>
+              <a:rPr lang="en-US"/>
+              <a:t>Tag 2-Nachmittag</a:t>
+            </a:r>
+            <a:r>
+              <a:rPr lang="en-US"/>
+              <a:t>: </a:t>
+            </a:r>
+            <a:r>
+              <a:rPr lang="en-US" smtClean="0"/>
+              <a:t>Verschachtelung bei impliziten Konstruktoraufrufen</a:t>
+            </a:r>
+            <a:endParaRPr lang="en-US"/>
+          </a:p>
+        </p:txBody>
+      </p:sp>
+      <p:sp>
+        <p:nvSpPr>
+          <p:cNvPr id="5" name="Inhaltsplatzhalter 4"/>
+          <p:cNvSpPr>
+            <a:spLocks noGrp="1"/>
+          </p:cNvSpPr>
+          <p:nvPr>
+            <p:ph idx="1"/>
+          </p:nvPr>
+        </p:nvSpPr>
+        <p:spPr/>
+        <p:txBody>
+          <a:bodyPr/>
+          <a:lstStyle/>
+          <a:p>
+            <a:r>
+              <a:rPr lang="en-US" b="1" smtClean="0"/>
+              <a:t>Fazit</a:t>
+            </a:r>
+          </a:p>
+          <a:p>
+            <a:pPr marL="342900" indent="-342900">
+              <a:buFont typeface="Wingdings" panose="05000000000000000000" pitchFamily="2" charset="2"/>
+              <a:buChar char="§"/>
+            </a:pPr>
+            <a:r>
+              <a:rPr lang="en-US" smtClean="0"/>
+              <a:t>Man kann implizite Konstruktoraufrufe offenbar nicht verschachteln.</a:t>
+            </a:r>
+            <a:endParaRPr lang="en-US"/>
+          </a:p>
+        </p:txBody>
+      </p:sp>
+      <p:sp>
+        <p:nvSpPr>
+          <p:cNvPr id="3" name="Rechteck 2"/>
+          <p:cNvSpPr/>
+          <p:nvPr/>
+        </p:nvSpPr>
+        <p:spPr>
+          <a:xfrm>
+            <a:off x="346880" y="2492896"/>
+            <a:ext cx="4110421" cy="3183949"/>
+          </a:xfrm>
+          <a:prstGeom prst="rect">
+            <a:avLst/>
+          </a:prstGeom>
+          <a:noFill/>
+          <a:ln>
+            <a:solidFill>
+              <a:schemeClr val="tx1"/>
+            </a:solidFill>
+          </a:ln>
+        </p:spPr>
+        <p:txBody>
+          <a:bodyPr wrap="none" rtlCol="0">
+            <a:spAutoFit/>
+          </a:bodyPr>
+          <a:lstStyle/>
+          <a:p>
+            <a:pPr algn="l"/>
+            <a:r>
+              <a:rPr lang="en-US">
+                <a:latin typeface="Consolas" panose="020B0609020204030204" pitchFamily="49" charset="0"/>
+                <a:cs typeface="Consolas" panose="020B0609020204030204" pitchFamily="49" charset="0"/>
+              </a:rPr>
+              <a:t>#include &lt;string&gt;</a:t>
+            </a:r>
+          </a:p>
+          <a:p>
+            <a:pPr algn="l"/>
+            <a:r>
+              <a:rPr lang="en-US">
+                <a:latin typeface="Consolas" panose="020B0609020204030204" pitchFamily="49" charset="0"/>
+                <a:cs typeface="Consolas" panose="020B0609020204030204" pitchFamily="49" charset="0"/>
+              </a:rPr>
+              <a:t>class C {</a:t>
+            </a:r>
+          </a:p>
+          <a:p>
+            <a:pPr algn="l"/>
+            <a:r>
+              <a:rPr lang="en-US">
+                <a:latin typeface="Consolas" panose="020B0609020204030204" pitchFamily="49" charset="0"/>
+                <a:cs typeface="Consolas" panose="020B0609020204030204" pitchFamily="49" charset="0"/>
+              </a:rPr>
+              <a:t>public:</a:t>
+            </a:r>
+          </a:p>
+          <a:p>
+            <a:pPr algn="l"/>
+            <a:r>
+              <a:rPr lang="en-US">
+                <a:latin typeface="Consolas" panose="020B0609020204030204" pitchFamily="49" charset="0"/>
+                <a:cs typeface="Consolas" panose="020B0609020204030204" pitchFamily="49" charset="0"/>
+              </a:rPr>
+              <a:t>  C (const std::string &amp;) {}   </a:t>
+            </a:r>
+          </a:p>
+          <a:p>
+            <a:pPr algn="l"/>
+            <a:r>
+              <a:rPr lang="en-US">
+                <a:latin typeface="Consolas" panose="020B0609020204030204" pitchFamily="49" charset="0"/>
+                <a:cs typeface="Consolas" panose="020B0609020204030204" pitchFamily="49" charset="0"/>
+              </a:rPr>
+              <a:t>};</a:t>
+            </a:r>
+          </a:p>
+          <a:p>
+            <a:pPr algn="l"/>
+            <a:endParaRPr lang="en-US">
+              <a:latin typeface="Consolas" panose="020B0609020204030204" pitchFamily="49" charset="0"/>
+              <a:cs typeface="Consolas" panose="020B0609020204030204" pitchFamily="49" charset="0"/>
+            </a:endParaRPr>
+          </a:p>
+          <a:p>
+            <a:pPr algn="l"/>
+            <a:r>
+              <a:rPr lang="en-US">
+                <a:latin typeface="Consolas" panose="020B0609020204030204" pitchFamily="49" charset="0"/>
+                <a:cs typeface="Consolas" panose="020B0609020204030204" pitchFamily="49" charset="0"/>
+              </a:rPr>
+              <a:t>void myFunction(const C) {}</a:t>
+            </a:r>
+          </a:p>
+          <a:p>
+            <a:pPr algn="l"/>
+            <a:endParaRPr lang="en-US">
+              <a:latin typeface="Consolas" panose="020B0609020204030204" pitchFamily="49" charset="0"/>
+              <a:cs typeface="Consolas" panose="020B0609020204030204" pitchFamily="49" charset="0"/>
+            </a:endParaRPr>
+          </a:p>
+          <a:p>
+            <a:pPr algn="l"/>
+            <a:r>
+              <a:rPr lang="en-US">
+                <a:latin typeface="Consolas" panose="020B0609020204030204" pitchFamily="49" charset="0"/>
+                <a:cs typeface="Consolas" panose="020B0609020204030204" pitchFamily="49" charset="0"/>
+              </a:rPr>
+              <a:t>int main() {</a:t>
+            </a:r>
+          </a:p>
+          <a:p>
+            <a:pPr algn="l"/>
+            <a:r>
+              <a:rPr lang="en-US">
+                <a:latin typeface="Consolas" panose="020B0609020204030204" pitchFamily="49" charset="0"/>
+                <a:cs typeface="Consolas" panose="020B0609020204030204" pitchFamily="49" charset="0"/>
+              </a:rPr>
+              <a:t>  myFunction("C");</a:t>
+            </a:r>
+          </a:p>
+          <a:p>
+            <a:pPr algn="l"/>
+            <a:r>
+              <a:rPr lang="en-US">
+                <a:latin typeface="Consolas" panose="020B0609020204030204" pitchFamily="49" charset="0"/>
+                <a:cs typeface="Consolas" panose="020B0609020204030204" pitchFamily="49" charset="0"/>
+              </a:rPr>
+              <a:t>  myFunction(std::string("C"));</a:t>
+            </a:r>
+          </a:p>
+          <a:p>
+            <a:pPr algn="l"/>
+            <a:r>
+              <a:rPr lang="en-US">
+                <a:latin typeface="Consolas" panose="020B0609020204030204" pitchFamily="49" charset="0"/>
+                <a:cs typeface="Consolas" panose="020B0609020204030204" pitchFamily="49" charset="0"/>
+              </a:rPr>
+              <a:t>}</a:t>
+            </a:r>
+          </a:p>
+        </p:txBody>
+      </p:sp>
+      <p:sp>
+        <p:nvSpPr>
+          <p:cNvPr id="4" name="Abgerundete rechteckige Legende 3"/>
+          <p:cNvSpPr/>
+          <p:nvPr/>
+        </p:nvSpPr>
+        <p:spPr bwMode="auto">
+          <a:xfrm>
+            <a:off x="4211960" y="4293096"/>
+            <a:ext cx="4752528" cy="672241"/>
+          </a:xfrm>
+          <a:prstGeom prst="wedgeRoundRectCallout">
+            <a:avLst>
+              <a:gd name="adj1" fmla="val -81424"/>
+              <a:gd name="adj2" fmla="val 50691"/>
+              <a:gd name="adj3" fmla="val 16667"/>
+            </a:avLst>
+          </a:prstGeom>
+          <a:solidFill>
+            <a:srgbClr val="C00000"/>
+          </a:solidFill>
+          <a:ln>
+            <a:noFill/>
+            <a:headEnd/>
+            <a:tailEnd/>
+          </a:ln>
+          <a:extLst/>
+        </p:spPr>
+        <p:style>
+          <a:lnRef idx="2">
+            <a:schemeClr val="dk1">
+              <a:shade val="50000"/>
+            </a:schemeClr>
+          </a:lnRef>
+          <a:fillRef idx="1">
+            <a:schemeClr val="dk1"/>
+          </a:fillRef>
+          <a:effectRef idx="0">
+            <a:schemeClr val="dk1"/>
+          </a:effectRef>
+          <a:fontRef idx="minor">
+            <a:schemeClr val="lt1"/>
+          </a:fontRef>
+        </p:style>
+        <p:txBody>
+          <a:bodyPr rtlCol="0" anchor="ctr">
+            <a:spAutoFit/>
+          </a:bodyPr>
+          <a:lstStyle/>
+          <a:p>
+            <a:pPr algn="l">
+              <a:buSzTx/>
+            </a:pPr>
+            <a:r>
+              <a:rPr lang="en-US"/>
+              <a:t>error: could not convert '(const char*)"C"' from 'const char*' to 'C'</a:t>
+            </a:r>
+            <a:endParaRPr lang="en-US" dirty="0" err="1">
+              <a:solidFill>
+                <a:srgbClr val="7F0055"/>
+              </a:solidFill>
+              <a:latin typeface="Consolas" pitchFamily="49" charset="0"/>
+            </a:endParaRPr>
+          </a:p>
+        </p:txBody>
+      </p:sp>
+      <p:sp>
+        <p:nvSpPr>
+          <p:cNvPr id="6" name="Rechteck 5"/>
+          <p:cNvSpPr/>
+          <p:nvPr/>
+        </p:nvSpPr>
+        <p:spPr>
+          <a:xfrm>
+            <a:off x="6540675" y="6165304"/>
+            <a:ext cx="2210863" cy="349968"/>
+          </a:xfrm>
+          <a:prstGeom prst="rect">
+            <a:avLst/>
+          </a:prstGeom>
+        </p:spPr>
+        <p:txBody>
+          <a:bodyPr wrap="none">
+            <a:spAutoFit/>
+          </a:bodyPr>
+          <a:lstStyle/>
+          <a:p>
+            <a:r>
+              <a:rPr lang="en-US">
+                <a:hlinkClick r:id="rId2"/>
+              </a:rPr>
+              <a:t>http</a:t>
+            </a:r>
+            <a:r>
+              <a:rPr lang="en-US">
+                <a:hlinkClick r:id="rId2"/>
+              </a:rPr>
+              <a:t>://</a:t>
+            </a:r>
+            <a:r>
+              <a:rPr lang="en-US" smtClean="0">
+                <a:hlinkClick r:id="rId2"/>
+              </a:rPr>
+              <a:t>cpp.sh/43don</a:t>
+            </a:r>
+            <a:r>
+              <a:rPr lang="en-US" smtClean="0"/>
+              <a:t> </a:t>
+            </a:r>
+            <a:endParaRPr lang="en-US"/>
+          </a:p>
+        </p:txBody>
+      </p:sp>
+    </p:spTree>
+    <p:extLst>
+      <p:ext uri="{BB962C8B-B14F-4D97-AF65-F5344CB8AC3E}">
+        <p14:creationId xmlns:p14="http://schemas.microsoft.com/office/powerpoint/2010/main" val="1874845698"/>
+      </p:ext>
+    </p:extLst>
+  </p:cSld>
+  <p:clrMapOvr>
+    <a:masterClrMapping/>
+  </p:clrMapOvr>
+</p:sld>
+</file>
+
+<file path=ppt/slides/slide18.xml><?xml version="1.0" encoding="utf-8"?>
 <p:sld xmlns:a="http://schemas.openxmlformats.org/drawingml/2006/main" xmlns:r="http://schemas.openxmlformats.org/officeDocument/2006/relationships" xmlns:p="http://schemas.openxmlformats.org/presentationml/2006/main">
   <p:cSld>
     <p:spTree>

</xml_diff>

<commit_message>
Fix minor typos/layout issues
</commit_message>
<xml_diff>
--- a/2017/recap_and_warmup_slides.pptx
+++ b/2017/recap_and_warmup_slides.pptx
@@ -5,10 +5,10 @@
     <p:sldMasterId id="2147483650" r:id="rId1"/>
   </p:sldMasterIdLst>
   <p:notesMasterIdLst>
-    <p:notesMasterId r:id="rId20"/>
+    <p:notesMasterId r:id="rId23"/>
   </p:notesMasterIdLst>
   <p:handoutMasterIdLst>
-    <p:handoutMasterId r:id="rId21"/>
+    <p:handoutMasterId r:id="rId24"/>
   </p:handoutMasterIdLst>
   <p:sldIdLst>
     <p:sldId id="454" r:id="rId2"/>
@@ -28,7 +28,10 @@
     <p:sldId id="488" r:id="rId16"/>
     <p:sldId id="489" r:id="rId17"/>
     <p:sldId id="490" r:id="rId18"/>
-    <p:sldId id="486" r:id="rId19"/>
+    <p:sldId id="491" r:id="rId19"/>
+    <p:sldId id="492" r:id="rId20"/>
+    <p:sldId id="493" r:id="rId21"/>
+    <p:sldId id="486" r:id="rId22"/>
   </p:sldIdLst>
   <p:sldSz cx="9144000" cy="6858000" type="screen4x3"/>
   <p:notesSz cx="7099300" cy="10234613"/>
@@ -219,6 +222,9 @@
             <p14:sldId id="488"/>
             <p14:sldId id="489"/>
             <p14:sldId id="490"/>
+            <p14:sldId id="491"/>
+            <p14:sldId id="492"/>
+            <p14:sldId id="493"/>
             <p14:sldId id="486"/>
           </p14:sldIdLst>
         </p14:section>
@@ -2027,7 +2033,13 @@
               <a:rPr lang="de-DE" altLang="de-DE" b="0" i="0" smtClean="0">
                 <a:latin typeface="Times New Roman" pitchFamily="16" charset="0"/>
               </a:rPr>
-              <a:t>, (iii) Multiplikation</a:t>
+              <a:t>, (iii) </a:t>
+            </a:r>
+            <a:r>
+              <a:rPr lang="de-DE" altLang="de-DE" b="1" i="0" smtClean="0">
+                <a:latin typeface="Times New Roman" pitchFamily="16" charset="0"/>
+              </a:rPr>
+              <a:t>Multiplikation</a:t>
             </a:r>
           </a:p>
           <a:p>
@@ -2090,7 +2102,13 @@
               <a:rPr lang="de-DE" altLang="de-DE" b="0" i="0" baseline="0" smtClean="0">
                 <a:latin typeface="Times New Roman" pitchFamily="16" charset="0"/>
               </a:rPr>
-              <a:t>, (iii) Bitweises Oder</a:t>
+              <a:t>, (iii) Bitweises </a:t>
+            </a:r>
+            <a:r>
+              <a:rPr lang="de-DE" altLang="de-DE" b="1" i="0" baseline="0" smtClean="0">
+                <a:latin typeface="Times New Roman" pitchFamily="16" charset="0"/>
+              </a:rPr>
+              <a:t>Und</a:t>
             </a:r>
             <a:endParaRPr lang="de-DE" altLang="de-DE" b="1" i="0" dirty="0" smtClean="0">
               <a:latin typeface="Times New Roman" pitchFamily="16" charset="0"/>
@@ -3952,6 +3970,1104 @@
     <p:extLst>
       <p:ext uri="{BB962C8B-B14F-4D97-AF65-F5344CB8AC3E}">
         <p14:creationId xmlns:p14="http://schemas.microsoft.com/office/powerpoint/2010/main" val="3079654040"/>
+      </p:ext>
+    </p:extLst>
+  </p:cSld>
+  <p:clrMapOvr>
+    <a:masterClrMapping/>
+  </p:clrMapOvr>
+</p:notes>
+</file>
+
+<file path=ppt/notesSlides/notesSlide5.xml><?xml version="1.0" encoding="utf-8"?>
+<p:notes xmlns:a="http://schemas.openxmlformats.org/drawingml/2006/main" xmlns:r="http://schemas.openxmlformats.org/officeDocument/2006/relationships" xmlns:p="http://schemas.openxmlformats.org/presentationml/2006/main">
+  <p:cSld>
+    <p:spTree>
+      <p:nvGrpSpPr>
+        <p:cNvPr id="1" name=""/>
+        <p:cNvGrpSpPr/>
+        <p:nvPr/>
+      </p:nvGrpSpPr>
+      <p:grpSpPr>
+        <a:xfrm>
+          <a:off x="0" y="0"/>
+          <a:ext cx="0" cy="0"/>
+          <a:chOff x="0" y="0"/>
+          <a:chExt cx="0" cy="0"/>
+        </a:xfrm>
+      </p:grpSpPr>
+      <p:sp>
+        <p:nvSpPr>
+          <p:cNvPr id="53250" name="Folienbildplatzhalter 1"/>
+          <p:cNvSpPr>
+            <a:spLocks noGrp="1" noRot="1" noChangeAspect="1" noTextEdit="1"/>
+          </p:cNvSpPr>
+          <p:nvPr>
+            <p:ph type="sldImg"/>
+          </p:nvPr>
+        </p:nvSpPr>
+        <p:spPr>
+          <a:ln/>
+        </p:spPr>
+      </p:sp>
+      <p:sp>
+        <p:nvSpPr>
+          <p:cNvPr id="53251" name="Notizenplatzhalter 2"/>
+          <p:cNvSpPr>
+            <a:spLocks noGrp="1"/>
+          </p:cNvSpPr>
+          <p:nvPr>
+            <p:ph type="body" idx="1"/>
+          </p:nvPr>
+        </p:nvSpPr>
+        <p:spPr>
+          <a:noFill/>
+          <a:extLst>
+            <a:ext uri="{909E8E84-426E-40DD-AFC4-6F175D3DCCD1}">
+              <a14:hiddenFill xmlns:a14="http://schemas.microsoft.com/office/drawing/2010/main">
+                <a:solidFill>
+                  <a:srgbClr val="FFFFFF"/>
+                </a:solidFill>
+              </a14:hiddenFill>
+            </a:ext>
+            <a:ext uri="{91240B29-F687-4F45-9708-019B960494DF}">
+              <a14:hiddenLine xmlns:a14="http://schemas.microsoft.com/office/drawing/2010/main" w="9525">
+                <a:solidFill>
+                  <a:srgbClr val="000000"/>
+                </a:solidFill>
+                <a:miter lim="800000"/>
+                <a:headEnd/>
+                <a:tailEnd/>
+              </a14:hiddenLine>
+            </a:ext>
+          </a:extLst>
+        </p:spPr>
+        <p:txBody>
+          <a:bodyPr/>
+          <a:lstStyle/>
+          <a:p>
+            <a:pPr marL="0" indent="0">
+              <a:buFontTx/>
+              <a:buNone/>
+            </a:pPr>
+            <a:r>
+              <a:rPr lang="de-DE" altLang="de-DE" i="0" smtClean="0">
+                <a:latin typeface="Times New Roman" pitchFamily="16" charset="0"/>
+              </a:rPr>
+              <a:t>*iP; ist eine</a:t>
+            </a:r>
+            <a:r>
+              <a:rPr lang="de-DE" altLang="de-DE" i="0" baseline="0" smtClean="0">
+                <a:latin typeface="Times New Roman" pitchFamily="16" charset="0"/>
+              </a:rPr>
+              <a:t> Referenz auf die Speicherzelle von i.</a:t>
+            </a:r>
+          </a:p>
+          <a:p>
+            <a:pPr marL="0" indent="0">
+              <a:buFontTx/>
+              <a:buNone/>
+            </a:pPr>
+            <a:r>
+              <a:rPr lang="de-DE" altLang="de-DE" i="0" baseline="0" smtClean="0">
+                <a:latin typeface="Times New Roman" pitchFamily="16" charset="0"/>
+              </a:rPr>
+              <a:t>Ansonsten wäre folgende Zuweisung nicht möglich: "int &amp;iR = *iP"</a:t>
+            </a:r>
+          </a:p>
+          <a:p>
+            <a:pPr marL="0" indent="0">
+              <a:buFontTx/>
+              <a:buNone/>
+            </a:pPr>
+            <a:endParaRPr lang="de-DE" altLang="de-DE" i="0" smtClean="0">
+              <a:latin typeface="Times New Roman" pitchFamily="16" charset="0"/>
+            </a:endParaRPr>
+          </a:p>
+          <a:p>
+            <a:pPr marL="0" indent="0">
+              <a:buFontTx/>
+              <a:buNone/>
+            </a:pPr>
+            <a:r>
+              <a:rPr lang="de-DE" altLang="de-DE" i="0" smtClean="0">
+                <a:latin typeface="Times New Roman" pitchFamily="16" charset="0"/>
+              </a:rPr>
+              <a:t>Asterisk: (i) Als Teil des </a:t>
+            </a:r>
+            <a:r>
+              <a:rPr lang="de-DE" altLang="de-DE" b="1" i="0" smtClean="0">
+                <a:latin typeface="Times New Roman" pitchFamily="16" charset="0"/>
+              </a:rPr>
+              <a:t>Typs</a:t>
+            </a:r>
+            <a:r>
+              <a:rPr lang="de-DE" altLang="de-DE" i="0" smtClean="0">
+                <a:latin typeface="Times New Roman" pitchFamily="16" charset="0"/>
+              </a:rPr>
+              <a:t> bei Pointern, (ii) Als Dereferenzierungs</a:t>
+            </a:r>
+            <a:r>
+              <a:rPr lang="de-DE" altLang="de-DE" b="1" i="0" smtClean="0">
+                <a:latin typeface="Times New Roman" pitchFamily="16" charset="0"/>
+              </a:rPr>
+              <a:t>operator</a:t>
+            </a:r>
+            <a:r>
+              <a:rPr lang="de-DE" altLang="de-DE" b="0" i="0" smtClean="0">
+                <a:latin typeface="Times New Roman" pitchFamily="16" charset="0"/>
+              </a:rPr>
+              <a:t>, (iii) </a:t>
+            </a:r>
+            <a:r>
+              <a:rPr lang="de-DE" altLang="de-DE" b="1" i="0" smtClean="0">
+                <a:latin typeface="Times New Roman" pitchFamily="16" charset="0"/>
+              </a:rPr>
+              <a:t>Multiplikation</a:t>
+            </a:r>
+          </a:p>
+          <a:p>
+            <a:pPr marL="0" indent="0">
+              <a:buFontTx/>
+              <a:buNone/>
+            </a:pPr>
+            <a:endParaRPr lang="de-DE" altLang="de-DE" b="1" i="0" smtClean="0">
+              <a:latin typeface="Times New Roman" pitchFamily="16" charset="0"/>
+            </a:endParaRPr>
+          </a:p>
+          <a:p>
+            <a:pPr marL="0" indent="0">
+              <a:buFontTx/>
+              <a:buNone/>
+            </a:pPr>
+            <a:r>
+              <a:rPr lang="de-DE" altLang="de-DE" i="0" smtClean="0">
+                <a:latin typeface="Times New Roman" pitchFamily="16" charset="0"/>
+              </a:rPr>
+              <a:t>Ampersand: (i) Als Teil des </a:t>
+            </a:r>
+            <a:r>
+              <a:rPr lang="de-DE" altLang="de-DE" b="1" i="0" smtClean="0">
+                <a:latin typeface="Times New Roman" pitchFamily="16" charset="0"/>
+              </a:rPr>
+              <a:t>Typs</a:t>
+            </a:r>
+            <a:r>
+              <a:rPr lang="de-DE" altLang="de-DE" i="0" smtClean="0">
+                <a:latin typeface="Times New Roman" pitchFamily="16" charset="0"/>
+              </a:rPr>
+              <a:t> bei</a:t>
+            </a:r>
+            <a:r>
+              <a:rPr lang="de-DE" altLang="de-DE" i="0" baseline="0" smtClean="0">
+                <a:latin typeface="Times New Roman" pitchFamily="16" charset="0"/>
+              </a:rPr>
+              <a:t> Referenzen, (ii) Als Adress</a:t>
+            </a:r>
+            <a:r>
+              <a:rPr lang="de-DE" altLang="de-DE" b="1" i="0" baseline="0" smtClean="0">
+                <a:latin typeface="Times New Roman" pitchFamily="16" charset="0"/>
+              </a:rPr>
+              <a:t>operator</a:t>
+            </a:r>
+            <a:r>
+              <a:rPr lang="de-DE" altLang="de-DE" b="0" i="0" baseline="0" smtClean="0">
+                <a:latin typeface="Times New Roman" pitchFamily="16" charset="0"/>
+              </a:rPr>
+              <a:t>, (iii) Bitweises </a:t>
+            </a:r>
+            <a:r>
+              <a:rPr lang="de-DE" altLang="de-DE" b="1" i="0" baseline="0" smtClean="0">
+                <a:latin typeface="Times New Roman" pitchFamily="16" charset="0"/>
+              </a:rPr>
+              <a:t>Und</a:t>
+            </a:r>
+            <a:endParaRPr lang="de-DE" altLang="de-DE" b="1" i="0" dirty="0" smtClean="0">
+              <a:latin typeface="Times New Roman" pitchFamily="16" charset="0"/>
+            </a:endParaRPr>
+          </a:p>
+        </p:txBody>
+      </p:sp>
+      <p:sp>
+        <p:nvSpPr>
+          <p:cNvPr id="53252" name="Datumsplatzhalter 3"/>
+          <p:cNvSpPr>
+            <a:spLocks noGrp="1"/>
+          </p:cNvSpPr>
+          <p:nvPr>
+            <p:ph type="dt" sz="quarter"/>
+          </p:nvPr>
+        </p:nvSpPr>
+        <p:spPr>
+          <a:noFill/>
+          <a:extLst>
+            <a:ext uri="{909E8E84-426E-40DD-AFC4-6F175D3DCCD1}">
+              <a14:hiddenFill xmlns:a14="http://schemas.microsoft.com/office/drawing/2010/main">
+                <a:solidFill>
+                  <a:srgbClr val="FFFFFF"/>
+                </a:solidFill>
+              </a14:hiddenFill>
+            </a:ext>
+            <a:ext uri="{91240B29-F687-4F45-9708-019B960494DF}">
+              <a14:hiddenLine xmlns:a14="http://schemas.microsoft.com/office/drawing/2010/main" w="9525">
+                <a:solidFill>
+                  <a:srgbClr val="000000"/>
+                </a:solidFill>
+                <a:miter lim="800000"/>
+                <a:headEnd/>
+                <a:tailEnd/>
+              </a14:hiddenLine>
+            </a:ext>
+          </a:extLst>
+        </p:spPr>
+        <p:txBody>
+          <a:bodyPr/>
+          <a:lstStyle>
+            <a:lvl1pPr defTabSz="463550" eaLnBrk="0" hangingPunct="0">
+              <a:tabLst>
+                <a:tab pos="746125" algn="l"/>
+                <a:tab pos="1492250" algn="l"/>
+              </a:tabLst>
+              <a:defRPr>
+                <a:solidFill>
+                  <a:schemeClr val="tx1"/>
+                </a:solidFill>
+                <a:latin typeface="Arial" charset="0"/>
+                <a:ea typeface="Lucida Sans Unicode" pitchFamily="34" charset="0"/>
+                <a:cs typeface="Lucida Sans Unicode" pitchFamily="34" charset="0"/>
+              </a:defRPr>
+            </a:lvl1pPr>
+            <a:lvl2pPr marL="742950" indent="-285750" defTabSz="463550" eaLnBrk="0" hangingPunct="0">
+              <a:tabLst>
+                <a:tab pos="746125" algn="l"/>
+                <a:tab pos="1492250" algn="l"/>
+              </a:tabLst>
+              <a:defRPr>
+                <a:solidFill>
+                  <a:schemeClr val="tx1"/>
+                </a:solidFill>
+                <a:latin typeface="Arial" charset="0"/>
+                <a:ea typeface="Lucida Sans Unicode" pitchFamily="34" charset="0"/>
+                <a:cs typeface="Lucida Sans Unicode" pitchFamily="34" charset="0"/>
+              </a:defRPr>
+            </a:lvl2pPr>
+            <a:lvl3pPr marL="1143000" indent="-228600" defTabSz="463550" eaLnBrk="0" hangingPunct="0">
+              <a:tabLst>
+                <a:tab pos="746125" algn="l"/>
+                <a:tab pos="1492250" algn="l"/>
+              </a:tabLst>
+              <a:defRPr>
+                <a:solidFill>
+                  <a:schemeClr val="tx1"/>
+                </a:solidFill>
+                <a:latin typeface="Arial" charset="0"/>
+                <a:ea typeface="Lucida Sans Unicode" pitchFamily="34" charset="0"/>
+                <a:cs typeface="Lucida Sans Unicode" pitchFamily="34" charset="0"/>
+              </a:defRPr>
+            </a:lvl3pPr>
+            <a:lvl4pPr marL="1600200" indent="-228600" defTabSz="463550" eaLnBrk="0" hangingPunct="0">
+              <a:tabLst>
+                <a:tab pos="746125" algn="l"/>
+                <a:tab pos="1492250" algn="l"/>
+              </a:tabLst>
+              <a:defRPr>
+                <a:solidFill>
+                  <a:schemeClr val="tx1"/>
+                </a:solidFill>
+                <a:latin typeface="Arial" charset="0"/>
+                <a:ea typeface="Lucida Sans Unicode" pitchFamily="34" charset="0"/>
+                <a:cs typeface="Lucida Sans Unicode" pitchFamily="34" charset="0"/>
+              </a:defRPr>
+            </a:lvl4pPr>
+            <a:lvl5pPr marL="2057400" indent="-228600" defTabSz="463550" eaLnBrk="0" hangingPunct="0">
+              <a:tabLst>
+                <a:tab pos="746125" algn="l"/>
+                <a:tab pos="1492250" algn="l"/>
+              </a:tabLst>
+              <a:defRPr>
+                <a:solidFill>
+                  <a:schemeClr val="tx1"/>
+                </a:solidFill>
+                <a:latin typeface="Arial" charset="0"/>
+                <a:ea typeface="Lucida Sans Unicode" pitchFamily="34" charset="0"/>
+                <a:cs typeface="Lucida Sans Unicode" pitchFamily="34" charset="0"/>
+              </a:defRPr>
+            </a:lvl5pPr>
+            <a:lvl6pPr marL="2514600" indent="-228600" algn="ctr" defTabSz="463550" eaLnBrk="0" fontAlgn="base" hangingPunct="0">
+              <a:lnSpc>
+                <a:spcPct val="93000"/>
+              </a:lnSpc>
+              <a:spcBef>
+                <a:spcPct val="0"/>
+              </a:spcBef>
+              <a:spcAft>
+                <a:spcPct val="0"/>
+              </a:spcAft>
+              <a:buClr>
+                <a:srgbClr val="000000"/>
+              </a:buClr>
+              <a:buSzPct val="100000"/>
+              <a:buFont typeface="Arial" charset="0"/>
+              <a:tabLst>
+                <a:tab pos="746125" algn="l"/>
+                <a:tab pos="1492250" algn="l"/>
+              </a:tabLst>
+              <a:defRPr>
+                <a:solidFill>
+                  <a:schemeClr val="tx1"/>
+                </a:solidFill>
+                <a:latin typeface="Arial" charset="0"/>
+                <a:ea typeface="Lucida Sans Unicode" pitchFamily="34" charset="0"/>
+                <a:cs typeface="Lucida Sans Unicode" pitchFamily="34" charset="0"/>
+              </a:defRPr>
+            </a:lvl6pPr>
+            <a:lvl7pPr marL="2971800" indent="-228600" algn="ctr" defTabSz="463550" eaLnBrk="0" fontAlgn="base" hangingPunct="0">
+              <a:lnSpc>
+                <a:spcPct val="93000"/>
+              </a:lnSpc>
+              <a:spcBef>
+                <a:spcPct val="0"/>
+              </a:spcBef>
+              <a:spcAft>
+                <a:spcPct val="0"/>
+              </a:spcAft>
+              <a:buClr>
+                <a:srgbClr val="000000"/>
+              </a:buClr>
+              <a:buSzPct val="100000"/>
+              <a:buFont typeface="Arial" charset="0"/>
+              <a:tabLst>
+                <a:tab pos="746125" algn="l"/>
+                <a:tab pos="1492250" algn="l"/>
+              </a:tabLst>
+              <a:defRPr>
+                <a:solidFill>
+                  <a:schemeClr val="tx1"/>
+                </a:solidFill>
+                <a:latin typeface="Arial" charset="0"/>
+                <a:ea typeface="Lucida Sans Unicode" pitchFamily="34" charset="0"/>
+                <a:cs typeface="Lucida Sans Unicode" pitchFamily="34" charset="0"/>
+              </a:defRPr>
+            </a:lvl7pPr>
+            <a:lvl8pPr marL="3429000" indent="-228600" algn="ctr" defTabSz="463550" eaLnBrk="0" fontAlgn="base" hangingPunct="0">
+              <a:lnSpc>
+                <a:spcPct val="93000"/>
+              </a:lnSpc>
+              <a:spcBef>
+                <a:spcPct val="0"/>
+              </a:spcBef>
+              <a:spcAft>
+                <a:spcPct val="0"/>
+              </a:spcAft>
+              <a:buClr>
+                <a:srgbClr val="000000"/>
+              </a:buClr>
+              <a:buSzPct val="100000"/>
+              <a:buFont typeface="Arial" charset="0"/>
+              <a:tabLst>
+                <a:tab pos="746125" algn="l"/>
+                <a:tab pos="1492250" algn="l"/>
+              </a:tabLst>
+              <a:defRPr>
+                <a:solidFill>
+                  <a:schemeClr val="tx1"/>
+                </a:solidFill>
+                <a:latin typeface="Arial" charset="0"/>
+                <a:ea typeface="Lucida Sans Unicode" pitchFamily="34" charset="0"/>
+                <a:cs typeface="Lucida Sans Unicode" pitchFamily="34" charset="0"/>
+              </a:defRPr>
+            </a:lvl8pPr>
+            <a:lvl9pPr marL="3886200" indent="-228600" algn="ctr" defTabSz="463550" eaLnBrk="0" fontAlgn="base" hangingPunct="0">
+              <a:lnSpc>
+                <a:spcPct val="93000"/>
+              </a:lnSpc>
+              <a:spcBef>
+                <a:spcPct val="0"/>
+              </a:spcBef>
+              <a:spcAft>
+                <a:spcPct val="0"/>
+              </a:spcAft>
+              <a:buClr>
+                <a:srgbClr val="000000"/>
+              </a:buClr>
+              <a:buSzPct val="100000"/>
+              <a:buFont typeface="Arial" charset="0"/>
+              <a:tabLst>
+                <a:tab pos="746125" algn="l"/>
+                <a:tab pos="1492250" algn="l"/>
+              </a:tabLst>
+              <a:defRPr>
+                <a:solidFill>
+                  <a:schemeClr val="tx1"/>
+                </a:solidFill>
+                <a:latin typeface="Arial" charset="0"/>
+                <a:ea typeface="Lucida Sans Unicode" pitchFamily="34" charset="0"/>
+                <a:cs typeface="Lucida Sans Unicode" pitchFamily="34" charset="0"/>
+              </a:defRPr>
+            </a:lvl9pPr>
+          </a:lstStyle>
+          <a:p>
+            <a:pPr eaLnBrk="1" hangingPunct="1"/>
+            <a:r>
+              <a:rPr lang="en-US" altLang="de-DE" smtClean="0">
+                <a:solidFill>
+                  <a:srgbClr val="000000"/>
+                </a:solidFill>
+                <a:latin typeface="Stafford" pitchFamily="2" charset="0"/>
+              </a:rPr>
+              <a:t>November 19, 2007</a:t>
+            </a:r>
+          </a:p>
+        </p:txBody>
+      </p:sp>
+      <p:sp>
+        <p:nvSpPr>
+          <p:cNvPr id="53253" name="Fußzeilenplatzhalter 4"/>
+          <p:cNvSpPr>
+            <a:spLocks noGrp="1"/>
+          </p:cNvSpPr>
+          <p:nvPr>
+            <p:ph type="ftr" sz="quarter"/>
+          </p:nvPr>
+        </p:nvSpPr>
+        <p:spPr>
+          <a:noFill/>
+          <a:extLst>
+            <a:ext uri="{909E8E84-426E-40DD-AFC4-6F175D3DCCD1}">
+              <a14:hiddenFill xmlns:a14="http://schemas.microsoft.com/office/drawing/2010/main">
+                <a:solidFill>
+                  <a:srgbClr val="FFFFFF"/>
+                </a:solidFill>
+              </a14:hiddenFill>
+            </a:ext>
+            <a:ext uri="{91240B29-F687-4F45-9708-019B960494DF}">
+              <a14:hiddenLine xmlns:a14="http://schemas.microsoft.com/office/drawing/2010/main" w="9525">
+                <a:solidFill>
+                  <a:srgbClr val="000000"/>
+                </a:solidFill>
+                <a:miter lim="800000"/>
+                <a:headEnd/>
+                <a:tailEnd/>
+              </a14:hiddenLine>
+            </a:ext>
+          </a:extLst>
+        </p:spPr>
+        <p:txBody>
+          <a:bodyPr/>
+          <a:lstStyle>
+            <a:lvl1pPr defTabSz="463550" eaLnBrk="0" hangingPunct="0">
+              <a:tabLst>
+                <a:tab pos="746125" algn="l"/>
+                <a:tab pos="1492250" algn="l"/>
+                <a:tab pos="2238375" algn="l"/>
+                <a:tab pos="2986088" algn="l"/>
+                <a:tab pos="3732213" algn="l"/>
+              </a:tabLst>
+              <a:defRPr>
+                <a:solidFill>
+                  <a:schemeClr val="tx1"/>
+                </a:solidFill>
+                <a:latin typeface="Arial" charset="0"/>
+                <a:ea typeface="Lucida Sans Unicode" pitchFamily="34" charset="0"/>
+                <a:cs typeface="Lucida Sans Unicode" pitchFamily="34" charset="0"/>
+              </a:defRPr>
+            </a:lvl1pPr>
+            <a:lvl2pPr marL="742950" indent="-285750" defTabSz="463550" eaLnBrk="0" hangingPunct="0">
+              <a:tabLst>
+                <a:tab pos="746125" algn="l"/>
+                <a:tab pos="1492250" algn="l"/>
+                <a:tab pos="2238375" algn="l"/>
+                <a:tab pos="2986088" algn="l"/>
+                <a:tab pos="3732213" algn="l"/>
+              </a:tabLst>
+              <a:defRPr>
+                <a:solidFill>
+                  <a:schemeClr val="tx1"/>
+                </a:solidFill>
+                <a:latin typeface="Arial" charset="0"/>
+                <a:ea typeface="Lucida Sans Unicode" pitchFamily="34" charset="0"/>
+                <a:cs typeface="Lucida Sans Unicode" pitchFamily="34" charset="0"/>
+              </a:defRPr>
+            </a:lvl2pPr>
+            <a:lvl3pPr marL="1143000" indent="-228600" defTabSz="463550" eaLnBrk="0" hangingPunct="0">
+              <a:tabLst>
+                <a:tab pos="746125" algn="l"/>
+                <a:tab pos="1492250" algn="l"/>
+                <a:tab pos="2238375" algn="l"/>
+                <a:tab pos="2986088" algn="l"/>
+                <a:tab pos="3732213" algn="l"/>
+              </a:tabLst>
+              <a:defRPr>
+                <a:solidFill>
+                  <a:schemeClr val="tx1"/>
+                </a:solidFill>
+                <a:latin typeface="Arial" charset="0"/>
+                <a:ea typeface="Lucida Sans Unicode" pitchFamily="34" charset="0"/>
+                <a:cs typeface="Lucida Sans Unicode" pitchFamily="34" charset="0"/>
+              </a:defRPr>
+            </a:lvl3pPr>
+            <a:lvl4pPr marL="1600200" indent="-228600" defTabSz="463550" eaLnBrk="0" hangingPunct="0">
+              <a:tabLst>
+                <a:tab pos="746125" algn="l"/>
+                <a:tab pos="1492250" algn="l"/>
+                <a:tab pos="2238375" algn="l"/>
+                <a:tab pos="2986088" algn="l"/>
+                <a:tab pos="3732213" algn="l"/>
+              </a:tabLst>
+              <a:defRPr>
+                <a:solidFill>
+                  <a:schemeClr val="tx1"/>
+                </a:solidFill>
+                <a:latin typeface="Arial" charset="0"/>
+                <a:ea typeface="Lucida Sans Unicode" pitchFamily="34" charset="0"/>
+                <a:cs typeface="Lucida Sans Unicode" pitchFamily="34" charset="0"/>
+              </a:defRPr>
+            </a:lvl4pPr>
+            <a:lvl5pPr marL="2057400" indent="-228600" defTabSz="463550" eaLnBrk="0" hangingPunct="0">
+              <a:tabLst>
+                <a:tab pos="746125" algn="l"/>
+                <a:tab pos="1492250" algn="l"/>
+                <a:tab pos="2238375" algn="l"/>
+                <a:tab pos="2986088" algn="l"/>
+                <a:tab pos="3732213" algn="l"/>
+              </a:tabLst>
+              <a:defRPr>
+                <a:solidFill>
+                  <a:schemeClr val="tx1"/>
+                </a:solidFill>
+                <a:latin typeface="Arial" charset="0"/>
+                <a:ea typeface="Lucida Sans Unicode" pitchFamily="34" charset="0"/>
+                <a:cs typeface="Lucida Sans Unicode" pitchFamily="34" charset="0"/>
+              </a:defRPr>
+            </a:lvl5pPr>
+            <a:lvl6pPr marL="2514600" indent="-228600" algn="ctr" defTabSz="463550" eaLnBrk="0" fontAlgn="base" hangingPunct="0">
+              <a:lnSpc>
+                <a:spcPct val="93000"/>
+              </a:lnSpc>
+              <a:spcBef>
+                <a:spcPct val="0"/>
+              </a:spcBef>
+              <a:spcAft>
+                <a:spcPct val="0"/>
+              </a:spcAft>
+              <a:buClr>
+                <a:srgbClr val="000000"/>
+              </a:buClr>
+              <a:buSzPct val="100000"/>
+              <a:buFont typeface="Arial" charset="0"/>
+              <a:tabLst>
+                <a:tab pos="746125" algn="l"/>
+                <a:tab pos="1492250" algn="l"/>
+                <a:tab pos="2238375" algn="l"/>
+                <a:tab pos="2986088" algn="l"/>
+                <a:tab pos="3732213" algn="l"/>
+              </a:tabLst>
+              <a:defRPr>
+                <a:solidFill>
+                  <a:schemeClr val="tx1"/>
+                </a:solidFill>
+                <a:latin typeface="Arial" charset="0"/>
+                <a:ea typeface="Lucida Sans Unicode" pitchFamily="34" charset="0"/>
+                <a:cs typeface="Lucida Sans Unicode" pitchFamily="34" charset="0"/>
+              </a:defRPr>
+            </a:lvl6pPr>
+            <a:lvl7pPr marL="2971800" indent="-228600" algn="ctr" defTabSz="463550" eaLnBrk="0" fontAlgn="base" hangingPunct="0">
+              <a:lnSpc>
+                <a:spcPct val="93000"/>
+              </a:lnSpc>
+              <a:spcBef>
+                <a:spcPct val="0"/>
+              </a:spcBef>
+              <a:spcAft>
+                <a:spcPct val="0"/>
+              </a:spcAft>
+              <a:buClr>
+                <a:srgbClr val="000000"/>
+              </a:buClr>
+              <a:buSzPct val="100000"/>
+              <a:buFont typeface="Arial" charset="0"/>
+              <a:tabLst>
+                <a:tab pos="746125" algn="l"/>
+                <a:tab pos="1492250" algn="l"/>
+                <a:tab pos="2238375" algn="l"/>
+                <a:tab pos="2986088" algn="l"/>
+                <a:tab pos="3732213" algn="l"/>
+              </a:tabLst>
+              <a:defRPr>
+                <a:solidFill>
+                  <a:schemeClr val="tx1"/>
+                </a:solidFill>
+                <a:latin typeface="Arial" charset="0"/>
+                <a:ea typeface="Lucida Sans Unicode" pitchFamily="34" charset="0"/>
+                <a:cs typeface="Lucida Sans Unicode" pitchFamily="34" charset="0"/>
+              </a:defRPr>
+            </a:lvl7pPr>
+            <a:lvl8pPr marL="3429000" indent="-228600" algn="ctr" defTabSz="463550" eaLnBrk="0" fontAlgn="base" hangingPunct="0">
+              <a:lnSpc>
+                <a:spcPct val="93000"/>
+              </a:lnSpc>
+              <a:spcBef>
+                <a:spcPct val="0"/>
+              </a:spcBef>
+              <a:spcAft>
+                <a:spcPct val="0"/>
+              </a:spcAft>
+              <a:buClr>
+                <a:srgbClr val="000000"/>
+              </a:buClr>
+              <a:buSzPct val="100000"/>
+              <a:buFont typeface="Arial" charset="0"/>
+              <a:tabLst>
+                <a:tab pos="746125" algn="l"/>
+                <a:tab pos="1492250" algn="l"/>
+                <a:tab pos="2238375" algn="l"/>
+                <a:tab pos="2986088" algn="l"/>
+                <a:tab pos="3732213" algn="l"/>
+              </a:tabLst>
+              <a:defRPr>
+                <a:solidFill>
+                  <a:schemeClr val="tx1"/>
+                </a:solidFill>
+                <a:latin typeface="Arial" charset="0"/>
+                <a:ea typeface="Lucida Sans Unicode" pitchFamily="34" charset="0"/>
+                <a:cs typeface="Lucida Sans Unicode" pitchFamily="34" charset="0"/>
+              </a:defRPr>
+            </a:lvl8pPr>
+            <a:lvl9pPr marL="3886200" indent="-228600" algn="ctr" defTabSz="463550" eaLnBrk="0" fontAlgn="base" hangingPunct="0">
+              <a:lnSpc>
+                <a:spcPct val="93000"/>
+              </a:lnSpc>
+              <a:spcBef>
+                <a:spcPct val="0"/>
+              </a:spcBef>
+              <a:spcAft>
+                <a:spcPct val="0"/>
+              </a:spcAft>
+              <a:buClr>
+                <a:srgbClr val="000000"/>
+              </a:buClr>
+              <a:buSzPct val="100000"/>
+              <a:buFont typeface="Arial" charset="0"/>
+              <a:tabLst>
+                <a:tab pos="746125" algn="l"/>
+                <a:tab pos="1492250" algn="l"/>
+                <a:tab pos="2238375" algn="l"/>
+                <a:tab pos="2986088" algn="l"/>
+                <a:tab pos="3732213" algn="l"/>
+              </a:tabLst>
+              <a:defRPr>
+                <a:solidFill>
+                  <a:schemeClr val="tx1"/>
+                </a:solidFill>
+                <a:latin typeface="Arial" charset="0"/>
+                <a:ea typeface="Lucida Sans Unicode" pitchFamily="34" charset="0"/>
+                <a:cs typeface="Lucida Sans Unicode" pitchFamily="34" charset="0"/>
+              </a:defRPr>
+            </a:lvl9pPr>
+          </a:lstStyle>
+          <a:p>
+            <a:pPr eaLnBrk="1" hangingPunct="1"/>
+            <a:r>
+              <a:rPr lang="en-US" altLang="de-DE" smtClean="0">
+                <a:solidFill>
+                  <a:srgbClr val="000000"/>
+                </a:solidFill>
+                <a:latin typeface="Stafford" pitchFamily="2" charset="0"/>
+              </a:rPr>
+              <a:t>|  </a:t>
+            </a:r>
+          </a:p>
+        </p:txBody>
+      </p:sp>
+      <p:sp>
+        <p:nvSpPr>
+          <p:cNvPr id="53254" name="Foliennummernplatzhalter 5"/>
+          <p:cNvSpPr>
+            <a:spLocks noGrp="1"/>
+          </p:cNvSpPr>
+          <p:nvPr>
+            <p:ph type="sldNum" sz="quarter"/>
+          </p:nvPr>
+        </p:nvSpPr>
+        <p:spPr>
+          <a:noFill/>
+          <a:extLst>
+            <a:ext uri="{909E8E84-426E-40DD-AFC4-6F175D3DCCD1}">
+              <a14:hiddenFill xmlns:a14="http://schemas.microsoft.com/office/drawing/2010/main">
+                <a:solidFill>
+                  <a:srgbClr val="FFFFFF"/>
+                </a:solidFill>
+              </a14:hiddenFill>
+            </a:ext>
+            <a:ext uri="{91240B29-F687-4F45-9708-019B960494DF}">
+              <a14:hiddenLine xmlns:a14="http://schemas.microsoft.com/office/drawing/2010/main" w="9525">
+                <a:solidFill>
+                  <a:srgbClr val="000000"/>
+                </a:solidFill>
+                <a:miter lim="800000"/>
+                <a:headEnd/>
+                <a:tailEnd/>
+              </a14:hiddenLine>
+            </a:ext>
+          </a:extLst>
+        </p:spPr>
+        <p:txBody>
+          <a:bodyPr/>
+          <a:lstStyle>
+            <a:lvl1pPr defTabSz="463550" eaLnBrk="0" hangingPunct="0">
+              <a:tabLst>
+                <a:tab pos="746125" algn="l"/>
+              </a:tabLst>
+              <a:defRPr>
+                <a:solidFill>
+                  <a:schemeClr val="tx1"/>
+                </a:solidFill>
+                <a:latin typeface="Arial" charset="0"/>
+                <a:ea typeface="Lucida Sans Unicode" pitchFamily="34" charset="0"/>
+                <a:cs typeface="Lucida Sans Unicode" pitchFamily="34" charset="0"/>
+              </a:defRPr>
+            </a:lvl1pPr>
+            <a:lvl2pPr marL="742950" indent="-285750" defTabSz="463550" eaLnBrk="0" hangingPunct="0">
+              <a:tabLst>
+                <a:tab pos="746125" algn="l"/>
+              </a:tabLst>
+              <a:defRPr>
+                <a:solidFill>
+                  <a:schemeClr val="tx1"/>
+                </a:solidFill>
+                <a:latin typeface="Arial" charset="0"/>
+                <a:ea typeface="Lucida Sans Unicode" pitchFamily="34" charset="0"/>
+                <a:cs typeface="Lucida Sans Unicode" pitchFamily="34" charset="0"/>
+              </a:defRPr>
+            </a:lvl2pPr>
+            <a:lvl3pPr marL="1143000" indent="-228600" defTabSz="463550" eaLnBrk="0" hangingPunct="0">
+              <a:tabLst>
+                <a:tab pos="746125" algn="l"/>
+              </a:tabLst>
+              <a:defRPr>
+                <a:solidFill>
+                  <a:schemeClr val="tx1"/>
+                </a:solidFill>
+                <a:latin typeface="Arial" charset="0"/>
+                <a:ea typeface="Lucida Sans Unicode" pitchFamily="34" charset="0"/>
+                <a:cs typeface="Lucida Sans Unicode" pitchFamily="34" charset="0"/>
+              </a:defRPr>
+            </a:lvl3pPr>
+            <a:lvl4pPr marL="1600200" indent="-228600" defTabSz="463550" eaLnBrk="0" hangingPunct="0">
+              <a:tabLst>
+                <a:tab pos="746125" algn="l"/>
+              </a:tabLst>
+              <a:defRPr>
+                <a:solidFill>
+                  <a:schemeClr val="tx1"/>
+                </a:solidFill>
+                <a:latin typeface="Arial" charset="0"/>
+                <a:ea typeface="Lucida Sans Unicode" pitchFamily="34" charset="0"/>
+                <a:cs typeface="Lucida Sans Unicode" pitchFamily="34" charset="0"/>
+              </a:defRPr>
+            </a:lvl4pPr>
+            <a:lvl5pPr marL="2057400" indent="-228600" defTabSz="463550" eaLnBrk="0" hangingPunct="0">
+              <a:tabLst>
+                <a:tab pos="746125" algn="l"/>
+              </a:tabLst>
+              <a:defRPr>
+                <a:solidFill>
+                  <a:schemeClr val="tx1"/>
+                </a:solidFill>
+                <a:latin typeface="Arial" charset="0"/>
+                <a:ea typeface="Lucida Sans Unicode" pitchFamily="34" charset="0"/>
+                <a:cs typeface="Lucida Sans Unicode" pitchFamily="34" charset="0"/>
+              </a:defRPr>
+            </a:lvl5pPr>
+            <a:lvl6pPr marL="2514600" indent="-228600" algn="ctr" defTabSz="463550" eaLnBrk="0" fontAlgn="base" hangingPunct="0">
+              <a:lnSpc>
+                <a:spcPct val="93000"/>
+              </a:lnSpc>
+              <a:spcBef>
+                <a:spcPct val="0"/>
+              </a:spcBef>
+              <a:spcAft>
+                <a:spcPct val="0"/>
+              </a:spcAft>
+              <a:buClr>
+                <a:srgbClr val="000000"/>
+              </a:buClr>
+              <a:buSzPct val="100000"/>
+              <a:buFont typeface="Arial" charset="0"/>
+              <a:tabLst>
+                <a:tab pos="746125" algn="l"/>
+              </a:tabLst>
+              <a:defRPr>
+                <a:solidFill>
+                  <a:schemeClr val="tx1"/>
+                </a:solidFill>
+                <a:latin typeface="Arial" charset="0"/>
+                <a:ea typeface="Lucida Sans Unicode" pitchFamily="34" charset="0"/>
+                <a:cs typeface="Lucida Sans Unicode" pitchFamily="34" charset="0"/>
+              </a:defRPr>
+            </a:lvl6pPr>
+            <a:lvl7pPr marL="2971800" indent="-228600" algn="ctr" defTabSz="463550" eaLnBrk="0" fontAlgn="base" hangingPunct="0">
+              <a:lnSpc>
+                <a:spcPct val="93000"/>
+              </a:lnSpc>
+              <a:spcBef>
+                <a:spcPct val="0"/>
+              </a:spcBef>
+              <a:spcAft>
+                <a:spcPct val="0"/>
+              </a:spcAft>
+              <a:buClr>
+                <a:srgbClr val="000000"/>
+              </a:buClr>
+              <a:buSzPct val="100000"/>
+              <a:buFont typeface="Arial" charset="0"/>
+              <a:tabLst>
+                <a:tab pos="746125" algn="l"/>
+              </a:tabLst>
+              <a:defRPr>
+                <a:solidFill>
+                  <a:schemeClr val="tx1"/>
+                </a:solidFill>
+                <a:latin typeface="Arial" charset="0"/>
+                <a:ea typeface="Lucida Sans Unicode" pitchFamily="34" charset="0"/>
+                <a:cs typeface="Lucida Sans Unicode" pitchFamily="34" charset="0"/>
+              </a:defRPr>
+            </a:lvl7pPr>
+            <a:lvl8pPr marL="3429000" indent="-228600" algn="ctr" defTabSz="463550" eaLnBrk="0" fontAlgn="base" hangingPunct="0">
+              <a:lnSpc>
+                <a:spcPct val="93000"/>
+              </a:lnSpc>
+              <a:spcBef>
+                <a:spcPct val="0"/>
+              </a:spcBef>
+              <a:spcAft>
+                <a:spcPct val="0"/>
+              </a:spcAft>
+              <a:buClr>
+                <a:srgbClr val="000000"/>
+              </a:buClr>
+              <a:buSzPct val="100000"/>
+              <a:buFont typeface="Arial" charset="0"/>
+              <a:tabLst>
+                <a:tab pos="746125" algn="l"/>
+              </a:tabLst>
+              <a:defRPr>
+                <a:solidFill>
+                  <a:schemeClr val="tx1"/>
+                </a:solidFill>
+                <a:latin typeface="Arial" charset="0"/>
+                <a:ea typeface="Lucida Sans Unicode" pitchFamily="34" charset="0"/>
+                <a:cs typeface="Lucida Sans Unicode" pitchFamily="34" charset="0"/>
+              </a:defRPr>
+            </a:lvl8pPr>
+            <a:lvl9pPr marL="3886200" indent="-228600" algn="ctr" defTabSz="463550" eaLnBrk="0" fontAlgn="base" hangingPunct="0">
+              <a:lnSpc>
+                <a:spcPct val="93000"/>
+              </a:lnSpc>
+              <a:spcBef>
+                <a:spcPct val="0"/>
+              </a:spcBef>
+              <a:spcAft>
+                <a:spcPct val="0"/>
+              </a:spcAft>
+              <a:buClr>
+                <a:srgbClr val="000000"/>
+              </a:buClr>
+              <a:buSzPct val="100000"/>
+              <a:buFont typeface="Arial" charset="0"/>
+              <a:tabLst>
+                <a:tab pos="746125" algn="l"/>
+              </a:tabLst>
+              <a:defRPr>
+                <a:solidFill>
+                  <a:schemeClr val="tx1"/>
+                </a:solidFill>
+                <a:latin typeface="Arial" charset="0"/>
+                <a:ea typeface="Lucida Sans Unicode" pitchFamily="34" charset="0"/>
+                <a:cs typeface="Lucida Sans Unicode" pitchFamily="34" charset="0"/>
+              </a:defRPr>
+            </a:lvl9pPr>
+          </a:lstStyle>
+          <a:p>
+            <a:pPr eaLnBrk="1" hangingPunct="1"/>
+            <a:r>
+              <a:rPr lang="en-US" altLang="de-DE" smtClean="0">
+                <a:solidFill>
+                  <a:srgbClr val="000000"/>
+                </a:solidFill>
+                <a:latin typeface="Stafford" pitchFamily="2" charset="0"/>
+              </a:rPr>
+              <a:t>|  </a:t>
+            </a:r>
+            <a:fld id="{6775A062-1A8A-4084-8B81-E33BA407A859}" type="slidenum">
+              <a:rPr lang="en-US" altLang="de-DE" smtClean="0">
+                <a:solidFill>
+                  <a:srgbClr val="000000"/>
+                </a:solidFill>
+                <a:latin typeface="Stafford" pitchFamily="2" charset="0"/>
+              </a:rPr>
+              <a:pPr eaLnBrk="1" hangingPunct="1"/>
+              <a:t>18</a:t>
+            </a:fld>
+            <a:endParaRPr lang="en-US" altLang="de-DE" smtClean="0">
+              <a:solidFill>
+                <a:srgbClr val="000000"/>
+              </a:solidFill>
+              <a:latin typeface="Stafford" pitchFamily="2" charset="0"/>
+            </a:endParaRPr>
+          </a:p>
+        </p:txBody>
+      </p:sp>
+    </p:spTree>
+    <p:extLst>
+      <p:ext uri="{BB962C8B-B14F-4D97-AF65-F5344CB8AC3E}">
+        <p14:creationId xmlns:p14="http://schemas.microsoft.com/office/powerpoint/2010/main" val="1755253459"/>
+      </p:ext>
+    </p:extLst>
+  </p:cSld>
+  <p:clrMapOvr>
+    <a:masterClrMapping/>
+  </p:clrMapOvr>
+</p:notes>
+</file>
+
+<file path=ppt/notesSlides/notesSlide6.xml><?xml version="1.0" encoding="utf-8"?>
+<p:notes xmlns:a="http://schemas.openxmlformats.org/drawingml/2006/main" xmlns:r="http://schemas.openxmlformats.org/officeDocument/2006/relationships" xmlns:p="http://schemas.openxmlformats.org/presentationml/2006/main">
+  <p:cSld>
+    <p:spTree>
+      <p:nvGrpSpPr>
+        <p:cNvPr id="1" name=""/>
+        <p:cNvGrpSpPr/>
+        <p:nvPr/>
+      </p:nvGrpSpPr>
+      <p:grpSpPr>
+        <a:xfrm>
+          <a:off x="0" y="0"/>
+          <a:ext cx="0" cy="0"/>
+          <a:chOff x="0" y="0"/>
+          <a:chExt cx="0" cy="0"/>
+        </a:xfrm>
+      </p:grpSpPr>
+      <p:sp>
+        <p:nvSpPr>
+          <p:cNvPr id="2" name="Folienbildplatzhalter 1"/>
+          <p:cNvSpPr>
+            <a:spLocks noGrp="1" noRot="1" noChangeAspect="1"/>
+          </p:cNvSpPr>
+          <p:nvPr>
+            <p:ph type="sldImg"/>
+          </p:nvPr>
+        </p:nvSpPr>
+        <p:spPr/>
+      </p:sp>
+      <p:sp>
+        <p:nvSpPr>
+          <p:cNvPr id="3" name="Notizenplatzhalter 2"/>
+          <p:cNvSpPr>
+            <a:spLocks noGrp="1"/>
+          </p:cNvSpPr>
+          <p:nvPr>
+            <p:ph type="body" idx="1"/>
+          </p:nvPr>
+        </p:nvSpPr>
+        <p:spPr/>
+        <p:txBody>
+          <a:bodyPr/>
+          <a:lstStyle/>
+          <a:p>
+            <a:endParaRPr lang="en-US"/>
+          </a:p>
+        </p:txBody>
+      </p:sp>
+      <p:sp>
+        <p:nvSpPr>
+          <p:cNvPr id="4" name="Datumsplatzhalter 3"/>
+          <p:cNvSpPr>
+            <a:spLocks noGrp="1"/>
+          </p:cNvSpPr>
+          <p:nvPr>
+            <p:ph type="dt" idx="10"/>
+          </p:nvPr>
+        </p:nvSpPr>
+        <p:spPr/>
+        <p:txBody>
+          <a:bodyPr/>
+          <a:lstStyle/>
+          <a:p>
+            <a:pPr>
+              <a:defRPr/>
+            </a:pPr>
+            <a:r>
+              <a:rPr lang="en-US" smtClean="0"/>
+              <a:t>November 19, 2007</a:t>
+            </a:r>
+            <a:endParaRPr lang="en-US"/>
+          </a:p>
+        </p:txBody>
+      </p:sp>
+      <p:sp>
+        <p:nvSpPr>
+          <p:cNvPr id="5" name="Fußzeilenplatzhalter 4"/>
+          <p:cNvSpPr>
+            <a:spLocks noGrp="1"/>
+          </p:cNvSpPr>
+          <p:nvPr>
+            <p:ph type="ftr" idx="11"/>
+          </p:nvPr>
+        </p:nvSpPr>
+        <p:spPr/>
+        <p:txBody>
+          <a:bodyPr/>
+          <a:lstStyle/>
+          <a:p>
+            <a:pPr>
+              <a:defRPr/>
+            </a:pPr>
+            <a:r>
+              <a:rPr lang="en-US" smtClean="0"/>
+              <a:t>|  </a:t>
+            </a:r>
+            <a:endParaRPr lang="en-US"/>
+          </a:p>
+        </p:txBody>
+      </p:sp>
+      <p:sp>
+        <p:nvSpPr>
+          <p:cNvPr id="6" name="Foliennummernplatzhalter 5"/>
+          <p:cNvSpPr>
+            <a:spLocks noGrp="1"/>
+          </p:cNvSpPr>
+          <p:nvPr>
+            <p:ph type="sldNum" idx="12"/>
+          </p:nvPr>
+        </p:nvSpPr>
+        <p:spPr/>
+        <p:txBody>
+          <a:bodyPr/>
+          <a:lstStyle/>
+          <a:p>
+            <a:pPr>
+              <a:defRPr/>
+            </a:pPr>
+            <a:r>
+              <a:rPr lang="en-US" smtClean="0"/>
+              <a:t>|  </a:t>
+            </a:r>
+            <a:fld id="{1AC4CB2F-BC5A-454C-A55C-75DB3FC15FD2}" type="slidenum">
+              <a:rPr lang="en-US" smtClean="0"/>
+              <a:pPr>
+                <a:defRPr/>
+              </a:pPr>
+              <a:t>19</a:t>
+            </a:fld>
+            <a:endParaRPr lang="en-US"/>
+          </a:p>
+        </p:txBody>
+      </p:sp>
+    </p:spTree>
+    <p:extLst>
+      <p:ext uri="{BB962C8B-B14F-4D97-AF65-F5344CB8AC3E}">
+        <p14:creationId xmlns:p14="http://schemas.microsoft.com/office/powerpoint/2010/main" val="1492250181"/>
       </p:ext>
     </p:extLst>
   </p:cSld>
@@ -8407,7 +9523,7 @@
           <a:graphicData uri="http://schemas.openxmlformats.org/presentationml/2006/ole">
             <mc:AlternateContent xmlns:mc="http://schemas.openxmlformats.org/markup-compatibility/2006">
               <mc:Choice xmlns:v="urn:schemas-microsoft-com:vml" Requires="v">
-                <p:oleObj spid="_x0000_s2009" r:id="rId16" imgW="1038370" imgH="980952" progId="">
+                <p:oleObj spid="_x0000_s2011" r:id="rId16" imgW="1038370" imgH="980952" progId="">
                   <p:embed/>
                 </p:oleObj>
               </mc:Choice>
@@ -8845,7 +9961,7 @@
                 </a:lnSpc>
                 <a:defRPr/>
               </a:pPr>
-              <a:t>15.09.2017</a:t>
+              <a:t>18.09.2017</a:t>
             </a:fld>
             <a:r>
               <a:rPr lang="en-GB" altLang="de-DE" sz="1000" smtClean="0">
@@ -11545,15 +12661,7 @@
           <a:p>
             <a:r>
               <a:rPr lang="en-US" smtClean="0"/>
-              <a:t>Tag </a:t>
-            </a:r>
-            <a:r>
-              <a:rPr lang="en-US" smtClean="0"/>
-              <a:t>2-Nachmittag</a:t>
-            </a:r>
-            <a:r>
-              <a:rPr lang="en-US" smtClean="0"/>
-              <a:t>: Deklaration bei Klassen</a:t>
+              <a:t>Tag 2-Nachmittag: Deklaration bei Klassen</a:t>
             </a:r>
             <a:endParaRPr lang="en-US"/>
           </a:p>
@@ -11688,14 +12796,7 @@
                 <a:latin typeface="Consolas" panose="020B0609020204030204" pitchFamily="49" charset="0"/>
                 <a:cs typeface="Consolas" panose="020B0609020204030204" pitchFamily="49" charset="0"/>
               </a:rPr>
-              <a:t>int </a:t>
-            </a:r>
-            <a:r>
-              <a:rPr lang="en-US">
-                <a:latin typeface="Consolas" panose="020B0609020204030204" pitchFamily="49" charset="0"/>
-                <a:cs typeface="Consolas" panose="020B0609020204030204" pitchFamily="49" charset="0"/>
-              </a:rPr>
-              <a:t>main</a:t>
+              <a:t>int main</a:t>
             </a:r>
             <a:r>
               <a:rPr lang="en-US" smtClean="0">
@@ -11829,13 +12930,7 @@
               <a:rPr lang="en-US">
                 <a:hlinkClick r:id="rId2"/>
               </a:rPr>
-              <a:t>http</a:t>
-            </a:r>
-            <a:r>
-              <a:rPr lang="en-US">
-                <a:hlinkClick r:id="rId2"/>
-              </a:rPr>
-              <a:t>://</a:t>
+              <a:t>http://</a:t>
             </a:r>
             <a:r>
               <a:rPr lang="en-US" smtClean="0">
@@ -11905,11 +13000,7 @@
           <a:p>
             <a:r>
               <a:rPr lang="en-US"/>
-              <a:t>Tag 2-Nachmittag</a:t>
-            </a:r>
-            <a:r>
-              <a:rPr lang="en-US"/>
-              <a:t>: </a:t>
+              <a:t>Tag 2-Nachmittag: </a:t>
             </a:r>
             <a:r>
               <a:rPr lang="en-US" smtClean="0"/>
@@ -12185,13 +13276,7 @@
               <a:rPr lang="en-US">
                 <a:hlinkClick r:id="rId2"/>
               </a:rPr>
-              <a:t>http</a:t>
-            </a:r>
-            <a:r>
-              <a:rPr lang="en-US">
-                <a:hlinkClick r:id="rId2"/>
-              </a:rPr>
-              <a:t>://</a:t>
+              <a:t>http://</a:t>
             </a:r>
             <a:r>
               <a:rPr lang="en-US" smtClean="0">
@@ -12217,10 +13302,640 @@
   <p:clrMapOvr>
     <a:masterClrMapping/>
   </p:clrMapOvr>
+  <p:timing>
+    <p:tnLst>
+      <p:par>
+        <p:cTn id="1" dur="indefinite" restart="never" nodeType="tmRoot"/>
+      </p:par>
+    </p:tnLst>
+  </p:timing>
 </p:sld>
 </file>
 
 <file path=ppt/slides/slide18.xml><?xml version="1.0" encoding="utf-8"?>
+<p:sld xmlns:a="http://schemas.openxmlformats.org/drawingml/2006/main" xmlns:r="http://schemas.openxmlformats.org/officeDocument/2006/relationships" xmlns:p="http://schemas.openxmlformats.org/presentationml/2006/main">
+  <p:cSld>
+    <p:spTree>
+      <p:nvGrpSpPr>
+        <p:cNvPr id="1" name=""/>
+        <p:cNvGrpSpPr/>
+        <p:nvPr/>
+      </p:nvGrpSpPr>
+      <p:grpSpPr>
+        <a:xfrm>
+          <a:off x="0" y="0"/>
+          <a:ext cx="0" cy="0"/>
+          <a:chOff x="0" y="0"/>
+          <a:chExt cx="0" cy="0"/>
+        </a:xfrm>
+      </p:grpSpPr>
+      <p:sp>
+        <p:nvSpPr>
+          <p:cNvPr id="15362" name="Titel 1"/>
+          <p:cNvSpPr>
+            <a:spLocks noGrp="1"/>
+          </p:cNvSpPr>
+          <p:nvPr>
+            <p:ph type="title"/>
+          </p:nvPr>
+        </p:nvSpPr>
+        <p:spPr/>
+        <p:txBody>
+          <a:bodyPr/>
+          <a:lstStyle/>
+          <a:p>
+            <a:r>
+              <a:rPr lang="en-US"/>
+              <a:t>Tag 3: Rückschau und Warm Up </a:t>
+            </a:r>
+            <a:r>
+              <a:rPr lang="en-US" smtClean="0"/>
+              <a:t>(I)</a:t>
+            </a:r>
+            <a:endParaRPr lang="de-DE" altLang="de-DE" dirty="0" smtClean="0">
+              <a:latin typeface="Consolas" panose="020B0609020204030204" pitchFamily="49" charset="0"/>
+              <a:cs typeface="Consolas" panose="020B0609020204030204" pitchFamily="49" charset="0"/>
+            </a:endParaRPr>
+          </a:p>
+        </p:txBody>
+      </p:sp>
+      <p:sp>
+        <p:nvSpPr>
+          <p:cNvPr id="2" name="Inhaltsplatzhalter 1"/>
+          <p:cNvSpPr>
+            <a:spLocks noGrp="1"/>
+          </p:cNvSpPr>
+          <p:nvPr>
+            <p:ph idx="1"/>
+          </p:nvPr>
+        </p:nvSpPr>
+        <p:spPr/>
+        <p:txBody>
+          <a:bodyPr/>
+          <a:lstStyle/>
+          <a:p>
+            <a:pPr eaLnBrk="1" hangingPunct="1">
+              <a:spcBef>
+                <a:spcPct val="0"/>
+              </a:spcBef>
+            </a:pPr>
+            <a:r>
+              <a:rPr lang="de-DE" altLang="de-DE" smtClean="0"/>
+              <a:t>Was ist eigentlich der Typ von "*iP" im Folgenden?</a:t>
+            </a:r>
+            <a:br>
+              <a:rPr lang="de-DE" altLang="de-DE" smtClean="0"/>
+            </a:br>
+            <a:r>
+              <a:rPr lang="de-DE" altLang="de-DE" smtClean="0"/>
+              <a:t/>
+            </a:r>
+            <a:br>
+              <a:rPr lang="de-DE" altLang="de-DE" smtClean="0"/>
+            </a:br>
+            <a:r>
+              <a:rPr lang="de-DE" altLang="de-DE" smtClean="0">
+                <a:latin typeface="Consolas" panose="020B0609020204030204" pitchFamily="49" charset="0"/>
+                <a:cs typeface="Consolas" panose="020B0609020204030204" pitchFamily="49" charset="0"/>
+              </a:rPr>
+              <a:t>int i = 3;</a:t>
+            </a:r>
+          </a:p>
+          <a:p>
+            <a:pPr eaLnBrk="1" hangingPunct="1">
+              <a:spcBef>
+                <a:spcPct val="0"/>
+              </a:spcBef>
+            </a:pPr>
+            <a:r>
+              <a:rPr lang="de-DE" altLang="de-DE" smtClean="0">
+                <a:latin typeface="Consolas" panose="020B0609020204030204" pitchFamily="49" charset="0"/>
+                <a:cs typeface="Consolas" panose="020B0609020204030204" pitchFamily="49" charset="0"/>
+              </a:rPr>
+              <a:t>int *iP = &amp;i;</a:t>
+            </a:r>
+          </a:p>
+          <a:p>
+            <a:pPr eaLnBrk="1" hangingPunct="1">
+              <a:spcBef>
+                <a:spcPct val="0"/>
+              </a:spcBef>
+            </a:pPr>
+            <a:r>
+              <a:rPr lang="de-DE" altLang="de-DE" smtClean="0">
+                <a:latin typeface="Consolas" panose="020B0609020204030204" pitchFamily="49" charset="0"/>
+                <a:cs typeface="Consolas" panose="020B0609020204030204" pitchFamily="49" charset="0"/>
+              </a:rPr>
+              <a:t>*iP; // &lt;- Type?</a:t>
+            </a:r>
+          </a:p>
+          <a:p>
+            <a:pPr eaLnBrk="1" hangingPunct="1">
+              <a:spcBef>
+                <a:spcPct val="0"/>
+              </a:spcBef>
+            </a:pPr>
+            <a:r>
+              <a:rPr lang="de-DE" altLang="de-DE" smtClean="0">
+                <a:latin typeface="Consolas" panose="020B0609020204030204" pitchFamily="49" charset="0"/>
+                <a:cs typeface="Consolas" panose="020B0609020204030204" pitchFamily="49" charset="0"/>
+              </a:rPr>
+              <a:t>//Reference</a:t>
+            </a:r>
+            <a:r>
+              <a:rPr lang="de-DE" altLang="de-DE">
+                <a:latin typeface="Consolas" panose="020B0609020204030204" pitchFamily="49" charset="0"/>
+                <a:cs typeface="Consolas" panose="020B0609020204030204" pitchFamily="49" charset="0"/>
+              </a:rPr>
+              <a:t>, otherwise assignment not possible</a:t>
+            </a:r>
+            <a:br>
+              <a:rPr lang="de-DE" altLang="de-DE">
+                <a:latin typeface="Consolas" panose="020B0609020204030204" pitchFamily="49" charset="0"/>
+                <a:cs typeface="Consolas" panose="020B0609020204030204" pitchFamily="49" charset="0"/>
+              </a:rPr>
+            </a:br>
+            <a:r>
+              <a:rPr lang="de-DE" altLang="de-DE">
+                <a:latin typeface="Consolas" panose="020B0609020204030204" pitchFamily="49" charset="0"/>
+                <a:cs typeface="Consolas" panose="020B0609020204030204" pitchFamily="49" charset="0"/>
+              </a:rPr>
+              <a:t>int </a:t>
+            </a:r>
+            <a:r>
+              <a:rPr lang="de-DE" altLang="de-DE" smtClean="0">
+                <a:latin typeface="Consolas" panose="020B0609020204030204" pitchFamily="49" charset="0"/>
+                <a:cs typeface="Consolas" panose="020B0609020204030204" pitchFamily="49" charset="0"/>
+              </a:rPr>
+              <a:t>&amp;iR = *iP</a:t>
+            </a:r>
+            <a:r>
+              <a:rPr lang="de-DE" altLang="de-DE" smtClean="0">
+                <a:latin typeface="Consolas" panose="020B0609020204030204" pitchFamily="49" charset="0"/>
+                <a:cs typeface="Consolas" panose="020B0609020204030204" pitchFamily="49" charset="0"/>
+              </a:rPr>
+              <a:t>;</a:t>
+            </a:r>
+            <a:endParaRPr lang="de-DE" altLang="de-DE" smtClean="0">
+              <a:latin typeface="Consolas" panose="020B0609020204030204" pitchFamily="49" charset="0"/>
+              <a:cs typeface="Consolas" panose="020B0609020204030204" pitchFamily="49" charset="0"/>
+            </a:endParaRPr>
+          </a:p>
+          <a:p>
+            <a:pPr eaLnBrk="1" hangingPunct="1">
+              <a:spcBef>
+                <a:spcPct val="0"/>
+              </a:spcBef>
+            </a:pPr>
+            <a:r>
+              <a:rPr lang="de-DE" altLang="de-DE" smtClean="0">
+                <a:latin typeface="Consolas" panose="020B0609020204030204" pitchFamily="49" charset="0"/>
+                <a:cs typeface="Consolas" panose="020B0609020204030204" pitchFamily="49" charset="0"/>
+              </a:rPr>
+              <a:t>int i = *iP;</a:t>
+            </a:r>
+          </a:p>
+          <a:p>
+            <a:pPr eaLnBrk="1" hangingPunct="1">
+              <a:spcBef>
+                <a:spcPct val="0"/>
+              </a:spcBef>
+            </a:pPr>
+            <a:endParaRPr lang="de-DE" altLang="de-DE"/>
+          </a:p>
+          <a:p>
+            <a:pPr eaLnBrk="1" hangingPunct="1">
+              <a:spcBef>
+                <a:spcPct val="0"/>
+              </a:spcBef>
+            </a:pPr>
+            <a:r>
+              <a:rPr lang="de-DE" altLang="de-DE" smtClean="0"/>
+              <a:t>Welche </a:t>
+            </a:r>
+            <a:r>
+              <a:rPr lang="de-DE" altLang="de-DE" b="1"/>
+              <a:t>Bedeutung</a:t>
+            </a:r>
+            <a:r>
+              <a:rPr lang="de-DE" altLang="de-DE"/>
+              <a:t> kann der Asterisk (</a:t>
+            </a:r>
+            <a:r>
+              <a:rPr lang="de-DE" altLang="de-DE">
+                <a:latin typeface="Courier New" panose="02070309020205020404" pitchFamily="49" charset="0"/>
+                <a:cs typeface="Courier New" panose="02070309020205020404" pitchFamily="49" charset="0"/>
+              </a:rPr>
+              <a:t>*</a:t>
+            </a:r>
+            <a:r>
+              <a:rPr lang="de-DE" altLang="de-DE"/>
+              <a:t>) im Code annehmen?</a:t>
+            </a:r>
+          </a:p>
+          <a:p>
+            <a:pPr eaLnBrk="1" hangingPunct="1">
+              <a:spcBef>
+                <a:spcPct val="0"/>
+              </a:spcBef>
+            </a:pPr>
+            <a:endParaRPr lang="de-DE" altLang="de-DE"/>
+          </a:p>
+          <a:p>
+            <a:pPr eaLnBrk="1" hangingPunct="1">
+              <a:spcBef>
+                <a:spcPct val="0"/>
+              </a:spcBef>
+            </a:pPr>
+            <a:endParaRPr lang="de-DE" altLang="de-DE"/>
+          </a:p>
+          <a:p>
+            <a:pPr eaLnBrk="1" hangingPunct="1">
+              <a:spcBef>
+                <a:spcPct val="0"/>
+              </a:spcBef>
+            </a:pPr>
+            <a:r>
+              <a:rPr lang="de-DE" altLang="de-DE"/>
+              <a:t>Welche </a:t>
+            </a:r>
+            <a:r>
+              <a:rPr lang="de-DE" altLang="de-DE" b="1"/>
+              <a:t>Bedeutung</a:t>
+            </a:r>
+            <a:r>
+              <a:rPr lang="de-DE" altLang="de-DE"/>
+              <a:t> kann das Ampersand (</a:t>
+            </a:r>
+            <a:r>
+              <a:rPr lang="de-DE" altLang="de-DE">
+                <a:latin typeface="Courier New" panose="02070309020205020404" pitchFamily="49" charset="0"/>
+                <a:cs typeface="Courier New" panose="02070309020205020404" pitchFamily="49" charset="0"/>
+              </a:rPr>
+              <a:t>&amp;</a:t>
+            </a:r>
+            <a:r>
+              <a:rPr lang="de-DE" altLang="de-DE"/>
+              <a:t>) im Code annehmen?</a:t>
+            </a:r>
+          </a:p>
+          <a:p>
+            <a:pPr eaLnBrk="1" hangingPunct="1">
+              <a:spcBef>
+                <a:spcPct val="0"/>
+              </a:spcBef>
+            </a:pPr>
+            <a:endParaRPr lang="de-DE" altLang="de-DE"/>
+          </a:p>
+          <a:p>
+            <a:endParaRPr lang="en-US"/>
+          </a:p>
+        </p:txBody>
+      </p:sp>
+    </p:spTree>
+    <p:extLst>
+      <p:ext uri="{BB962C8B-B14F-4D97-AF65-F5344CB8AC3E}">
+        <p14:creationId xmlns:p14="http://schemas.microsoft.com/office/powerpoint/2010/main" val="1399694041"/>
+      </p:ext>
+    </p:extLst>
+  </p:cSld>
+  <p:clrMapOvr>
+    <a:masterClrMapping/>
+  </p:clrMapOvr>
+  <mc:AlternateContent xmlns:mc="http://schemas.openxmlformats.org/markup-compatibility/2006" xmlns:p14="http://schemas.microsoft.com/office/powerpoint/2010/main">
+    <mc:Choice Requires="p14">
+      <p:transition spd="slow" p14:dur="2000"/>
+    </mc:Choice>
+    <mc:Fallback xmlns="">
+      <p:transition spd="slow"/>
+    </mc:Fallback>
+  </mc:AlternateContent>
+  <p:timing>
+    <p:tnLst>
+      <p:par>
+        <p:cTn id="1" dur="indefinite" restart="never" nodeType="tmRoot">
+          <p:childTnLst>
+            <p:seq concurrent="1" nextAc="seek">
+              <p:cTn id="2" dur="indefinite" nodeType="mainSeq">
+                <p:childTnLst>
+                  <p:par>
+                    <p:cTn id="3" fill="hold">
+                      <p:stCondLst>
+                        <p:cond delay="indefinite"/>
+                      </p:stCondLst>
+                      <p:childTnLst>
+                        <p:par>
+                          <p:cTn id="4" fill="hold">
+                            <p:stCondLst>
+                              <p:cond delay="0"/>
+                            </p:stCondLst>
+                            <p:childTnLst>
+                              <p:par>
+                                <p:cTn id="5" presetID="1" presetClass="entr" presetSubtype="0" fill="hold" grpId="0" nodeType="clickEffect">
+                                  <p:stCondLst>
+                                    <p:cond delay="0"/>
+                                  </p:stCondLst>
+                                  <p:childTnLst>
+                                    <p:set>
+                                      <p:cBhvr>
+                                        <p:cTn id="6" dur="1" fill="hold">
+                                          <p:stCondLst>
+                                            <p:cond delay="0"/>
+                                          </p:stCondLst>
+                                        </p:cTn>
+                                        <p:tgtEl>
+                                          <p:spTgt spid="2">
+                                            <p:txEl>
+                                              <p:pRg st="0" end="0"/>
+                                            </p:txEl>
+                                          </p:spTgt>
+                                        </p:tgtEl>
+                                        <p:attrNameLst>
+                                          <p:attrName>style.visibility</p:attrName>
+                                        </p:attrNameLst>
+                                      </p:cBhvr>
+                                      <p:to>
+                                        <p:strVal val="visible"/>
+                                      </p:to>
+                                    </p:set>
+                                  </p:childTnLst>
+                                </p:cTn>
+                              </p:par>
+                              <p:par>
+                                <p:cTn id="7" presetID="1" presetClass="entr" presetSubtype="0" fill="hold" grpId="0" nodeType="withEffect">
+                                  <p:stCondLst>
+                                    <p:cond delay="0"/>
+                                  </p:stCondLst>
+                                  <p:childTnLst>
+                                    <p:set>
+                                      <p:cBhvr>
+                                        <p:cTn id="8" dur="1" fill="hold">
+                                          <p:stCondLst>
+                                            <p:cond delay="0"/>
+                                          </p:stCondLst>
+                                        </p:cTn>
+                                        <p:tgtEl>
+                                          <p:spTgt spid="2">
+                                            <p:txEl>
+                                              <p:pRg st="1" end="1"/>
+                                            </p:txEl>
+                                          </p:spTgt>
+                                        </p:tgtEl>
+                                        <p:attrNameLst>
+                                          <p:attrName>style.visibility</p:attrName>
+                                        </p:attrNameLst>
+                                      </p:cBhvr>
+                                      <p:to>
+                                        <p:strVal val="visible"/>
+                                      </p:to>
+                                    </p:set>
+                                  </p:childTnLst>
+                                </p:cTn>
+                              </p:par>
+                              <p:par>
+                                <p:cTn id="9" presetID="1" presetClass="entr" presetSubtype="0" fill="hold" grpId="0" nodeType="withEffect">
+                                  <p:stCondLst>
+                                    <p:cond delay="0"/>
+                                  </p:stCondLst>
+                                  <p:childTnLst>
+                                    <p:set>
+                                      <p:cBhvr>
+                                        <p:cTn id="10" dur="1" fill="hold">
+                                          <p:stCondLst>
+                                            <p:cond delay="0"/>
+                                          </p:stCondLst>
+                                        </p:cTn>
+                                        <p:tgtEl>
+                                          <p:spTgt spid="2">
+                                            <p:txEl>
+                                              <p:pRg st="2" end="2"/>
+                                            </p:txEl>
+                                          </p:spTgt>
+                                        </p:tgtEl>
+                                        <p:attrNameLst>
+                                          <p:attrName>style.visibility</p:attrName>
+                                        </p:attrNameLst>
+                                      </p:cBhvr>
+                                      <p:to>
+                                        <p:strVal val="visible"/>
+                                      </p:to>
+                                    </p:set>
+                                  </p:childTnLst>
+                                </p:cTn>
+                              </p:par>
+                            </p:childTnLst>
+                          </p:cTn>
+                        </p:par>
+                      </p:childTnLst>
+                    </p:cTn>
+                  </p:par>
+                  <p:par>
+                    <p:cTn id="11" fill="hold">
+                      <p:stCondLst>
+                        <p:cond delay="indefinite"/>
+                      </p:stCondLst>
+                      <p:childTnLst>
+                        <p:par>
+                          <p:cTn id="12" fill="hold">
+                            <p:stCondLst>
+                              <p:cond delay="0"/>
+                            </p:stCondLst>
+                            <p:childTnLst>
+                              <p:par>
+                                <p:cTn id="13" presetID="1" presetClass="entr" presetSubtype="0" fill="hold" grpId="0" nodeType="clickEffect">
+                                  <p:stCondLst>
+                                    <p:cond delay="0"/>
+                                  </p:stCondLst>
+                                  <p:childTnLst>
+                                    <p:set>
+                                      <p:cBhvr>
+                                        <p:cTn id="14" dur="1" fill="hold">
+                                          <p:stCondLst>
+                                            <p:cond delay="0"/>
+                                          </p:stCondLst>
+                                        </p:cTn>
+                                        <p:tgtEl>
+                                          <p:spTgt spid="2">
+                                            <p:txEl>
+                                              <p:pRg st="3" end="3"/>
+                                            </p:txEl>
+                                          </p:spTgt>
+                                        </p:tgtEl>
+                                        <p:attrNameLst>
+                                          <p:attrName>style.visibility</p:attrName>
+                                        </p:attrNameLst>
+                                      </p:cBhvr>
+                                      <p:to>
+                                        <p:strVal val="visible"/>
+                                      </p:to>
+                                    </p:set>
+                                  </p:childTnLst>
+                                </p:cTn>
+                              </p:par>
+                              <p:par>
+                                <p:cTn id="15" presetID="1" presetClass="entr" presetSubtype="0" fill="hold" grpId="0" nodeType="withEffect">
+                                  <p:stCondLst>
+                                    <p:cond delay="0"/>
+                                  </p:stCondLst>
+                                  <p:childTnLst>
+                                    <p:set>
+                                      <p:cBhvr>
+                                        <p:cTn id="16" dur="1" fill="hold">
+                                          <p:stCondLst>
+                                            <p:cond delay="0"/>
+                                          </p:stCondLst>
+                                        </p:cTn>
+                                        <p:tgtEl>
+                                          <p:spTgt spid="2">
+                                            <p:txEl>
+                                              <p:pRg st="4" end="4"/>
+                                            </p:txEl>
+                                          </p:spTgt>
+                                        </p:tgtEl>
+                                        <p:attrNameLst>
+                                          <p:attrName>style.visibility</p:attrName>
+                                        </p:attrNameLst>
+                                      </p:cBhvr>
+                                      <p:to>
+                                        <p:strVal val="visible"/>
+                                      </p:to>
+                                    </p:set>
+                                  </p:childTnLst>
+                                </p:cTn>
+                              </p:par>
+                            </p:childTnLst>
+                          </p:cTn>
+                        </p:par>
+                      </p:childTnLst>
+                    </p:cTn>
+                  </p:par>
+                  <p:par>
+                    <p:cTn id="17" fill="hold">
+                      <p:stCondLst>
+                        <p:cond delay="indefinite"/>
+                      </p:stCondLst>
+                      <p:childTnLst>
+                        <p:par>
+                          <p:cTn id="18" fill="hold">
+                            <p:stCondLst>
+                              <p:cond delay="0"/>
+                            </p:stCondLst>
+                            <p:childTnLst>
+                              <p:par>
+                                <p:cTn id="19" presetID="1" presetClass="entr" presetSubtype="0" fill="hold" grpId="0" nodeType="clickEffect">
+                                  <p:stCondLst>
+                                    <p:cond delay="0"/>
+                                  </p:stCondLst>
+                                  <p:childTnLst>
+                                    <p:set>
+                                      <p:cBhvr>
+                                        <p:cTn id="20" dur="1" fill="hold">
+                                          <p:stCondLst>
+                                            <p:cond delay="0"/>
+                                          </p:stCondLst>
+                                        </p:cTn>
+                                        <p:tgtEl>
+                                          <p:spTgt spid="2">
+                                            <p:txEl>
+                                              <p:pRg st="6" end="6"/>
+                                            </p:txEl>
+                                          </p:spTgt>
+                                        </p:tgtEl>
+                                        <p:attrNameLst>
+                                          <p:attrName>style.visibility</p:attrName>
+                                        </p:attrNameLst>
+                                      </p:cBhvr>
+                                      <p:to>
+                                        <p:strVal val="visible"/>
+                                      </p:to>
+                                    </p:set>
+                                  </p:childTnLst>
+                                </p:cTn>
+                              </p:par>
+                            </p:childTnLst>
+                          </p:cTn>
+                        </p:par>
+                      </p:childTnLst>
+                    </p:cTn>
+                  </p:par>
+                  <p:par>
+                    <p:cTn id="21" fill="hold">
+                      <p:stCondLst>
+                        <p:cond delay="indefinite"/>
+                      </p:stCondLst>
+                      <p:childTnLst>
+                        <p:par>
+                          <p:cTn id="22" fill="hold">
+                            <p:stCondLst>
+                              <p:cond delay="0"/>
+                            </p:stCondLst>
+                            <p:childTnLst>
+                              <p:par>
+                                <p:cTn id="23" presetID="1" presetClass="entr" presetSubtype="0" fill="hold" grpId="0" nodeType="clickEffect">
+                                  <p:stCondLst>
+                                    <p:cond delay="0"/>
+                                  </p:stCondLst>
+                                  <p:childTnLst>
+                                    <p:set>
+                                      <p:cBhvr>
+                                        <p:cTn id="24" dur="1" fill="hold">
+                                          <p:stCondLst>
+                                            <p:cond delay="0"/>
+                                          </p:stCondLst>
+                                        </p:cTn>
+                                        <p:tgtEl>
+                                          <p:spTgt spid="2">
+                                            <p:txEl>
+                                              <p:pRg st="9" end="9"/>
+                                            </p:txEl>
+                                          </p:spTgt>
+                                        </p:tgtEl>
+                                        <p:attrNameLst>
+                                          <p:attrName>style.visibility</p:attrName>
+                                        </p:attrNameLst>
+                                      </p:cBhvr>
+                                      <p:to>
+                                        <p:strVal val="visible"/>
+                                      </p:to>
+                                    </p:set>
+                                  </p:childTnLst>
+                                </p:cTn>
+                              </p:par>
+                            </p:childTnLst>
+                          </p:cTn>
+                        </p:par>
+                      </p:childTnLst>
+                    </p:cTn>
+                  </p:par>
+                </p:childTnLst>
+              </p:cTn>
+              <p:prevCondLst>
+                <p:cond evt="onPrev" delay="0">
+                  <p:tgtEl>
+                    <p:sldTgt/>
+                  </p:tgtEl>
+                </p:cond>
+              </p:prevCondLst>
+              <p:nextCondLst>
+                <p:cond evt="onNext" delay="0">
+                  <p:tgtEl>
+                    <p:sldTgt/>
+                  </p:tgtEl>
+                </p:cond>
+              </p:nextCondLst>
+            </p:seq>
+          </p:childTnLst>
+        </p:cTn>
+      </p:par>
+    </p:tnLst>
+    <p:bldLst>
+      <p:bldP spid="2" grpId="0" build="p"/>
+    </p:bldLst>
+  </p:timing>
+</p:sld>
+</file>
+
+<file path=ppt/slides/slide19.xml><?xml version="1.0" encoding="utf-8"?>
 <p:sld xmlns:a="http://schemas.openxmlformats.org/drawingml/2006/main" xmlns:r="http://schemas.openxmlformats.org/officeDocument/2006/relationships" xmlns:p="http://schemas.openxmlformats.org/presentationml/2006/main">
   <p:cSld>
     <p:spTree>
@@ -12252,23 +13967,31 @@
           <a:bodyPr/>
           <a:lstStyle/>
           <a:p>
-            <a:pPr>
-              <a:tabLst>
-                <a:tab pos="2155825" algn="l"/>
-              </a:tabLst>
-            </a:pPr>
-            <a:r>
-              <a:rPr lang="de-DE" altLang="de-DE"/>
+            <a:r>
+              <a:rPr lang="en-US"/>
               <a:t>Tag </a:t>
             </a:r>
             <a:r>
-              <a:rPr lang="de-DE" altLang="de-DE" smtClean="0"/>
-              <a:t>5: </a:t>
+              <a:rPr lang="en-US" smtClean="0"/>
+              <a:t>3: </a:t>
+            </a:r>
+            <a:r>
+              <a:rPr lang="en-US" dirty="0" err="1"/>
+              <a:t>Rückschau</a:t>
+            </a:r>
+            <a:r>
+              <a:rPr lang="en-US" dirty="0"/>
+              <a:t> und </a:t>
             </a:r>
             <a:r>
               <a:rPr lang="en-US"/>
-              <a:t>Hinweise zur Klausur</a:t>
-            </a:r>
+              <a:t>Warm </a:t>
+            </a:r>
+            <a:r>
+              <a:rPr lang="en-US" smtClean="0"/>
+              <a:t>Up  (II) </a:t>
+            </a:r>
+            <a:endParaRPr lang="en-US" dirty="0"/>
           </a:p>
         </p:txBody>
       </p:sp>
@@ -12282,155 +14005,641 @@
             <p:ph idx="1"/>
           </p:nvPr>
         </p:nvSpPr>
-        <p:spPr/>
+        <p:spPr>
+          <a:xfrm>
+            <a:off x="250825" y="1484313"/>
+            <a:ext cx="8640763" cy="504527"/>
+          </a:xfrm>
+        </p:spPr>
         <p:txBody>
           <a:bodyPr/>
           <a:lstStyle/>
           <a:p>
-            <a:pPr>
-              <a:tabLst>
-                <a:tab pos="2155825" algn="l"/>
-              </a:tabLst>
-            </a:pPr>
+            <a:r>
+              <a:rPr lang="en-US" b="1" dirty="0" smtClean="0"/>
+              <a:t>Was </a:t>
+            </a:r>
+            <a:r>
+              <a:rPr lang="en-US" b="1" dirty="0" err="1" smtClean="0"/>
+              <a:t>ist</a:t>
+            </a:r>
+            <a:r>
+              <a:rPr lang="en-US" b="1" dirty="0" smtClean="0"/>
+              <a:t> </a:t>
+            </a:r>
+            <a:r>
+              <a:rPr lang="en-US" b="1" dirty="0" err="1" smtClean="0"/>
+              <a:t>hier</a:t>
+            </a:r>
+            <a:r>
+              <a:rPr lang="en-US" b="1" dirty="0" smtClean="0"/>
+              <a:t> </a:t>
+            </a:r>
+            <a:r>
+              <a:rPr lang="en-US" b="1" dirty="0" err="1" smtClean="0"/>
+              <a:t>verkehrt</a:t>
+            </a:r>
+            <a:r>
+              <a:rPr lang="en-US" b="1" dirty="0" smtClean="0"/>
+              <a:t>? Welches Problem </a:t>
+            </a:r>
+            <a:r>
+              <a:rPr lang="en-US" b="1" dirty="0" err="1" smtClean="0"/>
+              <a:t>wird</a:t>
+            </a:r>
+            <a:r>
+              <a:rPr lang="en-US" b="1" dirty="0" smtClean="0"/>
+              <a:t> </a:t>
+            </a:r>
+            <a:r>
+              <a:rPr lang="en-US" b="1" err="1" smtClean="0"/>
+              <a:t>auftreten</a:t>
+            </a:r>
+            <a:r>
+              <a:rPr lang="en-US" b="1" smtClean="0"/>
+              <a:t>?</a:t>
+            </a:r>
+          </a:p>
+          <a:p>
+            <a:endParaRPr lang="en-US" b="1"/>
+          </a:p>
+          <a:p>
+            <a:endParaRPr lang="en-US" b="1" smtClean="0"/>
+          </a:p>
+          <a:p>
+            <a:endParaRPr lang="en-US" b="1"/>
+          </a:p>
+          <a:p>
+            <a:endParaRPr lang="en-US" b="1" smtClean="0"/>
+          </a:p>
+          <a:p>
+            <a:endParaRPr lang="en-US" b="1"/>
+          </a:p>
+          <a:p>
+            <a:endParaRPr lang="en-US" b="1" smtClean="0"/>
+          </a:p>
+          <a:p>
+            <a:endParaRPr lang="en-US" b="1"/>
+          </a:p>
+          <a:p>
             <a:r>
               <a:rPr lang="en-US" b="1"/>
-              <a:t>Hinweise zur Klausur</a:t>
-            </a:r>
-          </a:p>
-          <a:p>
-            <a:pPr lvl="1">
-              <a:tabLst>
-                <a:tab pos="2155825" algn="l"/>
-              </a:tabLst>
-            </a:pPr>
+              <a:t>Lösung</a:t>
+            </a:r>
             <a:r>
               <a:rPr lang="en-US"/>
-              <a:t>Wir gehen davon aus, dass </a:t>
-            </a:r>
-            <a:r>
-              <a:rPr lang="en-US" b="1"/>
-              <a:t>alle nicht-optionalen Übungen </a:t>
-            </a:r>
-            <a:r>
-              <a:rPr lang="en-US" smtClean="0"/>
-              <a:t>bearbeitet </a:t>
-            </a:r>
-            <a:r>
-              <a:rPr lang="en-US"/>
-              <a:t>wurden </a:t>
-            </a:r>
-            <a:r>
-              <a:rPr lang="en-US" b="1"/>
-              <a:t>und</a:t>
-            </a:r>
-            <a:r>
-              <a:rPr lang="en-US"/>
-              <a:t> alle Folien soweit verstanden wurden.</a:t>
-            </a:r>
-          </a:p>
-          <a:p>
-            <a:pPr lvl="1">
-              <a:tabLst>
-                <a:tab pos="2155825" algn="l"/>
-              </a:tabLst>
-            </a:pPr>
-            <a:r>
-              <a:rPr lang="en-US"/>
-              <a:t>Es wird ein </a:t>
-            </a:r>
-            <a:r>
-              <a:rPr lang="en-US" b="1"/>
-              <a:t>Codehandout</a:t>
-            </a:r>
-            <a:r>
-              <a:rPr lang="en-US"/>
-              <a:t> geben, in dem für bestimmte Funktionen/Datentypen/Methoden eine Beschreibung vorliegt.</a:t>
-            </a:r>
-          </a:p>
-          <a:p>
-            <a:pPr lvl="2">
-              <a:tabLst>
-                <a:tab pos="2155825" algn="l"/>
-              </a:tabLst>
-            </a:pPr>
-            <a:r>
-              <a:rPr lang="en-US" b="1"/>
-              <a:t>NICHT </a:t>
-            </a:r>
-            <a:r>
-              <a:rPr lang="en-US"/>
-              <a:t>zu erwarten ist bspw. </a:t>
+              <a:t>: </a:t>
             </a:r>
             <a:r>
               <a:rPr lang="en-US">
                 <a:latin typeface="Consolas" panose="020B0609020204030204" pitchFamily="49" charset="0"/>
                 <a:cs typeface="Consolas" panose="020B0609020204030204" pitchFamily="49" charset="0"/>
               </a:rPr>
-              <a:t>std::vector&lt;T&gt;::push_back</a:t>
-            </a:r>
-          </a:p>
-          <a:p>
-            <a:pPr lvl="2">
-              <a:tabLst>
-                <a:tab pos="2155825" algn="l"/>
-              </a:tabLst>
+              <a:t>#include </a:t>
+            </a:r>
+            <a:r>
+              <a:rPr lang="en-US"/>
+              <a:t>von .cpp-Datei -&gt; </a:t>
+            </a:r>
+            <a:r>
+              <a:rPr lang="en-US"/>
+              <a:t>Verletzung </a:t>
+            </a:r>
+            <a:r>
+              <a:rPr lang="en-US" smtClean="0"/>
+              <a:t>der </a:t>
+            </a:r>
+            <a:r>
+              <a:rPr lang="en-US" b="1" smtClean="0"/>
+              <a:t>One </a:t>
+            </a:r>
+            <a:r>
+              <a:rPr lang="en-US" b="1"/>
+              <a:t>Definition Rule</a:t>
+            </a:r>
+          </a:p>
+          <a:p>
+            <a:endParaRPr lang="en-US" b="1" smtClean="0"/>
+          </a:p>
+          <a:p>
+            <a:endParaRPr lang="en-US" b="1"/>
+          </a:p>
+          <a:p>
+            <a:endParaRPr lang="en-US" b="1" smtClean="0"/>
+          </a:p>
+          <a:p>
+            <a:endParaRPr lang="en-US" b="1"/>
+          </a:p>
+          <a:p>
+            <a:endParaRPr lang="en-US" b="1" smtClean="0"/>
+          </a:p>
+          <a:p>
+            <a:endParaRPr lang="en-US" b="1"/>
+          </a:p>
+          <a:p>
+            <a:endParaRPr lang="en-US" b="1" smtClean="0"/>
+          </a:p>
+          <a:p>
+            <a:pPr eaLnBrk="1" hangingPunct="1">
+              <a:spcBef>
+                <a:spcPct val="0"/>
+              </a:spcBef>
             </a:pPr>
-            <a:r>
-              <a:rPr lang="en-US"/>
-              <a:t>Zu erwarten ist bspw. </a:t>
-            </a:r>
-            <a:r>
-              <a:rPr lang="en-US">
-                <a:latin typeface="Consolas" panose="020B0609020204030204" pitchFamily="49" charset="0"/>
-                <a:cs typeface="Consolas" panose="020B0609020204030204" pitchFamily="49" charset="0"/>
-              </a:rPr>
-              <a:t>std::string::</a:t>
-            </a:r>
-            <a:r>
-              <a:rPr lang="en-US" smtClean="0">
-                <a:latin typeface="Consolas" panose="020B0609020204030204" pitchFamily="49" charset="0"/>
-                <a:cs typeface="Consolas" panose="020B0609020204030204" pitchFamily="49" charset="0"/>
-              </a:rPr>
-              <a:t>find</a:t>
-            </a:r>
-          </a:p>
-          <a:p>
-            <a:pPr lvl="2">
-              <a:tabLst>
-                <a:tab pos="2155825" algn="l"/>
-              </a:tabLst>
-            </a:pPr>
-            <a:r>
-              <a:rPr lang="en-US"/>
-              <a:t>Das </a:t>
-            </a:r>
-            <a:r>
-              <a:rPr lang="en-US" b="1" smtClean="0"/>
-              <a:t>Codehandout </a:t>
-            </a:r>
-            <a:r>
-              <a:rPr lang="en-US" smtClean="0"/>
-              <a:t>ist auf </a:t>
-            </a:r>
-            <a:r>
-              <a:rPr lang="en-US" b="1" smtClean="0"/>
-              <a:t>Englisch</a:t>
-            </a:r>
-            <a:r>
-              <a:rPr lang="en-US" smtClean="0"/>
-              <a:t>! (Ist das für jemanden problematisch?)</a:t>
-            </a:r>
-            <a:endParaRPr lang="en-US"/>
-          </a:p>
-          <a:p>
-            <a:endParaRPr lang="en-US"/>
+            <a:endParaRPr lang="en-US" b="1" dirty="0"/>
+          </a:p>
+          <a:p>
+            <a:endParaRPr lang="en-US" b="1" dirty="0"/>
           </a:p>
         </p:txBody>
       </p:sp>
+      <p:grpSp>
+        <p:nvGrpSpPr>
+          <p:cNvPr id="7" name="Gruppieren 6"/>
+          <p:cNvGrpSpPr/>
+          <p:nvPr/>
+        </p:nvGrpSpPr>
+        <p:grpSpPr>
+          <a:xfrm>
+            <a:off x="93240" y="1988840"/>
+            <a:ext cx="8798348" cy="2088232"/>
+            <a:chOff x="1306805" y="1988840"/>
+            <a:chExt cx="7584783" cy="1800200"/>
+          </a:xfrm>
+        </p:grpSpPr>
+        <p:sp>
+          <p:nvSpPr>
+            <p:cNvPr id="4" name="Gefaltete Ecke 3"/>
+            <p:cNvSpPr/>
+            <p:nvPr/>
+          </p:nvSpPr>
+          <p:spPr bwMode="auto">
+            <a:xfrm>
+              <a:off x="1306805" y="1988840"/>
+              <a:ext cx="2502216" cy="1800200"/>
+            </a:xfrm>
+            <a:prstGeom prst="foldedCorner">
+              <a:avLst/>
+            </a:prstGeom>
+            <a:noFill/>
+            <a:ln w="9525">
+              <a:solidFill>
+                <a:srgbClr val="000000"/>
+              </a:solidFill>
+              <a:miter lim="800000"/>
+              <a:headEnd/>
+              <a:tailEnd/>
+            </a:ln>
+            <a:extLst>
+              <a:ext uri="{909E8E84-426E-40DD-AFC4-6F175D3DCCD1}">
+                <a14:hiddenFill xmlns:a14="http://schemas.microsoft.com/office/drawing/2010/main">
+                  <a:solidFill>
+                    <a:srgbClr val="FFFFFF"/>
+                  </a:solidFill>
+                </a14:hiddenFill>
+              </a:ext>
+            </a:extLst>
+          </p:spPr>
+          <p:txBody>
+            <a:bodyPr rtlCol="0" anchor="t" anchorCtr="0">
+              <a:noAutofit/>
+            </a:bodyPr>
+            <a:lstStyle/>
+            <a:p>
+              <a:pPr algn="l">
+                <a:buSzTx/>
+              </a:pPr>
+              <a:r>
+                <a:rPr lang="en-US" sz="1400" dirty="0" smtClean="0">
+                  <a:solidFill>
+                    <a:srgbClr val="7F0055"/>
+                  </a:solidFill>
+                  <a:latin typeface="Consolas" pitchFamily="49" charset="0"/>
+                </a:rPr>
+                <a:t>// main.cpp</a:t>
+              </a:r>
+            </a:p>
+            <a:p>
+              <a:pPr algn="l">
+                <a:buSzTx/>
+              </a:pPr>
+              <a:r>
+                <a:rPr lang="en-US" sz="1400" dirty="0" smtClean="0">
+                  <a:solidFill>
+                    <a:srgbClr val="7F0055"/>
+                  </a:solidFill>
+                  <a:latin typeface="Consolas" pitchFamily="49" charset="0"/>
+                </a:rPr>
+                <a:t>#</a:t>
+              </a:r>
+              <a:r>
+                <a:rPr lang="en-US" sz="1400" dirty="0">
+                  <a:solidFill>
+                    <a:srgbClr val="7F0055"/>
+                  </a:solidFill>
+                  <a:latin typeface="Consolas" pitchFamily="49" charset="0"/>
+                </a:rPr>
+                <a:t>include "functions.cpp"</a:t>
+              </a:r>
+            </a:p>
+            <a:p>
+              <a:pPr algn="l">
+                <a:buSzTx/>
+              </a:pPr>
+              <a:endParaRPr lang="en-US" sz="1400" dirty="0">
+                <a:solidFill>
+                  <a:srgbClr val="7F0055"/>
+                </a:solidFill>
+                <a:latin typeface="Consolas" pitchFamily="49" charset="0"/>
+              </a:endParaRPr>
+            </a:p>
+            <a:p>
+              <a:pPr algn="l">
+                <a:buSzTx/>
+              </a:pPr>
+              <a:r>
+                <a:rPr lang="en-US" sz="1400" dirty="0" err="1">
+                  <a:solidFill>
+                    <a:srgbClr val="7F0055"/>
+                  </a:solidFill>
+                  <a:latin typeface="Consolas" pitchFamily="49" charset="0"/>
+                </a:rPr>
+                <a:t>int</a:t>
+              </a:r>
+              <a:r>
+                <a:rPr lang="en-US" sz="1400" dirty="0">
+                  <a:solidFill>
+                    <a:srgbClr val="7F0055"/>
+                  </a:solidFill>
+                  <a:latin typeface="Consolas" pitchFamily="49" charset="0"/>
+                </a:rPr>
+                <a:t> main() {</a:t>
+              </a:r>
+            </a:p>
+            <a:p>
+              <a:pPr algn="l">
+                <a:buSzTx/>
+              </a:pPr>
+              <a:r>
+                <a:rPr lang="en-US" sz="1400" dirty="0">
+                  <a:solidFill>
+                    <a:srgbClr val="7F0055"/>
+                  </a:solidFill>
+                  <a:latin typeface="Consolas" pitchFamily="49" charset="0"/>
+                </a:rPr>
+                <a:t>	</a:t>
+              </a:r>
+              <a:r>
+                <a:rPr lang="en-US" sz="1400" dirty="0" err="1">
+                  <a:solidFill>
+                    <a:srgbClr val="7F0055"/>
+                  </a:solidFill>
+                  <a:latin typeface="Consolas" pitchFamily="49" charset="0"/>
+                </a:rPr>
+                <a:t>myNewFunction</a:t>
+              </a:r>
+              <a:r>
+                <a:rPr lang="en-US" sz="1400" dirty="0">
+                  <a:solidFill>
+                    <a:srgbClr val="7F0055"/>
+                  </a:solidFill>
+                  <a:latin typeface="Consolas" pitchFamily="49" charset="0"/>
+                </a:rPr>
+                <a:t>();</a:t>
+              </a:r>
+            </a:p>
+            <a:p>
+              <a:pPr algn="l">
+                <a:buSzTx/>
+              </a:pPr>
+              <a:r>
+                <a:rPr lang="en-US" sz="1400" dirty="0">
+                  <a:solidFill>
+                    <a:srgbClr val="7F0055"/>
+                  </a:solidFill>
+                  <a:latin typeface="Consolas" pitchFamily="49" charset="0"/>
+                </a:rPr>
+                <a:t>	return 0;</a:t>
+              </a:r>
+            </a:p>
+            <a:p>
+              <a:pPr algn="l">
+                <a:buSzTx/>
+              </a:pPr>
+              <a:r>
+                <a:rPr lang="en-US" sz="1400" dirty="0">
+                  <a:solidFill>
+                    <a:srgbClr val="7F0055"/>
+                  </a:solidFill>
+                  <a:latin typeface="Consolas" pitchFamily="49" charset="0"/>
+                </a:rPr>
+                <a:t>}</a:t>
+              </a:r>
+            </a:p>
+          </p:txBody>
+        </p:sp>
+        <p:sp>
+          <p:nvSpPr>
+            <p:cNvPr id="5" name="Gefaltete Ecke 4"/>
+            <p:cNvSpPr/>
+            <p:nvPr/>
+          </p:nvSpPr>
+          <p:spPr bwMode="auto">
+            <a:xfrm>
+              <a:off x="6271084" y="1988840"/>
+              <a:ext cx="2620504" cy="1800200"/>
+            </a:xfrm>
+            <a:prstGeom prst="foldedCorner">
+              <a:avLst/>
+            </a:prstGeom>
+            <a:noFill/>
+            <a:ln w="9525">
+              <a:solidFill>
+                <a:srgbClr val="000000"/>
+              </a:solidFill>
+              <a:miter lim="800000"/>
+              <a:headEnd/>
+              <a:tailEnd/>
+            </a:ln>
+            <a:extLst>
+              <a:ext uri="{909E8E84-426E-40DD-AFC4-6F175D3DCCD1}">
+                <a14:hiddenFill xmlns:a14="http://schemas.microsoft.com/office/drawing/2010/main">
+                  <a:solidFill>
+                    <a:srgbClr val="FFFFFF"/>
+                  </a:solidFill>
+                </a14:hiddenFill>
+              </a:ext>
+            </a:extLst>
+          </p:spPr>
+          <p:txBody>
+            <a:bodyPr wrap="square" rtlCol="0" anchor="t" anchorCtr="0">
+              <a:noAutofit/>
+            </a:bodyPr>
+            <a:lstStyle/>
+            <a:p>
+              <a:pPr algn="l">
+                <a:buSzTx/>
+              </a:pPr>
+              <a:r>
+                <a:rPr lang="en-US" sz="1400" dirty="0">
+                  <a:solidFill>
+                    <a:srgbClr val="7F0055"/>
+                  </a:solidFill>
+                  <a:latin typeface="Consolas" pitchFamily="49" charset="0"/>
+                </a:rPr>
+                <a:t>//</a:t>
+              </a:r>
+              <a:r>
+                <a:rPr lang="en-US" sz="1400" dirty="0" smtClean="0">
+                  <a:solidFill>
+                    <a:srgbClr val="7F0055"/>
+                  </a:solidFill>
+                  <a:latin typeface="Consolas" pitchFamily="49" charset="0"/>
+                </a:rPr>
+                <a:t>functions.cpp</a:t>
+              </a:r>
+            </a:p>
+            <a:p>
+              <a:pPr algn="l">
+                <a:buSzTx/>
+              </a:pPr>
+              <a:r>
+                <a:rPr lang="en-US" sz="1400" dirty="0" smtClean="0">
+                  <a:solidFill>
+                    <a:srgbClr val="7F0055"/>
+                  </a:solidFill>
+                  <a:latin typeface="Consolas" pitchFamily="49" charset="0"/>
+                </a:rPr>
+                <a:t>#include “functions.hpp”</a:t>
+              </a:r>
+              <a:r>
+                <a:rPr lang="en-US" sz="1400" dirty="0">
+                  <a:solidFill>
+                    <a:srgbClr val="7F0055"/>
+                  </a:solidFill>
+                  <a:latin typeface="Consolas" pitchFamily="49" charset="0"/>
+                </a:rPr>
+                <a:t/>
+              </a:r>
+              <a:br>
+                <a:rPr lang="en-US" sz="1400" dirty="0">
+                  <a:solidFill>
+                    <a:srgbClr val="7F0055"/>
+                  </a:solidFill>
+                  <a:latin typeface="Consolas" pitchFamily="49" charset="0"/>
+                </a:rPr>
+              </a:br>
+              <a:r>
+                <a:rPr lang="en-US" sz="1400" dirty="0">
+                  <a:solidFill>
+                    <a:srgbClr val="7F0055"/>
+                  </a:solidFill>
+                  <a:latin typeface="Consolas" pitchFamily="49" charset="0"/>
+                </a:rPr>
+                <a:t/>
+              </a:r>
+              <a:br>
+                <a:rPr lang="en-US" sz="1400" dirty="0">
+                  <a:solidFill>
+                    <a:srgbClr val="7F0055"/>
+                  </a:solidFill>
+                  <a:latin typeface="Consolas" pitchFamily="49" charset="0"/>
+                </a:rPr>
+              </a:br>
+              <a:r>
+                <a:rPr lang="en-US" sz="1400" dirty="0" err="1">
+                  <a:solidFill>
+                    <a:srgbClr val="7F0055"/>
+                  </a:solidFill>
+                  <a:latin typeface="Consolas" pitchFamily="49" charset="0"/>
+                </a:rPr>
+                <a:t>int</a:t>
+              </a:r>
+              <a:r>
+                <a:rPr lang="en-US" sz="1400" dirty="0">
+                  <a:solidFill>
+                    <a:srgbClr val="7F0055"/>
+                  </a:solidFill>
+                  <a:latin typeface="Consolas" pitchFamily="49" charset="0"/>
+                </a:rPr>
+                <a:t> </a:t>
+              </a:r>
+              <a:r>
+                <a:rPr lang="en-US" sz="1400" dirty="0" err="1">
+                  <a:solidFill>
+                    <a:srgbClr val="7F0055"/>
+                  </a:solidFill>
+                  <a:latin typeface="Consolas" pitchFamily="49" charset="0"/>
+                </a:rPr>
+                <a:t>myNewFunction</a:t>
+              </a:r>
+              <a:r>
+                <a:rPr lang="en-US" sz="1400" dirty="0">
+                  <a:solidFill>
+                    <a:srgbClr val="7F0055"/>
+                  </a:solidFill>
+                  <a:latin typeface="Consolas" pitchFamily="49" charset="0"/>
+                </a:rPr>
+                <a:t>() {</a:t>
+              </a:r>
+            </a:p>
+            <a:p>
+              <a:pPr algn="l">
+                <a:buSzTx/>
+              </a:pPr>
+              <a:r>
+                <a:rPr lang="en-US" sz="1400" dirty="0">
+                  <a:solidFill>
+                    <a:srgbClr val="7F0055"/>
+                  </a:solidFill>
+                  <a:latin typeface="Consolas" pitchFamily="49" charset="0"/>
+                </a:rPr>
+                <a:t>	return -12;</a:t>
+              </a:r>
+            </a:p>
+            <a:p>
+              <a:pPr algn="l">
+                <a:buSzTx/>
+              </a:pPr>
+              <a:r>
+                <a:rPr lang="en-US" sz="1400" dirty="0">
+                  <a:solidFill>
+                    <a:srgbClr val="7F0055"/>
+                  </a:solidFill>
+                  <a:latin typeface="Consolas" pitchFamily="49" charset="0"/>
+                </a:rPr>
+                <a:t>}</a:t>
+              </a:r>
+            </a:p>
+            <a:p>
+              <a:pPr algn="l">
+                <a:buSzTx/>
+              </a:pPr>
+              <a:endParaRPr lang="en-US" sz="1400" dirty="0">
+                <a:solidFill>
+                  <a:srgbClr val="7F0055"/>
+                </a:solidFill>
+                <a:latin typeface="Consolas" pitchFamily="49" charset="0"/>
+              </a:endParaRPr>
+            </a:p>
+          </p:txBody>
+        </p:sp>
+        <p:sp>
+          <p:nvSpPr>
+            <p:cNvPr id="6" name="Gefaltete Ecke 5"/>
+            <p:cNvSpPr/>
+            <p:nvPr/>
+          </p:nvSpPr>
+          <p:spPr bwMode="auto">
+            <a:xfrm>
+              <a:off x="3923928" y="1988840"/>
+              <a:ext cx="2232248" cy="1800200"/>
+            </a:xfrm>
+            <a:prstGeom prst="foldedCorner">
+              <a:avLst/>
+            </a:prstGeom>
+            <a:noFill/>
+            <a:ln w="9525">
+              <a:solidFill>
+                <a:srgbClr val="000000"/>
+              </a:solidFill>
+              <a:miter lim="800000"/>
+              <a:headEnd/>
+              <a:tailEnd/>
+            </a:ln>
+            <a:extLst>
+              <a:ext uri="{909E8E84-426E-40DD-AFC4-6F175D3DCCD1}">
+                <a14:hiddenFill xmlns:a14="http://schemas.microsoft.com/office/drawing/2010/main">
+                  <a:solidFill>
+                    <a:srgbClr val="FFFFFF"/>
+                  </a:solidFill>
+                </a14:hiddenFill>
+              </a:ext>
+            </a:extLst>
+          </p:spPr>
+          <p:txBody>
+            <a:bodyPr wrap="square" rtlCol="0" anchor="t" anchorCtr="0">
+              <a:noAutofit/>
+            </a:bodyPr>
+            <a:lstStyle/>
+            <a:p>
+              <a:pPr algn="l">
+                <a:buSzTx/>
+              </a:pPr>
+              <a:r>
+                <a:rPr lang="en-US" sz="1400" dirty="0" smtClean="0">
+                  <a:solidFill>
+                    <a:srgbClr val="7F0055"/>
+                  </a:solidFill>
+                  <a:latin typeface="Consolas" pitchFamily="49" charset="0"/>
+                </a:rPr>
+                <a:t>//functions.hpp</a:t>
+              </a:r>
+            </a:p>
+            <a:p>
+              <a:pPr algn="l">
+                <a:buSzTx/>
+              </a:pPr>
+              <a:endParaRPr lang="en-US" sz="1400" dirty="0" smtClean="0">
+                <a:solidFill>
+                  <a:srgbClr val="7F0055"/>
+                </a:solidFill>
+                <a:latin typeface="Consolas" pitchFamily="49" charset="0"/>
+              </a:endParaRPr>
+            </a:p>
+            <a:p>
+              <a:pPr algn="l">
+                <a:buSzTx/>
+              </a:pPr>
+              <a:r>
+                <a:rPr lang="en-US" sz="1400" dirty="0" err="1" smtClean="0">
+                  <a:solidFill>
+                    <a:srgbClr val="7F0055"/>
+                  </a:solidFill>
+                  <a:latin typeface="Consolas" pitchFamily="49" charset="0"/>
+                </a:rPr>
+                <a:t>int</a:t>
+              </a:r>
+              <a:r>
+                <a:rPr lang="en-US" sz="1400" dirty="0" smtClean="0">
+                  <a:solidFill>
+                    <a:srgbClr val="7F0055"/>
+                  </a:solidFill>
+                  <a:latin typeface="Consolas" pitchFamily="49" charset="0"/>
+                </a:rPr>
+                <a:t> </a:t>
+              </a:r>
+              <a:r>
+                <a:rPr lang="en-US" sz="1400" dirty="0" err="1">
+                  <a:solidFill>
+                    <a:srgbClr val="7F0055"/>
+                  </a:solidFill>
+                  <a:latin typeface="Consolas" pitchFamily="49" charset="0"/>
+                </a:rPr>
+                <a:t>myNewFunction</a:t>
+              </a:r>
+              <a:r>
+                <a:rPr lang="en-US" sz="1400" dirty="0" smtClean="0">
+                  <a:solidFill>
+                    <a:srgbClr val="7F0055"/>
+                  </a:solidFill>
+                  <a:latin typeface="Consolas" pitchFamily="49" charset="0"/>
+                </a:rPr>
+                <a:t>();</a:t>
+              </a:r>
+              <a:endParaRPr lang="en-US" sz="1400" dirty="0">
+                <a:solidFill>
+                  <a:srgbClr val="7F0055"/>
+                </a:solidFill>
+                <a:latin typeface="Consolas" pitchFamily="49" charset="0"/>
+              </a:endParaRPr>
+            </a:p>
+          </p:txBody>
+        </p:sp>
+      </p:grpSp>
     </p:spTree>
     <p:extLst>
       <p:ext uri="{BB962C8B-B14F-4D97-AF65-F5344CB8AC3E}">
-        <p14:creationId xmlns:p14="http://schemas.microsoft.com/office/powerpoint/2010/main" val="746502156"/>
+        <p14:creationId xmlns:p14="http://schemas.microsoft.com/office/powerpoint/2010/main" val="83985322"/>
       </p:ext>
     </p:extLst>
   </p:cSld>
@@ -12440,7 +14649,79 @@
   <p:timing>
     <p:tnLst>
       <p:par>
-        <p:cTn id="1" dur="indefinite" restart="never" nodeType="tmRoot"/>
+        <p:cTn id="1" dur="indefinite" restart="never" nodeType="tmRoot">
+          <p:childTnLst>
+            <p:seq concurrent="1" nextAc="seek">
+              <p:cTn id="2" dur="indefinite" nodeType="mainSeq">
+                <p:childTnLst>
+                  <p:par>
+                    <p:cTn id="3" fill="hold">
+                      <p:stCondLst>
+                        <p:cond delay="indefinite"/>
+                      </p:stCondLst>
+                      <p:childTnLst>
+                        <p:par>
+                          <p:cTn id="4" fill="hold">
+                            <p:stCondLst>
+                              <p:cond delay="0"/>
+                            </p:stCondLst>
+                            <p:childTnLst>
+                              <p:par>
+                                <p:cTn id="5" presetID="1" presetClass="entr" presetSubtype="0" fill="hold" nodeType="clickEffect">
+                                  <p:stCondLst>
+                                    <p:cond delay="0"/>
+                                  </p:stCondLst>
+                                  <p:childTnLst>
+                                    <p:set>
+                                      <p:cBhvr>
+                                        <p:cTn id="6" dur="1" fill="hold">
+                                          <p:stCondLst>
+                                            <p:cond delay="0"/>
+                                          </p:stCondLst>
+                                        </p:cTn>
+                                        <p:tgtEl>
+                                          <p:spTgt spid="3">
+                                            <p:txEl>
+                                              <p:pRg st="8" end="8"/>
+                                            </p:txEl>
+                                          </p:spTgt>
+                                        </p:tgtEl>
+                                        <p:attrNameLst>
+                                          <p:attrName>style.visibility</p:attrName>
+                                        </p:attrNameLst>
+                                      </p:cBhvr>
+                                      <p:to>
+                                        <p:strVal val="visible"/>
+                                      </p:to>
+                                    </p:set>
+                                  </p:childTnLst>
+                                </p:cTn>
+                              </p:par>
+                            </p:childTnLst>
+                          </p:cTn>
+                        </p:par>
+                      </p:childTnLst>
+                    </p:cTn>
+                  </p:par>
+                </p:childTnLst>
+              </p:cTn>
+              <p:prevCondLst>
+                <p:cond evt="onPrev" delay="0">
+                  <p:tgtEl>
+                    <p:sldTgt/>
+                  </p:tgtEl>
+                </p:cond>
+              </p:prevCondLst>
+              <p:nextCondLst>
+                <p:cond evt="onNext" delay="0">
+                  <p:tgtEl>
+                    <p:sldTgt/>
+                  </p:tgtEl>
+                </p:cond>
+              </p:nextCondLst>
+            </p:seq>
+          </p:childTnLst>
+        </p:cTn>
       </p:par>
     </p:tnLst>
   </p:timing>
@@ -12510,6 +14791,559 @@
     <p:extLst>
       <p:ext uri="{BB962C8B-B14F-4D97-AF65-F5344CB8AC3E}">
         <p14:creationId xmlns:p14="http://schemas.microsoft.com/office/powerpoint/2010/main" val="2753713110"/>
+      </p:ext>
+    </p:extLst>
+  </p:cSld>
+  <p:clrMapOvr>
+    <a:masterClrMapping/>
+  </p:clrMapOvr>
+  <p:timing>
+    <p:tnLst>
+      <p:par>
+        <p:cTn id="1" dur="indefinite" restart="never" nodeType="tmRoot"/>
+      </p:par>
+    </p:tnLst>
+  </p:timing>
+</p:sld>
+</file>
+
+<file path=ppt/slides/slide20.xml><?xml version="1.0" encoding="utf-8"?>
+<p:sld xmlns:a="http://schemas.openxmlformats.org/drawingml/2006/main" xmlns:r="http://schemas.openxmlformats.org/officeDocument/2006/relationships" xmlns:p="http://schemas.openxmlformats.org/presentationml/2006/main">
+  <p:cSld>
+    <p:spTree>
+      <p:nvGrpSpPr>
+        <p:cNvPr id="1" name=""/>
+        <p:cNvGrpSpPr/>
+        <p:nvPr/>
+      </p:nvGrpSpPr>
+      <p:grpSpPr>
+        <a:xfrm>
+          <a:off x="0" y="0"/>
+          <a:ext cx="0" cy="0"/>
+          <a:chOff x="0" y="0"/>
+          <a:chExt cx="0" cy="0"/>
+        </a:xfrm>
+      </p:grpSpPr>
+      <p:sp>
+        <p:nvSpPr>
+          <p:cNvPr id="2" name="Titel 1"/>
+          <p:cNvSpPr>
+            <a:spLocks noGrp="1"/>
+          </p:cNvSpPr>
+          <p:nvPr>
+            <p:ph type="title"/>
+          </p:nvPr>
+        </p:nvSpPr>
+        <p:spPr/>
+        <p:txBody>
+          <a:bodyPr/>
+          <a:lstStyle/>
+          <a:p>
+            <a:r>
+              <a:rPr lang="en-US" dirty="0" smtClean="0"/>
+              <a:t>Tag 3: </a:t>
+            </a:r>
+            <a:r>
+              <a:rPr lang="en-US" dirty="0" err="1" smtClean="0"/>
+              <a:t>Rückschau</a:t>
+            </a:r>
+            <a:r>
+              <a:rPr lang="en-US" dirty="0" smtClean="0"/>
+              <a:t> und </a:t>
+            </a:r>
+            <a:r>
+              <a:rPr lang="en-US" smtClean="0"/>
+              <a:t>Warm Up (III)</a:t>
+            </a:r>
+            <a:endParaRPr lang="en-US" dirty="0"/>
+          </a:p>
+        </p:txBody>
+      </p:sp>
+      <p:sp>
+        <p:nvSpPr>
+          <p:cNvPr id="3" name="Inhaltsplatzhalter 2"/>
+          <p:cNvSpPr>
+            <a:spLocks noGrp="1"/>
+          </p:cNvSpPr>
+          <p:nvPr>
+            <p:ph idx="1"/>
+          </p:nvPr>
+        </p:nvSpPr>
+        <p:spPr/>
+        <p:txBody>
+          <a:bodyPr/>
+          <a:lstStyle/>
+          <a:p>
+            <a:pPr marL="342900" indent="-342900">
+              <a:buFontTx/>
+              <a:buChar char="-"/>
+            </a:pPr>
+            <a:endParaRPr lang="en-US" dirty="0" smtClean="0"/>
+          </a:p>
+          <a:p>
+            <a:pPr marL="342900" indent="-342900">
+              <a:buFontTx/>
+              <a:buChar char="-"/>
+            </a:pPr>
+            <a:r>
+              <a:rPr lang="en-US" smtClean="0"/>
+              <a:t>Fragen </a:t>
+            </a:r>
+            <a:r>
+              <a:rPr lang="en-US" dirty="0" err="1" smtClean="0"/>
+              <a:t>für</a:t>
+            </a:r>
+            <a:r>
+              <a:rPr lang="en-US" dirty="0" smtClean="0"/>
+              <a:t> die </a:t>
+            </a:r>
+            <a:r>
+              <a:rPr lang="en-US" b="1" dirty="0" smtClean="0"/>
+              <a:t>Evaluation</a:t>
+            </a:r>
+            <a:r>
+              <a:rPr lang="en-US" dirty="0" smtClean="0"/>
+              <a:t> am </a:t>
+            </a:r>
+            <a:r>
+              <a:rPr lang="en-US" dirty="0" err="1" smtClean="0"/>
+              <a:t>letzten</a:t>
+            </a:r>
+            <a:r>
+              <a:rPr lang="en-US" dirty="0" smtClean="0"/>
+              <a:t> Tag</a:t>
+            </a:r>
+          </a:p>
+          <a:p>
+            <a:pPr marL="692150" lvl="1" indent="-342900">
+              <a:buFont typeface="+mj-lt"/>
+              <a:buAutoNum type="arabicPeriod"/>
+            </a:pPr>
+            <a:r>
+              <a:rPr lang="en-US" dirty="0" err="1" smtClean="0"/>
+              <a:t>Stärkerer</a:t>
+            </a:r>
+            <a:r>
+              <a:rPr lang="en-US" dirty="0" smtClean="0"/>
+              <a:t> </a:t>
+            </a:r>
+            <a:r>
+              <a:rPr lang="en-US" dirty="0" err="1" smtClean="0"/>
+              <a:t>Fokus</a:t>
+            </a:r>
+            <a:r>
+              <a:rPr lang="en-US" dirty="0" smtClean="0"/>
+              <a:t> auf </a:t>
+            </a:r>
+            <a:r>
+              <a:rPr lang="en-US" smtClean="0"/>
+              <a:t>C++(11) legen (= weniger Fokus auf C)?</a:t>
+            </a:r>
+            <a:endParaRPr lang="en-US" dirty="0" smtClean="0"/>
+          </a:p>
+          <a:p>
+            <a:pPr marL="692150" lvl="1" indent="-342900">
+              <a:buFont typeface="+mj-lt"/>
+              <a:buAutoNum type="arabicPeriod"/>
+            </a:pPr>
+            <a:r>
+              <a:rPr lang="en-US" smtClean="0"/>
+              <a:t>Selbsteinschätzung deiner C++-Kenntnisse (1=Keine Vorkenntnisse, 3=Eigene kleinere Projekte, 5=Sehr erfahrener C++-Programmierer)</a:t>
+            </a:r>
+          </a:p>
+          <a:p>
+            <a:pPr marL="692150" lvl="1" indent="-342900">
+              <a:buFont typeface="+mj-lt"/>
+              <a:buAutoNum type="arabicPeriod"/>
+            </a:pPr>
+            <a:endParaRPr lang="en-US" dirty="0"/>
+          </a:p>
+          <a:p>
+            <a:pPr marL="342900" indent="-342900">
+              <a:buFontTx/>
+              <a:buChar char="-"/>
+            </a:pPr>
+            <a:r>
+              <a:rPr lang="en-US" b="1" dirty="0" err="1" smtClean="0"/>
+              <a:t>Gastvortrag</a:t>
+            </a:r>
+            <a:r>
+              <a:rPr lang="en-US" b="1" dirty="0" smtClean="0"/>
+              <a:t> am </a:t>
+            </a:r>
+            <a:r>
+              <a:rPr lang="en-US" b="1" dirty="0" err="1" smtClean="0"/>
+              <a:t>letzten</a:t>
+            </a:r>
+            <a:r>
+              <a:rPr lang="en-US" b="1" dirty="0" smtClean="0"/>
+              <a:t> Tag</a:t>
+            </a:r>
+            <a:r>
+              <a:rPr lang="en-US" dirty="0" smtClean="0"/>
+              <a:t>: Holger Wech </a:t>
+            </a:r>
+            <a:r>
+              <a:rPr lang="en-US" smtClean="0"/>
+              <a:t>von </a:t>
+            </a:r>
+            <a:r>
+              <a:rPr lang="en-US" smtClean="0"/>
+              <a:t>Cypress</a:t>
+            </a:r>
+            <a:r>
+              <a:rPr lang="en-US" dirty="0" smtClean="0"/>
+              <a:t/>
+            </a:r>
+            <a:br>
+              <a:rPr lang="en-US" dirty="0" smtClean="0"/>
+            </a:br>
+            <a:endParaRPr lang="en-US" dirty="0"/>
+          </a:p>
+        </p:txBody>
+      </p:sp>
+      <p:grpSp>
+        <p:nvGrpSpPr>
+          <p:cNvPr id="8" name="Gruppieren 7"/>
+          <p:cNvGrpSpPr/>
+          <p:nvPr/>
+        </p:nvGrpSpPr>
+        <p:grpSpPr>
+          <a:xfrm>
+            <a:off x="683568" y="3968750"/>
+            <a:ext cx="4992961" cy="1865682"/>
+            <a:chOff x="1475656" y="4521395"/>
+            <a:chExt cx="4992961" cy="1865682"/>
+          </a:xfrm>
+        </p:grpSpPr>
+        <p:pic>
+          <p:nvPicPr>
+            <p:cNvPr id="4" name="Grafik 3"/>
+            <p:cNvPicPr>
+              <a:picLocks noChangeAspect="1"/>
+            </p:cNvPicPr>
+            <p:nvPr/>
+          </p:nvPicPr>
+          <p:blipFill>
+            <a:blip r:embed="rId2"/>
+            <a:stretch>
+              <a:fillRect/>
+            </a:stretch>
+          </p:blipFill>
+          <p:spPr>
+            <a:xfrm>
+              <a:off x="1475656" y="4521395"/>
+              <a:ext cx="4824536" cy="1865682"/>
+            </a:xfrm>
+            <a:prstGeom prst="rect">
+              <a:avLst/>
+            </a:prstGeom>
+          </p:spPr>
+        </p:pic>
+        <p:sp>
+          <p:nvSpPr>
+            <p:cNvPr id="5" name="Rechteck 4"/>
+            <p:cNvSpPr/>
+            <p:nvPr/>
+          </p:nvSpPr>
+          <p:spPr bwMode="auto">
+            <a:xfrm>
+              <a:off x="4139952" y="5805264"/>
+              <a:ext cx="2328665" cy="170166"/>
+            </a:xfrm>
+            <a:prstGeom prst="rect">
+              <a:avLst/>
+            </a:prstGeom>
+            <a:solidFill>
+              <a:schemeClr val="bg1"/>
+            </a:solidFill>
+            <a:ln w="9525">
+              <a:noFill/>
+              <a:miter lim="800000"/>
+              <a:headEnd/>
+              <a:tailEnd/>
+            </a:ln>
+            <a:extLst/>
+          </p:spPr>
+          <p:txBody>
+            <a:bodyPr wrap="square" rtlCol="0" anchor="ctr">
+              <a:spAutoFit/>
+            </a:bodyPr>
+            <a:lstStyle/>
+            <a:p>
+              <a:pPr algn="ctr" eaLnBrk="1" hangingPunct="1">
+                <a:spcBef>
+                  <a:spcPct val="0"/>
+                </a:spcBef>
+                <a:buSzTx/>
+                <a:buFont typeface="Arial" charset="0"/>
+                <a:buNone/>
+              </a:pPr>
+              <a:endParaRPr lang="en-US" sz="1400" dirty="0" err="1">
+                <a:solidFill>
+                  <a:srgbClr val="7F0055"/>
+                </a:solidFill>
+                <a:latin typeface="Consolas" pitchFamily="49" charset="0"/>
+              </a:endParaRPr>
+            </a:p>
+          </p:txBody>
+        </p:sp>
+      </p:grpSp>
+      <p:pic>
+        <p:nvPicPr>
+          <p:cNvPr id="9" name="Grafik 8"/>
+          <p:cNvPicPr>
+            <a:picLocks noChangeAspect="1"/>
+          </p:cNvPicPr>
+          <p:nvPr/>
+        </p:nvPicPr>
+        <p:blipFill>
+          <a:blip r:embed="rId3"/>
+          <a:stretch>
+            <a:fillRect/>
+          </a:stretch>
+        </p:blipFill>
+        <p:spPr>
+          <a:xfrm>
+            <a:off x="5508104" y="3968750"/>
+            <a:ext cx="2707204" cy="837625"/>
+          </a:xfrm>
+          <a:prstGeom prst="rect">
+            <a:avLst/>
+          </a:prstGeom>
+        </p:spPr>
+      </p:pic>
+    </p:spTree>
+    <p:extLst>
+      <p:ext uri="{BB962C8B-B14F-4D97-AF65-F5344CB8AC3E}">
+        <p14:creationId xmlns:p14="http://schemas.microsoft.com/office/powerpoint/2010/main" val="3465569304"/>
+      </p:ext>
+    </p:extLst>
+  </p:cSld>
+  <p:clrMapOvr>
+    <a:masterClrMapping/>
+  </p:clrMapOvr>
+  <p:timing>
+    <p:tnLst>
+      <p:par>
+        <p:cTn id="1" dur="indefinite" restart="never" nodeType="tmRoot"/>
+      </p:par>
+    </p:tnLst>
+  </p:timing>
+</p:sld>
+</file>
+
+<file path=ppt/slides/slide21.xml><?xml version="1.0" encoding="utf-8"?>
+<p:sld xmlns:a="http://schemas.openxmlformats.org/drawingml/2006/main" xmlns:r="http://schemas.openxmlformats.org/officeDocument/2006/relationships" xmlns:p="http://schemas.openxmlformats.org/presentationml/2006/main">
+  <p:cSld>
+    <p:spTree>
+      <p:nvGrpSpPr>
+        <p:cNvPr id="1" name=""/>
+        <p:cNvGrpSpPr/>
+        <p:nvPr/>
+      </p:nvGrpSpPr>
+      <p:grpSpPr>
+        <a:xfrm>
+          <a:off x="0" y="0"/>
+          <a:ext cx="0" cy="0"/>
+          <a:chOff x="0" y="0"/>
+          <a:chExt cx="0" cy="0"/>
+        </a:xfrm>
+      </p:grpSpPr>
+      <p:sp>
+        <p:nvSpPr>
+          <p:cNvPr id="2" name="Titel 1"/>
+          <p:cNvSpPr>
+            <a:spLocks noGrp="1"/>
+          </p:cNvSpPr>
+          <p:nvPr>
+            <p:ph type="title"/>
+          </p:nvPr>
+        </p:nvSpPr>
+        <p:spPr/>
+        <p:txBody>
+          <a:bodyPr/>
+          <a:lstStyle/>
+          <a:p>
+            <a:pPr>
+              <a:tabLst>
+                <a:tab pos="2155825" algn="l"/>
+              </a:tabLst>
+            </a:pPr>
+            <a:r>
+              <a:rPr lang="de-DE" altLang="de-DE"/>
+              <a:t>Tag </a:t>
+            </a:r>
+            <a:r>
+              <a:rPr lang="de-DE" altLang="de-DE" smtClean="0"/>
+              <a:t>5: </a:t>
+            </a:r>
+            <a:r>
+              <a:rPr lang="en-US"/>
+              <a:t>Hinweise zur Klausur</a:t>
+            </a:r>
+          </a:p>
+        </p:txBody>
+      </p:sp>
+      <p:sp>
+        <p:nvSpPr>
+          <p:cNvPr id="3" name="Inhaltsplatzhalter 2"/>
+          <p:cNvSpPr>
+            <a:spLocks noGrp="1"/>
+          </p:cNvSpPr>
+          <p:nvPr>
+            <p:ph idx="1"/>
+          </p:nvPr>
+        </p:nvSpPr>
+        <p:spPr/>
+        <p:txBody>
+          <a:bodyPr/>
+          <a:lstStyle/>
+          <a:p>
+            <a:pPr>
+              <a:tabLst>
+                <a:tab pos="2155825" algn="l"/>
+              </a:tabLst>
+            </a:pPr>
+            <a:r>
+              <a:rPr lang="en-US" b="1"/>
+              <a:t>Hinweise zur Klausur</a:t>
+            </a:r>
+          </a:p>
+          <a:p>
+            <a:pPr lvl="1">
+              <a:tabLst>
+                <a:tab pos="2155825" algn="l"/>
+              </a:tabLst>
+            </a:pPr>
+            <a:r>
+              <a:rPr lang="en-US"/>
+              <a:t>Wir gehen davon aus, dass </a:t>
+            </a:r>
+            <a:r>
+              <a:rPr lang="en-US" b="1"/>
+              <a:t>alle nicht-optionalen Übungen </a:t>
+            </a:r>
+            <a:r>
+              <a:rPr lang="en-US" smtClean="0"/>
+              <a:t>bearbeitet </a:t>
+            </a:r>
+            <a:r>
+              <a:rPr lang="en-US"/>
+              <a:t>wurden </a:t>
+            </a:r>
+            <a:r>
+              <a:rPr lang="en-US" b="1"/>
+              <a:t>und</a:t>
+            </a:r>
+            <a:r>
+              <a:rPr lang="en-US"/>
+              <a:t> alle Folien soweit verstanden wurden.</a:t>
+            </a:r>
+          </a:p>
+          <a:p>
+            <a:pPr lvl="1">
+              <a:tabLst>
+                <a:tab pos="2155825" algn="l"/>
+              </a:tabLst>
+            </a:pPr>
+            <a:r>
+              <a:rPr lang="en-US"/>
+              <a:t>Es wird ein </a:t>
+            </a:r>
+            <a:r>
+              <a:rPr lang="en-US" b="1"/>
+              <a:t>Codehandout</a:t>
+            </a:r>
+            <a:r>
+              <a:rPr lang="en-US"/>
+              <a:t> geben, in dem für bestimmte Funktionen/Datentypen/Methoden eine Beschreibung vorliegt.</a:t>
+            </a:r>
+          </a:p>
+          <a:p>
+            <a:pPr lvl="2">
+              <a:tabLst>
+                <a:tab pos="2155825" algn="l"/>
+              </a:tabLst>
+            </a:pPr>
+            <a:r>
+              <a:rPr lang="en-US" b="1"/>
+              <a:t>NICHT </a:t>
+            </a:r>
+            <a:r>
+              <a:rPr lang="en-US"/>
+              <a:t>zu erwarten ist bspw. </a:t>
+            </a:r>
+            <a:r>
+              <a:rPr lang="en-US">
+                <a:latin typeface="Consolas" panose="020B0609020204030204" pitchFamily="49" charset="0"/>
+                <a:cs typeface="Consolas" panose="020B0609020204030204" pitchFamily="49" charset="0"/>
+              </a:rPr>
+              <a:t>std::vector&lt;T&gt;::push_back</a:t>
+            </a:r>
+          </a:p>
+          <a:p>
+            <a:pPr lvl="2">
+              <a:tabLst>
+                <a:tab pos="2155825" algn="l"/>
+              </a:tabLst>
+            </a:pPr>
+            <a:r>
+              <a:rPr lang="en-US"/>
+              <a:t>Zu erwarten ist bspw. </a:t>
+            </a:r>
+            <a:r>
+              <a:rPr lang="en-US">
+                <a:latin typeface="Consolas" panose="020B0609020204030204" pitchFamily="49" charset="0"/>
+                <a:cs typeface="Consolas" panose="020B0609020204030204" pitchFamily="49" charset="0"/>
+              </a:rPr>
+              <a:t>std::string::</a:t>
+            </a:r>
+            <a:r>
+              <a:rPr lang="en-US" smtClean="0">
+                <a:latin typeface="Consolas" panose="020B0609020204030204" pitchFamily="49" charset="0"/>
+                <a:cs typeface="Consolas" panose="020B0609020204030204" pitchFamily="49" charset="0"/>
+              </a:rPr>
+              <a:t>find</a:t>
+            </a:r>
+          </a:p>
+          <a:p>
+            <a:pPr lvl="2">
+              <a:tabLst>
+                <a:tab pos="2155825" algn="l"/>
+              </a:tabLst>
+            </a:pPr>
+            <a:r>
+              <a:rPr lang="en-US"/>
+              <a:t>Das </a:t>
+            </a:r>
+            <a:r>
+              <a:rPr lang="en-US" b="1" smtClean="0"/>
+              <a:t>Codehandout </a:t>
+            </a:r>
+            <a:r>
+              <a:rPr lang="en-US" smtClean="0"/>
+              <a:t>ist auf </a:t>
+            </a:r>
+            <a:r>
+              <a:rPr lang="en-US" b="1" smtClean="0"/>
+              <a:t>Englisch</a:t>
+            </a:r>
+            <a:r>
+              <a:rPr lang="en-US" smtClean="0"/>
+              <a:t>! (Ist das für jemanden problematisch?)</a:t>
+            </a:r>
+            <a:endParaRPr lang="en-US"/>
+          </a:p>
+          <a:p>
+            <a:endParaRPr lang="en-US"/>
+          </a:p>
+        </p:txBody>
+      </p:sp>
+    </p:spTree>
+    <p:extLst>
+      <p:ext uri="{BB962C8B-B14F-4D97-AF65-F5344CB8AC3E}">
+        <p14:creationId xmlns:p14="http://schemas.microsoft.com/office/powerpoint/2010/main" val="746502156"/>
       </p:ext>
     </p:extLst>
   </p:cSld>

</xml_diff>

<commit_message>
Bugfix in ex. 21.3
</commit_message>
<xml_diff>
--- a/2017/recap_and_warmup_slides.pptx
+++ b/2017/recap_and_warmup_slides.pptx
@@ -9523,7 +9523,7 @@
           <a:graphicData uri="http://schemas.openxmlformats.org/presentationml/2006/ole">
             <mc:AlternateContent xmlns:mc="http://schemas.openxmlformats.org/markup-compatibility/2006">
               <mc:Choice xmlns:v="urn:schemas-microsoft-com:vml" Requires="v">
-                <p:oleObj spid="_x0000_s2011" r:id="rId16" imgW="1038370" imgH="980952" progId="">
+                <p:oleObj spid="_x0000_s2012" r:id="rId16" imgW="1038370" imgH="980952" progId="">
                   <p:embed/>
                 </p:oleObj>
               </mc:Choice>
@@ -9961,7 +9961,7 @@
                 </a:lnSpc>
                 <a:defRPr/>
               </a:pPr>
-              <a:t>18.09.2017</a:t>
+              <a:t>19.09.2017</a:t>
             </a:fld>
             <a:r>
               <a:rPr lang="en-GB" altLang="de-DE" sz="1000" smtClean="0">
@@ -11284,25 +11284,6 @@
               <a:rPr lang="en-US" smtClean="0"/>
               <a:t>Block 2</a:t>
             </a:r>
-            <a:endParaRPr lang="en-US"/>
-          </a:p>
-        </p:txBody>
-      </p:sp>
-      <p:sp>
-        <p:nvSpPr>
-          <p:cNvPr id="3" name="Textplatzhalter 2"/>
-          <p:cNvSpPr>
-            <a:spLocks noGrp="1"/>
-          </p:cNvSpPr>
-          <p:nvPr>
-            <p:ph type="body" idx="1"/>
-          </p:nvPr>
-        </p:nvSpPr>
-        <p:spPr/>
-        <p:txBody>
-          <a:bodyPr/>
-          <a:lstStyle/>
-          <a:p>
             <a:endParaRPr lang="en-US"/>
           </a:p>
         </p:txBody>
@@ -13467,19 +13448,8 @@
                 <a:latin typeface="Consolas" panose="020B0609020204030204" pitchFamily="49" charset="0"/>
                 <a:cs typeface="Consolas" panose="020B0609020204030204" pitchFamily="49" charset="0"/>
               </a:rPr>
-              <a:t>&amp;iR = *iP</a:t>
-            </a:r>
-            <a:r>
-              <a:rPr lang="de-DE" altLang="de-DE" smtClean="0">
-                <a:latin typeface="Consolas" panose="020B0609020204030204" pitchFamily="49" charset="0"/>
-                <a:cs typeface="Consolas" panose="020B0609020204030204" pitchFamily="49" charset="0"/>
-              </a:rPr>
-              <a:t>;</a:t>
-            </a:r>
-            <a:endParaRPr lang="de-DE" altLang="de-DE" smtClean="0">
-              <a:latin typeface="Consolas" panose="020B0609020204030204" pitchFamily="49" charset="0"/>
-              <a:cs typeface="Consolas" panose="020B0609020204030204" pitchFamily="49" charset="0"/>
-            </a:endParaRPr>
+              <a:t>&amp;iR = *iP;</a:t>
+            </a:r>
           </a:p>
           <a:p>
             <a:pPr eaLnBrk="1" hangingPunct="1">
@@ -14099,11 +14069,7 @@
             </a:r>
             <a:r>
               <a:rPr lang="en-US"/>
-              <a:t>von .cpp-Datei -&gt; </a:t>
-            </a:r>
-            <a:r>
-              <a:rPr lang="en-US"/>
-              <a:t>Verletzung </a:t>
+              <a:t>von .cpp-Datei -&gt; Verletzung </a:t>
             </a:r>
             <a:r>
               <a:rPr lang="en-US" smtClean="0"/>
@@ -14768,25 +14734,6 @@
           </a:p>
         </p:txBody>
       </p:sp>
-      <p:sp>
-        <p:nvSpPr>
-          <p:cNvPr id="3" name="Textplatzhalter 2"/>
-          <p:cNvSpPr>
-            <a:spLocks noGrp="1"/>
-          </p:cNvSpPr>
-          <p:nvPr>
-            <p:ph type="body" idx="1"/>
-          </p:nvPr>
-        </p:nvSpPr>
-        <p:spPr/>
-        <p:txBody>
-          <a:bodyPr/>
-          <a:lstStyle/>
-          <a:p>
-            <a:endParaRPr lang="en-US"/>
-          </a:p>
-        </p:txBody>
-      </p:sp>
     </p:spTree>
     <p:extLst>
       <p:ext uri="{BB962C8B-B14F-4D97-AF65-F5344CB8AC3E}">
@@ -14985,11 +14932,7 @@
             </a:r>
             <a:r>
               <a:rPr lang="en-US" smtClean="0"/>
-              <a:t>von </a:t>
-            </a:r>
-            <a:r>
-              <a:rPr lang="en-US" smtClean="0"/>
-              <a:t>Cypress</a:t>
+              <a:t>von Cypress</a:t>
             </a:r>
             <a:r>
               <a:rPr lang="en-US" dirty="0" smtClean="0"/>

</xml_diff>

<commit_message>
Bugfixes in exs. 12 ("Exceptions") and 17 ("Functional")
</commit_message>
<xml_diff>
--- a/2017/recap_and_warmup_slides.pptx
+++ b/2017/recap_and_warmup_slides.pptx
@@ -5,10 +5,10 @@
     <p:sldMasterId id="2147483650" r:id="rId1"/>
   </p:sldMasterIdLst>
   <p:notesMasterIdLst>
-    <p:notesMasterId r:id="rId23"/>
+    <p:notesMasterId r:id="rId25"/>
   </p:notesMasterIdLst>
   <p:handoutMasterIdLst>
-    <p:handoutMasterId r:id="rId24"/>
+    <p:handoutMasterId r:id="rId26"/>
   </p:handoutMasterIdLst>
   <p:sldIdLst>
     <p:sldId id="454" r:id="rId2"/>
@@ -31,7 +31,9 @@
     <p:sldId id="491" r:id="rId19"/>
     <p:sldId id="492" r:id="rId20"/>
     <p:sldId id="493" r:id="rId21"/>
-    <p:sldId id="486" r:id="rId22"/>
+    <p:sldId id="494" r:id="rId22"/>
+    <p:sldId id="486" r:id="rId23"/>
+    <p:sldId id="495" r:id="rId24"/>
   </p:sldIdLst>
   <p:sldSz cx="9144000" cy="6858000" type="screen4x3"/>
   <p:notesSz cx="7099300" cy="10234613"/>
@@ -225,7 +227,9 @@
             <p14:sldId id="491"/>
             <p14:sldId id="492"/>
             <p14:sldId id="493"/>
+            <p14:sldId id="494"/>
             <p14:sldId id="486"/>
+            <p14:sldId id="495"/>
           </p14:sldIdLst>
         </p14:section>
       </p14:sectionLst>
@@ -9523,7 +9527,7 @@
           <a:graphicData uri="http://schemas.openxmlformats.org/presentationml/2006/ole">
             <mc:AlternateContent xmlns:mc="http://schemas.openxmlformats.org/markup-compatibility/2006">
               <mc:Choice xmlns:v="urn:schemas-microsoft-com:vml" Requires="v">
-                <p:oleObj spid="_x0000_s2012" r:id="rId16" imgW="1038370" imgH="980952" progId="">
+                <p:oleObj spid="_x0000_s2019" r:id="rId16" imgW="1038370" imgH="980952" progId="">
                   <p:embed/>
                 </p:oleObj>
               </mc:Choice>
@@ -15108,23 +15112,11 @@
           <a:bodyPr/>
           <a:lstStyle/>
           <a:p>
-            <a:pPr>
-              <a:tabLst>
-                <a:tab pos="2155825" algn="l"/>
-              </a:tabLst>
-            </a:pPr>
-            <a:r>
-              <a:rPr lang="de-DE" altLang="de-DE"/>
-              <a:t>Tag </a:t>
-            </a:r>
-            <a:r>
-              <a:rPr lang="de-DE" altLang="de-DE" smtClean="0"/>
-              <a:t>5: </a:t>
-            </a:r>
-            <a:r>
-              <a:rPr lang="en-US"/>
-              <a:t>Hinweise zur Klausur</a:t>
-            </a:r>
+            <a:r>
+              <a:rPr lang="en-US" smtClean="0"/>
+              <a:t>Tag 5: Bugfixes</a:t>
+            </a:r>
+            <a:endParaRPr lang="en-US" dirty="0"/>
           </a:p>
         </p:txBody>
       </p:sp>
@@ -15143,6 +15135,318 @@
           <a:bodyPr/>
           <a:lstStyle/>
           <a:p>
+            <a:pPr marL="342900" indent="-342900">
+              <a:buFontTx/>
+              <a:buChar char="-"/>
+            </a:pPr>
+            <a:r>
+              <a:rPr lang="en-US" b="1" smtClean="0"/>
+              <a:t>Bugfix Aufgabe 12 </a:t>
+            </a:r>
+            <a:r>
+              <a:rPr lang="en-US" smtClean="0"/>
+              <a:t>(Musterlösung)</a:t>
+            </a:r>
+          </a:p>
+          <a:p>
+            <a:pPr marL="692150" lvl="1" indent="-342900">
+              <a:buFontTx/>
+              <a:buChar char="-"/>
+            </a:pPr>
+            <a:r>
+              <a:rPr lang="en-US" smtClean="0"/>
+              <a:t>Es ist erlaubt, dengleichen Fehler-Typ mehrfach zu fangen, aber der Compiler wird eine Warnung werfen.</a:t>
+            </a:r>
+            <a:endParaRPr lang="en-US" dirty="0" smtClean="0"/>
+          </a:p>
+          <a:p>
+            <a:pPr marL="342900" indent="-342900">
+              <a:buFontTx/>
+              <a:buChar char="-"/>
+            </a:pPr>
+            <a:r>
+              <a:rPr lang="en-US" b="1" smtClean="0"/>
+              <a:t>Bugfix Aufgabe 17 </a:t>
+            </a:r>
+            <a:r>
+              <a:rPr lang="en-US" smtClean="0"/>
+              <a:t>(inkl. Musterlösung)</a:t>
+            </a:r>
+          </a:p>
+          <a:p>
+            <a:pPr marL="692150" lvl="1" indent="-342900">
+              <a:buFontTx/>
+              <a:buChar char="-"/>
+            </a:pPr>
+            <a:r>
+              <a:rPr lang="en-US" smtClean="0"/>
+              <a:t>"rechter Wert" bei der Funktion, die an reduce übergeben wird, kann jetzt beliebig sein.</a:t>
+            </a:r>
+          </a:p>
+          <a:p>
+            <a:pPr marL="692150" lvl="1" indent="-342900">
+              <a:buFontTx/>
+              <a:buChar char="-"/>
+            </a:pPr>
+            <a:endParaRPr lang="en-US"/>
+          </a:p>
+          <a:p>
+            <a:pPr marL="692150" lvl="1" indent="-342900">
+              <a:buFontTx/>
+              <a:buChar char="-"/>
+            </a:pPr>
+            <a:endParaRPr lang="en-US" smtClean="0"/>
+          </a:p>
+          <a:p>
+            <a:pPr marL="692150" lvl="1" indent="-342900">
+              <a:buFontTx/>
+              <a:buChar char="-"/>
+            </a:pPr>
+            <a:endParaRPr lang="en-US" smtClean="0"/>
+          </a:p>
+          <a:p>
+            <a:pPr marL="692150" lvl="1" indent="-342900">
+              <a:buFontTx/>
+              <a:buChar char="-"/>
+            </a:pPr>
+            <a:endParaRPr lang="en-US"/>
+          </a:p>
+          <a:p>
+            <a:pPr marL="692150" lvl="1" indent="-342900">
+              <a:buFontTx/>
+              <a:buChar char="-"/>
+            </a:pPr>
+            <a:endParaRPr lang="en-US" smtClean="0"/>
+          </a:p>
+          <a:p>
+            <a:pPr marL="342900" indent="-342900">
+              <a:buFontTx/>
+              <a:buChar char="-"/>
+            </a:pPr>
+            <a:r>
+              <a:rPr lang="en-US" b="1" smtClean="0"/>
+              <a:t>Bugfix </a:t>
+            </a:r>
+            <a:r>
+              <a:rPr lang="en-US" smtClean="0"/>
+              <a:t>in </a:t>
+            </a:r>
+            <a:r>
+              <a:rPr lang="en-US" b="1" smtClean="0"/>
+              <a:t>Aufgabe 21.3 </a:t>
+            </a:r>
+          </a:p>
+          <a:p>
+            <a:pPr marL="692150" lvl="1" indent="-342900">
+              <a:buFontTx/>
+              <a:buChar char="-"/>
+            </a:pPr>
+            <a:r>
+              <a:rPr lang="en-US" smtClean="0"/>
+              <a:t>Bitte vor der Bearbeitung pullen, sonst sieht man keinen Effekt beim Überschreiben des Nullbytes</a:t>
+            </a:r>
+            <a:endParaRPr lang="en-US" dirty="0"/>
+          </a:p>
+        </p:txBody>
+      </p:sp>
+      <p:grpSp>
+        <p:nvGrpSpPr>
+          <p:cNvPr id="7" name="Gruppieren 6"/>
+          <p:cNvGrpSpPr/>
+          <p:nvPr/>
+        </p:nvGrpSpPr>
+        <p:grpSpPr>
+          <a:xfrm>
+            <a:off x="250825" y="3429000"/>
+            <a:ext cx="8640763" cy="1657483"/>
+            <a:chOff x="250825" y="2893282"/>
+            <a:chExt cx="8640763" cy="1657483"/>
+          </a:xfrm>
+        </p:grpSpPr>
+        <p:pic>
+          <p:nvPicPr>
+            <p:cNvPr id="4" name="Grafik 3"/>
+            <p:cNvPicPr>
+              <a:picLocks noChangeAspect="1"/>
+            </p:cNvPicPr>
+            <p:nvPr/>
+          </p:nvPicPr>
+          <p:blipFill>
+            <a:blip r:embed="rId2"/>
+            <a:stretch>
+              <a:fillRect/>
+            </a:stretch>
+          </p:blipFill>
+          <p:spPr>
+            <a:xfrm>
+              <a:off x="250825" y="2893282"/>
+              <a:ext cx="8640763" cy="607726"/>
+            </a:xfrm>
+            <a:prstGeom prst="rect">
+              <a:avLst/>
+            </a:prstGeom>
+          </p:spPr>
+        </p:pic>
+        <p:pic>
+          <p:nvPicPr>
+            <p:cNvPr id="5" name="Grafik 4"/>
+            <p:cNvPicPr>
+              <a:picLocks noChangeAspect="1"/>
+            </p:cNvPicPr>
+            <p:nvPr/>
+          </p:nvPicPr>
+          <p:blipFill>
+            <a:blip r:embed="rId3"/>
+            <a:stretch>
+              <a:fillRect/>
+            </a:stretch>
+          </p:blipFill>
+          <p:spPr>
+            <a:xfrm>
+              <a:off x="250825" y="3789040"/>
+              <a:ext cx="8606351" cy="761725"/>
+            </a:xfrm>
+            <a:prstGeom prst="rect">
+              <a:avLst/>
+            </a:prstGeom>
+          </p:spPr>
+        </p:pic>
+        <p:sp>
+          <p:nvSpPr>
+            <p:cNvPr id="6" name="Pfeil nach unten 5"/>
+            <p:cNvSpPr/>
+            <p:nvPr/>
+          </p:nvSpPr>
+          <p:spPr bwMode="auto">
+            <a:xfrm>
+              <a:off x="3059832" y="3501008"/>
+              <a:ext cx="1944216" cy="288032"/>
+            </a:xfrm>
+            <a:prstGeom prst="downArrow">
+              <a:avLst/>
+            </a:prstGeom>
+            <a:solidFill>
+              <a:schemeClr val="accent2"/>
+            </a:solidFill>
+            <a:ln w="9525">
+              <a:noFill/>
+              <a:miter lim="800000"/>
+              <a:headEnd/>
+              <a:tailEnd/>
+            </a:ln>
+            <a:extLst/>
+          </p:spPr>
+          <p:txBody>
+            <a:bodyPr rtlCol="0" anchor="ctr">
+              <a:noAutofit/>
+            </a:bodyPr>
+            <a:lstStyle/>
+            <a:p>
+              <a:pPr algn="ctr" eaLnBrk="1" hangingPunct="1">
+                <a:spcBef>
+                  <a:spcPct val="0"/>
+                </a:spcBef>
+                <a:buSzTx/>
+                <a:buFont typeface="Arial" charset="0"/>
+                <a:buNone/>
+              </a:pPr>
+              <a:endParaRPr lang="en-US" sz="1400" dirty="0" err="1">
+                <a:solidFill>
+                  <a:srgbClr val="7F0055"/>
+                </a:solidFill>
+                <a:latin typeface="Consolas" pitchFamily="49" charset="0"/>
+              </a:endParaRPr>
+            </a:p>
+          </p:txBody>
+        </p:sp>
+      </p:grpSp>
+    </p:spTree>
+    <p:extLst>
+      <p:ext uri="{BB962C8B-B14F-4D97-AF65-F5344CB8AC3E}">
+        <p14:creationId xmlns:p14="http://schemas.microsoft.com/office/powerpoint/2010/main" val="4021375379"/>
+      </p:ext>
+    </p:extLst>
+  </p:cSld>
+  <p:clrMapOvr>
+    <a:masterClrMapping/>
+  </p:clrMapOvr>
+  <p:timing>
+    <p:tnLst>
+      <p:par>
+        <p:cTn id="1" dur="indefinite" restart="never" nodeType="tmRoot"/>
+      </p:par>
+    </p:tnLst>
+  </p:timing>
+</p:sld>
+</file>
+
+<file path=ppt/slides/slide22.xml><?xml version="1.0" encoding="utf-8"?>
+<p:sld xmlns:a="http://schemas.openxmlformats.org/drawingml/2006/main" xmlns:r="http://schemas.openxmlformats.org/officeDocument/2006/relationships" xmlns:p="http://schemas.openxmlformats.org/presentationml/2006/main">
+  <p:cSld>
+    <p:spTree>
+      <p:nvGrpSpPr>
+        <p:cNvPr id="1" name=""/>
+        <p:cNvGrpSpPr/>
+        <p:nvPr/>
+      </p:nvGrpSpPr>
+      <p:grpSpPr>
+        <a:xfrm>
+          <a:off x="0" y="0"/>
+          <a:ext cx="0" cy="0"/>
+          <a:chOff x="0" y="0"/>
+          <a:chExt cx="0" cy="0"/>
+        </a:xfrm>
+      </p:grpSpPr>
+      <p:sp>
+        <p:nvSpPr>
+          <p:cNvPr id="2" name="Titel 1"/>
+          <p:cNvSpPr>
+            <a:spLocks noGrp="1"/>
+          </p:cNvSpPr>
+          <p:nvPr>
+            <p:ph type="title"/>
+          </p:nvPr>
+        </p:nvSpPr>
+        <p:spPr/>
+        <p:txBody>
+          <a:bodyPr/>
+          <a:lstStyle/>
+          <a:p>
+            <a:pPr>
+              <a:tabLst>
+                <a:tab pos="2155825" algn="l"/>
+              </a:tabLst>
+            </a:pPr>
+            <a:r>
+              <a:rPr lang="de-DE" altLang="de-DE"/>
+              <a:t>Tag </a:t>
+            </a:r>
+            <a:r>
+              <a:rPr lang="de-DE" altLang="de-DE" smtClean="0"/>
+              <a:t>5: </a:t>
+            </a:r>
+            <a:r>
+              <a:rPr lang="en-US"/>
+              <a:t>Hinweise zur Klausur</a:t>
+            </a:r>
+          </a:p>
+        </p:txBody>
+      </p:sp>
+      <p:sp>
+        <p:nvSpPr>
+          <p:cNvPr id="3" name="Inhaltsplatzhalter 2"/>
+          <p:cNvSpPr>
+            <a:spLocks noGrp="1"/>
+          </p:cNvSpPr>
+          <p:nvPr>
+            <p:ph idx="1"/>
+          </p:nvPr>
+        </p:nvSpPr>
+        <p:spPr/>
+        <p:txBody>
+          <a:bodyPr/>
+          <a:lstStyle/>
+          <a:p>
             <a:pPr>
               <a:tabLst>
                 <a:tab pos="2155825" algn="l"/>
@@ -15287,6 +15591,382 @@
     <p:extLst>
       <p:ext uri="{BB962C8B-B14F-4D97-AF65-F5344CB8AC3E}">
         <p14:creationId xmlns:p14="http://schemas.microsoft.com/office/powerpoint/2010/main" val="746502156"/>
+      </p:ext>
+    </p:extLst>
+  </p:cSld>
+  <p:clrMapOvr>
+    <a:masterClrMapping/>
+  </p:clrMapOvr>
+  <p:timing>
+    <p:tnLst>
+      <p:par>
+        <p:cTn id="1" dur="indefinite" restart="never" nodeType="tmRoot"/>
+      </p:par>
+    </p:tnLst>
+  </p:timing>
+</p:sld>
+</file>
+
+<file path=ppt/slides/slide23.xml><?xml version="1.0" encoding="utf-8"?>
+<p:sld xmlns:a="http://schemas.openxmlformats.org/drawingml/2006/main" xmlns:r="http://schemas.openxmlformats.org/officeDocument/2006/relationships" xmlns:p="http://schemas.openxmlformats.org/presentationml/2006/main">
+  <p:cSld>
+    <p:spTree>
+      <p:nvGrpSpPr>
+        <p:cNvPr id="1" name=""/>
+        <p:cNvGrpSpPr/>
+        <p:nvPr/>
+      </p:nvGrpSpPr>
+      <p:grpSpPr>
+        <a:xfrm>
+          <a:off x="0" y="0"/>
+          <a:ext cx="0" cy="0"/>
+          <a:chOff x="0" y="0"/>
+          <a:chExt cx="0" cy="0"/>
+        </a:xfrm>
+      </p:grpSpPr>
+      <p:sp>
+        <p:nvSpPr>
+          <p:cNvPr id="2" name="Titel 1"/>
+          <p:cNvSpPr>
+            <a:spLocks noGrp="1"/>
+          </p:cNvSpPr>
+          <p:nvPr>
+            <p:ph type="title"/>
+          </p:nvPr>
+        </p:nvSpPr>
+        <p:spPr/>
+        <p:txBody>
+          <a:bodyPr/>
+          <a:lstStyle/>
+          <a:p>
+            <a:r>
+              <a:rPr lang="en-US" smtClean="0"/>
+              <a:t>Tag 5: Evaluation und Gastvortrag</a:t>
+            </a:r>
+            <a:endParaRPr lang="en-US" dirty="0"/>
+          </a:p>
+        </p:txBody>
+      </p:sp>
+      <p:sp>
+        <p:nvSpPr>
+          <p:cNvPr id="3" name="Inhaltsplatzhalter 2"/>
+          <p:cNvSpPr>
+            <a:spLocks noGrp="1"/>
+          </p:cNvSpPr>
+          <p:nvPr>
+            <p:ph idx="1"/>
+          </p:nvPr>
+        </p:nvSpPr>
+        <p:spPr/>
+        <p:txBody>
+          <a:bodyPr/>
+          <a:lstStyle/>
+          <a:p>
+            <a:pPr marL="342900" indent="-342900">
+              <a:buFontTx/>
+              <a:buChar char="-"/>
+            </a:pPr>
+            <a:endParaRPr lang="en-US" dirty="0" smtClean="0"/>
+          </a:p>
+          <a:p>
+            <a:pPr marL="342900" indent="-342900">
+              <a:buFontTx/>
+              <a:buChar char="-"/>
+            </a:pPr>
+            <a:r>
+              <a:rPr lang="en-US" smtClean="0"/>
+              <a:t>Fragen </a:t>
+            </a:r>
+            <a:r>
+              <a:rPr lang="en-US" dirty="0" err="1" smtClean="0"/>
+              <a:t>für</a:t>
+            </a:r>
+            <a:r>
+              <a:rPr lang="en-US" dirty="0" smtClean="0"/>
+              <a:t> die </a:t>
+            </a:r>
+            <a:r>
+              <a:rPr lang="en-US" b="1" dirty="0" smtClean="0"/>
+              <a:t>Evaluation</a:t>
+            </a:r>
+            <a:r>
+              <a:rPr lang="en-US" dirty="0" smtClean="0"/>
+              <a:t> am </a:t>
+            </a:r>
+            <a:r>
+              <a:rPr lang="en-US" dirty="0" err="1" smtClean="0"/>
+              <a:t>letzten</a:t>
+            </a:r>
+            <a:r>
+              <a:rPr lang="en-US" dirty="0" smtClean="0"/>
+              <a:t> Tag</a:t>
+            </a:r>
+          </a:p>
+          <a:p>
+            <a:pPr marL="692150" lvl="1" indent="-342900">
+              <a:buFont typeface="+mj-lt"/>
+              <a:buAutoNum type="arabicPeriod"/>
+            </a:pPr>
+            <a:r>
+              <a:rPr lang="en-US" dirty="0" err="1" smtClean="0"/>
+              <a:t>Stärkerer</a:t>
+            </a:r>
+            <a:r>
+              <a:rPr lang="en-US" dirty="0" smtClean="0"/>
+              <a:t> </a:t>
+            </a:r>
+            <a:r>
+              <a:rPr lang="en-US" dirty="0" err="1" smtClean="0"/>
+              <a:t>Fokus</a:t>
+            </a:r>
+            <a:r>
+              <a:rPr lang="en-US" dirty="0" smtClean="0"/>
+              <a:t> auf </a:t>
+            </a:r>
+            <a:r>
+              <a:rPr lang="en-US" smtClean="0"/>
+              <a:t>C++(11) legen (= weniger Fokus auf C)?</a:t>
+            </a:r>
+            <a:endParaRPr lang="en-US" dirty="0" smtClean="0"/>
+          </a:p>
+          <a:p>
+            <a:pPr marL="692150" lvl="1" indent="-342900">
+              <a:buFont typeface="+mj-lt"/>
+              <a:buAutoNum type="arabicPeriod"/>
+            </a:pPr>
+            <a:r>
+              <a:rPr lang="en-US" smtClean="0"/>
+              <a:t>Selbsteinschätzung deiner C++-Kenntnisse (1=Keine Vorkenntnisse, 3=Eigene kleinere Projekte, 5=Sehr erfahrener C++-Programmierer)</a:t>
+            </a:r>
+          </a:p>
+          <a:p>
+            <a:pPr marL="692150" lvl="1" indent="-342900">
+              <a:buFont typeface="+mj-lt"/>
+              <a:buAutoNum type="arabicPeriod"/>
+            </a:pPr>
+            <a:endParaRPr lang="en-US" dirty="0"/>
+          </a:p>
+          <a:p>
+            <a:pPr marL="342900" indent="-342900">
+              <a:buFontTx/>
+              <a:buChar char="-"/>
+            </a:pPr>
+            <a:r>
+              <a:rPr lang="en-US" b="1" dirty="0" err="1" smtClean="0"/>
+              <a:t>Gastvortrag</a:t>
+            </a:r>
+            <a:r>
+              <a:rPr lang="en-US" b="1" dirty="0" smtClean="0"/>
+              <a:t> am </a:t>
+            </a:r>
+            <a:r>
+              <a:rPr lang="en-US" b="1" dirty="0" err="1" smtClean="0"/>
+              <a:t>letzten</a:t>
+            </a:r>
+            <a:r>
+              <a:rPr lang="en-US" b="1" dirty="0" smtClean="0"/>
+              <a:t> Tag</a:t>
+            </a:r>
+            <a:r>
+              <a:rPr lang="en-US" dirty="0" smtClean="0"/>
+              <a:t>: Holger Wech </a:t>
+            </a:r>
+            <a:r>
+              <a:rPr lang="en-US" smtClean="0"/>
+              <a:t>von Cypress / Spansion</a:t>
+            </a:r>
+            <a:r>
+              <a:rPr lang="en-US" dirty="0" smtClean="0"/>
+              <a:t/>
+            </a:r>
+            <a:br>
+              <a:rPr lang="en-US" dirty="0" smtClean="0"/>
+            </a:br>
+            <a:endParaRPr lang="en-US" dirty="0"/>
+          </a:p>
+        </p:txBody>
+      </p:sp>
+      <p:grpSp>
+        <p:nvGrpSpPr>
+          <p:cNvPr id="8" name="Gruppieren 7"/>
+          <p:cNvGrpSpPr/>
+          <p:nvPr/>
+        </p:nvGrpSpPr>
+        <p:grpSpPr>
+          <a:xfrm>
+            <a:off x="1475656" y="3968750"/>
+            <a:ext cx="4992961" cy="1865682"/>
+            <a:chOff x="1475656" y="4521395"/>
+            <a:chExt cx="4992961" cy="1865682"/>
+          </a:xfrm>
+        </p:grpSpPr>
+        <p:pic>
+          <p:nvPicPr>
+            <p:cNvPr id="4" name="Grafik 3"/>
+            <p:cNvPicPr>
+              <a:picLocks noChangeAspect="1"/>
+            </p:cNvPicPr>
+            <p:nvPr/>
+          </p:nvPicPr>
+          <p:blipFill>
+            <a:blip r:embed="rId2"/>
+            <a:stretch>
+              <a:fillRect/>
+            </a:stretch>
+          </p:blipFill>
+          <p:spPr>
+            <a:xfrm>
+              <a:off x="1475656" y="4521395"/>
+              <a:ext cx="4824536" cy="1865682"/>
+            </a:xfrm>
+            <a:prstGeom prst="rect">
+              <a:avLst/>
+            </a:prstGeom>
+          </p:spPr>
+        </p:pic>
+        <p:sp>
+          <p:nvSpPr>
+            <p:cNvPr id="5" name="Rechteck 4"/>
+            <p:cNvSpPr/>
+            <p:nvPr/>
+          </p:nvSpPr>
+          <p:spPr bwMode="auto">
+            <a:xfrm>
+              <a:off x="4139952" y="5805264"/>
+              <a:ext cx="2328665" cy="170166"/>
+            </a:xfrm>
+            <a:prstGeom prst="rect">
+              <a:avLst/>
+            </a:prstGeom>
+            <a:solidFill>
+              <a:schemeClr val="bg1"/>
+            </a:solidFill>
+            <a:ln w="9525">
+              <a:noFill/>
+              <a:miter lim="800000"/>
+              <a:headEnd/>
+              <a:tailEnd/>
+            </a:ln>
+            <a:extLst/>
+          </p:spPr>
+          <p:txBody>
+            <a:bodyPr wrap="square" rtlCol="0" anchor="ctr">
+              <a:spAutoFit/>
+            </a:bodyPr>
+            <a:lstStyle/>
+            <a:p>
+              <a:pPr algn="ctr" eaLnBrk="1" hangingPunct="1">
+                <a:spcBef>
+                  <a:spcPct val="0"/>
+                </a:spcBef>
+                <a:buSzTx/>
+                <a:buFont typeface="Arial" charset="0"/>
+                <a:buNone/>
+              </a:pPr>
+              <a:endParaRPr lang="en-US" sz="1400" dirty="0" err="1">
+                <a:solidFill>
+                  <a:srgbClr val="7F0055"/>
+                </a:solidFill>
+                <a:latin typeface="Consolas" pitchFamily="49" charset="0"/>
+              </a:endParaRPr>
+            </a:p>
+          </p:txBody>
+        </p:sp>
+      </p:grpSp>
+      <p:sp>
+        <p:nvSpPr>
+          <p:cNvPr id="6" name="Abgerundete rechteckige Legende 5"/>
+          <p:cNvSpPr/>
+          <p:nvPr/>
+        </p:nvSpPr>
+        <p:spPr bwMode="auto">
+          <a:xfrm>
+            <a:off x="6300887" y="3995018"/>
+            <a:ext cx="2448272" cy="672241"/>
+          </a:xfrm>
+          <a:prstGeom prst="wedgeRoundRectCallout">
+            <a:avLst>
+              <a:gd name="adj1" fmla="val -64124"/>
+              <a:gd name="adj2" fmla="val 39314"/>
+              <a:gd name="adj3" fmla="val 16667"/>
+            </a:avLst>
+          </a:prstGeom>
+          <a:ln>
+            <a:headEnd/>
+            <a:tailEnd/>
+          </a:ln>
+          <a:extLst/>
+        </p:spPr>
+        <p:style>
+          <a:lnRef idx="2">
+            <a:schemeClr val="dk1">
+              <a:shade val="50000"/>
+            </a:schemeClr>
+          </a:lnRef>
+          <a:fillRef idx="1">
+            <a:schemeClr val="dk1"/>
+          </a:fillRef>
+          <a:effectRef idx="0">
+            <a:schemeClr val="dk1"/>
+          </a:effectRef>
+          <a:fontRef idx="minor">
+            <a:schemeClr val="lt1"/>
+          </a:fontRef>
+        </p:style>
+        <p:txBody>
+          <a:bodyPr rtlCol="0" anchor="ctr">
+            <a:spAutoFit/>
+          </a:bodyPr>
+          <a:lstStyle/>
+          <a:p>
+            <a:pPr algn="ctr" eaLnBrk="1" hangingPunct="1">
+              <a:spcBef>
+                <a:spcPct val="0"/>
+              </a:spcBef>
+              <a:buSzTx/>
+              <a:buFont typeface="Arial" charset="0"/>
+              <a:buNone/>
+            </a:pPr>
+            <a:r>
+              <a:rPr lang="en-US" smtClean="0">
+                <a:solidFill>
+                  <a:schemeClr val="bg1"/>
+                </a:solidFill>
+                <a:latin typeface="+mj-lt"/>
+              </a:rPr>
+              <a:t>Wir starten </a:t>
+            </a:r>
+            <a:r>
+              <a:rPr lang="en-US" b="1" smtClean="0">
+                <a:solidFill>
+                  <a:schemeClr val="bg1"/>
+                </a:solidFill>
+                <a:latin typeface="+mj-lt"/>
+              </a:rPr>
+              <a:t>pünktlich</a:t>
+            </a:r>
+            <a:r>
+              <a:rPr lang="en-US" smtClean="0">
+                <a:solidFill>
+                  <a:schemeClr val="bg1"/>
+                </a:solidFill>
+                <a:latin typeface="+mj-lt"/>
+              </a:rPr>
+              <a:t> um 9 Uhr</a:t>
+            </a:r>
+            <a:endParaRPr lang="en-US" dirty="0" err="1">
+              <a:solidFill>
+                <a:schemeClr val="bg1"/>
+              </a:solidFill>
+              <a:latin typeface="+mj-lt"/>
+            </a:endParaRPr>
+          </a:p>
+        </p:txBody>
+      </p:sp>
+    </p:spTree>
+    <p:extLst>
+      <p:ext uri="{BB962C8B-B14F-4D97-AF65-F5344CB8AC3E}">
+        <p14:creationId xmlns:p14="http://schemas.microsoft.com/office/powerpoint/2010/main" val="1965795303"/>
       </p:ext>
     </p:extLst>
   </p:cSld>

</xml_diff>

<commit_message>
Several bugfixes (Ex. 20.1, 21.3; slides 218/223/228; see changelog.md)
</commit_message>
<xml_diff>
--- a/2017/recap_and_warmup_slides.pptx
+++ b/2017/recap_and_warmup_slides.pptx
@@ -5,10 +5,10 @@
     <p:sldMasterId id="2147483650" r:id="rId1"/>
   </p:sldMasterIdLst>
   <p:notesMasterIdLst>
-    <p:notesMasterId r:id="rId25"/>
+    <p:notesMasterId r:id="rId26"/>
   </p:notesMasterIdLst>
   <p:handoutMasterIdLst>
-    <p:handoutMasterId r:id="rId26"/>
+    <p:handoutMasterId r:id="rId27"/>
   </p:handoutMasterIdLst>
   <p:sldIdLst>
     <p:sldId id="454" r:id="rId2"/>
@@ -34,6 +34,7 @@
     <p:sldId id="494" r:id="rId22"/>
     <p:sldId id="486" r:id="rId23"/>
     <p:sldId id="495" r:id="rId24"/>
+    <p:sldId id="496" r:id="rId25"/>
   </p:sldIdLst>
   <p:sldSz cx="9144000" cy="6858000" type="screen4x3"/>
   <p:notesSz cx="7099300" cy="10234613"/>
@@ -230,6 +231,7 @@
             <p14:sldId id="494"/>
             <p14:sldId id="486"/>
             <p14:sldId id="495"/>
+            <p14:sldId id="496"/>
           </p14:sldIdLst>
         </p14:section>
       </p14:sectionLst>
@@ -9527,7 +9529,7 @@
           <a:graphicData uri="http://schemas.openxmlformats.org/presentationml/2006/ole">
             <mc:AlternateContent xmlns:mc="http://schemas.openxmlformats.org/markup-compatibility/2006">
               <mc:Choice xmlns:v="urn:schemas-microsoft-com:vml" Requires="v">
-                <p:oleObj spid="_x0000_s2019" r:id="rId16" imgW="1038370" imgH="980952" progId="">
+                <p:oleObj spid="_x0000_s2027" r:id="rId16" imgW="1038370" imgH="980952" progId="">
                   <p:embed/>
                 </p:oleObj>
               </mc:Choice>
@@ -9965,7 +9967,7 @@
                 </a:lnSpc>
                 <a:defRPr/>
               </a:pPr>
-              <a:t>19.09.2017</a:t>
+              <a:t>20.09.2017</a:t>
             </a:fld>
             <a:r>
               <a:rPr lang="en-GB" altLang="de-DE" sz="1000" smtClean="0">
@@ -15155,7 +15157,15 @@
             </a:pPr>
             <a:r>
               <a:rPr lang="en-US" smtClean="0"/>
-              <a:t>Es ist erlaubt, dengleichen Fehler-Typ mehrfach zu fangen, aber der Compiler wird eine Warnung werfen.</a:t>
+              <a:t>Es </a:t>
+            </a:r>
+            <a:r>
+              <a:rPr lang="en-US" b="1" smtClean="0"/>
+              <a:t>ist erlaubt</a:t>
+            </a:r>
+            <a:r>
+              <a:rPr lang="en-US" smtClean="0"/>
+              <a:t>, dengleichen Fehler-Typ mehrfach zu fangen, aber der Compiler wird eine Warnung werfen.</a:t>
             </a:r>
             <a:endParaRPr lang="en-US" dirty="0" smtClean="0"/>
           </a:p>
@@ -15360,6 +15370,118 @@
           </p:txBody>
         </p:sp>
       </p:grpSp>
+      <p:sp>
+        <p:nvSpPr>
+          <p:cNvPr id="8" name="Rechteck 7"/>
+          <p:cNvSpPr/>
+          <p:nvPr/>
+        </p:nvSpPr>
+        <p:spPr bwMode="auto">
+          <a:xfrm>
+            <a:off x="4427984" y="4324758"/>
+            <a:ext cx="1440160" cy="328378"/>
+          </a:xfrm>
+          <a:prstGeom prst="rect">
+            <a:avLst/>
+          </a:prstGeom>
+          <a:noFill/>
+          <a:ln w="9525">
+            <a:solidFill>
+              <a:srgbClr val="000000"/>
+            </a:solidFill>
+            <a:miter lim="800000"/>
+            <a:headEnd/>
+            <a:tailEnd/>
+          </a:ln>
+          <a:extLst>
+            <a:ext uri="{909E8E84-426E-40DD-AFC4-6F175D3DCCD1}">
+              <a14:hiddenFill xmlns:a14="http://schemas.microsoft.com/office/drawing/2010/main">
+                <a:solidFill>
+                  <a:srgbClr val="FFFFFF"/>
+                </a:solidFill>
+              </a14:hiddenFill>
+            </a:ext>
+          </a:extLst>
+        </p:spPr>
+        <p:txBody>
+          <a:bodyPr rtlCol="0" anchor="ctr">
+            <a:spAutoFit/>
+          </a:bodyPr>
+          <a:lstStyle/>
+          <a:p>
+            <a:pPr algn="ctr" eaLnBrk="1" hangingPunct="1">
+              <a:spcBef>
+                <a:spcPct val="0"/>
+              </a:spcBef>
+              <a:buSzTx/>
+              <a:buFont typeface="Arial" charset="0"/>
+              <a:buNone/>
+            </a:pPr>
+            <a:endParaRPr lang="en-US" sz="1400" dirty="0" err="1">
+              <a:solidFill>
+                <a:srgbClr val="7F0055"/>
+              </a:solidFill>
+              <a:latin typeface="Consolas" pitchFamily="49" charset="0"/>
+            </a:endParaRPr>
+          </a:p>
+        </p:txBody>
+      </p:sp>
+      <p:sp>
+        <p:nvSpPr>
+          <p:cNvPr id="9" name="Rechteck 8"/>
+          <p:cNvSpPr/>
+          <p:nvPr/>
+        </p:nvSpPr>
+        <p:spPr bwMode="auto">
+          <a:xfrm>
+            <a:off x="7812360" y="4616244"/>
+            <a:ext cx="1044816" cy="328378"/>
+          </a:xfrm>
+          <a:prstGeom prst="rect">
+            <a:avLst/>
+          </a:prstGeom>
+          <a:noFill/>
+          <a:ln w="9525">
+            <a:solidFill>
+              <a:srgbClr val="000000"/>
+            </a:solidFill>
+            <a:miter lim="800000"/>
+            <a:headEnd/>
+            <a:tailEnd/>
+          </a:ln>
+          <a:extLst>
+            <a:ext uri="{909E8E84-426E-40DD-AFC4-6F175D3DCCD1}">
+              <a14:hiddenFill xmlns:a14="http://schemas.microsoft.com/office/drawing/2010/main">
+                <a:solidFill>
+                  <a:srgbClr val="FFFFFF"/>
+                </a:solidFill>
+              </a14:hiddenFill>
+            </a:ext>
+          </a:extLst>
+        </p:spPr>
+        <p:txBody>
+          <a:bodyPr rtlCol="0" anchor="ctr">
+            <a:spAutoFit/>
+          </a:bodyPr>
+          <a:lstStyle/>
+          <a:p>
+            <a:pPr algn="ctr" eaLnBrk="1" hangingPunct="1">
+              <a:spcBef>
+                <a:spcPct val="0"/>
+              </a:spcBef>
+              <a:buSzTx/>
+              <a:buFont typeface="Arial" charset="0"/>
+              <a:buNone/>
+            </a:pPr>
+            <a:endParaRPr lang="en-US" sz="1400" dirty="0" err="1">
+              <a:solidFill>
+                <a:srgbClr val="7F0055"/>
+              </a:solidFill>
+              <a:latin typeface="Consolas" pitchFamily="49" charset="0"/>
+            </a:endParaRPr>
+          </a:p>
+        </p:txBody>
+      </p:sp>
     </p:spTree>
     <p:extLst>
       <p:ext uri="{BB962C8B-B14F-4D97-AF65-F5344CB8AC3E}">
@@ -15578,7 +15700,59 @@
             </a:r>
             <a:r>
               <a:rPr lang="en-US" smtClean="0"/>
-              <a:t>! (Ist das für jemanden problematisch?)</a:t>
+              <a:t>! (Ist das für jemanden problematisch</a:t>
+            </a:r>
+            <a:r>
+              <a:rPr lang="en-US" smtClean="0"/>
+              <a:t>?)</a:t>
+            </a:r>
+          </a:p>
+          <a:p>
+            <a:pPr lvl="1">
+              <a:tabLst>
+                <a:tab pos="2155825" algn="l"/>
+              </a:tabLst>
+            </a:pPr>
+            <a:r>
+              <a:rPr lang="en-US" b="1"/>
+              <a:t>Musterklausur </a:t>
+            </a:r>
+            <a:r>
+              <a:rPr lang="en-US" b="1" smtClean="0"/>
+              <a:t>(ohne Lösung) </a:t>
+            </a:r>
+            <a:r>
+              <a:rPr lang="en-US" smtClean="0"/>
+              <a:t>ist </a:t>
+            </a:r>
+            <a:r>
+              <a:rPr lang="en-US"/>
+              <a:t>online auf der FG-Veranstaltungsseite:</a:t>
+            </a:r>
+            <a:br>
+              <a:rPr lang="en-US"/>
+            </a:br>
+            <a:r>
+              <a:rPr lang="en-US">
+                <a:hlinkClick r:id="rId2"/>
+              </a:rPr>
+              <a:t>http://</a:t>
+            </a:r>
+            <a:r>
+              <a:rPr lang="en-US">
+                <a:hlinkClick r:id="rId2"/>
+              </a:rPr>
+              <a:t>www.es.tu-darmstadt.de/lehre/aktuelle-veranstaltungen/c-und-c-p</a:t>
+            </a:r>
+            <a:r>
+              <a:rPr lang="en-US" smtClean="0">
+                <a:hlinkClick r:id="rId2"/>
+              </a:rPr>
+              <a:t>/</a:t>
+            </a:r>
+            <a:r>
+              <a:rPr lang="en-US" smtClean="0"/>
+              <a:t> </a:t>
             </a:r>
             <a:endParaRPr lang="en-US"/>
           </a:p>
@@ -15703,17 +15877,12 @@
             </a:r>
           </a:p>
           <a:p>
-            <a:pPr marL="692150" lvl="1" indent="-342900">
-              <a:buFont typeface="+mj-lt"/>
-              <a:buAutoNum type="arabicPeriod"/>
+            <a:pPr lvl="1" indent="0">
+              <a:buNone/>
             </a:pPr>
             <a:r>
-              <a:rPr lang="en-US" dirty="0" err="1" smtClean="0"/>
-              <a:t>Stärkerer</a:t>
-            </a:r>
-            <a:r>
-              <a:rPr lang="en-US" dirty="0" smtClean="0"/>
-              <a:t> </a:t>
+              <a:rPr lang="en-US" smtClean="0"/>
+              <a:t>5.1 	Stärkerer </a:t>
             </a:r>
             <a:r>
               <a:rPr lang="en-US" dirty="0" err="1" smtClean="0"/>
@@ -15725,18 +15894,55 @@
             </a:r>
             <a:r>
               <a:rPr lang="en-US" smtClean="0"/>
-              <a:t>C++(11) legen (= weniger Fokus auf C)?</a:t>
-            </a:r>
-            <a:endParaRPr lang="en-US" dirty="0" smtClean="0"/>
-          </a:p>
-          <a:p>
-            <a:pPr marL="692150" lvl="1" indent="-342900">
-              <a:buFont typeface="+mj-lt"/>
-              <a:buAutoNum type="arabicPeriod"/>
+              <a:t>C++(11) legen (= weniger Fokus auf C</a:t>
+            </a:r>
+            <a:r>
+              <a:rPr lang="en-US" smtClean="0"/>
+              <a:t>)?</a:t>
+            </a:r>
+            <a:endParaRPr lang="en-US" dirty="0"/>
+          </a:p>
+          <a:p>
+            <a:pPr lvl="1" indent="0">
+              <a:buNone/>
             </a:pPr>
             <a:r>
               <a:rPr lang="en-US" smtClean="0"/>
-              <a:t>Selbsteinschätzung deiner C++-Kenntnisse (1=Keine Vorkenntnisse, 3=Eigene kleinere Projekte, 5=Sehr erfahrener C++-Programmierer)</a:t>
+              <a:t>5.2 	Selbsteinschätzung </a:t>
+            </a:r>
+            <a:r>
+              <a:rPr lang="en-US" smtClean="0"/>
+              <a:t>deiner C++-Kenntnisse </a:t>
+            </a:r>
+            <a:r>
+              <a:rPr lang="en-US" smtClean="0"/>
+              <a:t/>
+            </a:r>
+            <a:br>
+              <a:rPr lang="en-US" smtClean="0"/>
+            </a:br>
+            <a:r>
+              <a:rPr lang="en-US" smtClean="0"/>
+              <a:t>	(</a:t>
+            </a:r>
+            <a:r>
+              <a:rPr lang="en-US" smtClean="0"/>
+              <a:t>1=Keine Vorkenntnisse, 3=Eigene kleinere Projekte, </a:t>
+            </a:r>
+            <a:r>
+              <a:rPr lang="en-US" smtClean="0"/>
+              <a:t/>
+            </a:r>
+            <a:br>
+              <a:rPr lang="en-US" smtClean="0"/>
+            </a:br>
+            <a:r>
+              <a:rPr lang="en-US" smtClean="0"/>
+              <a:t>	 5=Sehr </a:t>
+            </a:r>
+            <a:r>
+              <a:rPr lang="en-US" smtClean="0"/>
+              <a:t>erfahrener C++-Programmierer)</a:t>
             </a:r>
           </a:p>
           <a:p>
@@ -15794,7 +16000,7 @@
         </p:nvGrpSpPr>
         <p:grpSpPr>
           <a:xfrm>
-            <a:off x="1475656" y="3968750"/>
+            <a:off x="1475656" y="4266828"/>
             <a:ext cx="4992961" cy="1865682"/>
             <a:chOff x="1475656" y="4521395"/>
             <a:chExt cx="4992961" cy="1865682"/>
@@ -15881,7 +16087,7 @@
         </p:nvSpPr>
         <p:spPr bwMode="auto">
           <a:xfrm>
-            <a:off x="6300887" y="3995018"/>
+            <a:off x="6300887" y="4293096"/>
             <a:ext cx="2448272" cy="672241"/>
           </a:xfrm>
           <a:prstGeom prst="wedgeRoundRectCallout">
@@ -15967,6 +16173,236 @@
     <p:extLst>
       <p:ext uri="{BB962C8B-B14F-4D97-AF65-F5344CB8AC3E}">
         <p14:creationId xmlns:p14="http://schemas.microsoft.com/office/powerpoint/2010/main" val="1965795303"/>
+      </p:ext>
+    </p:extLst>
+  </p:cSld>
+  <p:clrMapOvr>
+    <a:masterClrMapping/>
+  </p:clrMapOvr>
+  <p:timing>
+    <p:tnLst>
+      <p:par>
+        <p:cTn id="1" dur="indefinite" restart="never" nodeType="tmRoot"/>
+      </p:par>
+    </p:tnLst>
+  </p:timing>
+</p:sld>
+</file>
+
+<file path=ppt/slides/slide24.xml><?xml version="1.0" encoding="utf-8"?>
+<p:sld xmlns:a="http://schemas.openxmlformats.org/drawingml/2006/main" xmlns:r="http://schemas.openxmlformats.org/officeDocument/2006/relationships" xmlns:p="http://schemas.openxmlformats.org/presentationml/2006/main">
+  <p:cSld>
+    <p:spTree>
+      <p:nvGrpSpPr>
+        <p:cNvPr id="1" name=""/>
+        <p:cNvGrpSpPr/>
+        <p:nvPr/>
+      </p:nvGrpSpPr>
+      <p:grpSpPr>
+        <a:xfrm>
+          <a:off x="0" y="0"/>
+          <a:ext cx="0" cy="0"/>
+          <a:chOff x="0" y="0"/>
+          <a:chExt cx="0" cy="0"/>
+        </a:xfrm>
+      </p:grpSpPr>
+      <p:sp>
+        <p:nvSpPr>
+          <p:cNvPr id="2" name="Titel 1"/>
+          <p:cNvSpPr>
+            <a:spLocks noGrp="1"/>
+          </p:cNvSpPr>
+          <p:nvPr>
+            <p:ph type="title"/>
+          </p:nvPr>
+        </p:nvSpPr>
+        <p:spPr/>
+        <p:txBody>
+          <a:bodyPr/>
+          <a:lstStyle/>
+          <a:p>
+            <a:r>
+              <a:rPr lang="en-US" smtClean="0"/>
+              <a:t>Tag </a:t>
+            </a:r>
+            <a:r>
+              <a:rPr lang="en-US" smtClean="0"/>
+              <a:t>5-Nachmittag: Bugfixes</a:t>
+            </a:r>
+            <a:endParaRPr lang="en-US" dirty="0"/>
+          </a:p>
+        </p:txBody>
+      </p:sp>
+      <p:sp>
+        <p:nvSpPr>
+          <p:cNvPr id="3" name="Inhaltsplatzhalter 2"/>
+          <p:cNvSpPr>
+            <a:spLocks noGrp="1"/>
+          </p:cNvSpPr>
+          <p:nvPr>
+            <p:ph idx="1"/>
+          </p:nvPr>
+        </p:nvSpPr>
+        <p:spPr/>
+        <p:txBody>
+          <a:bodyPr/>
+          <a:lstStyle/>
+          <a:p>
+            <a:pPr marL="342900" indent="-342900">
+              <a:buFontTx/>
+              <a:buChar char="-"/>
+            </a:pPr>
+            <a:r>
+              <a:rPr lang="en-US" b="1" smtClean="0"/>
+              <a:t>Folien</a:t>
+            </a:r>
+          </a:p>
+          <a:p>
+            <a:pPr marL="692150" lvl="1" indent="-342900">
+              <a:buFontTx/>
+              <a:buChar char="-"/>
+            </a:pPr>
+            <a:r>
+              <a:rPr lang="en-US" b="1" smtClean="0"/>
+              <a:t>223</a:t>
+            </a:r>
+            <a:r>
+              <a:rPr lang="en-US" smtClean="0"/>
+              <a:t>: Bitmaske und Werte sollten jetzt gefixt sein</a:t>
+            </a:r>
+          </a:p>
+          <a:p>
+            <a:pPr marL="692150" lvl="1" indent="-342900">
+              <a:buFontTx/>
+              <a:buChar char="-"/>
+            </a:pPr>
+            <a:r>
+              <a:rPr lang="en-US" b="1" smtClean="0"/>
+              <a:t>228</a:t>
+            </a:r>
+            <a:r>
+              <a:rPr lang="en-US" smtClean="0"/>
+              <a:t>: "RAM" </a:t>
+            </a:r>
+            <a:r>
+              <a:rPr lang="en-US" smtClean="0">
+                <a:sym typeface="Wingdings" panose="05000000000000000000" pitchFamily="2" charset="2"/>
+              </a:rPr>
+              <a:t> "Adressraum"</a:t>
+            </a:r>
+          </a:p>
+          <a:p>
+            <a:pPr marL="692150" lvl="1" indent="-342900">
+              <a:buFontTx/>
+              <a:buChar char="-"/>
+            </a:pPr>
+            <a:endParaRPr lang="en-US" smtClean="0">
+              <a:sym typeface="Wingdings" panose="05000000000000000000" pitchFamily="2" charset="2"/>
+            </a:endParaRPr>
+          </a:p>
+          <a:p>
+            <a:pPr marL="342900" indent="-342900">
+              <a:buFontTx/>
+              <a:buChar char="-"/>
+            </a:pPr>
+            <a:r>
+              <a:rPr lang="en-US" b="1" smtClean="0">
+                <a:sym typeface="Wingdings" panose="05000000000000000000" pitchFamily="2" charset="2"/>
+              </a:rPr>
+              <a:t>Aufgaben</a:t>
+            </a:r>
+          </a:p>
+          <a:p>
+            <a:pPr marL="692150" lvl="1" indent="-342900">
+              <a:buFontTx/>
+              <a:buChar char="-"/>
+            </a:pPr>
+            <a:r>
+              <a:rPr lang="en-US" b="1" smtClean="0">
+                <a:sym typeface="Wingdings" panose="05000000000000000000" pitchFamily="2" charset="2"/>
+              </a:rPr>
+              <a:t>20.1 ("Makefiles")</a:t>
+            </a:r>
+            <a:r>
+              <a:rPr lang="en-US" smtClean="0">
+                <a:sym typeface="Wingdings" panose="05000000000000000000" pitchFamily="2" charset="2"/>
+              </a:rPr>
+              <a:t>: Man muss den Standardpfad zur </a:t>
+            </a:r>
+            <a:r>
+              <a:rPr lang="en-US" i="1" smtClean="0">
+                <a:sym typeface="Wingdings" panose="05000000000000000000" pitchFamily="2" charset="2"/>
+              </a:rPr>
+              <a:t>main.exe</a:t>
+            </a:r>
+            <a:r>
+              <a:rPr lang="en-US" smtClean="0">
+                <a:sym typeface="Wingdings" panose="05000000000000000000" pitchFamily="2" charset="2"/>
+              </a:rPr>
+              <a:t> ändern (oder alle Ziele mit dem Präfix "build/" versehen).</a:t>
+            </a:r>
+          </a:p>
+          <a:p>
+            <a:pPr marL="692150" lvl="1" indent="-342900">
+              <a:buFontTx/>
+              <a:buChar char="-"/>
+            </a:pPr>
+            <a:r>
+              <a:rPr lang="en-US" b="1" smtClean="0">
+                <a:sym typeface="Wingdings" panose="05000000000000000000" pitchFamily="2" charset="2"/>
+              </a:rPr>
+              <a:t>21.3</a:t>
+            </a:r>
+            <a:r>
+              <a:rPr lang="en-US" smtClean="0">
+                <a:sym typeface="Wingdings" panose="05000000000000000000" pitchFamily="2" charset="2"/>
+              </a:rPr>
+              <a:t> </a:t>
+            </a:r>
+            <a:r>
+              <a:rPr lang="en-US" b="1" smtClean="0">
+                <a:sym typeface="Wingdings" panose="05000000000000000000" pitchFamily="2" charset="2"/>
+              </a:rPr>
+              <a:t>("C vs. C++")</a:t>
+            </a:r>
+            <a:r>
+              <a:rPr lang="en-US" smtClean="0">
+                <a:sym typeface="Wingdings" panose="05000000000000000000" pitchFamily="2" charset="2"/>
+              </a:rPr>
+              <a:t>: Um das Nullbyte zu überschreiben, muss man auf </a:t>
+            </a:r>
+            <a:r>
+              <a:rPr lang="en-US" b="1" smtClean="0">
+                <a:sym typeface="Wingdings" panose="05000000000000000000" pitchFamily="2" charset="2"/>
+              </a:rPr>
+              <a:t>buffer[7]</a:t>
+            </a:r>
+            <a:r>
+              <a:rPr lang="en-US" smtClean="0">
+                <a:sym typeface="Wingdings" panose="05000000000000000000" pitchFamily="2" charset="2"/>
+              </a:rPr>
+              <a:t> oder </a:t>
+            </a:r>
+            <a:r>
+              <a:rPr lang="en-US" b="1" smtClean="0">
+                <a:sym typeface="Wingdings" panose="05000000000000000000" pitchFamily="2" charset="2"/>
+              </a:rPr>
+              <a:t>buffer[strlen(buffer)]</a:t>
+            </a:r>
+            <a:r>
+              <a:rPr lang="en-US" smtClean="0">
+                <a:sym typeface="Wingdings" panose="05000000000000000000" pitchFamily="2" charset="2"/>
+              </a:rPr>
+              <a:t> zugreifen.</a:t>
+            </a:r>
+            <a:endParaRPr lang="en-US" dirty="0"/>
+          </a:p>
+        </p:txBody>
+      </p:sp>
+    </p:spTree>
+    <p:extLst>
+      <p:ext uri="{BB962C8B-B14F-4D97-AF65-F5344CB8AC3E}">
+        <p14:creationId xmlns:p14="http://schemas.microsoft.com/office/powerpoint/2010/main" val="3140505883"/>
       </p:ext>
     </p:extLst>
   </p:cSld>

</xml_diff>

<commit_message>
Missing wildcard operator in Ex. 20
</commit_message>
<xml_diff>
--- a/2017/recap_and_warmup_slides.pptx
+++ b/2017/recap_and_warmup_slides.pptx
@@ -9529,7 +9529,7 @@
           <a:graphicData uri="http://schemas.openxmlformats.org/presentationml/2006/ole">
             <mc:AlternateContent xmlns:mc="http://schemas.openxmlformats.org/markup-compatibility/2006">
               <mc:Choice xmlns:v="urn:schemas-microsoft-com:vml" Requires="v">
-                <p:oleObj spid="_x0000_s2027" r:id="rId16" imgW="1038370" imgH="980952" progId="">
+                <p:oleObj spid="_x0000_s2028" r:id="rId16" imgW="1038370" imgH="980952" progId="">
                   <p:embed/>
                 </p:oleObj>
               </mc:Choice>
@@ -15700,11 +15700,7 @@
             </a:r>
             <a:r>
               <a:rPr lang="en-US" smtClean="0"/>
-              <a:t>! (Ist das für jemanden problematisch</a:t>
-            </a:r>
-            <a:r>
-              <a:rPr lang="en-US" smtClean="0"/>
-              <a:t>?)</a:t>
+              <a:t>! (Ist das für jemanden problematisch?)</a:t>
             </a:r>
           </a:p>
           <a:p>
@@ -15736,13 +15732,7 @@
               <a:rPr lang="en-US">
                 <a:hlinkClick r:id="rId2"/>
               </a:rPr>
-              <a:t>http://</a:t>
-            </a:r>
-            <a:r>
-              <a:rPr lang="en-US">
-                <a:hlinkClick r:id="rId2"/>
-              </a:rPr>
-              <a:t>www.es.tu-darmstadt.de/lehre/aktuelle-veranstaltungen/c-und-c-p</a:t>
+              <a:t>http://www.es.tu-darmstadt.de/lehre/aktuelle-veranstaltungen/c-und-c-p</a:t>
             </a:r>
             <a:r>
               <a:rPr lang="en-US" smtClean="0">
@@ -15894,11 +15884,7 @@
             </a:r>
             <a:r>
               <a:rPr lang="en-US" smtClean="0"/>
-              <a:t>C++(11) legen (= weniger Fokus auf C</a:t>
-            </a:r>
-            <a:r>
-              <a:rPr lang="en-US" smtClean="0"/>
-              <a:t>)?</a:t>
+              <a:t>C++(11) legen (= weniger Fokus auf C)?</a:t>
             </a:r>
             <a:endParaRPr lang="en-US" dirty="0"/>
           </a:p>
@@ -15908,41 +15894,21 @@
             </a:pPr>
             <a:r>
               <a:rPr lang="en-US" smtClean="0"/>
-              <a:t>5.2 	Selbsteinschätzung </a:t>
-            </a:r>
-            <a:r>
-              <a:rPr lang="en-US" smtClean="0"/>
-              <a:t>deiner C++-Kenntnisse </a:t>
-            </a:r>
-            <a:r>
-              <a:rPr lang="en-US" smtClean="0"/>
-              <a:t/>
+              <a:t>5.2 	Selbsteinschätzung deiner C++-Kenntnisse </a:t>
             </a:r>
             <a:br>
               <a:rPr lang="en-US" smtClean="0"/>
             </a:br>
             <a:r>
               <a:rPr lang="en-US" smtClean="0"/>
-              <a:t>	(</a:t>
-            </a:r>
-            <a:r>
-              <a:rPr lang="en-US" smtClean="0"/>
-              <a:t>1=Keine Vorkenntnisse, 3=Eigene kleinere Projekte, </a:t>
-            </a:r>
-            <a:r>
-              <a:rPr lang="en-US" smtClean="0"/>
-              <a:t/>
+              <a:t>	(1=Keine Vorkenntnisse, 3=Eigene kleinere Projekte, </a:t>
             </a:r>
             <a:br>
               <a:rPr lang="en-US" smtClean="0"/>
             </a:br>
             <a:r>
               <a:rPr lang="en-US" smtClean="0"/>
-              <a:t>	 5=Sehr </a:t>
-            </a:r>
-            <a:r>
-              <a:rPr lang="en-US" smtClean="0"/>
-              <a:t>erfahrener C++-Programmierer)</a:t>
+              <a:t>	 5=Sehr erfahrener C++-Programmierer)</a:t>
             </a:r>
           </a:p>
           <a:p>
@@ -16223,11 +16189,7 @@
           <a:p>
             <a:r>
               <a:rPr lang="en-US" smtClean="0"/>
-              <a:t>Tag </a:t>
-            </a:r>
-            <a:r>
-              <a:rPr lang="en-US" smtClean="0"/>
-              <a:t>5-Nachmittag: Bugfixes</a:t>
+              <a:t>Tag 5-Nachmittag: Bugfixes</a:t>
             </a:r>
             <a:endParaRPr lang="en-US" dirty="0"/>
           </a:p>
@@ -16339,8 +16301,53 @@
               <a:rPr lang="en-US" smtClean="0">
                 <a:sym typeface="Wingdings" panose="05000000000000000000" pitchFamily="2" charset="2"/>
               </a:rPr>
-              <a:t> ändern (oder alle Ziele mit dem Präfix "build/" versehen).</a:t>
-            </a:r>
+              <a:t> ändern (oder alle Ziele mit dem Präfix "build/" versehen</a:t>
+            </a:r>
+            <a:r>
+              <a:rPr lang="en-US" smtClean="0">
+                <a:sym typeface="Wingdings" panose="05000000000000000000" pitchFamily="2" charset="2"/>
+              </a:rPr>
+              <a:t>).</a:t>
+            </a:r>
+          </a:p>
+          <a:p>
+            <a:pPr marL="881063" lvl="2" indent="-342900">
+              <a:buFontTx/>
+              <a:buChar char="-"/>
+            </a:pPr>
+            <a:r>
+              <a:rPr lang="en-US" smtClean="0">
+                <a:sym typeface="Wingdings" panose="05000000000000000000" pitchFamily="2" charset="2"/>
+              </a:rPr>
+              <a:t>Projekt rechtsklicken -&gt; "Settings -&gt; General"</a:t>
+            </a:r>
+          </a:p>
+          <a:p>
+            <a:pPr marL="1060450" lvl="3" indent="-342900">
+              <a:buFontTx/>
+              <a:buChar char="-"/>
+            </a:pPr>
+            <a:r>
+              <a:rPr lang="en-US" smtClean="0">
+                <a:sym typeface="Wingdings" panose="05000000000000000000" pitchFamily="2" charset="2"/>
+              </a:rPr>
+              <a:t>"Executable to Run/Debug" = $(ProjectPath)/main.exe</a:t>
+            </a:r>
+          </a:p>
+          <a:p>
+            <a:pPr marL="1060450" lvl="3" indent="-342900">
+              <a:buFontTx/>
+              <a:buChar char="-"/>
+            </a:pPr>
+            <a:r>
+              <a:rPr lang="en-US" smtClean="0">
+                <a:sym typeface="Wingdings" panose="05000000000000000000" pitchFamily="2" charset="2"/>
+              </a:rPr>
+              <a:t>"Working Directory" = $(ProjectPath)</a:t>
+            </a:r>
+            <a:endParaRPr lang="en-US" smtClean="0">
+              <a:sym typeface="Wingdings" panose="05000000000000000000" pitchFamily="2" charset="2"/>
+            </a:endParaRPr>
           </a:p>
           <a:p>
             <a:pPr marL="692150" lvl="1" indent="-342900">

</xml_diff>

<commit_message>
Add evaluation questions for Block 2
</commit_message>
<xml_diff>
--- a/2017/recap_and_warmup_slides.pptx
+++ b/2017/recap_and_warmup_slides.pptx
@@ -5,10 +5,10 @@
     <p:sldMasterId id="2147483650" r:id="rId1"/>
   </p:sldMasterIdLst>
   <p:notesMasterIdLst>
-    <p:notesMasterId r:id="rId26"/>
+    <p:notesMasterId r:id="rId27"/>
   </p:notesMasterIdLst>
   <p:handoutMasterIdLst>
-    <p:handoutMasterId r:id="rId27"/>
+    <p:handoutMasterId r:id="rId28"/>
   </p:handoutMasterIdLst>
   <p:sldIdLst>
     <p:sldId id="454" r:id="rId2"/>
@@ -35,6 +35,7 @@
     <p:sldId id="486" r:id="rId23"/>
     <p:sldId id="495" r:id="rId24"/>
     <p:sldId id="496" r:id="rId25"/>
+    <p:sldId id="497" r:id="rId26"/>
   </p:sldIdLst>
   <p:sldSz cx="9144000" cy="6858000" type="screen4x3"/>
   <p:notesSz cx="7099300" cy="10234613"/>
@@ -232,6 +233,7 @@
             <p14:sldId id="486"/>
             <p14:sldId id="495"/>
             <p14:sldId id="496"/>
+            <p14:sldId id="497"/>
           </p14:sldIdLst>
         </p14:section>
       </p14:sectionLst>
@@ -5083,6 +5085,826 @@
 </p:notes>
 </file>
 
+<file path=ppt/notesSlides/notesSlide7.xml><?xml version="1.0" encoding="utf-8"?>
+<p:notes xmlns:a="http://schemas.openxmlformats.org/drawingml/2006/main" xmlns:r="http://schemas.openxmlformats.org/officeDocument/2006/relationships" xmlns:p="http://schemas.openxmlformats.org/presentationml/2006/main">
+  <p:cSld>
+    <p:spTree>
+      <p:nvGrpSpPr>
+        <p:cNvPr id="1" name=""/>
+        <p:cNvGrpSpPr/>
+        <p:nvPr/>
+      </p:nvGrpSpPr>
+      <p:grpSpPr>
+        <a:xfrm>
+          <a:off x="0" y="0"/>
+          <a:ext cx="0" cy="0"/>
+          <a:chOff x="0" y="0"/>
+          <a:chExt cx="0" cy="0"/>
+        </a:xfrm>
+      </p:grpSpPr>
+      <p:sp>
+        <p:nvSpPr>
+          <p:cNvPr id="53250" name="Folienbildplatzhalter 1"/>
+          <p:cNvSpPr>
+            <a:spLocks noGrp="1" noRot="1" noChangeAspect="1" noTextEdit="1"/>
+          </p:cNvSpPr>
+          <p:nvPr>
+            <p:ph type="sldImg"/>
+          </p:nvPr>
+        </p:nvSpPr>
+        <p:spPr>
+          <a:ln/>
+        </p:spPr>
+      </p:sp>
+      <p:sp>
+        <p:nvSpPr>
+          <p:cNvPr id="53251" name="Notizenplatzhalter 2"/>
+          <p:cNvSpPr>
+            <a:spLocks noGrp="1"/>
+          </p:cNvSpPr>
+          <p:nvPr>
+            <p:ph type="body" idx="1"/>
+          </p:nvPr>
+        </p:nvSpPr>
+        <p:spPr>
+          <a:noFill/>
+          <a:extLst>
+            <a:ext uri="{909E8E84-426E-40DD-AFC4-6F175D3DCCD1}">
+              <a14:hiddenFill xmlns:a14="http://schemas.microsoft.com/office/drawing/2010/main">
+                <a:solidFill>
+                  <a:srgbClr val="FFFFFF"/>
+                </a:solidFill>
+              </a14:hiddenFill>
+            </a:ext>
+            <a:ext uri="{91240B29-F687-4F45-9708-019B960494DF}">
+              <a14:hiddenLine xmlns:a14="http://schemas.microsoft.com/office/drawing/2010/main" w="9525">
+                <a:solidFill>
+                  <a:srgbClr val="000000"/>
+                </a:solidFill>
+                <a:miter lim="800000"/>
+                <a:headEnd/>
+                <a:tailEnd/>
+              </a14:hiddenLine>
+            </a:ext>
+          </a:extLst>
+        </p:spPr>
+        <p:txBody>
+          <a:bodyPr/>
+          <a:lstStyle/>
+          <a:p>
+            <a:pPr marL="0" indent="0">
+              <a:buFontTx/>
+              <a:buNone/>
+            </a:pPr>
+            <a:endParaRPr lang="de-DE" altLang="de-DE" b="1" i="0" dirty="0" smtClean="0">
+              <a:latin typeface="Times New Roman" pitchFamily="16" charset="0"/>
+            </a:endParaRPr>
+          </a:p>
+        </p:txBody>
+      </p:sp>
+      <p:sp>
+        <p:nvSpPr>
+          <p:cNvPr id="53252" name="Datumsplatzhalter 3"/>
+          <p:cNvSpPr>
+            <a:spLocks noGrp="1"/>
+          </p:cNvSpPr>
+          <p:nvPr>
+            <p:ph type="dt" sz="quarter"/>
+          </p:nvPr>
+        </p:nvSpPr>
+        <p:spPr>
+          <a:noFill/>
+          <a:extLst>
+            <a:ext uri="{909E8E84-426E-40DD-AFC4-6F175D3DCCD1}">
+              <a14:hiddenFill xmlns:a14="http://schemas.microsoft.com/office/drawing/2010/main">
+                <a:solidFill>
+                  <a:srgbClr val="FFFFFF"/>
+                </a:solidFill>
+              </a14:hiddenFill>
+            </a:ext>
+            <a:ext uri="{91240B29-F687-4F45-9708-019B960494DF}">
+              <a14:hiddenLine xmlns:a14="http://schemas.microsoft.com/office/drawing/2010/main" w="9525">
+                <a:solidFill>
+                  <a:srgbClr val="000000"/>
+                </a:solidFill>
+                <a:miter lim="800000"/>
+                <a:headEnd/>
+                <a:tailEnd/>
+              </a14:hiddenLine>
+            </a:ext>
+          </a:extLst>
+        </p:spPr>
+        <p:txBody>
+          <a:bodyPr/>
+          <a:lstStyle>
+            <a:lvl1pPr defTabSz="463550" eaLnBrk="0" hangingPunct="0">
+              <a:tabLst>
+                <a:tab pos="746125" algn="l"/>
+                <a:tab pos="1492250" algn="l"/>
+              </a:tabLst>
+              <a:defRPr>
+                <a:solidFill>
+                  <a:schemeClr val="tx1"/>
+                </a:solidFill>
+                <a:latin typeface="Arial" charset="0"/>
+                <a:ea typeface="Lucida Sans Unicode" pitchFamily="34" charset="0"/>
+                <a:cs typeface="Lucida Sans Unicode" pitchFamily="34" charset="0"/>
+              </a:defRPr>
+            </a:lvl1pPr>
+            <a:lvl2pPr marL="742950" indent="-285750" defTabSz="463550" eaLnBrk="0" hangingPunct="0">
+              <a:tabLst>
+                <a:tab pos="746125" algn="l"/>
+                <a:tab pos="1492250" algn="l"/>
+              </a:tabLst>
+              <a:defRPr>
+                <a:solidFill>
+                  <a:schemeClr val="tx1"/>
+                </a:solidFill>
+                <a:latin typeface="Arial" charset="0"/>
+                <a:ea typeface="Lucida Sans Unicode" pitchFamily="34" charset="0"/>
+                <a:cs typeface="Lucida Sans Unicode" pitchFamily="34" charset="0"/>
+              </a:defRPr>
+            </a:lvl2pPr>
+            <a:lvl3pPr marL="1143000" indent="-228600" defTabSz="463550" eaLnBrk="0" hangingPunct="0">
+              <a:tabLst>
+                <a:tab pos="746125" algn="l"/>
+                <a:tab pos="1492250" algn="l"/>
+              </a:tabLst>
+              <a:defRPr>
+                <a:solidFill>
+                  <a:schemeClr val="tx1"/>
+                </a:solidFill>
+                <a:latin typeface="Arial" charset="0"/>
+                <a:ea typeface="Lucida Sans Unicode" pitchFamily="34" charset="0"/>
+                <a:cs typeface="Lucida Sans Unicode" pitchFamily="34" charset="0"/>
+              </a:defRPr>
+            </a:lvl3pPr>
+            <a:lvl4pPr marL="1600200" indent="-228600" defTabSz="463550" eaLnBrk="0" hangingPunct="0">
+              <a:tabLst>
+                <a:tab pos="746125" algn="l"/>
+                <a:tab pos="1492250" algn="l"/>
+              </a:tabLst>
+              <a:defRPr>
+                <a:solidFill>
+                  <a:schemeClr val="tx1"/>
+                </a:solidFill>
+                <a:latin typeface="Arial" charset="0"/>
+                <a:ea typeface="Lucida Sans Unicode" pitchFamily="34" charset="0"/>
+                <a:cs typeface="Lucida Sans Unicode" pitchFamily="34" charset="0"/>
+              </a:defRPr>
+            </a:lvl4pPr>
+            <a:lvl5pPr marL="2057400" indent="-228600" defTabSz="463550" eaLnBrk="0" hangingPunct="0">
+              <a:tabLst>
+                <a:tab pos="746125" algn="l"/>
+                <a:tab pos="1492250" algn="l"/>
+              </a:tabLst>
+              <a:defRPr>
+                <a:solidFill>
+                  <a:schemeClr val="tx1"/>
+                </a:solidFill>
+                <a:latin typeface="Arial" charset="0"/>
+                <a:ea typeface="Lucida Sans Unicode" pitchFamily="34" charset="0"/>
+                <a:cs typeface="Lucida Sans Unicode" pitchFamily="34" charset="0"/>
+              </a:defRPr>
+            </a:lvl5pPr>
+            <a:lvl6pPr marL="2514600" indent="-228600" algn="ctr" defTabSz="463550" eaLnBrk="0" fontAlgn="base" hangingPunct="0">
+              <a:lnSpc>
+                <a:spcPct val="93000"/>
+              </a:lnSpc>
+              <a:spcBef>
+                <a:spcPct val="0"/>
+              </a:spcBef>
+              <a:spcAft>
+                <a:spcPct val="0"/>
+              </a:spcAft>
+              <a:buClr>
+                <a:srgbClr val="000000"/>
+              </a:buClr>
+              <a:buSzPct val="100000"/>
+              <a:buFont typeface="Arial" charset="0"/>
+              <a:tabLst>
+                <a:tab pos="746125" algn="l"/>
+                <a:tab pos="1492250" algn="l"/>
+              </a:tabLst>
+              <a:defRPr>
+                <a:solidFill>
+                  <a:schemeClr val="tx1"/>
+                </a:solidFill>
+                <a:latin typeface="Arial" charset="0"/>
+                <a:ea typeface="Lucida Sans Unicode" pitchFamily="34" charset="0"/>
+                <a:cs typeface="Lucida Sans Unicode" pitchFamily="34" charset="0"/>
+              </a:defRPr>
+            </a:lvl6pPr>
+            <a:lvl7pPr marL="2971800" indent="-228600" algn="ctr" defTabSz="463550" eaLnBrk="0" fontAlgn="base" hangingPunct="0">
+              <a:lnSpc>
+                <a:spcPct val="93000"/>
+              </a:lnSpc>
+              <a:spcBef>
+                <a:spcPct val="0"/>
+              </a:spcBef>
+              <a:spcAft>
+                <a:spcPct val="0"/>
+              </a:spcAft>
+              <a:buClr>
+                <a:srgbClr val="000000"/>
+              </a:buClr>
+              <a:buSzPct val="100000"/>
+              <a:buFont typeface="Arial" charset="0"/>
+              <a:tabLst>
+                <a:tab pos="746125" algn="l"/>
+                <a:tab pos="1492250" algn="l"/>
+              </a:tabLst>
+              <a:defRPr>
+                <a:solidFill>
+                  <a:schemeClr val="tx1"/>
+                </a:solidFill>
+                <a:latin typeface="Arial" charset="0"/>
+                <a:ea typeface="Lucida Sans Unicode" pitchFamily="34" charset="0"/>
+                <a:cs typeface="Lucida Sans Unicode" pitchFamily="34" charset="0"/>
+              </a:defRPr>
+            </a:lvl7pPr>
+            <a:lvl8pPr marL="3429000" indent="-228600" algn="ctr" defTabSz="463550" eaLnBrk="0" fontAlgn="base" hangingPunct="0">
+              <a:lnSpc>
+                <a:spcPct val="93000"/>
+              </a:lnSpc>
+              <a:spcBef>
+                <a:spcPct val="0"/>
+              </a:spcBef>
+              <a:spcAft>
+                <a:spcPct val="0"/>
+              </a:spcAft>
+              <a:buClr>
+                <a:srgbClr val="000000"/>
+              </a:buClr>
+              <a:buSzPct val="100000"/>
+              <a:buFont typeface="Arial" charset="0"/>
+              <a:tabLst>
+                <a:tab pos="746125" algn="l"/>
+                <a:tab pos="1492250" algn="l"/>
+              </a:tabLst>
+              <a:defRPr>
+                <a:solidFill>
+                  <a:schemeClr val="tx1"/>
+                </a:solidFill>
+                <a:latin typeface="Arial" charset="0"/>
+                <a:ea typeface="Lucida Sans Unicode" pitchFamily="34" charset="0"/>
+                <a:cs typeface="Lucida Sans Unicode" pitchFamily="34" charset="0"/>
+              </a:defRPr>
+            </a:lvl8pPr>
+            <a:lvl9pPr marL="3886200" indent="-228600" algn="ctr" defTabSz="463550" eaLnBrk="0" fontAlgn="base" hangingPunct="0">
+              <a:lnSpc>
+                <a:spcPct val="93000"/>
+              </a:lnSpc>
+              <a:spcBef>
+                <a:spcPct val="0"/>
+              </a:spcBef>
+              <a:spcAft>
+                <a:spcPct val="0"/>
+              </a:spcAft>
+              <a:buClr>
+                <a:srgbClr val="000000"/>
+              </a:buClr>
+              <a:buSzPct val="100000"/>
+              <a:buFont typeface="Arial" charset="0"/>
+              <a:tabLst>
+                <a:tab pos="746125" algn="l"/>
+                <a:tab pos="1492250" algn="l"/>
+              </a:tabLst>
+              <a:defRPr>
+                <a:solidFill>
+                  <a:schemeClr val="tx1"/>
+                </a:solidFill>
+                <a:latin typeface="Arial" charset="0"/>
+                <a:ea typeface="Lucida Sans Unicode" pitchFamily="34" charset="0"/>
+                <a:cs typeface="Lucida Sans Unicode" pitchFamily="34" charset="0"/>
+              </a:defRPr>
+            </a:lvl9pPr>
+          </a:lstStyle>
+          <a:p>
+            <a:pPr eaLnBrk="1" hangingPunct="1"/>
+            <a:r>
+              <a:rPr lang="en-US" altLang="de-DE" smtClean="0">
+                <a:solidFill>
+                  <a:srgbClr val="000000"/>
+                </a:solidFill>
+                <a:latin typeface="Stafford" pitchFamily="2" charset="0"/>
+              </a:rPr>
+              <a:t>November 19, 2007</a:t>
+            </a:r>
+          </a:p>
+        </p:txBody>
+      </p:sp>
+      <p:sp>
+        <p:nvSpPr>
+          <p:cNvPr id="53253" name="Fußzeilenplatzhalter 4"/>
+          <p:cNvSpPr>
+            <a:spLocks noGrp="1"/>
+          </p:cNvSpPr>
+          <p:nvPr>
+            <p:ph type="ftr" sz="quarter"/>
+          </p:nvPr>
+        </p:nvSpPr>
+        <p:spPr>
+          <a:noFill/>
+          <a:extLst>
+            <a:ext uri="{909E8E84-426E-40DD-AFC4-6F175D3DCCD1}">
+              <a14:hiddenFill xmlns:a14="http://schemas.microsoft.com/office/drawing/2010/main">
+                <a:solidFill>
+                  <a:srgbClr val="FFFFFF"/>
+                </a:solidFill>
+              </a14:hiddenFill>
+            </a:ext>
+            <a:ext uri="{91240B29-F687-4F45-9708-019B960494DF}">
+              <a14:hiddenLine xmlns:a14="http://schemas.microsoft.com/office/drawing/2010/main" w="9525">
+                <a:solidFill>
+                  <a:srgbClr val="000000"/>
+                </a:solidFill>
+                <a:miter lim="800000"/>
+                <a:headEnd/>
+                <a:tailEnd/>
+              </a14:hiddenLine>
+            </a:ext>
+          </a:extLst>
+        </p:spPr>
+        <p:txBody>
+          <a:bodyPr/>
+          <a:lstStyle>
+            <a:lvl1pPr defTabSz="463550" eaLnBrk="0" hangingPunct="0">
+              <a:tabLst>
+                <a:tab pos="746125" algn="l"/>
+                <a:tab pos="1492250" algn="l"/>
+                <a:tab pos="2238375" algn="l"/>
+                <a:tab pos="2986088" algn="l"/>
+                <a:tab pos="3732213" algn="l"/>
+              </a:tabLst>
+              <a:defRPr>
+                <a:solidFill>
+                  <a:schemeClr val="tx1"/>
+                </a:solidFill>
+                <a:latin typeface="Arial" charset="0"/>
+                <a:ea typeface="Lucida Sans Unicode" pitchFamily="34" charset="0"/>
+                <a:cs typeface="Lucida Sans Unicode" pitchFamily="34" charset="0"/>
+              </a:defRPr>
+            </a:lvl1pPr>
+            <a:lvl2pPr marL="742950" indent="-285750" defTabSz="463550" eaLnBrk="0" hangingPunct="0">
+              <a:tabLst>
+                <a:tab pos="746125" algn="l"/>
+                <a:tab pos="1492250" algn="l"/>
+                <a:tab pos="2238375" algn="l"/>
+                <a:tab pos="2986088" algn="l"/>
+                <a:tab pos="3732213" algn="l"/>
+              </a:tabLst>
+              <a:defRPr>
+                <a:solidFill>
+                  <a:schemeClr val="tx1"/>
+                </a:solidFill>
+                <a:latin typeface="Arial" charset="0"/>
+                <a:ea typeface="Lucida Sans Unicode" pitchFamily="34" charset="0"/>
+                <a:cs typeface="Lucida Sans Unicode" pitchFamily="34" charset="0"/>
+              </a:defRPr>
+            </a:lvl2pPr>
+            <a:lvl3pPr marL="1143000" indent="-228600" defTabSz="463550" eaLnBrk="0" hangingPunct="0">
+              <a:tabLst>
+                <a:tab pos="746125" algn="l"/>
+                <a:tab pos="1492250" algn="l"/>
+                <a:tab pos="2238375" algn="l"/>
+                <a:tab pos="2986088" algn="l"/>
+                <a:tab pos="3732213" algn="l"/>
+              </a:tabLst>
+              <a:defRPr>
+                <a:solidFill>
+                  <a:schemeClr val="tx1"/>
+                </a:solidFill>
+                <a:latin typeface="Arial" charset="0"/>
+                <a:ea typeface="Lucida Sans Unicode" pitchFamily="34" charset="0"/>
+                <a:cs typeface="Lucida Sans Unicode" pitchFamily="34" charset="0"/>
+              </a:defRPr>
+            </a:lvl3pPr>
+            <a:lvl4pPr marL="1600200" indent="-228600" defTabSz="463550" eaLnBrk="0" hangingPunct="0">
+              <a:tabLst>
+                <a:tab pos="746125" algn="l"/>
+                <a:tab pos="1492250" algn="l"/>
+                <a:tab pos="2238375" algn="l"/>
+                <a:tab pos="2986088" algn="l"/>
+                <a:tab pos="3732213" algn="l"/>
+              </a:tabLst>
+              <a:defRPr>
+                <a:solidFill>
+                  <a:schemeClr val="tx1"/>
+                </a:solidFill>
+                <a:latin typeface="Arial" charset="0"/>
+                <a:ea typeface="Lucida Sans Unicode" pitchFamily="34" charset="0"/>
+                <a:cs typeface="Lucida Sans Unicode" pitchFamily="34" charset="0"/>
+              </a:defRPr>
+            </a:lvl4pPr>
+            <a:lvl5pPr marL="2057400" indent="-228600" defTabSz="463550" eaLnBrk="0" hangingPunct="0">
+              <a:tabLst>
+                <a:tab pos="746125" algn="l"/>
+                <a:tab pos="1492250" algn="l"/>
+                <a:tab pos="2238375" algn="l"/>
+                <a:tab pos="2986088" algn="l"/>
+                <a:tab pos="3732213" algn="l"/>
+              </a:tabLst>
+              <a:defRPr>
+                <a:solidFill>
+                  <a:schemeClr val="tx1"/>
+                </a:solidFill>
+                <a:latin typeface="Arial" charset="0"/>
+                <a:ea typeface="Lucida Sans Unicode" pitchFamily="34" charset="0"/>
+                <a:cs typeface="Lucida Sans Unicode" pitchFamily="34" charset="0"/>
+              </a:defRPr>
+            </a:lvl5pPr>
+            <a:lvl6pPr marL="2514600" indent="-228600" algn="ctr" defTabSz="463550" eaLnBrk="0" fontAlgn="base" hangingPunct="0">
+              <a:lnSpc>
+                <a:spcPct val="93000"/>
+              </a:lnSpc>
+              <a:spcBef>
+                <a:spcPct val="0"/>
+              </a:spcBef>
+              <a:spcAft>
+                <a:spcPct val="0"/>
+              </a:spcAft>
+              <a:buClr>
+                <a:srgbClr val="000000"/>
+              </a:buClr>
+              <a:buSzPct val="100000"/>
+              <a:buFont typeface="Arial" charset="0"/>
+              <a:tabLst>
+                <a:tab pos="746125" algn="l"/>
+                <a:tab pos="1492250" algn="l"/>
+                <a:tab pos="2238375" algn="l"/>
+                <a:tab pos="2986088" algn="l"/>
+                <a:tab pos="3732213" algn="l"/>
+              </a:tabLst>
+              <a:defRPr>
+                <a:solidFill>
+                  <a:schemeClr val="tx1"/>
+                </a:solidFill>
+                <a:latin typeface="Arial" charset="0"/>
+                <a:ea typeface="Lucida Sans Unicode" pitchFamily="34" charset="0"/>
+                <a:cs typeface="Lucida Sans Unicode" pitchFamily="34" charset="0"/>
+              </a:defRPr>
+            </a:lvl6pPr>
+            <a:lvl7pPr marL="2971800" indent="-228600" algn="ctr" defTabSz="463550" eaLnBrk="0" fontAlgn="base" hangingPunct="0">
+              <a:lnSpc>
+                <a:spcPct val="93000"/>
+              </a:lnSpc>
+              <a:spcBef>
+                <a:spcPct val="0"/>
+              </a:spcBef>
+              <a:spcAft>
+                <a:spcPct val="0"/>
+              </a:spcAft>
+              <a:buClr>
+                <a:srgbClr val="000000"/>
+              </a:buClr>
+              <a:buSzPct val="100000"/>
+              <a:buFont typeface="Arial" charset="0"/>
+              <a:tabLst>
+                <a:tab pos="746125" algn="l"/>
+                <a:tab pos="1492250" algn="l"/>
+                <a:tab pos="2238375" algn="l"/>
+                <a:tab pos="2986088" algn="l"/>
+                <a:tab pos="3732213" algn="l"/>
+              </a:tabLst>
+              <a:defRPr>
+                <a:solidFill>
+                  <a:schemeClr val="tx1"/>
+                </a:solidFill>
+                <a:latin typeface="Arial" charset="0"/>
+                <a:ea typeface="Lucida Sans Unicode" pitchFamily="34" charset="0"/>
+                <a:cs typeface="Lucida Sans Unicode" pitchFamily="34" charset="0"/>
+              </a:defRPr>
+            </a:lvl7pPr>
+            <a:lvl8pPr marL="3429000" indent="-228600" algn="ctr" defTabSz="463550" eaLnBrk="0" fontAlgn="base" hangingPunct="0">
+              <a:lnSpc>
+                <a:spcPct val="93000"/>
+              </a:lnSpc>
+              <a:spcBef>
+                <a:spcPct val="0"/>
+              </a:spcBef>
+              <a:spcAft>
+                <a:spcPct val="0"/>
+              </a:spcAft>
+              <a:buClr>
+                <a:srgbClr val="000000"/>
+              </a:buClr>
+              <a:buSzPct val="100000"/>
+              <a:buFont typeface="Arial" charset="0"/>
+              <a:tabLst>
+                <a:tab pos="746125" algn="l"/>
+                <a:tab pos="1492250" algn="l"/>
+                <a:tab pos="2238375" algn="l"/>
+                <a:tab pos="2986088" algn="l"/>
+                <a:tab pos="3732213" algn="l"/>
+              </a:tabLst>
+              <a:defRPr>
+                <a:solidFill>
+                  <a:schemeClr val="tx1"/>
+                </a:solidFill>
+                <a:latin typeface="Arial" charset="0"/>
+                <a:ea typeface="Lucida Sans Unicode" pitchFamily="34" charset="0"/>
+                <a:cs typeface="Lucida Sans Unicode" pitchFamily="34" charset="0"/>
+              </a:defRPr>
+            </a:lvl8pPr>
+            <a:lvl9pPr marL="3886200" indent="-228600" algn="ctr" defTabSz="463550" eaLnBrk="0" fontAlgn="base" hangingPunct="0">
+              <a:lnSpc>
+                <a:spcPct val="93000"/>
+              </a:lnSpc>
+              <a:spcBef>
+                <a:spcPct val="0"/>
+              </a:spcBef>
+              <a:spcAft>
+                <a:spcPct val="0"/>
+              </a:spcAft>
+              <a:buClr>
+                <a:srgbClr val="000000"/>
+              </a:buClr>
+              <a:buSzPct val="100000"/>
+              <a:buFont typeface="Arial" charset="0"/>
+              <a:tabLst>
+                <a:tab pos="746125" algn="l"/>
+                <a:tab pos="1492250" algn="l"/>
+                <a:tab pos="2238375" algn="l"/>
+                <a:tab pos="2986088" algn="l"/>
+                <a:tab pos="3732213" algn="l"/>
+              </a:tabLst>
+              <a:defRPr>
+                <a:solidFill>
+                  <a:schemeClr val="tx1"/>
+                </a:solidFill>
+                <a:latin typeface="Arial" charset="0"/>
+                <a:ea typeface="Lucida Sans Unicode" pitchFamily="34" charset="0"/>
+                <a:cs typeface="Lucida Sans Unicode" pitchFamily="34" charset="0"/>
+              </a:defRPr>
+            </a:lvl9pPr>
+          </a:lstStyle>
+          <a:p>
+            <a:pPr eaLnBrk="1" hangingPunct="1"/>
+            <a:r>
+              <a:rPr lang="en-US" altLang="de-DE" smtClean="0">
+                <a:solidFill>
+                  <a:srgbClr val="000000"/>
+                </a:solidFill>
+                <a:latin typeface="Stafford" pitchFamily="2" charset="0"/>
+              </a:rPr>
+              <a:t>|  </a:t>
+            </a:r>
+          </a:p>
+        </p:txBody>
+      </p:sp>
+      <p:sp>
+        <p:nvSpPr>
+          <p:cNvPr id="53254" name="Foliennummernplatzhalter 5"/>
+          <p:cNvSpPr>
+            <a:spLocks noGrp="1"/>
+          </p:cNvSpPr>
+          <p:nvPr>
+            <p:ph type="sldNum" sz="quarter"/>
+          </p:nvPr>
+        </p:nvSpPr>
+        <p:spPr>
+          <a:noFill/>
+          <a:extLst>
+            <a:ext uri="{909E8E84-426E-40DD-AFC4-6F175D3DCCD1}">
+              <a14:hiddenFill xmlns:a14="http://schemas.microsoft.com/office/drawing/2010/main">
+                <a:solidFill>
+                  <a:srgbClr val="FFFFFF"/>
+                </a:solidFill>
+              </a14:hiddenFill>
+            </a:ext>
+            <a:ext uri="{91240B29-F687-4F45-9708-019B960494DF}">
+              <a14:hiddenLine xmlns:a14="http://schemas.microsoft.com/office/drawing/2010/main" w="9525">
+                <a:solidFill>
+                  <a:srgbClr val="000000"/>
+                </a:solidFill>
+                <a:miter lim="800000"/>
+                <a:headEnd/>
+                <a:tailEnd/>
+              </a14:hiddenLine>
+            </a:ext>
+          </a:extLst>
+        </p:spPr>
+        <p:txBody>
+          <a:bodyPr/>
+          <a:lstStyle>
+            <a:lvl1pPr defTabSz="463550" eaLnBrk="0" hangingPunct="0">
+              <a:tabLst>
+                <a:tab pos="746125" algn="l"/>
+              </a:tabLst>
+              <a:defRPr>
+                <a:solidFill>
+                  <a:schemeClr val="tx1"/>
+                </a:solidFill>
+                <a:latin typeface="Arial" charset="0"/>
+                <a:ea typeface="Lucida Sans Unicode" pitchFamily="34" charset="0"/>
+                <a:cs typeface="Lucida Sans Unicode" pitchFamily="34" charset="0"/>
+              </a:defRPr>
+            </a:lvl1pPr>
+            <a:lvl2pPr marL="742950" indent="-285750" defTabSz="463550" eaLnBrk="0" hangingPunct="0">
+              <a:tabLst>
+                <a:tab pos="746125" algn="l"/>
+              </a:tabLst>
+              <a:defRPr>
+                <a:solidFill>
+                  <a:schemeClr val="tx1"/>
+                </a:solidFill>
+                <a:latin typeface="Arial" charset="0"/>
+                <a:ea typeface="Lucida Sans Unicode" pitchFamily="34" charset="0"/>
+                <a:cs typeface="Lucida Sans Unicode" pitchFamily="34" charset="0"/>
+              </a:defRPr>
+            </a:lvl2pPr>
+            <a:lvl3pPr marL="1143000" indent="-228600" defTabSz="463550" eaLnBrk="0" hangingPunct="0">
+              <a:tabLst>
+                <a:tab pos="746125" algn="l"/>
+              </a:tabLst>
+              <a:defRPr>
+                <a:solidFill>
+                  <a:schemeClr val="tx1"/>
+                </a:solidFill>
+                <a:latin typeface="Arial" charset="0"/>
+                <a:ea typeface="Lucida Sans Unicode" pitchFamily="34" charset="0"/>
+                <a:cs typeface="Lucida Sans Unicode" pitchFamily="34" charset="0"/>
+              </a:defRPr>
+            </a:lvl3pPr>
+            <a:lvl4pPr marL="1600200" indent="-228600" defTabSz="463550" eaLnBrk="0" hangingPunct="0">
+              <a:tabLst>
+                <a:tab pos="746125" algn="l"/>
+              </a:tabLst>
+              <a:defRPr>
+                <a:solidFill>
+                  <a:schemeClr val="tx1"/>
+                </a:solidFill>
+                <a:latin typeface="Arial" charset="0"/>
+                <a:ea typeface="Lucida Sans Unicode" pitchFamily="34" charset="0"/>
+                <a:cs typeface="Lucida Sans Unicode" pitchFamily="34" charset="0"/>
+              </a:defRPr>
+            </a:lvl4pPr>
+            <a:lvl5pPr marL="2057400" indent="-228600" defTabSz="463550" eaLnBrk="0" hangingPunct="0">
+              <a:tabLst>
+                <a:tab pos="746125" algn="l"/>
+              </a:tabLst>
+              <a:defRPr>
+                <a:solidFill>
+                  <a:schemeClr val="tx1"/>
+                </a:solidFill>
+                <a:latin typeface="Arial" charset="0"/>
+                <a:ea typeface="Lucida Sans Unicode" pitchFamily="34" charset="0"/>
+                <a:cs typeface="Lucida Sans Unicode" pitchFamily="34" charset="0"/>
+              </a:defRPr>
+            </a:lvl5pPr>
+            <a:lvl6pPr marL="2514600" indent="-228600" algn="ctr" defTabSz="463550" eaLnBrk="0" fontAlgn="base" hangingPunct="0">
+              <a:lnSpc>
+                <a:spcPct val="93000"/>
+              </a:lnSpc>
+              <a:spcBef>
+                <a:spcPct val="0"/>
+              </a:spcBef>
+              <a:spcAft>
+                <a:spcPct val="0"/>
+              </a:spcAft>
+              <a:buClr>
+                <a:srgbClr val="000000"/>
+              </a:buClr>
+              <a:buSzPct val="100000"/>
+              <a:buFont typeface="Arial" charset="0"/>
+              <a:tabLst>
+                <a:tab pos="746125" algn="l"/>
+              </a:tabLst>
+              <a:defRPr>
+                <a:solidFill>
+                  <a:schemeClr val="tx1"/>
+                </a:solidFill>
+                <a:latin typeface="Arial" charset="0"/>
+                <a:ea typeface="Lucida Sans Unicode" pitchFamily="34" charset="0"/>
+                <a:cs typeface="Lucida Sans Unicode" pitchFamily="34" charset="0"/>
+              </a:defRPr>
+            </a:lvl6pPr>
+            <a:lvl7pPr marL="2971800" indent="-228600" algn="ctr" defTabSz="463550" eaLnBrk="0" fontAlgn="base" hangingPunct="0">
+              <a:lnSpc>
+                <a:spcPct val="93000"/>
+              </a:lnSpc>
+              <a:spcBef>
+                <a:spcPct val="0"/>
+              </a:spcBef>
+              <a:spcAft>
+                <a:spcPct val="0"/>
+              </a:spcAft>
+              <a:buClr>
+                <a:srgbClr val="000000"/>
+              </a:buClr>
+              <a:buSzPct val="100000"/>
+              <a:buFont typeface="Arial" charset="0"/>
+              <a:tabLst>
+                <a:tab pos="746125" algn="l"/>
+              </a:tabLst>
+              <a:defRPr>
+                <a:solidFill>
+                  <a:schemeClr val="tx1"/>
+                </a:solidFill>
+                <a:latin typeface="Arial" charset="0"/>
+                <a:ea typeface="Lucida Sans Unicode" pitchFamily="34" charset="0"/>
+                <a:cs typeface="Lucida Sans Unicode" pitchFamily="34" charset="0"/>
+              </a:defRPr>
+            </a:lvl7pPr>
+            <a:lvl8pPr marL="3429000" indent="-228600" algn="ctr" defTabSz="463550" eaLnBrk="0" fontAlgn="base" hangingPunct="0">
+              <a:lnSpc>
+                <a:spcPct val="93000"/>
+              </a:lnSpc>
+              <a:spcBef>
+                <a:spcPct val="0"/>
+              </a:spcBef>
+              <a:spcAft>
+                <a:spcPct val="0"/>
+              </a:spcAft>
+              <a:buClr>
+                <a:srgbClr val="000000"/>
+              </a:buClr>
+              <a:buSzPct val="100000"/>
+              <a:buFont typeface="Arial" charset="0"/>
+              <a:tabLst>
+                <a:tab pos="746125" algn="l"/>
+              </a:tabLst>
+              <a:defRPr>
+                <a:solidFill>
+                  <a:schemeClr val="tx1"/>
+                </a:solidFill>
+                <a:latin typeface="Arial" charset="0"/>
+                <a:ea typeface="Lucida Sans Unicode" pitchFamily="34" charset="0"/>
+                <a:cs typeface="Lucida Sans Unicode" pitchFamily="34" charset="0"/>
+              </a:defRPr>
+            </a:lvl8pPr>
+            <a:lvl9pPr marL="3886200" indent="-228600" algn="ctr" defTabSz="463550" eaLnBrk="0" fontAlgn="base" hangingPunct="0">
+              <a:lnSpc>
+                <a:spcPct val="93000"/>
+              </a:lnSpc>
+              <a:spcBef>
+                <a:spcPct val="0"/>
+              </a:spcBef>
+              <a:spcAft>
+                <a:spcPct val="0"/>
+              </a:spcAft>
+              <a:buClr>
+                <a:srgbClr val="000000"/>
+              </a:buClr>
+              <a:buSzPct val="100000"/>
+              <a:buFont typeface="Arial" charset="0"/>
+              <a:tabLst>
+                <a:tab pos="746125" algn="l"/>
+              </a:tabLst>
+              <a:defRPr>
+                <a:solidFill>
+                  <a:schemeClr val="tx1"/>
+                </a:solidFill>
+                <a:latin typeface="Arial" charset="0"/>
+                <a:ea typeface="Lucida Sans Unicode" pitchFamily="34" charset="0"/>
+                <a:cs typeface="Lucida Sans Unicode" pitchFamily="34" charset="0"/>
+              </a:defRPr>
+            </a:lvl9pPr>
+          </a:lstStyle>
+          <a:p>
+            <a:pPr eaLnBrk="1" hangingPunct="1"/>
+            <a:r>
+              <a:rPr lang="en-US" altLang="de-DE" smtClean="0">
+                <a:solidFill>
+                  <a:srgbClr val="000000"/>
+                </a:solidFill>
+                <a:latin typeface="Stafford" pitchFamily="2" charset="0"/>
+              </a:rPr>
+              <a:t>|  </a:t>
+            </a:r>
+            <a:fld id="{6775A062-1A8A-4084-8B81-E33BA407A859}" type="slidenum">
+              <a:rPr lang="en-US" altLang="de-DE" smtClean="0">
+                <a:solidFill>
+                  <a:srgbClr val="000000"/>
+                </a:solidFill>
+                <a:latin typeface="Stafford" pitchFamily="2" charset="0"/>
+              </a:rPr>
+              <a:pPr eaLnBrk="1" hangingPunct="1"/>
+              <a:t>25</a:t>
+            </a:fld>
+            <a:endParaRPr lang="en-US" altLang="de-DE" smtClean="0">
+              <a:solidFill>
+                <a:srgbClr val="000000"/>
+              </a:solidFill>
+              <a:latin typeface="Stafford" pitchFamily="2" charset="0"/>
+            </a:endParaRPr>
+          </a:p>
+        </p:txBody>
+      </p:sp>
+    </p:spTree>
+    <p:extLst>
+      <p:ext uri="{BB962C8B-B14F-4D97-AF65-F5344CB8AC3E}">
+        <p14:creationId xmlns:p14="http://schemas.microsoft.com/office/powerpoint/2010/main" val="2746815142"/>
+      </p:ext>
+    </p:extLst>
+  </p:cSld>
+  <p:clrMapOvr>
+    <a:masterClrMapping/>
+  </p:clrMapOvr>
+</p:notes>
+</file>
+
 <file path=ppt/slideLayouts/slideLayout1.xml><?xml version="1.0" encoding="utf-8"?>
 <p:sldLayout xmlns:a="http://schemas.openxmlformats.org/drawingml/2006/main" xmlns:r="http://schemas.openxmlformats.org/officeDocument/2006/relationships" xmlns:p="http://schemas.openxmlformats.org/presentationml/2006/main" showMasterSp="0" type="title" preserve="1">
   <p:cSld name="Titelfolie">
@@ -9529,7 +10351,7 @@
           <a:graphicData uri="http://schemas.openxmlformats.org/presentationml/2006/ole">
             <mc:AlternateContent xmlns:mc="http://schemas.openxmlformats.org/markup-compatibility/2006">
               <mc:Choice xmlns:v="urn:schemas-microsoft-com:vml" Requires="v">
-                <p:oleObj spid="_x0000_s2028" r:id="rId16" imgW="1038370" imgH="980952" progId="">
+                <p:oleObj spid="_x0000_s2031" r:id="rId16" imgW="1038370" imgH="980952" progId="">
                   <p:embed/>
                 </p:oleObj>
               </mc:Choice>
@@ -9967,7 +10789,7 @@
                 </a:lnSpc>
                 <a:defRPr/>
               </a:pPr>
-              <a:t>20.09.2017</a:t>
+              <a:t>21.09.2017</a:t>
             </a:fld>
             <a:r>
               <a:rPr lang="en-GB" altLang="de-DE" sz="1000" smtClean="0">
@@ -16301,13 +17123,7 @@
               <a:rPr lang="en-US" smtClean="0">
                 <a:sym typeface="Wingdings" panose="05000000000000000000" pitchFamily="2" charset="2"/>
               </a:rPr>
-              <a:t> ändern (oder alle Ziele mit dem Präfix "build/" versehen</a:t>
-            </a:r>
-            <a:r>
-              <a:rPr lang="en-US" smtClean="0">
-                <a:sym typeface="Wingdings" panose="05000000000000000000" pitchFamily="2" charset="2"/>
-              </a:rPr>
-              <a:t>).</a:t>
+              <a:t> ändern (oder alle Ziele mit dem Präfix "build/" versehen).</a:t>
             </a:r>
           </a:p>
           <a:p>
@@ -16345,9 +17161,6 @@
               </a:rPr>
               <a:t>"Working Directory" = $(ProjectPath)</a:t>
             </a:r>
-            <a:endParaRPr lang="en-US" smtClean="0">
-              <a:sym typeface="Wingdings" panose="05000000000000000000" pitchFamily="2" charset="2"/>
-            </a:endParaRPr>
           </a:p>
           <a:p>
             <a:pPr marL="692150" lvl="1" indent="-342900">
@@ -16378,6 +17191,12 @@
               </a:rPr>
               <a:t>: Um das Nullbyte zu überschreiben, muss man auf </a:t>
             </a:r>
+          </a:p>
+          <a:p>
+            <a:pPr marL="881063" lvl="2" indent="-342900">
+              <a:buFontTx/>
+              <a:buChar char="-"/>
+            </a:pPr>
             <a:r>
               <a:rPr lang="en-US" b="1" smtClean="0">
                 <a:sym typeface="Wingdings" panose="05000000000000000000" pitchFamily="2" charset="2"/>
@@ -16390,6 +17209,12 @@
               </a:rPr>
               <a:t> oder </a:t>
             </a:r>
+          </a:p>
+          <a:p>
+            <a:pPr marL="881063" lvl="2" indent="-342900">
+              <a:buFontTx/>
+              <a:buChar char="-"/>
+            </a:pPr>
             <a:r>
               <a:rPr lang="en-US" b="1" smtClean="0">
                 <a:sym typeface="Wingdings" panose="05000000000000000000" pitchFamily="2" charset="2"/>
@@ -16416,6 +17241,197 @@
   <p:clrMapOvr>
     <a:masterClrMapping/>
   </p:clrMapOvr>
+  <p:timing>
+    <p:tnLst>
+      <p:par>
+        <p:cTn id="1" dur="indefinite" restart="never" nodeType="tmRoot"/>
+      </p:par>
+    </p:tnLst>
+  </p:timing>
+</p:sld>
+</file>
+
+<file path=ppt/slides/slide25.xml><?xml version="1.0" encoding="utf-8"?>
+<p:sld xmlns:a="http://schemas.openxmlformats.org/drawingml/2006/main" xmlns:r="http://schemas.openxmlformats.org/officeDocument/2006/relationships" xmlns:p="http://schemas.openxmlformats.org/presentationml/2006/main">
+  <p:cSld>
+    <p:spTree>
+      <p:nvGrpSpPr>
+        <p:cNvPr id="1" name=""/>
+        <p:cNvGrpSpPr/>
+        <p:nvPr/>
+      </p:nvGrpSpPr>
+      <p:grpSpPr>
+        <a:xfrm>
+          <a:off x="0" y="0"/>
+          <a:ext cx="0" cy="0"/>
+          <a:chOff x="0" y="0"/>
+          <a:chExt cx="0" cy="0"/>
+        </a:xfrm>
+      </p:grpSpPr>
+      <p:sp>
+        <p:nvSpPr>
+          <p:cNvPr id="15362" name="Titel 1"/>
+          <p:cNvSpPr>
+            <a:spLocks noGrp="1"/>
+          </p:cNvSpPr>
+          <p:nvPr>
+            <p:ph type="title"/>
+          </p:nvPr>
+        </p:nvSpPr>
+        <p:spPr/>
+        <p:txBody>
+          <a:bodyPr/>
+          <a:lstStyle/>
+          <a:p>
+            <a:r>
+              <a:rPr lang="de-DE" altLang="de-DE" smtClean="0"/>
+              <a:t>Tag 6: Evaluationsfragen</a:t>
+            </a:r>
+            <a:endParaRPr lang="de-DE" altLang="de-DE" dirty="0" smtClean="0"/>
+          </a:p>
+        </p:txBody>
+      </p:sp>
+      <p:sp>
+        <p:nvSpPr>
+          <p:cNvPr id="2" name="Inhaltsplatzhalter 1"/>
+          <p:cNvSpPr>
+            <a:spLocks noGrp="1"/>
+          </p:cNvSpPr>
+          <p:nvPr>
+            <p:ph idx="1"/>
+          </p:nvPr>
+        </p:nvSpPr>
+        <p:spPr/>
+        <p:txBody>
+          <a:bodyPr/>
+          <a:lstStyle/>
+          <a:p>
+            <a:r>
+              <a:rPr lang="en-US" b="1" smtClean="0"/>
+              <a:t>Versuchsgerät = Entwicklungsumgebung + Microcontrollerboards</a:t>
+            </a:r>
+          </a:p>
+          <a:p>
+            <a:endParaRPr lang="en-US" b="1"/>
+          </a:p>
+          <a:p>
+            <a:r>
+              <a:rPr lang="en-US" b="1" smtClean="0"/>
+              <a:t>Praktikumsgruppe = 1 für Block 1; 2 für Block 2</a:t>
+            </a:r>
+          </a:p>
+          <a:p>
+            <a:endParaRPr lang="en-US" b="1"/>
+          </a:p>
+          <a:p>
+            <a:r>
+              <a:rPr lang="en-US" b="1" smtClean="0"/>
+              <a:t>Fragen für die Evaluation</a:t>
+            </a:r>
+          </a:p>
+          <a:p>
+            <a:pPr marL="523875" lvl="1" indent="-342900">
+              <a:buFont typeface="+mj-lt"/>
+              <a:buAutoNum type="arabicPeriod"/>
+            </a:pPr>
+            <a:r>
+              <a:rPr lang="en-US" smtClean="0"/>
+              <a:t>Stärkeren Fokus auf C++(11) legen (= weniger Fokus auf C)?</a:t>
+            </a:r>
+          </a:p>
+          <a:p>
+            <a:pPr lvl="2"/>
+            <a:r>
+              <a:rPr lang="en-US" smtClean="0"/>
+              <a:t>"trifft zu" = mehr C++</a:t>
+            </a:r>
+          </a:p>
+          <a:p>
+            <a:pPr lvl="2"/>
+            <a:r>
+              <a:rPr lang="en-US" smtClean="0"/>
+              <a:t>"Mitte" = gleich lassen</a:t>
+            </a:r>
+          </a:p>
+          <a:p>
+            <a:pPr lvl="2"/>
+            <a:r>
+              <a:rPr lang="en-US" smtClean="0"/>
+              <a:t>"trifft nicht zu" = mehr C</a:t>
+            </a:r>
+          </a:p>
+          <a:p>
+            <a:pPr marL="523875" lvl="1" indent="-342900">
+              <a:buFont typeface="+mj-lt"/>
+              <a:buAutoNum type="arabicPeriod"/>
+            </a:pPr>
+            <a:r>
+              <a:rPr lang="en-US" smtClean="0"/>
+              <a:t>Ich hatte vorher keine C++-Kenntnisse</a:t>
+            </a:r>
+          </a:p>
+          <a:p>
+            <a:pPr lvl="2">
+              <a:tabLst>
+                <a:tab pos="2155825" algn="l"/>
+              </a:tabLst>
+            </a:pPr>
+            <a:r>
+              <a:rPr lang="en-US" smtClean="0"/>
+              <a:t>"trifft zu" 	= Keine Vorkenntnisse</a:t>
+            </a:r>
+          </a:p>
+          <a:p>
+            <a:pPr lvl="2">
+              <a:tabLst>
+                <a:tab pos="2155825" algn="l"/>
+              </a:tabLst>
+            </a:pPr>
+            <a:r>
+              <a:rPr lang="en-US" smtClean="0"/>
+              <a:t>"Mitte"	= Eigene kleinere Projekte</a:t>
+            </a:r>
+          </a:p>
+          <a:p>
+            <a:pPr lvl="2">
+              <a:tabLst>
+                <a:tab pos="2155825" algn="l"/>
+              </a:tabLst>
+            </a:pPr>
+            <a:r>
+              <a:rPr lang="en-US" smtClean="0"/>
+              <a:t>"trifft nicht zu" 	= Sehr erfahrener C++-Programmierer</a:t>
+            </a:r>
+          </a:p>
+          <a:p>
+            <a:pPr marL="350838" lvl="2" indent="0">
+              <a:buNone/>
+              <a:tabLst>
+                <a:tab pos="2155825" algn="l"/>
+              </a:tabLst>
+            </a:pPr>
+            <a:endParaRPr lang="en-US"/>
+          </a:p>
+        </p:txBody>
+      </p:sp>
+    </p:spTree>
+    <p:extLst>
+      <p:ext uri="{BB962C8B-B14F-4D97-AF65-F5344CB8AC3E}">
+        <p14:creationId xmlns:p14="http://schemas.microsoft.com/office/powerpoint/2010/main" val="433139748"/>
+      </p:ext>
+    </p:extLst>
+  </p:cSld>
+  <p:clrMapOvr>
+    <a:masterClrMapping/>
+  </p:clrMapOvr>
+  <mc:AlternateContent xmlns:mc="http://schemas.openxmlformats.org/markup-compatibility/2006" xmlns:p14="http://schemas.microsoft.com/office/powerpoint/2010/main">
+    <mc:Choice Requires="p14">
+      <p:transition spd="slow" p14:dur="2000"/>
+    </mc:Choice>
+    <mc:Fallback xmlns="">
+      <p:transition spd="slow"/>
+    </mc:Fallback>
+  </mc:AlternateContent>
   <p:timing>
     <p:tnLst>
       <p:par>

</xml_diff>